<commit_message>
Starting Issue 634 [Update DevMan: {Review repo, Release repo} --> {Contributor repo, Committer repo}] Update Issue 634
</commit_message>
<xml_diff>
--- a/doc/diagrams/workflow.pptx
+++ b/doc/diagrams/workflow.pptx
@@ -10,7 +10,7 @@
   <p:sldIdLst>
     <p:sldId id="256" r:id="rId2"/>
   </p:sldIdLst>
-  <p:sldSz cx="8640763" cy="5761038"/>
+  <p:sldSz cx="9144000" cy="5761038"/>
   <p:notesSz cx="6858000" cy="9144000"/>
   <p:defaultTextStyle>
     <a:defPPr>
@@ -193,7 +193,7 @@
             <a:fld id="{DC50A2AC-D691-437C-A69B-81ECFE08AD4B}" type="datetimeFigureOut">
               <a:rPr lang="en-SG" smtClean="0"/>
               <a:pPr/>
-              <a:t>28/7/2012</a:t>
+              <a:t>9/2/2013</a:t>
             </a:fld>
             <a:endParaRPr lang="en-SG"/>
           </a:p>
@@ -211,8 +211,8 @@
         </p:nvSpPr>
         <p:spPr>
           <a:xfrm>
-            <a:off x="858838" y="685800"/>
-            <a:ext cx="5140325" cy="3429000"/>
+            <a:off x="708025" y="685800"/>
+            <a:ext cx="5441950" cy="3429000"/>
           </a:xfrm>
           <a:prstGeom prst="rect">
             <a:avLst/>
@@ -362,7 +362,7 @@
     </p:spTree>
     <p:extLst>
       <p:ext uri="{BB962C8B-B14F-4D97-AF65-F5344CB8AC3E}">
-        <p14:creationId xmlns:p14="http://schemas.microsoft.com/office/powerpoint/2010/main" xmlns="" val="2265103329"/>
+        <p14:creationId xmlns:p14="http://schemas.microsoft.com/office/powerpoint/2010/main" val="2265103329"/>
       </p:ext>
     </p:extLst>
   </p:cSld>
@@ -491,8 +491,8 @@
         </p:nvSpPr>
         <p:spPr>
           <a:xfrm>
-            <a:off x="858838" y="685800"/>
-            <a:ext cx="5140325" cy="3429000"/>
+            <a:off x="708025" y="685800"/>
+            <a:ext cx="5441950" cy="3429000"/>
           </a:xfrm>
         </p:spPr>
       </p:sp>
@@ -542,7 +542,7 @@
     </p:spTree>
     <p:extLst>
       <p:ext uri="{BB962C8B-B14F-4D97-AF65-F5344CB8AC3E}">
-        <p14:creationId xmlns:p14="http://schemas.microsoft.com/office/powerpoint/2010/main" xmlns="" val="1558229004"/>
+        <p14:creationId xmlns:p14="http://schemas.microsoft.com/office/powerpoint/2010/main" val="1558229004"/>
       </p:ext>
     </p:extLst>
   </p:cSld>
@@ -581,8 +581,8 @@
         </p:nvSpPr>
         <p:spPr>
           <a:xfrm>
-            <a:off x="648057" y="1789656"/>
-            <a:ext cx="7344649" cy="1234890"/>
+            <a:off x="685802" y="1789656"/>
+            <a:ext cx="7772400" cy="1234890"/>
           </a:xfrm>
         </p:spPr>
         <p:txBody>
@@ -609,8 +609,8 @@
         </p:nvSpPr>
         <p:spPr>
           <a:xfrm>
-            <a:off x="1296115" y="3264588"/>
-            <a:ext cx="6048534" cy="1472266"/>
+            <a:off x="1371601" y="3264588"/>
+            <a:ext cx="6400800" cy="1472266"/>
           </a:xfrm>
         </p:spPr>
         <p:txBody>
@@ -734,7 +734,7 @@
             <a:fld id="{1D8BD707-D9CF-40AE-B4C6-C98DA3205C09}" type="datetimeFigureOut">
               <a:rPr lang="en-US" smtClean="0"/>
               <a:pPr/>
-              <a:t>7/28/2012</a:t>
+              <a:t>2/9/2013</a:t>
             </a:fld>
             <a:endParaRPr lang="en-US"/>
           </a:p>
@@ -901,7 +901,7 @@
             <a:fld id="{1D8BD707-D9CF-40AE-B4C6-C98DA3205C09}" type="datetimeFigureOut">
               <a:rPr lang="en-US" smtClean="0"/>
               <a:pPr/>
-              <a:t>7/28/2012</a:t>
+              <a:t>2/9/2013</a:t>
             </a:fld>
             <a:endParaRPr lang="en-US"/>
           </a:p>
@@ -987,8 +987,8 @@
         </p:nvSpPr>
         <p:spPr>
           <a:xfrm>
-            <a:off x="6264553" y="230710"/>
-            <a:ext cx="1944172" cy="4915552"/>
+            <a:off x="6629401" y="230710"/>
+            <a:ext cx="2057400" cy="4915552"/>
           </a:xfrm>
         </p:spPr>
         <p:txBody>
@@ -1015,8 +1015,8 @@
         </p:nvSpPr>
         <p:spPr>
           <a:xfrm>
-            <a:off x="432039" y="230710"/>
-            <a:ext cx="5688502" cy="4915552"/>
+            <a:off x="457201" y="230710"/>
+            <a:ext cx="6019800" cy="4915552"/>
           </a:xfrm>
         </p:spPr>
         <p:txBody>
@@ -1078,7 +1078,7 @@
             <a:fld id="{1D8BD707-D9CF-40AE-B4C6-C98DA3205C09}" type="datetimeFigureOut">
               <a:rPr lang="en-US" smtClean="0"/>
               <a:pPr/>
-              <a:t>7/28/2012</a:t>
+              <a:t>2/9/2013</a:t>
             </a:fld>
             <a:endParaRPr lang="en-US"/>
           </a:p>
@@ -1245,7 +1245,7 @@
             <a:fld id="{1D8BD707-D9CF-40AE-B4C6-C98DA3205C09}" type="datetimeFigureOut">
               <a:rPr lang="en-US" smtClean="0"/>
               <a:pPr/>
-              <a:t>7/28/2012</a:t>
+              <a:t>2/9/2013</a:t>
             </a:fld>
             <a:endParaRPr lang="en-US"/>
           </a:p>
@@ -1331,8 +1331,8 @@
         </p:nvSpPr>
         <p:spPr>
           <a:xfrm>
-            <a:off x="682561" y="3702001"/>
-            <a:ext cx="7344649" cy="1144206"/>
+            <a:off x="722314" y="3702001"/>
+            <a:ext cx="7772400" cy="1144206"/>
           </a:xfrm>
         </p:spPr>
         <p:txBody>
@@ -1363,8 +1363,8 @@
         </p:nvSpPr>
         <p:spPr>
           <a:xfrm>
-            <a:off x="682561" y="2441774"/>
-            <a:ext cx="7344649" cy="1260227"/>
+            <a:off x="722314" y="2441774"/>
+            <a:ext cx="7772400" cy="1260227"/>
           </a:xfrm>
         </p:spPr>
         <p:txBody>
@@ -1488,7 +1488,7 @@
             <a:fld id="{1D8BD707-D9CF-40AE-B4C6-C98DA3205C09}" type="datetimeFigureOut">
               <a:rPr lang="en-US" smtClean="0"/>
               <a:pPr/>
-              <a:t>7/28/2012</a:t>
+              <a:t>2/9/2013</a:t>
             </a:fld>
             <a:endParaRPr lang="en-US"/>
           </a:p>
@@ -1597,8 +1597,8 @@
         </p:nvSpPr>
         <p:spPr>
           <a:xfrm>
-            <a:off x="432039" y="1344242"/>
-            <a:ext cx="3816337" cy="3802019"/>
+            <a:off x="457202" y="1344242"/>
+            <a:ext cx="4038600" cy="3802019"/>
           </a:xfrm>
         </p:spPr>
         <p:txBody>
@@ -1682,8 +1682,8 @@
         </p:nvSpPr>
         <p:spPr>
           <a:xfrm>
-            <a:off x="4392388" y="1344242"/>
-            <a:ext cx="3816337" cy="3802019"/>
+            <a:off x="4648201" y="1344242"/>
+            <a:ext cx="4038600" cy="3802019"/>
           </a:xfrm>
         </p:spPr>
         <p:txBody>
@@ -1773,7 +1773,7 @@
             <a:fld id="{1D8BD707-D9CF-40AE-B4C6-C98DA3205C09}" type="datetimeFigureOut">
               <a:rPr lang="en-US" smtClean="0"/>
               <a:pPr/>
-              <a:t>7/28/2012</a:t>
+              <a:t>2/9/2013</a:t>
             </a:fld>
             <a:endParaRPr lang="en-US"/>
           </a:p>
@@ -1886,8 +1886,8 @@
         </p:nvSpPr>
         <p:spPr>
           <a:xfrm>
-            <a:off x="432039" y="1289566"/>
-            <a:ext cx="3817838" cy="537430"/>
+            <a:off x="457201" y="1289566"/>
+            <a:ext cx="4040189" cy="537430"/>
           </a:xfrm>
         </p:spPr>
         <p:txBody>
@@ -1951,8 +1951,8 @@
         </p:nvSpPr>
         <p:spPr>
           <a:xfrm>
-            <a:off x="432039" y="1826997"/>
-            <a:ext cx="3817838" cy="3319265"/>
+            <a:off x="457201" y="1826997"/>
+            <a:ext cx="4040189" cy="3319265"/>
           </a:xfrm>
         </p:spPr>
         <p:txBody>
@@ -2036,8 +2036,8 @@
         </p:nvSpPr>
         <p:spPr>
           <a:xfrm>
-            <a:off x="4389389" y="1289566"/>
-            <a:ext cx="3819337" cy="537430"/>
+            <a:off x="4645028" y="1289566"/>
+            <a:ext cx="4041774" cy="537430"/>
           </a:xfrm>
         </p:spPr>
         <p:txBody>
@@ -2101,8 +2101,8 @@
         </p:nvSpPr>
         <p:spPr>
           <a:xfrm>
-            <a:off x="4389389" y="1826997"/>
-            <a:ext cx="3819337" cy="3319265"/>
+            <a:off x="4645028" y="1826997"/>
+            <a:ext cx="4041774" cy="3319265"/>
           </a:xfrm>
         </p:spPr>
         <p:txBody>
@@ -2192,7 +2192,7 @@
             <a:fld id="{1D8BD707-D9CF-40AE-B4C6-C98DA3205C09}" type="datetimeFigureOut">
               <a:rPr lang="en-US" smtClean="0"/>
               <a:pPr/>
-              <a:t>7/28/2012</a:t>
+              <a:t>2/9/2013</a:t>
             </a:fld>
             <a:endParaRPr lang="en-US"/>
           </a:p>
@@ -2307,7 +2307,7 @@
             <a:fld id="{1D8BD707-D9CF-40AE-B4C6-C98DA3205C09}" type="datetimeFigureOut">
               <a:rPr lang="en-US" smtClean="0"/>
               <a:pPr/>
-              <a:t>7/28/2012</a:t>
+              <a:t>2/9/2013</a:t>
             </a:fld>
             <a:endParaRPr lang="en-US"/>
           </a:p>
@@ -2399,7 +2399,7 @@
             <a:fld id="{1D8BD707-D9CF-40AE-B4C6-C98DA3205C09}" type="datetimeFigureOut">
               <a:rPr lang="en-US" smtClean="0"/>
               <a:pPr/>
-              <a:t>7/28/2012</a:t>
+              <a:t>2/9/2013</a:t>
             </a:fld>
             <a:endParaRPr lang="en-US"/>
           </a:p>
@@ -2485,8 +2485,8 @@
         </p:nvSpPr>
         <p:spPr>
           <a:xfrm>
-            <a:off x="432039" y="229375"/>
-            <a:ext cx="2842752" cy="976176"/>
+            <a:off x="457201" y="229375"/>
+            <a:ext cx="3008314" cy="976176"/>
           </a:xfrm>
         </p:spPr>
         <p:txBody>
@@ -2517,8 +2517,8 @@
         </p:nvSpPr>
         <p:spPr>
           <a:xfrm>
-            <a:off x="3378298" y="229375"/>
-            <a:ext cx="4830427" cy="4916886"/>
+            <a:off x="3575051" y="229375"/>
+            <a:ext cx="5111751" cy="4916886"/>
           </a:xfrm>
         </p:spPr>
         <p:txBody>
@@ -2602,8 +2602,8 @@
         </p:nvSpPr>
         <p:spPr>
           <a:xfrm>
-            <a:off x="432039" y="1205551"/>
-            <a:ext cx="2842752" cy="3940710"/>
+            <a:off x="457201" y="1205551"/>
+            <a:ext cx="3008314" cy="3940710"/>
           </a:xfrm>
         </p:spPr>
         <p:txBody>
@@ -2673,7 +2673,7 @@
             <a:fld id="{1D8BD707-D9CF-40AE-B4C6-C98DA3205C09}" type="datetimeFigureOut">
               <a:rPr lang="en-US" smtClean="0"/>
               <a:pPr/>
-              <a:t>7/28/2012</a:t>
+              <a:t>2/9/2013</a:t>
             </a:fld>
             <a:endParaRPr lang="en-US"/>
           </a:p>
@@ -2759,8 +2759,8 @@
         </p:nvSpPr>
         <p:spPr>
           <a:xfrm>
-            <a:off x="1693650" y="4032727"/>
-            <a:ext cx="5184458" cy="476086"/>
+            <a:off x="1792288" y="4032727"/>
+            <a:ext cx="5486400" cy="476086"/>
           </a:xfrm>
         </p:spPr>
         <p:txBody>
@@ -2791,8 +2791,8 @@
         </p:nvSpPr>
         <p:spPr>
           <a:xfrm>
-            <a:off x="1693650" y="514760"/>
-            <a:ext cx="5184458" cy="3456623"/>
+            <a:off x="1792288" y="514762"/>
+            <a:ext cx="5486400" cy="3456623"/>
           </a:xfrm>
         </p:spPr>
         <p:txBody>
@@ -2852,8 +2852,8 @@
         </p:nvSpPr>
         <p:spPr>
           <a:xfrm>
-            <a:off x="1693650" y="4508813"/>
-            <a:ext cx="5184458" cy="676121"/>
+            <a:off x="1792288" y="4508815"/>
+            <a:ext cx="5486400" cy="676121"/>
           </a:xfrm>
         </p:spPr>
         <p:txBody>
@@ -2923,7 +2923,7 @@
             <a:fld id="{1D8BD707-D9CF-40AE-B4C6-C98DA3205C09}" type="datetimeFigureOut">
               <a:rPr lang="en-US" smtClean="0"/>
               <a:pPr/>
-              <a:t>7/28/2012</a:t>
+              <a:t>2/9/2013</a:t>
             </a:fld>
             <a:endParaRPr lang="en-US"/>
           </a:p>
@@ -3014,8 +3014,8 @@
         </p:nvSpPr>
         <p:spPr>
           <a:xfrm>
-            <a:off x="432038" y="230709"/>
-            <a:ext cx="7776687" cy="960173"/>
+            <a:off x="457202" y="230709"/>
+            <a:ext cx="8229600" cy="960173"/>
           </a:xfrm>
           <a:prstGeom prst="rect">
             <a:avLst/>
@@ -3047,8 +3047,8 @@
         </p:nvSpPr>
         <p:spPr>
           <a:xfrm>
-            <a:off x="432038" y="1344242"/>
-            <a:ext cx="7776687" cy="3802019"/>
+            <a:off x="457202" y="1344242"/>
+            <a:ext cx="8229600" cy="3802019"/>
           </a:xfrm>
           <a:prstGeom prst="rect">
             <a:avLst/>
@@ -3109,8 +3109,8 @@
         </p:nvSpPr>
         <p:spPr>
           <a:xfrm>
-            <a:off x="432039" y="5339630"/>
-            <a:ext cx="2016178" cy="306722"/>
+            <a:off x="457201" y="5339630"/>
+            <a:ext cx="2133600" cy="306722"/>
           </a:xfrm>
           <a:prstGeom prst="rect">
             <a:avLst/>
@@ -3133,7 +3133,7 @@
             <a:fld id="{1D8BD707-D9CF-40AE-B4C6-C98DA3205C09}" type="datetimeFigureOut">
               <a:rPr lang="en-US" smtClean="0"/>
               <a:pPr/>
-              <a:t>7/28/2012</a:t>
+              <a:t>2/9/2013</a:t>
             </a:fld>
             <a:endParaRPr lang="en-US"/>
           </a:p>
@@ -3151,8 +3151,8 @@
         </p:nvSpPr>
         <p:spPr>
           <a:xfrm>
-            <a:off x="2952262" y="5339630"/>
-            <a:ext cx="2736242" cy="306722"/>
+            <a:off x="3124202" y="5339630"/>
+            <a:ext cx="2895600" cy="306722"/>
           </a:xfrm>
           <a:prstGeom prst="rect">
             <a:avLst/>
@@ -3188,8 +3188,8 @@
         </p:nvSpPr>
         <p:spPr>
           <a:xfrm>
-            <a:off x="6192548" y="5339630"/>
-            <a:ext cx="2016178" cy="306722"/>
+            <a:off x="6553201" y="5339630"/>
+            <a:ext cx="2133600" cy="306722"/>
           </a:xfrm>
           <a:prstGeom prst="rect">
             <a:avLst/>
@@ -3506,13 +3506,449 @@
       </p:grpSpPr>
       <p:sp>
         <p:nvSpPr>
-          <p:cNvPr id="173" name="Rounded Rectangle 172"/>
+          <p:cNvPr id="5" name="laptop"/>
+          <p:cNvSpPr>
+            <a:spLocks noEditPoints="1" noChangeArrowheads="1"/>
+          </p:cNvSpPr>
+          <p:nvPr/>
+        </p:nvSpPr>
+        <p:spPr bwMode="auto">
+          <a:xfrm>
+            <a:off x="457199" y="1053848"/>
+            <a:ext cx="1272365" cy="988472"/>
+          </a:xfrm>
+          <a:custGeom>
+            <a:avLst/>
+            <a:gdLst>
+              <a:gd name="T0" fmla="*/ 3362 w 21600"/>
+              <a:gd name="T1" fmla="*/ 0 h 21600"/>
+              <a:gd name="T2" fmla="*/ 3362 w 21600"/>
+              <a:gd name="T3" fmla="*/ 7173 h 21600"/>
+              <a:gd name="T4" fmla="*/ 18327 w 21600"/>
+              <a:gd name="T5" fmla="*/ 0 h 21600"/>
+              <a:gd name="T6" fmla="*/ 18327 w 21600"/>
+              <a:gd name="T7" fmla="*/ 7173 h 21600"/>
+              <a:gd name="T8" fmla="*/ 10800 w 21600"/>
+              <a:gd name="T9" fmla="*/ 0 h 21600"/>
+              <a:gd name="T10" fmla="*/ 10800 w 21600"/>
+              <a:gd name="T11" fmla="*/ 21600 h 21600"/>
+              <a:gd name="T12" fmla="*/ 0 w 21600"/>
+              <a:gd name="T13" fmla="*/ 21600 h 21600"/>
+              <a:gd name="T14" fmla="*/ 21600 w 21600"/>
+              <a:gd name="T15" fmla="*/ 21600 h 21600"/>
+              <a:gd name="T16" fmla="*/ 4445 w 21600"/>
+              <a:gd name="T17" fmla="*/ 1858 h 21600"/>
+              <a:gd name="T18" fmla="*/ 17311 w 21600"/>
+              <a:gd name="T19" fmla="*/ 12323 h 21600"/>
+            </a:gdLst>
+            <a:ahLst/>
+            <a:cxnLst>
+              <a:cxn ang="0">
+                <a:pos x="T0" y="T1"/>
+              </a:cxn>
+              <a:cxn ang="0">
+                <a:pos x="T2" y="T3"/>
+              </a:cxn>
+              <a:cxn ang="0">
+                <a:pos x="T4" y="T5"/>
+              </a:cxn>
+              <a:cxn ang="0">
+                <a:pos x="T6" y="T7"/>
+              </a:cxn>
+              <a:cxn ang="0">
+                <a:pos x="T8" y="T9"/>
+              </a:cxn>
+              <a:cxn ang="0">
+                <a:pos x="T10" y="T11"/>
+              </a:cxn>
+              <a:cxn ang="0">
+                <a:pos x="T12" y="T13"/>
+              </a:cxn>
+              <a:cxn ang="0">
+                <a:pos x="T14" y="T15"/>
+              </a:cxn>
+            </a:cxnLst>
+            <a:rect l="T16" t="T17" r="T18" b="T19"/>
+            <a:pathLst>
+              <a:path w="21600" h="21600" extrusionOk="0">
+                <a:moveTo>
+                  <a:pt x="3362" y="0"/>
+                </a:moveTo>
+                <a:lnTo>
+                  <a:pt x="18327" y="0"/>
+                </a:lnTo>
+                <a:lnTo>
+                  <a:pt x="18327" y="14347"/>
+                </a:lnTo>
+                <a:lnTo>
+                  <a:pt x="3362" y="14347"/>
+                </a:lnTo>
+                <a:lnTo>
+                  <a:pt x="3362" y="0"/>
+                </a:lnTo>
+                <a:close/>
+              </a:path>
+              <a:path w="21600" h="21600" extrusionOk="0">
+                <a:moveTo>
+                  <a:pt x="3340" y="15068"/>
+                </a:moveTo>
+                <a:lnTo>
+                  <a:pt x="0" y="19877"/>
+                </a:lnTo>
+                <a:lnTo>
+                  <a:pt x="21600" y="19877"/>
+                </a:lnTo>
+                <a:lnTo>
+                  <a:pt x="18327" y="15068"/>
+                </a:lnTo>
+                <a:lnTo>
+                  <a:pt x="3340" y="15068"/>
+                </a:lnTo>
+                <a:close/>
+              </a:path>
+              <a:path w="21600" h="21600" extrusionOk="0">
+                <a:moveTo>
+                  <a:pt x="0" y="19877"/>
+                </a:moveTo>
+                <a:lnTo>
+                  <a:pt x="0" y="21600"/>
+                </a:lnTo>
+                <a:lnTo>
+                  <a:pt x="21600" y="21600"/>
+                </a:lnTo>
+                <a:lnTo>
+                  <a:pt x="21600" y="19877"/>
+                </a:lnTo>
+                <a:lnTo>
+                  <a:pt x="0" y="19877"/>
+                </a:lnTo>
+                <a:close/>
+              </a:path>
+              <a:path w="21600" h="21600" extrusionOk="0">
+                <a:moveTo>
+                  <a:pt x="4186" y="1523"/>
+                </a:moveTo>
+                <a:lnTo>
+                  <a:pt x="17547" y="1523"/>
+                </a:lnTo>
+                <a:lnTo>
+                  <a:pt x="17547" y="12744"/>
+                </a:lnTo>
+                <a:lnTo>
+                  <a:pt x="4186" y="12744"/>
+                </a:lnTo>
+                <a:lnTo>
+                  <a:pt x="4186" y="1523"/>
+                </a:lnTo>
+                <a:close/>
+              </a:path>
+              <a:path w="21600" h="21600" extrusionOk="0">
+                <a:moveTo>
+                  <a:pt x="3318" y="15549"/>
+                </a:moveTo>
+                <a:lnTo>
+                  <a:pt x="2917" y="16110"/>
+                </a:lnTo>
+                <a:lnTo>
+                  <a:pt x="18727" y="16110"/>
+                </a:lnTo>
+                <a:lnTo>
+                  <a:pt x="18327" y="15549"/>
+                </a:lnTo>
+                <a:lnTo>
+                  <a:pt x="3318" y="15549"/>
+                </a:lnTo>
+                <a:close/>
+              </a:path>
+              <a:path w="21600" h="21600" extrusionOk="0">
+                <a:moveTo>
+                  <a:pt x="6213" y="18314"/>
+                </a:moveTo>
+                <a:lnTo>
+                  <a:pt x="5946" y="18875"/>
+                </a:lnTo>
+                <a:lnTo>
+                  <a:pt x="15766" y="18875"/>
+                </a:lnTo>
+                <a:lnTo>
+                  <a:pt x="15499" y="18314"/>
+                </a:lnTo>
+                <a:lnTo>
+                  <a:pt x="6213" y="18314"/>
+                </a:lnTo>
+                <a:close/>
+              </a:path>
+              <a:path w="21600" h="21600" extrusionOk="0">
+                <a:moveTo>
+                  <a:pt x="2828" y="16471"/>
+                </a:moveTo>
+                <a:lnTo>
+                  <a:pt x="2405" y="17072"/>
+                </a:lnTo>
+                <a:lnTo>
+                  <a:pt x="19284" y="17072"/>
+                </a:lnTo>
+                <a:lnTo>
+                  <a:pt x="18839" y="16471"/>
+                </a:lnTo>
+                <a:lnTo>
+                  <a:pt x="2828" y="16471"/>
+                </a:lnTo>
+                <a:close/>
+              </a:path>
+              <a:path w="21600" h="21600" extrusionOk="0">
+                <a:moveTo>
+                  <a:pt x="2316" y="17352"/>
+                </a:moveTo>
+                <a:lnTo>
+                  <a:pt x="1871" y="17953"/>
+                </a:lnTo>
+                <a:lnTo>
+                  <a:pt x="19863" y="17953"/>
+                </a:lnTo>
+                <a:lnTo>
+                  <a:pt x="19395" y="17352"/>
+                </a:lnTo>
+                <a:lnTo>
+                  <a:pt x="2316" y="17352"/>
+                </a:lnTo>
+                <a:close/>
+              </a:path>
+            </a:pathLst>
+          </a:custGeom>
+          <a:solidFill>
+            <a:schemeClr val="bg1"/>
+          </a:solidFill>
+          <a:ln w="38100">
+            <a:solidFill>
+              <a:schemeClr val="bg1">
+                <a:lumMod val="85000"/>
+              </a:schemeClr>
+            </a:solidFill>
+            <a:miter lim="800000"/>
+            <a:headEnd/>
+            <a:tailEnd/>
+          </a:ln>
+        </p:spPr>
+        <p:txBody>
+          <a:bodyPr vert="horz" wrap="square" lIns="91440" tIns="45720" rIns="91440" bIns="45720" numCol="1" anchor="t" anchorCtr="0" compatLnSpc="1">
+            <a:prstTxWarp prst="textNoShape">
+              <a:avLst/>
+            </a:prstTxWarp>
+          </a:bodyPr>
+          <a:lstStyle/>
+          <a:p>
+            <a:endParaRPr lang="en-US"/>
+          </a:p>
+        </p:txBody>
+      </p:sp>
+      <p:sp>
+        <p:nvSpPr>
+          <p:cNvPr id="80" name="Cloud 79"/>
           <p:cNvSpPr/>
           <p:nvPr/>
         </p:nvSpPr>
         <p:spPr>
           <a:xfrm>
-            <a:off x="3482181" y="3947319"/>
+            <a:off x="7941267" y="1350987"/>
+            <a:ext cx="1186265" cy="462732"/>
+          </a:xfrm>
+          <a:prstGeom prst="cloud">
+            <a:avLst/>
+          </a:prstGeom>
+          <a:solidFill>
+            <a:schemeClr val="bg1"/>
+          </a:solidFill>
+          <a:ln>
+            <a:solidFill>
+              <a:schemeClr val="bg1">
+                <a:lumMod val="85000"/>
+              </a:schemeClr>
+            </a:solidFill>
+          </a:ln>
+        </p:spPr>
+        <p:style>
+          <a:lnRef idx="2">
+            <a:schemeClr val="accent1">
+              <a:shade val="50000"/>
+            </a:schemeClr>
+          </a:lnRef>
+          <a:fillRef idx="1">
+            <a:schemeClr val="accent1"/>
+          </a:fillRef>
+          <a:effectRef idx="0">
+            <a:schemeClr val="accent1"/>
+          </a:effectRef>
+          <a:fontRef idx="minor">
+            <a:schemeClr val="lt1"/>
+          </a:fontRef>
+        </p:style>
+        <p:txBody>
+          <a:bodyPr lIns="0" rIns="0" bIns="0" rtlCol="0" anchor="ctr"/>
+          <a:lstStyle/>
+          <a:p>
+            <a:pPr algn="ctr"/>
+            <a:r>
+              <a:rPr lang="en-US" sz="1400" b="1" dirty="0" err="1">
+                <a:solidFill>
+                  <a:schemeClr val="bg1">
+                    <a:lumMod val="65000"/>
+                  </a:schemeClr>
+                </a:solidFill>
+              </a:rPr>
+              <a:t>Appspot</a:t>
+            </a:r>
+            <a:endParaRPr lang="en-US" sz="1400" b="1" dirty="0">
+              <a:solidFill>
+                <a:schemeClr val="bg1">
+                  <a:lumMod val="65000"/>
+                </a:schemeClr>
+              </a:solidFill>
+            </a:endParaRPr>
+          </a:p>
+        </p:txBody>
+      </p:sp>
+      <p:sp>
+        <p:nvSpPr>
+          <p:cNvPr id="81" name="Cloud 80"/>
+          <p:cNvSpPr/>
+          <p:nvPr/>
+        </p:nvSpPr>
+        <p:spPr>
+          <a:xfrm>
+            <a:off x="5476710" y="1432719"/>
+            <a:ext cx="1609890" cy="462732"/>
+          </a:xfrm>
+          <a:prstGeom prst="cloud">
+            <a:avLst/>
+          </a:prstGeom>
+          <a:solidFill>
+            <a:schemeClr val="bg1"/>
+          </a:solidFill>
+          <a:ln>
+            <a:solidFill>
+              <a:schemeClr val="bg1">
+                <a:lumMod val="85000"/>
+              </a:schemeClr>
+            </a:solidFill>
+          </a:ln>
+        </p:spPr>
+        <p:style>
+          <a:lnRef idx="2">
+            <a:schemeClr val="accent1">
+              <a:shade val="50000"/>
+            </a:schemeClr>
+          </a:lnRef>
+          <a:fillRef idx="1">
+            <a:schemeClr val="accent1"/>
+          </a:fillRef>
+          <a:effectRef idx="0">
+            <a:schemeClr val="accent1"/>
+          </a:effectRef>
+          <a:fontRef idx="minor">
+            <a:schemeClr val="lt1"/>
+          </a:fontRef>
+        </p:style>
+        <p:txBody>
+          <a:bodyPr lIns="0" rIns="0" bIns="0" rtlCol="0" anchor="ctr"/>
+          <a:lstStyle/>
+          <a:p>
+            <a:pPr algn="ctr"/>
+            <a:r>
+              <a:rPr lang="en-US" sz="1400" b="1" dirty="0" err="1" smtClean="0">
+                <a:solidFill>
+                  <a:schemeClr val="bg1">
+                    <a:lumMod val="65000"/>
+                  </a:schemeClr>
+                </a:solidFill>
+              </a:rPr>
+              <a:t>GoogleCode</a:t>
+            </a:r>
+            <a:endParaRPr lang="en-US" sz="1400" b="1" dirty="0">
+              <a:solidFill>
+                <a:schemeClr val="bg1">
+                  <a:lumMod val="65000"/>
+                </a:schemeClr>
+              </a:solidFill>
+            </a:endParaRPr>
+          </a:p>
+        </p:txBody>
+      </p:sp>
+      <p:sp>
+        <p:nvSpPr>
+          <p:cNvPr id="82" name="Cloud 81"/>
+          <p:cNvSpPr/>
+          <p:nvPr/>
+        </p:nvSpPr>
+        <p:spPr>
+          <a:xfrm>
+            <a:off x="2895600" y="1432719"/>
+            <a:ext cx="1609890" cy="462732"/>
+          </a:xfrm>
+          <a:prstGeom prst="cloud">
+            <a:avLst/>
+          </a:prstGeom>
+          <a:solidFill>
+            <a:schemeClr val="bg1"/>
+          </a:solidFill>
+          <a:ln>
+            <a:solidFill>
+              <a:schemeClr val="bg1">
+                <a:lumMod val="85000"/>
+              </a:schemeClr>
+            </a:solidFill>
+          </a:ln>
+        </p:spPr>
+        <p:style>
+          <a:lnRef idx="2">
+            <a:schemeClr val="accent1">
+              <a:shade val="50000"/>
+            </a:schemeClr>
+          </a:lnRef>
+          <a:fillRef idx="1">
+            <a:schemeClr val="accent1"/>
+          </a:fillRef>
+          <a:effectRef idx="0">
+            <a:schemeClr val="accent1"/>
+          </a:effectRef>
+          <a:fontRef idx="minor">
+            <a:schemeClr val="lt1"/>
+          </a:fontRef>
+        </p:style>
+        <p:txBody>
+          <a:bodyPr lIns="0" rIns="0" bIns="0" rtlCol="0" anchor="ctr"/>
+          <a:lstStyle/>
+          <a:p>
+            <a:pPr algn="ctr"/>
+            <a:r>
+              <a:rPr lang="en-US" sz="1400" b="1" dirty="0" err="1" smtClean="0">
+                <a:solidFill>
+                  <a:schemeClr val="bg1">
+                    <a:lumMod val="65000"/>
+                  </a:schemeClr>
+                </a:solidFill>
+              </a:rPr>
+              <a:t>GoogleCode</a:t>
+            </a:r>
+            <a:endParaRPr lang="en-US" sz="1400" b="1" dirty="0">
+              <a:solidFill>
+                <a:schemeClr val="bg1">
+                  <a:lumMod val="65000"/>
+                </a:schemeClr>
+              </a:solidFill>
+            </a:endParaRPr>
+          </a:p>
+        </p:txBody>
+      </p:sp>
+      <p:sp>
+        <p:nvSpPr>
+          <p:cNvPr id="83" name="Rounded Rectangle 82"/>
+          <p:cNvSpPr/>
+          <p:nvPr/>
+        </p:nvSpPr>
+        <p:spPr>
+          <a:xfrm>
+            <a:off x="3962400" y="3947319"/>
             <a:ext cx="5029200" cy="1737518"/>
           </a:xfrm>
           <a:prstGeom prst="roundRect">
@@ -3559,28 +3995,27 @@
       </p:sp>
       <p:sp>
         <p:nvSpPr>
-          <p:cNvPr id="58" name="Can 57"/>
+          <p:cNvPr id="84" name="Can 83"/>
           <p:cNvSpPr/>
           <p:nvPr/>
         </p:nvSpPr>
         <p:spPr>
           <a:xfrm>
-            <a:off x="2491581" y="826096"/>
-            <a:ext cx="1066800" cy="762000"/>
+            <a:off x="3200400" y="826096"/>
+            <a:ext cx="1184858" cy="762000"/>
           </a:xfrm>
           <a:prstGeom prst="can">
             <a:avLst/>
           </a:prstGeom>
           <a:solidFill>
-            <a:schemeClr val="bg1">
-              <a:lumMod val="65000"/>
+            <a:schemeClr val="accent2">
+              <a:lumMod val="60000"/>
+              <a:lumOff val="40000"/>
             </a:schemeClr>
           </a:solidFill>
           <a:ln>
             <a:solidFill>
-              <a:schemeClr val="bg1">
-                <a:lumMod val="65000"/>
-              </a:schemeClr>
+              <a:srgbClr val="D28280"/>
             </a:solidFill>
           </a:ln>
         </p:spPr>
@@ -3606,44 +4041,43 @@
           <a:p>
             <a:pPr algn="ctr"/>
             <a:r>
-              <a:rPr lang="en-US" sz="1600" b="1" dirty="0" smtClean="0"/>
-              <a:t>Review</a:t>
+              <a:rPr lang="en-US" sz="1600" b="1" dirty="0"/>
+              <a:t>Contributor</a:t>
             </a:r>
           </a:p>
           <a:p>
             <a:pPr algn="ctr"/>
             <a:r>
-              <a:rPr lang="en-US" sz="1600" dirty="0" smtClean="0"/>
+              <a:rPr lang="en-US" sz="1600" b="1" dirty="0"/>
               <a:t>Repo</a:t>
             </a:r>
-            <a:endParaRPr lang="en-US" sz="1600" dirty="0"/>
-          </a:p>
-        </p:txBody>
-      </p:sp>
-      <p:sp>
-        <p:nvSpPr>
-          <p:cNvPr id="59" name="Can 58"/>
+            <a:endParaRPr lang="en-US" sz="1600" b="1" dirty="0"/>
+          </a:p>
+        </p:txBody>
+      </p:sp>
+      <p:sp>
+        <p:nvSpPr>
+          <p:cNvPr id="85" name="Can 84"/>
           <p:cNvSpPr/>
           <p:nvPr/>
         </p:nvSpPr>
         <p:spPr>
           <a:xfrm>
-            <a:off x="4929981" y="826096"/>
-            <a:ext cx="1066800" cy="762000"/>
+            <a:off x="5853514" y="826096"/>
+            <a:ext cx="1107933" cy="762000"/>
           </a:xfrm>
           <a:prstGeom prst="can">
             <a:avLst/>
           </a:prstGeom>
           <a:solidFill>
-            <a:schemeClr val="bg1">
-              <a:lumMod val="65000"/>
+            <a:schemeClr val="accent2">
+              <a:lumMod val="60000"/>
+              <a:lumOff val="40000"/>
             </a:schemeClr>
           </a:solidFill>
           <a:ln>
             <a:solidFill>
-              <a:schemeClr val="bg1">
-                <a:lumMod val="65000"/>
-              </a:schemeClr>
+              <a:srgbClr val="D28280"/>
             </a:solidFill>
           </a:ln>
         </p:spPr>
@@ -3670,8 +4104,9 @@
             <a:pPr algn="ctr"/>
             <a:r>
               <a:rPr lang="en-US" sz="1600" b="1" dirty="0" smtClean="0"/>
-              <a:t>Release</a:t>
-            </a:r>
+              <a:t>Committer</a:t>
+            </a:r>
+            <a:endParaRPr lang="en-US" sz="1600" b="1" dirty="0" smtClean="0"/>
           </a:p>
           <a:p>
             <a:pPr algn="ctr"/>
@@ -3684,7 +4119,7 @@
       </p:sp>
       <p:pic>
         <p:nvPicPr>
-          <p:cNvPr id="2050" name="Picture 2" descr="http://screenshots.en.sftcdn.net/en/scrn/70000/70210/google-app-engine-1.jpg"/>
+          <p:cNvPr id="86" name="Picture 2" descr="http://screenshots.en.sftcdn.net/en/scrn/70000/70210/google-app-engine-1.jpg"/>
           <p:cNvPicPr>
             <a:picLocks noChangeAspect="1" noChangeArrowheads="1"/>
           </p:cNvPicPr>
@@ -3702,7 +4137,13 @@
                 </a:srgbClr>
               </a:clrTo>
             </a:clrChange>
-            <a:grayscl/>
+            <a:duotone>
+              <a:schemeClr val="accent2">
+                <a:shade val="45000"/>
+                <a:satMod val="135000"/>
+              </a:schemeClr>
+              <a:prstClr val="white"/>
+            </a:duotone>
           </a:blip>
           <a:srcRect/>
           <a:stretch>
@@ -3711,7 +4152,7 @@
         </p:blipFill>
         <p:spPr bwMode="auto">
           <a:xfrm>
-            <a:off x="7349331" y="597496"/>
+            <a:off x="8058150" y="597496"/>
             <a:ext cx="1085850" cy="1085850"/>
           </a:xfrm>
           <a:prstGeom prst="rect">
@@ -3722,13 +4163,13 @@
       </p:pic>
       <p:grpSp>
         <p:nvGrpSpPr>
-          <p:cNvPr id="65" name="Group 64"/>
+          <p:cNvPr id="87" name="Group 86"/>
           <p:cNvGrpSpPr/>
           <p:nvPr/>
         </p:nvGrpSpPr>
         <p:grpSpPr>
           <a:xfrm>
-            <a:off x="434181" y="902296"/>
+            <a:off x="304800" y="902296"/>
             <a:ext cx="304800" cy="533400"/>
             <a:chOff x="2339181" y="3718719"/>
             <a:chExt cx="304800" cy="533400"/>
@@ -3742,7 +4183,7 @@
         </p:grpSpPr>
         <p:sp>
           <p:nvSpPr>
-            <p:cNvPr id="63" name="Flowchart: Connector 62"/>
+            <p:cNvPr id="88" name="Flowchart: Connector 87"/>
             <p:cNvSpPr/>
             <p:nvPr/>
           </p:nvSpPr>
@@ -3788,7 +4229,7 @@
         </p:sp>
         <p:sp>
           <p:nvSpPr>
-            <p:cNvPr id="64" name="Flowchart: Delay 63"/>
+            <p:cNvPr id="89" name="Flowchart: Delay 88"/>
             <p:cNvSpPr/>
             <p:nvPr/>
           </p:nvSpPr>
@@ -3835,13 +4276,13 @@
       </p:grpSp>
       <p:grpSp>
         <p:nvGrpSpPr>
-          <p:cNvPr id="68" name="Group 67"/>
+          <p:cNvPr id="90" name="Group 89"/>
           <p:cNvGrpSpPr/>
           <p:nvPr/>
         </p:nvGrpSpPr>
         <p:grpSpPr>
           <a:xfrm>
-            <a:off x="2415381" y="2578696"/>
+            <a:off x="3200400" y="2847777"/>
             <a:ext cx="304800" cy="533400"/>
             <a:chOff x="2339181" y="3718719"/>
             <a:chExt cx="304800" cy="533400"/>
@@ -3849,7 +4290,7 @@
         </p:grpSpPr>
         <p:sp>
           <p:nvSpPr>
-            <p:cNvPr id="69" name="Flowchart: Connector 68"/>
+            <p:cNvPr id="91" name="Flowchart: Connector 90"/>
             <p:cNvSpPr/>
             <p:nvPr/>
           </p:nvSpPr>
@@ -3889,7 +4330,7 @@
         </p:sp>
         <p:sp>
           <p:nvSpPr>
-            <p:cNvPr id="70" name="Flowchart: Delay 69"/>
+            <p:cNvPr id="93" name="Flowchart: Delay 92"/>
             <p:cNvSpPr/>
             <p:nvPr/>
           </p:nvSpPr>
@@ -3930,13 +4371,13 @@
       </p:grpSp>
       <p:sp>
         <p:nvSpPr>
-          <p:cNvPr id="71" name="TextBox 70"/>
+          <p:cNvPr id="94" name="TextBox 93"/>
           <p:cNvSpPr txBox="1"/>
           <p:nvPr/>
         </p:nvSpPr>
         <p:spPr>
           <a:xfrm>
-            <a:off x="2110581" y="3185319"/>
+            <a:off x="2895600" y="3454400"/>
             <a:ext cx="914400" cy="340519"/>
           </a:xfrm>
           <a:prstGeom prst="roundRect">
@@ -3973,13 +4414,13 @@
       </p:sp>
       <p:grpSp>
         <p:nvGrpSpPr>
-          <p:cNvPr id="72" name="Group 71"/>
+          <p:cNvPr id="95" name="Group 94"/>
           <p:cNvGrpSpPr/>
           <p:nvPr/>
         </p:nvGrpSpPr>
         <p:grpSpPr>
           <a:xfrm>
-            <a:off x="4167981" y="2578696"/>
+            <a:off x="4953000" y="2847777"/>
             <a:ext cx="304800" cy="533400"/>
             <a:chOff x="2339181" y="3718719"/>
             <a:chExt cx="304800" cy="533400"/>
@@ -3987,7 +4428,7 @@
         </p:grpSpPr>
         <p:sp>
           <p:nvSpPr>
-            <p:cNvPr id="73" name="Flowchart: Connector 72"/>
+            <p:cNvPr id="96" name="Flowchart: Connector 95"/>
             <p:cNvSpPr/>
             <p:nvPr/>
           </p:nvSpPr>
@@ -4027,7 +4468,7 @@
         </p:sp>
         <p:sp>
           <p:nvSpPr>
-            <p:cNvPr id="74" name="Flowchart: Delay 73"/>
+            <p:cNvPr id="100" name="Flowchart: Delay 99"/>
             <p:cNvSpPr/>
             <p:nvPr/>
           </p:nvSpPr>
@@ -4068,13 +4509,13 @@
       </p:grpSp>
       <p:sp>
         <p:nvSpPr>
-          <p:cNvPr id="75" name="TextBox 74"/>
+          <p:cNvPr id="101" name="TextBox 100"/>
           <p:cNvSpPr txBox="1"/>
           <p:nvPr/>
         </p:nvSpPr>
         <p:spPr>
           <a:xfrm>
-            <a:off x="3863181" y="3185319"/>
+            <a:off x="4648200" y="3454400"/>
             <a:ext cx="1066800" cy="340519"/>
           </a:xfrm>
           <a:prstGeom prst="roundRect">
@@ -4104,13 +4545,13 @@
       </p:sp>
       <p:grpSp>
         <p:nvGrpSpPr>
-          <p:cNvPr id="76" name="Group 75"/>
+          <p:cNvPr id="104" name="Group 103"/>
           <p:cNvGrpSpPr/>
           <p:nvPr/>
         </p:nvGrpSpPr>
         <p:grpSpPr>
           <a:xfrm>
-            <a:off x="6682581" y="2578696"/>
+            <a:off x="7467600" y="2847777"/>
             <a:ext cx="304800" cy="533400"/>
             <a:chOff x="2339181" y="3718719"/>
             <a:chExt cx="304800" cy="533400"/>
@@ -4118,7 +4559,7 @@
         </p:grpSpPr>
         <p:sp>
           <p:nvSpPr>
-            <p:cNvPr id="77" name="Flowchart: Connector 76"/>
+            <p:cNvPr id="105" name="Flowchart: Connector 104"/>
             <p:cNvSpPr/>
             <p:nvPr/>
           </p:nvSpPr>
@@ -4158,7 +4599,7 @@
         </p:sp>
         <p:sp>
           <p:nvSpPr>
-            <p:cNvPr id="78" name="Flowchart: Delay 77"/>
+            <p:cNvPr id="106" name="Flowchart: Delay 105"/>
             <p:cNvSpPr/>
             <p:nvPr/>
           </p:nvSpPr>
@@ -4199,13 +4640,13 @@
       </p:grpSp>
       <p:sp>
         <p:nvSpPr>
-          <p:cNvPr id="79" name="TextBox 78"/>
+          <p:cNvPr id="108" name="TextBox 107"/>
           <p:cNvSpPr txBox="1"/>
           <p:nvPr/>
         </p:nvSpPr>
         <p:spPr>
           <a:xfrm>
-            <a:off x="6576237" y="3185319"/>
+            <a:off x="7361256" y="3454400"/>
             <a:ext cx="533400" cy="340519"/>
           </a:xfrm>
           <a:prstGeom prst="roundRect">
@@ -4237,13 +4678,13 @@
       </p:sp>
       <p:sp>
         <p:nvSpPr>
-          <p:cNvPr id="92" name="TextBox 91"/>
+          <p:cNvPr id="109" name="TextBox 108"/>
           <p:cNvSpPr txBox="1"/>
           <p:nvPr/>
         </p:nvSpPr>
         <p:spPr>
           <a:xfrm>
-            <a:off x="205581" y="1552377"/>
+            <a:off x="76200" y="1552377"/>
             <a:ext cx="533400" cy="340519"/>
           </a:xfrm>
           <a:prstGeom prst="roundRect">
@@ -4272,14 +4713,14 @@
       </p:sp>
       <p:sp>
         <p:nvSpPr>
-          <p:cNvPr id="97" name="TextBox 96"/>
+          <p:cNvPr id="110" name="TextBox 109"/>
           <p:cNvSpPr txBox="1"/>
           <p:nvPr/>
         </p:nvSpPr>
         <p:spPr>
           <a:xfrm>
-            <a:off x="738981" y="137319"/>
-            <a:ext cx="762000" cy="307777"/>
+            <a:off x="1523999" y="-15081"/>
+            <a:ext cx="1533097" cy="307777"/>
           </a:xfrm>
           <a:prstGeom prst="rect">
             <a:avLst/>
@@ -4298,7 +4739,15 @@
                   <a:srgbClr val="00B050"/>
                 </a:solidFill>
               </a:rPr>
-              <a:t>1. pull</a:t>
+              <a:t>1. </a:t>
+            </a:r>
+            <a:r>
+              <a:rPr lang="en-US" sz="1400" b="1" dirty="0" smtClean="0">
+                <a:solidFill>
+                  <a:srgbClr val="00B050"/>
+                </a:solidFill>
+              </a:rPr>
+              <a:t>pull</a:t>
             </a:r>
             <a:endParaRPr lang="en-US" sz="1400" b="1" dirty="0">
               <a:solidFill>
@@ -4310,13 +4759,13 @@
       </p:sp>
       <p:sp>
         <p:nvSpPr>
-          <p:cNvPr id="98" name="Arc 97"/>
+          <p:cNvPr id="112" name="Arc 111"/>
           <p:cNvSpPr/>
           <p:nvPr/>
         </p:nvSpPr>
         <p:spPr>
           <a:xfrm>
-            <a:off x="662781" y="978496"/>
+            <a:off x="1447800" y="978496"/>
             <a:ext cx="381000" cy="304800"/>
           </a:xfrm>
           <a:prstGeom prst="arc">
@@ -4358,13 +4807,13 @@
       </p:sp>
       <p:sp>
         <p:nvSpPr>
-          <p:cNvPr id="99" name="TextBox 98"/>
+          <p:cNvPr id="114" name="TextBox 113"/>
           <p:cNvSpPr txBox="1"/>
           <p:nvPr/>
         </p:nvSpPr>
         <p:spPr>
           <a:xfrm>
-            <a:off x="1119981" y="749896"/>
+            <a:off x="1905000" y="749896"/>
             <a:ext cx="990600" cy="646331"/>
           </a:xfrm>
           <a:prstGeom prst="rect">
@@ -4421,13 +4870,13 @@
       </p:sp>
       <p:sp>
         <p:nvSpPr>
-          <p:cNvPr id="102" name="TextBox 101"/>
+          <p:cNvPr id="127" name="TextBox 126"/>
           <p:cNvSpPr txBox="1"/>
           <p:nvPr/>
         </p:nvSpPr>
         <p:spPr>
           <a:xfrm>
-            <a:off x="1119981" y="2154238"/>
+            <a:off x="1905000" y="2619104"/>
             <a:ext cx="685800" cy="215444"/>
           </a:xfrm>
           <a:prstGeom prst="rect">
@@ -4459,13 +4908,13 @@
       </p:sp>
       <p:cxnSp>
         <p:nvCxnSpPr>
-          <p:cNvPr id="103" name="Straight Arrow Connector 102"/>
+          <p:cNvPr id="128" name="Straight Arrow Connector 127"/>
           <p:cNvCxnSpPr/>
           <p:nvPr/>
         </p:nvCxnSpPr>
         <p:spPr>
           <a:xfrm flipV="1">
-            <a:off x="2567781" y="1773238"/>
+            <a:off x="3352800" y="2042319"/>
             <a:ext cx="228600" cy="685800"/>
           </a:xfrm>
           <a:prstGeom prst="straightConnector1">
@@ -4497,13 +4946,13 @@
       </p:cxnSp>
       <p:sp>
         <p:nvSpPr>
-          <p:cNvPr id="107" name="TextBox 106"/>
+          <p:cNvPr id="129" name="TextBox 128"/>
           <p:cNvSpPr txBox="1"/>
           <p:nvPr/>
         </p:nvSpPr>
         <p:spPr>
           <a:xfrm rot="17318509">
-            <a:off x="2087118" y="1989319"/>
+            <a:off x="2872137" y="2258400"/>
             <a:ext cx="843775" cy="215444"/>
           </a:xfrm>
           <a:prstGeom prst="rect">
@@ -4539,13 +4988,13 @@
       </p:sp>
       <p:sp>
         <p:nvSpPr>
-          <p:cNvPr id="111" name="Arc 110"/>
+          <p:cNvPr id="130" name="Arc 129"/>
           <p:cNvSpPr/>
           <p:nvPr/>
         </p:nvSpPr>
         <p:spPr>
           <a:xfrm>
-            <a:off x="738981" y="216496"/>
+            <a:off x="1524000" y="216496"/>
             <a:ext cx="4419600" cy="1219200"/>
           </a:xfrm>
           <a:prstGeom prst="arc">
@@ -4587,14 +5036,14 @@
       </p:sp>
       <p:sp>
         <p:nvSpPr>
-          <p:cNvPr id="113" name="Arc 112"/>
+          <p:cNvPr id="131" name="Arc 130"/>
           <p:cNvSpPr/>
           <p:nvPr/>
         </p:nvSpPr>
         <p:spPr>
           <a:xfrm flipV="1">
-            <a:off x="815181" y="1359496"/>
-            <a:ext cx="1600200" cy="718542"/>
+            <a:off x="1563511" y="1529307"/>
+            <a:ext cx="1600200" cy="1025723"/>
           </a:xfrm>
           <a:prstGeom prst="arc">
             <a:avLst>
@@ -4635,13 +5084,13 @@
       </p:sp>
       <p:sp>
         <p:nvSpPr>
-          <p:cNvPr id="115" name="Arc 114"/>
+          <p:cNvPr id="134" name="Arc 133"/>
           <p:cNvSpPr/>
           <p:nvPr/>
         </p:nvSpPr>
         <p:spPr>
           <a:xfrm rot="2715976" flipV="1">
-            <a:off x="2998146" y="1853413"/>
+            <a:off x="3783165" y="2018071"/>
             <a:ext cx="1356586" cy="381000"/>
           </a:xfrm>
           <a:prstGeom prst="arc">
@@ -4683,13 +5132,13 @@
       </p:sp>
       <p:sp>
         <p:nvSpPr>
-          <p:cNvPr id="116" name="TextBox 115"/>
+          <p:cNvPr id="135" name="TextBox 134"/>
           <p:cNvSpPr txBox="1"/>
           <p:nvPr/>
         </p:nvSpPr>
         <p:spPr>
           <a:xfrm rot="2360287">
-            <a:off x="3177381" y="2273896"/>
+            <a:off x="3962400" y="2542977"/>
             <a:ext cx="685800" cy="215444"/>
           </a:xfrm>
           <a:prstGeom prst="rect">
@@ -4721,13 +5170,13 @@
       </p:sp>
       <p:sp>
         <p:nvSpPr>
-          <p:cNvPr id="117" name="Arc 116"/>
+          <p:cNvPr id="136" name="Arc 135"/>
           <p:cNvSpPr/>
           <p:nvPr/>
         </p:nvSpPr>
         <p:spPr>
           <a:xfrm rot="16709798">
-            <a:off x="4156356" y="2332422"/>
+            <a:off x="4941375" y="2601503"/>
             <a:ext cx="381000" cy="304800"/>
           </a:xfrm>
           <a:prstGeom prst="arc">
@@ -4773,13 +5222,13 @@
       </p:sp>
       <p:sp>
         <p:nvSpPr>
-          <p:cNvPr id="118" name="TextBox 117"/>
+          <p:cNvPr id="137" name="TextBox 136"/>
           <p:cNvSpPr txBox="1"/>
           <p:nvPr/>
         </p:nvSpPr>
         <p:spPr>
           <a:xfrm>
-            <a:off x="4091781" y="1816696"/>
+            <a:off x="4876800" y="2085777"/>
             <a:ext cx="838200" cy="430887"/>
           </a:xfrm>
           <a:prstGeom prst="rect">
@@ -4826,13 +5275,13 @@
       </p:sp>
       <p:sp>
         <p:nvSpPr>
-          <p:cNvPr id="119" name="Arc 118"/>
+          <p:cNvPr id="140" name="Arc 139"/>
           <p:cNvSpPr/>
           <p:nvPr/>
         </p:nvSpPr>
         <p:spPr>
           <a:xfrm rot="19019392" flipV="1">
-            <a:off x="4344224" y="1923378"/>
+            <a:off x="5129243" y="2088036"/>
             <a:ext cx="1356586" cy="381000"/>
           </a:xfrm>
           <a:prstGeom prst="arc">
@@ -4874,13 +5323,13 @@
       </p:sp>
       <p:sp>
         <p:nvSpPr>
-          <p:cNvPr id="120" name="TextBox 119"/>
+          <p:cNvPr id="141" name="TextBox 140"/>
           <p:cNvSpPr txBox="1"/>
           <p:nvPr/>
         </p:nvSpPr>
         <p:spPr>
           <a:xfrm rot="18996887">
-            <a:off x="5009792" y="2290249"/>
+            <a:off x="5695298" y="2559330"/>
             <a:ext cx="685800" cy="215444"/>
           </a:xfrm>
           <a:prstGeom prst="rect">
@@ -4912,13 +5361,13 @@
       </p:sp>
       <p:sp>
         <p:nvSpPr>
-          <p:cNvPr id="121" name="Arc 120"/>
+          <p:cNvPr id="142" name="Arc 141"/>
           <p:cNvSpPr/>
           <p:nvPr/>
         </p:nvSpPr>
         <p:spPr>
           <a:xfrm rot="2715976" flipV="1">
-            <a:off x="5515779" y="1794935"/>
+            <a:off x="6300798" y="1959593"/>
             <a:ext cx="1356586" cy="381000"/>
           </a:xfrm>
           <a:prstGeom prst="arc">
@@ -4960,13 +5409,13 @@
       </p:sp>
       <p:sp>
         <p:nvSpPr>
-          <p:cNvPr id="122" name="TextBox 121"/>
+          <p:cNvPr id="143" name="TextBox 142"/>
           <p:cNvSpPr txBox="1"/>
           <p:nvPr/>
         </p:nvSpPr>
         <p:spPr>
           <a:xfrm rot="1991192">
-            <a:off x="5695014" y="2215418"/>
+            <a:off x="6480033" y="2484499"/>
             <a:ext cx="685800" cy="215444"/>
           </a:xfrm>
           <a:prstGeom prst="rect">
@@ -4998,13 +5447,13 @@
       </p:sp>
       <p:sp>
         <p:nvSpPr>
-          <p:cNvPr id="123" name="Arc 122"/>
+          <p:cNvPr id="148" name="Arc 147"/>
           <p:cNvSpPr/>
           <p:nvPr/>
         </p:nvSpPr>
         <p:spPr>
           <a:xfrm rot="16709798">
-            <a:off x="6673989" y="2273944"/>
+            <a:off x="7459008" y="2543025"/>
             <a:ext cx="381000" cy="304800"/>
           </a:xfrm>
           <a:prstGeom prst="arc">
@@ -5046,13 +5495,13 @@
       </p:sp>
       <p:sp>
         <p:nvSpPr>
-          <p:cNvPr id="124" name="TextBox 123"/>
+          <p:cNvPr id="149" name="TextBox 148"/>
           <p:cNvSpPr txBox="1"/>
           <p:nvPr/>
         </p:nvSpPr>
         <p:spPr>
           <a:xfrm>
-            <a:off x="6609414" y="1969096"/>
+            <a:off x="7394433" y="2238177"/>
             <a:ext cx="835167" cy="215444"/>
           </a:xfrm>
           <a:prstGeom prst="rect">
@@ -5084,13 +5533,13 @@
       </p:sp>
       <p:sp>
         <p:nvSpPr>
-          <p:cNvPr id="125" name="Arc 124"/>
+          <p:cNvPr id="151" name="Arc 150"/>
           <p:cNvSpPr/>
           <p:nvPr/>
         </p:nvSpPr>
         <p:spPr>
           <a:xfrm rot="19019392" flipV="1">
-            <a:off x="6861857" y="1864900"/>
+            <a:off x="7646876" y="2029558"/>
             <a:ext cx="1356586" cy="381000"/>
           </a:xfrm>
           <a:prstGeom prst="arc">
@@ -5132,13 +5581,13 @@
       </p:sp>
       <p:sp>
         <p:nvSpPr>
-          <p:cNvPr id="126" name="TextBox 125"/>
+          <p:cNvPr id="152" name="TextBox 151"/>
           <p:cNvSpPr txBox="1"/>
           <p:nvPr/>
         </p:nvSpPr>
         <p:spPr>
           <a:xfrm rot="18996887">
-            <a:off x="7506125" y="2178227"/>
+            <a:off x="8291144" y="2447308"/>
             <a:ext cx="841701" cy="215444"/>
           </a:xfrm>
           <a:prstGeom prst="rect">
@@ -5170,13 +5619,13 @@
       </p:sp>
       <p:sp>
         <p:nvSpPr>
-          <p:cNvPr id="132" name="Freeform 131"/>
+          <p:cNvPr id="153" name="Freeform 152"/>
           <p:cNvSpPr/>
           <p:nvPr/>
         </p:nvSpPr>
         <p:spPr>
           <a:xfrm>
-            <a:off x="944545" y="423418"/>
+            <a:off x="1729564" y="423418"/>
             <a:ext cx="3959051" cy="1273620"/>
           </a:xfrm>
           <a:custGeom>
@@ -5304,13 +5753,13 @@
       </p:sp>
       <p:sp>
         <p:nvSpPr>
-          <p:cNvPr id="133" name="TextBox 132"/>
+          <p:cNvPr id="155" name="TextBox 154"/>
           <p:cNvSpPr txBox="1"/>
           <p:nvPr/>
         </p:nvSpPr>
         <p:spPr>
           <a:xfrm>
-            <a:off x="1119981" y="1697038"/>
+            <a:off x="1905000" y="1697038"/>
             <a:ext cx="838200" cy="215444"/>
           </a:xfrm>
           <a:prstGeom prst="rect">
@@ -5330,7 +5779,15 @@
                   <a:srgbClr val="00B050"/>
                 </a:solidFill>
               </a:rPr>
-              <a:t>3.1 update</a:t>
+              <a:t>3.1 </a:t>
+            </a:r>
+            <a:r>
+              <a:rPr lang="en-US" sz="1400" b="1" dirty="0" smtClean="0">
+                <a:solidFill>
+                  <a:srgbClr val="00B050"/>
+                </a:solidFill>
+              </a:rPr>
+              <a:t>pull</a:t>
             </a:r>
             <a:endParaRPr lang="en-US" sz="1400" b="1" dirty="0">
               <a:solidFill>
@@ -5342,13 +5799,13 @@
       </p:sp>
       <p:cxnSp>
         <p:nvCxnSpPr>
-          <p:cNvPr id="138" name="Straight Connector 137"/>
+          <p:cNvPr id="156" name="Straight Connector 155"/>
           <p:cNvCxnSpPr/>
           <p:nvPr/>
         </p:nvCxnSpPr>
         <p:spPr>
           <a:xfrm>
-            <a:off x="4548981" y="5275460"/>
+            <a:off x="5029200" y="5275460"/>
             <a:ext cx="3657600" cy="0"/>
           </a:xfrm>
           <a:prstGeom prst="line">
@@ -5380,13 +5837,13 @@
       </p:cxnSp>
       <p:sp>
         <p:nvSpPr>
-          <p:cNvPr id="139" name="Flowchart: Connector 138"/>
+          <p:cNvPr id="157" name="Flowchart: Connector 156"/>
           <p:cNvSpPr/>
           <p:nvPr/>
         </p:nvSpPr>
         <p:spPr>
           <a:xfrm>
-            <a:off x="5082382" y="5199260"/>
+            <a:off x="5562601" y="5199260"/>
             <a:ext cx="152400" cy="152400"/>
           </a:xfrm>
           <a:prstGeom prst="flowChartConnector">
@@ -5432,13 +5889,13 @@
       </p:sp>
       <p:sp>
         <p:nvSpPr>
-          <p:cNvPr id="144" name="Flowchart: Connector 143"/>
+          <p:cNvPr id="159" name="Flowchart: Connector 158"/>
           <p:cNvSpPr/>
           <p:nvPr/>
         </p:nvSpPr>
         <p:spPr>
           <a:xfrm>
-            <a:off x="7673181" y="5199260"/>
+            <a:off x="8153400" y="5199260"/>
             <a:ext cx="152400" cy="152400"/>
           </a:xfrm>
           <a:prstGeom prst="flowChartConnector">
@@ -5472,13 +5929,13 @@
       </p:sp>
       <p:sp>
         <p:nvSpPr>
-          <p:cNvPr id="145" name="Flowchart: Connector 144"/>
+          <p:cNvPr id="161" name="Flowchart: Connector 160"/>
           <p:cNvSpPr/>
           <p:nvPr/>
         </p:nvSpPr>
         <p:spPr>
           <a:xfrm>
-            <a:off x="6453981" y="5199260"/>
+            <a:off x="6934200" y="5199260"/>
             <a:ext cx="152400" cy="152400"/>
           </a:xfrm>
           <a:prstGeom prst="flowChartConnector">
@@ -5524,13 +5981,13 @@
       </p:sp>
       <p:sp>
         <p:nvSpPr>
-          <p:cNvPr id="146" name="Flowchart: Connector 145"/>
+          <p:cNvPr id="162" name="Flowchart: Connector 161"/>
           <p:cNvSpPr/>
           <p:nvPr/>
         </p:nvSpPr>
         <p:spPr>
           <a:xfrm>
-            <a:off x="6834981" y="4589660"/>
+            <a:off x="7315200" y="4589660"/>
             <a:ext cx="152400" cy="152400"/>
           </a:xfrm>
           <a:prstGeom prst="flowChartConnector">
@@ -5575,13 +6032,13 @@
       </p:sp>
       <p:sp>
         <p:nvSpPr>
-          <p:cNvPr id="147" name="Flowchart: Connector 146"/>
+          <p:cNvPr id="164" name="Flowchart: Connector 163"/>
           <p:cNvSpPr/>
           <p:nvPr/>
         </p:nvSpPr>
         <p:spPr>
           <a:xfrm>
-            <a:off x="5615782" y="4589660"/>
+            <a:off x="6096001" y="4589660"/>
             <a:ext cx="152400" cy="152400"/>
           </a:xfrm>
           <a:prstGeom prst="flowChartConnector">
@@ -5626,16 +6083,16 @@
       </p:sp>
       <p:cxnSp>
         <p:nvCxnSpPr>
-          <p:cNvPr id="150" name="Shape 149"/>
+          <p:cNvPr id="167" name="Shape 149"/>
           <p:cNvCxnSpPr>
-            <a:stCxn id="139" idx="0"/>
-            <a:endCxn id="147" idx="2"/>
+            <a:stCxn id="157" idx="0"/>
+            <a:endCxn id="164" idx="2"/>
           </p:cNvCxnSpPr>
           <p:nvPr/>
         </p:nvCxnSpPr>
         <p:spPr>
           <a:xfrm rot="5400000" flipH="1" flipV="1">
-            <a:off x="5120482" y="4703960"/>
+            <a:off x="5600701" y="4703960"/>
             <a:ext cx="533400" cy="457200"/>
           </a:xfrm>
           <a:prstGeom prst="curvedConnector2">
@@ -5666,16 +6123,16 @@
       </p:cxnSp>
       <p:cxnSp>
         <p:nvCxnSpPr>
-          <p:cNvPr id="154" name="Shape 153"/>
+          <p:cNvPr id="169" name="Shape 153"/>
           <p:cNvCxnSpPr>
-            <a:stCxn id="146" idx="6"/>
-            <a:endCxn id="144" idx="1"/>
+            <a:stCxn id="162" idx="6"/>
+            <a:endCxn id="159" idx="1"/>
           </p:cNvCxnSpPr>
           <p:nvPr/>
         </p:nvCxnSpPr>
         <p:spPr>
           <a:xfrm>
-            <a:off x="6987381" y="4665860"/>
+            <a:off x="7467600" y="4665860"/>
             <a:ext cx="708118" cy="555718"/>
           </a:xfrm>
           <a:prstGeom prst="curvedConnector2">
@@ -5706,16 +6163,16 @@
       </p:cxnSp>
       <p:cxnSp>
         <p:nvCxnSpPr>
-          <p:cNvPr id="158" name="Straight Arrow Connector 157"/>
+          <p:cNvPr id="171" name="Straight Arrow Connector 170"/>
           <p:cNvCxnSpPr>
-            <a:stCxn id="147" idx="6"/>
-            <a:endCxn id="146" idx="2"/>
+            <a:stCxn id="164" idx="6"/>
+            <a:endCxn id="162" idx="2"/>
           </p:cNvCxnSpPr>
           <p:nvPr/>
         </p:nvCxnSpPr>
         <p:spPr>
           <a:xfrm>
-            <a:off x="5768182" y="4665860"/>
+            <a:off x="6248401" y="4665860"/>
             <a:ext cx="1066799" cy="0"/>
           </a:xfrm>
           <a:prstGeom prst="straightConnector1">
@@ -5746,16 +6203,16 @@
       </p:cxnSp>
       <p:cxnSp>
         <p:nvCxnSpPr>
-          <p:cNvPr id="160" name="Curved Connector 159"/>
+          <p:cNvPr id="172" name="Curved Connector 171"/>
           <p:cNvCxnSpPr>
-            <a:stCxn id="145" idx="7"/>
-            <a:endCxn id="146" idx="4"/>
+            <a:stCxn id="161" idx="7"/>
+            <a:endCxn id="162" idx="4"/>
           </p:cNvCxnSpPr>
           <p:nvPr/>
         </p:nvCxnSpPr>
         <p:spPr>
           <a:xfrm rot="5400000" flipH="1" flipV="1">
-            <a:off x="6507863" y="4818260"/>
+            <a:off x="6988082" y="4818260"/>
             <a:ext cx="479518" cy="327118"/>
           </a:xfrm>
           <a:prstGeom prst="curvedConnector3">
@@ -5789,13 +6246,13 @@
       </p:cxnSp>
       <p:sp>
         <p:nvSpPr>
-          <p:cNvPr id="163" name="TextBox 162"/>
+          <p:cNvPr id="174" name="TextBox 173"/>
           <p:cNvSpPr txBox="1"/>
           <p:nvPr/>
         </p:nvSpPr>
         <p:spPr>
           <a:xfrm rot="18268321">
-            <a:off x="4662895" y="4608370"/>
+            <a:off x="5143114" y="4608370"/>
             <a:ext cx="762000" cy="307777"/>
           </a:xfrm>
           <a:prstGeom prst="rect">
@@ -5827,13 +6284,13 @@
       </p:sp>
       <p:sp>
         <p:nvSpPr>
-          <p:cNvPr id="165" name="TextBox 164"/>
+          <p:cNvPr id="175" name="TextBox 174"/>
           <p:cNvSpPr txBox="1"/>
           <p:nvPr/>
         </p:nvSpPr>
         <p:spPr>
           <a:xfrm rot="2419831">
-            <a:off x="7273198" y="4522254"/>
+            <a:off x="7753417" y="4522254"/>
             <a:ext cx="762000" cy="307777"/>
           </a:xfrm>
           <a:prstGeom prst="rect">
@@ -5865,13 +6322,13 @@
       </p:sp>
       <p:sp>
         <p:nvSpPr>
-          <p:cNvPr id="166" name="TextBox 165"/>
+          <p:cNvPr id="176" name="TextBox 175"/>
           <p:cNvSpPr txBox="1"/>
           <p:nvPr/>
         </p:nvSpPr>
         <p:spPr>
           <a:xfrm>
-            <a:off x="5768181" y="4056260"/>
+            <a:off x="6248400" y="4056260"/>
             <a:ext cx="1295400" cy="523220"/>
           </a:xfrm>
           <a:prstGeom prst="rect">
@@ -5915,13 +6372,13 @@
       </p:sp>
       <p:sp>
         <p:nvSpPr>
-          <p:cNvPr id="168" name="TextBox 167"/>
+          <p:cNvPr id="177" name="TextBox 176"/>
           <p:cNvSpPr txBox="1"/>
           <p:nvPr/>
         </p:nvSpPr>
         <p:spPr>
           <a:xfrm>
-            <a:off x="5920581" y="4815283"/>
+            <a:off x="6355855" y="4858742"/>
             <a:ext cx="762000" cy="307777"/>
           </a:xfrm>
           <a:prstGeom prst="rect">
@@ -5935,13 +6392,14 @@
           </a:bodyPr>
           <a:lstStyle/>
           <a:p>
+            <a:pPr algn="r"/>
             <a:r>
               <a:rPr lang="en-US" sz="1400" b="1" dirty="0" smtClean="0">
                 <a:solidFill>
                   <a:srgbClr val="00B050"/>
                 </a:solidFill>
               </a:rPr>
-              <a:t>update</a:t>
+              <a:t>pull</a:t>
             </a:r>
             <a:endParaRPr lang="en-US" sz="1400" b="1" dirty="0">
               <a:solidFill>
@@ -5953,13 +6411,13 @@
       </p:sp>
       <p:sp>
         <p:nvSpPr>
-          <p:cNvPr id="170" name="TextBox 169"/>
+          <p:cNvPr id="178" name="TextBox 177"/>
           <p:cNvSpPr txBox="1"/>
           <p:nvPr/>
         </p:nvSpPr>
         <p:spPr>
           <a:xfrm>
-            <a:off x="3786981" y="4970660"/>
+            <a:off x="4267200" y="4970660"/>
             <a:ext cx="762000" cy="523220"/>
           </a:xfrm>
           <a:prstGeom prst="rect">
@@ -6012,10 +6470,152 @@
           </a:p>
         </p:txBody>
       </p:sp>
+      <p:cxnSp>
+        <p:nvCxnSpPr>
+          <p:cNvPr id="179" name="Straight Arrow Connector 178"/>
+          <p:cNvCxnSpPr/>
+          <p:nvPr/>
+        </p:nvCxnSpPr>
+        <p:spPr>
+          <a:xfrm flipH="1">
+            <a:off x="4572000" y="1328598"/>
+            <a:ext cx="914400" cy="0"/>
+          </a:xfrm>
+          <a:prstGeom prst="straightConnector1">
+            <a:avLst/>
+          </a:prstGeom>
+          <a:ln w="28575">
+            <a:solidFill>
+              <a:schemeClr val="bg1">
+                <a:lumMod val="65000"/>
+              </a:schemeClr>
+            </a:solidFill>
+            <a:tailEnd type="triangle"/>
+          </a:ln>
+        </p:spPr>
+        <p:style>
+          <a:lnRef idx="1">
+            <a:schemeClr val="accent1"/>
+          </a:lnRef>
+          <a:fillRef idx="0">
+            <a:schemeClr val="accent1"/>
+          </a:fillRef>
+          <a:effectRef idx="0">
+            <a:schemeClr val="accent1"/>
+          </a:effectRef>
+          <a:fontRef idx="minor">
+            <a:schemeClr val="tx1"/>
+          </a:fontRef>
+        </p:style>
+      </p:cxnSp>
+      <p:sp>
+        <p:nvSpPr>
+          <p:cNvPr id="180" name="TextBox 179"/>
+          <p:cNvSpPr txBox="1"/>
+          <p:nvPr/>
+        </p:nvSpPr>
+        <p:spPr>
+          <a:xfrm>
+            <a:off x="4385258" y="975519"/>
+            <a:ext cx="1482143" cy="307777"/>
+          </a:xfrm>
+          <a:prstGeom prst="rect">
+            <a:avLst/>
+          </a:prstGeom>
+          <a:noFill/>
+        </p:spPr>
+        <p:txBody>
+          <a:bodyPr wrap="square" rtlCol="0">
+            <a:spAutoFit/>
+          </a:bodyPr>
+          <a:lstStyle/>
+          <a:p>
+            <a:r>
+              <a:rPr lang="en-US" sz="1400" b="1" dirty="0" smtClean="0">
+                <a:solidFill>
+                  <a:schemeClr val="bg1">
+                    <a:lumMod val="65000"/>
+                  </a:schemeClr>
+                </a:solidFill>
+              </a:rPr>
+              <a:t>server-side clone</a:t>
+            </a:r>
+            <a:endParaRPr lang="en-US" sz="1400" b="1" dirty="0">
+              <a:solidFill>
+                <a:schemeClr val="bg1">
+                  <a:lumMod val="65000"/>
+                </a:schemeClr>
+              </a:solidFill>
+            </a:endParaRPr>
+          </a:p>
+        </p:txBody>
+      </p:sp>
+      <p:sp>
+        <p:nvSpPr>
+          <p:cNvPr id="181" name="Can 180"/>
+          <p:cNvSpPr/>
+          <p:nvPr/>
+        </p:nvSpPr>
+        <p:spPr>
+          <a:xfrm>
+            <a:off x="805543" y="902296"/>
+            <a:ext cx="685800" cy="650081"/>
+          </a:xfrm>
+          <a:prstGeom prst="can">
+            <a:avLst/>
+          </a:prstGeom>
+          <a:solidFill>
+            <a:schemeClr val="accent2">
+              <a:lumMod val="60000"/>
+              <a:lumOff val="40000"/>
+            </a:schemeClr>
+          </a:solidFill>
+          <a:ln>
+            <a:solidFill>
+              <a:srgbClr val="D28280"/>
+            </a:solidFill>
+          </a:ln>
+        </p:spPr>
+        <p:style>
+          <a:lnRef idx="2">
+            <a:schemeClr val="accent1">
+              <a:shade val="50000"/>
+            </a:schemeClr>
+          </a:lnRef>
+          <a:fillRef idx="1">
+            <a:schemeClr val="accent1"/>
+          </a:fillRef>
+          <a:effectRef idx="0">
+            <a:schemeClr val="accent1"/>
+          </a:effectRef>
+          <a:fontRef idx="minor">
+            <a:schemeClr val="lt1"/>
+          </a:fontRef>
+        </p:style>
+        <p:txBody>
+          <a:bodyPr rtlCol="0" anchor="ctr"/>
+          <a:lstStyle/>
+          <a:p>
+            <a:pPr algn="ctr"/>
+            <a:r>
+              <a:rPr lang="en-US" sz="1600" b="1" dirty="0"/>
+              <a:t>Local</a:t>
+            </a:r>
+          </a:p>
+          <a:p>
+            <a:pPr algn="ctr"/>
+            <a:r>
+              <a:rPr lang="en-US" sz="1600" b="1" dirty="0"/>
+              <a:t>Repo</a:t>
+            </a:r>
+            <a:endParaRPr lang="en-US" sz="1600" b="1" dirty="0"/>
+          </a:p>
+        </p:txBody>
+      </p:sp>
     </p:spTree>
     <p:extLst>
       <p:ext uri="{BB962C8B-B14F-4D97-AF65-F5344CB8AC3E}">
-        <p14:creationId xmlns:p14="http://schemas.microsoft.com/office/powerpoint/2010/main" xmlns="" val="2312643091"/>
+        <p14:creationId xmlns:p14="http://schemas.microsoft.com/office/powerpoint/2010/main" val="2312643091"/>
       </p:ext>
     </p:extLst>
   </p:cSld>

</xml_diff>

<commit_message>
Merging Issue 557 [DevMan: "Troubleshooting" (under "Setting Up" section)]
</commit_message>
<xml_diff>
--- a/doc/diagrams/workflow.pptx
+++ b/doc/diagrams/workflow.pptx
@@ -10,7 +10,7 @@
   <p:sldIdLst>
     <p:sldId id="256" r:id="rId2"/>
   </p:sldIdLst>
-  <p:sldSz cx="8640763" cy="5761038"/>
+  <p:sldSz cx="9144000" cy="5761038"/>
   <p:notesSz cx="6858000" cy="9144000"/>
   <p:defaultTextStyle>
     <a:defPPr>
@@ -193,7 +193,7 @@
             <a:fld id="{DC50A2AC-D691-437C-A69B-81ECFE08AD4B}" type="datetimeFigureOut">
               <a:rPr lang="en-SG" smtClean="0"/>
               <a:pPr/>
-              <a:t>28/7/2012</a:t>
+              <a:t>9/2/2013</a:t>
             </a:fld>
             <a:endParaRPr lang="en-SG"/>
           </a:p>
@@ -211,8 +211,8 @@
         </p:nvSpPr>
         <p:spPr>
           <a:xfrm>
-            <a:off x="858838" y="685800"/>
-            <a:ext cx="5140325" cy="3429000"/>
+            <a:off x="708025" y="685800"/>
+            <a:ext cx="5441950" cy="3429000"/>
           </a:xfrm>
           <a:prstGeom prst="rect">
             <a:avLst/>
@@ -362,7 +362,7 @@
     </p:spTree>
     <p:extLst>
       <p:ext uri="{BB962C8B-B14F-4D97-AF65-F5344CB8AC3E}">
-        <p14:creationId xmlns:p14="http://schemas.microsoft.com/office/powerpoint/2010/main" xmlns="" val="2265103329"/>
+        <p14:creationId xmlns:p14="http://schemas.microsoft.com/office/powerpoint/2010/main" val="2265103329"/>
       </p:ext>
     </p:extLst>
   </p:cSld>
@@ -491,8 +491,8 @@
         </p:nvSpPr>
         <p:spPr>
           <a:xfrm>
-            <a:off x="858838" y="685800"/>
-            <a:ext cx="5140325" cy="3429000"/>
+            <a:off x="708025" y="685800"/>
+            <a:ext cx="5441950" cy="3429000"/>
           </a:xfrm>
         </p:spPr>
       </p:sp>
@@ -542,7 +542,7 @@
     </p:spTree>
     <p:extLst>
       <p:ext uri="{BB962C8B-B14F-4D97-AF65-F5344CB8AC3E}">
-        <p14:creationId xmlns:p14="http://schemas.microsoft.com/office/powerpoint/2010/main" xmlns="" val="1558229004"/>
+        <p14:creationId xmlns:p14="http://schemas.microsoft.com/office/powerpoint/2010/main" val="1558229004"/>
       </p:ext>
     </p:extLst>
   </p:cSld>
@@ -581,8 +581,8 @@
         </p:nvSpPr>
         <p:spPr>
           <a:xfrm>
-            <a:off x="648057" y="1789656"/>
-            <a:ext cx="7344649" cy="1234890"/>
+            <a:off x="685802" y="1789656"/>
+            <a:ext cx="7772400" cy="1234890"/>
           </a:xfrm>
         </p:spPr>
         <p:txBody>
@@ -609,8 +609,8 @@
         </p:nvSpPr>
         <p:spPr>
           <a:xfrm>
-            <a:off x="1296115" y="3264588"/>
-            <a:ext cx="6048534" cy="1472266"/>
+            <a:off x="1371601" y="3264588"/>
+            <a:ext cx="6400800" cy="1472266"/>
           </a:xfrm>
         </p:spPr>
         <p:txBody>
@@ -734,7 +734,7 @@
             <a:fld id="{1D8BD707-D9CF-40AE-B4C6-C98DA3205C09}" type="datetimeFigureOut">
               <a:rPr lang="en-US" smtClean="0"/>
               <a:pPr/>
-              <a:t>7/28/2012</a:t>
+              <a:t>2/9/2013</a:t>
             </a:fld>
             <a:endParaRPr lang="en-US"/>
           </a:p>
@@ -901,7 +901,7 @@
             <a:fld id="{1D8BD707-D9CF-40AE-B4C6-C98DA3205C09}" type="datetimeFigureOut">
               <a:rPr lang="en-US" smtClean="0"/>
               <a:pPr/>
-              <a:t>7/28/2012</a:t>
+              <a:t>2/9/2013</a:t>
             </a:fld>
             <a:endParaRPr lang="en-US"/>
           </a:p>
@@ -987,8 +987,8 @@
         </p:nvSpPr>
         <p:spPr>
           <a:xfrm>
-            <a:off x="6264553" y="230710"/>
-            <a:ext cx="1944172" cy="4915552"/>
+            <a:off x="6629401" y="230710"/>
+            <a:ext cx="2057400" cy="4915552"/>
           </a:xfrm>
         </p:spPr>
         <p:txBody>
@@ -1015,8 +1015,8 @@
         </p:nvSpPr>
         <p:spPr>
           <a:xfrm>
-            <a:off x="432039" y="230710"/>
-            <a:ext cx="5688502" cy="4915552"/>
+            <a:off x="457201" y="230710"/>
+            <a:ext cx="6019800" cy="4915552"/>
           </a:xfrm>
         </p:spPr>
         <p:txBody>
@@ -1078,7 +1078,7 @@
             <a:fld id="{1D8BD707-D9CF-40AE-B4C6-C98DA3205C09}" type="datetimeFigureOut">
               <a:rPr lang="en-US" smtClean="0"/>
               <a:pPr/>
-              <a:t>7/28/2012</a:t>
+              <a:t>2/9/2013</a:t>
             </a:fld>
             <a:endParaRPr lang="en-US"/>
           </a:p>
@@ -1245,7 +1245,7 @@
             <a:fld id="{1D8BD707-D9CF-40AE-B4C6-C98DA3205C09}" type="datetimeFigureOut">
               <a:rPr lang="en-US" smtClean="0"/>
               <a:pPr/>
-              <a:t>7/28/2012</a:t>
+              <a:t>2/9/2013</a:t>
             </a:fld>
             <a:endParaRPr lang="en-US"/>
           </a:p>
@@ -1331,8 +1331,8 @@
         </p:nvSpPr>
         <p:spPr>
           <a:xfrm>
-            <a:off x="682561" y="3702001"/>
-            <a:ext cx="7344649" cy="1144206"/>
+            <a:off x="722314" y="3702001"/>
+            <a:ext cx="7772400" cy="1144206"/>
           </a:xfrm>
         </p:spPr>
         <p:txBody>
@@ -1363,8 +1363,8 @@
         </p:nvSpPr>
         <p:spPr>
           <a:xfrm>
-            <a:off x="682561" y="2441774"/>
-            <a:ext cx="7344649" cy="1260227"/>
+            <a:off x="722314" y="2441774"/>
+            <a:ext cx="7772400" cy="1260227"/>
           </a:xfrm>
         </p:spPr>
         <p:txBody>
@@ -1488,7 +1488,7 @@
             <a:fld id="{1D8BD707-D9CF-40AE-B4C6-C98DA3205C09}" type="datetimeFigureOut">
               <a:rPr lang="en-US" smtClean="0"/>
               <a:pPr/>
-              <a:t>7/28/2012</a:t>
+              <a:t>2/9/2013</a:t>
             </a:fld>
             <a:endParaRPr lang="en-US"/>
           </a:p>
@@ -1597,8 +1597,8 @@
         </p:nvSpPr>
         <p:spPr>
           <a:xfrm>
-            <a:off x="432039" y="1344242"/>
-            <a:ext cx="3816337" cy="3802019"/>
+            <a:off x="457202" y="1344242"/>
+            <a:ext cx="4038600" cy="3802019"/>
           </a:xfrm>
         </p:spPr>
         <p:txBody>
@@ -1682,8 +1682,8 @@
         </p:nvSpPr>
         <p:spPr>
           <a:xfrm>
-            <a:off x="4392388" y="1344242"/>
-            <a:ext cx="3816337" cy="3802019"/>
+            <a:off x="4648201" y="1344242"/>
+            <a:ext cx="4038600" cy="3802019"/>
           </a:xfrm>
         </p:spPr>
         <p:txBody>
@@ -1773,7 +1773,7 @@
             <a:fld id="{1D8BD707-D9CF-40AE-B4C6-C98DA3205C09}" type="datetimeFigureOut">
               <a:rPr lang="en-US" smtClean="0"/>
               <a:pPr/>
-              <a:t>7/28/2012</a:t>
+              <a:t>2/9/2013</a:t>
             </a:fld>
             <a:endParaRPr lang="en-US"/>
           </a:p>
@@ -1886,8 +1886,8 @@
         </p:nvSpPr>
         <p:spPr>
           <a:xfrm>
-            <a:off x="432039" y="1289566"/>
-            <a:ext cx="3817838" cy="537430"/>
+            <a:off x="457201" y="1289566"/>
+            <a:ext cx="4040189" cy="537430"/>
           </a:xfrm>
         </p:spPr>
         <p:txBody>
@@ -1951,8 +1951,8 @@
         </p:nvSpPr>
         <p:spPr>
           <a:xfrm>
-            <a:off x="432039" y="1826997"/>
-            <a:ext cx="3817838" cy="3319265"/>
+            <a:off x="457201" y="1826997"/>
+            <a:ext cx="4040189" cy="3319265"/>
           </a:xfrm>
         </p:spPr>
         <p:txBody>
@@ -2036,8 +2036,8 @@
         </p:nvSpPr>
         <p:spPr>
           <a:xfrm>
-            <a:off x="4389389" y="1289566"/>
-            <a:ext cx="3819337" cy="537430"/>
+            <a:off x="4645028" y="1289566"/>
+            <a:ext cx="4041774" cy="537430"/>
           </a:xfrm>
         </p:spPr>
         <p:txBody>
@@ -2101,8 +2101,8 @@
         </p:nvSpPr>
         <p:spPr>
           <a:xfrm>
-            <a:off x="4389389" y="1826997"/>
-            <a:ext cx="3819337" cy="3319265"/>
+            <a:off x="4645028" y="1826997"/>
+            <a:ext cx="4041774" cy="3319265"/>
           </a:xfrm>
         </p:spPr>
         <p:txBody>
@@ -2192,7 +2192,7 @@
             <a:fld id="{1D8BD707-D9CF-40AE-B4C6-C98DA3205C09}" type="datetimeFigureOut">
               <a:rPr lang="en-US" smtClean="0"/>
               <a:pPr/>
-              <a:t>7/28/2012</a:t>
+              <a:t>2/9/2013</a:t>
             </a:fld>
             <a:endParaRPr lang="en-US"/>
           </a:p>
@@ -2307,7 +2307,7 @@
             <a:fld id="{1D8BD707-D9CF-40AE-B4C6-C98DA3205C09}" type="datetimeFigureOut">
               <a:rPr lang="en-US" smtClean="0"/>
               <a:pPr/>
-              <a:t>7/28/2012</a:t>
+              <a:t>2/9/2013</a:t>
             </a:fld>
             <a:endParaRPr lang="en-US"/>
           </a:p>
@@ -2399,7 +2399,7 @@
             <a:fld id="{1D8BD707-D9CF-40AE-B4C6-C98DA3205C09}" type="datetimeFigureOut">
               <a:rPr lang="en-US" smtClean="0"/>
               <a:pPr/>
-              <a:t>7/28/2012</a:t>
+              <a:t>2/9/2013</a:t>
             </a:fld>
             <a:endParaRPr lang="en-US"/>
           </a:p>
@@ -2485,8 +2485,8 @@
         </p:nvSpPr>
         <p:spPr>
           <a:xfrm>
-            <a:off x="432039" y="229375"/>
-            <a:ext cx="2842752" cy="976176"/>
+            <a:off x="457201" y="229375"/>
+            <a:ext cx="3008314" cy="976176"/>
           </a:xfrm>
         </p:spPr>
         <p:txBody>
@@ -2517,8 +2517,8 @@
         </p:nvSpPr>
         <p:spPr>
           <a:xfrm>
-            <a:off x="3378298" y="229375"/>
-            <a:ext cx="4830427" cy="4916886"/>
+            <a:off x="3575051" y="229375"/>
+            <a:ext cx="5111751" cy="4916886"/>
           </a:xfrm>
         </p:spPr>
         <p:txBody>
@@ -2602,8 +2602,8 @@
         </p:nvSpPr>
         <p:spPr>
           <a:xfrm>
-            <a:off x="432039" y="1205551"/>
-            <a:ext cx="2842752" cy="3940710"/>
+            <a:off x="457201" y="1205551"/>
+            <a:ext cx="3008314" cy="3940710"/>
           </a:xfrm>
         </p:spPr>
         <p:txBody>
@@ -2673,7 +2673,7 @@
             <a:fld id="{1D8BD707-D9CF-40AE-B4C6-C98DA3205C09}" type="datetimeFigureOut">
               <a:rPr lang="en-US" smtClean="0"/>
               <a:pPr/>
-              <a:t>7/28/2012</a:t>
+              <a:t>2/9/2013</a:t>
             </a:fld>
             <a:endParaRPr lang="en-US"/>
           </a:p>
@@ -2759,8 +2759,8 @@
         </p:nvSpPr>
         <p:spPr>
           <a:xfrm>
-            <a:off x="1693650" y="4032727"/>
-            <a:ext cx="5184458" cy="476086"/>
+            <a:off x="1792288" y="4032727"/>
+            <a:ext cx="5486400" cy="476086"/>
           </a:xfrm>
         </p:spPr>
         <p:txBody>
@@ -2791,8 +2791,8 @@
         </p:nvSpPr>
         <p:spPr>
           <a:xfrm>
-            <a:off x="1693650" y="514760"/>
-            <a:ext cx="5184458" cy="3456623"/>
+            <a:off x="1792288" y="514762"/>
+            <a:ext cx="5486400" cy="3456623"/>
           </a:xfrm>
         </p:spPr>
         <p:txBody>
@@ -2852,8 +2852,8 @@
         </p:nvSpPr>
         <p:spPr>
           <a:xfrm>
-            <a:off x="1693650" y="4508813"/>
-            <a:ext cx="5184458" cy="676121"/>
+            <a:off x="1792288" y="4508815"/>
+            <a:ext cx="5486400" cy="676121"/>
           </a:xfrm>
         </p:spPr>
         <p:txBody>
@@ -2923,7 +2923,7 @@
             <a:fld id="{1D8BD707-D9CF-40AE-B4C6-C98DA3205C09}" type="datetimeFigureOut">
               <a:rPr lang="en-US" smtClean="0"/>
               <a:pPr/>
-              <a:t>7/28/2012</a:t>
+              <a:t>2/9/2013</a:t>
             </a:fld>
             <a:endParaRPr lang="en-US"/>
           </a:p>
@@ -3014,8 +3014,8 @@
         </p:nvSpPr>
         <p:spPr>
           <a:xfrm>
-            <a:off x="432038" y="230709"/>
-            <a:ext cx="7776687" cy="960173"/>
+            <a:off x="457202" y="230709"/>
+            <a:ext cx="8229600" cy="960173"/>
           </a:xfrm>
           <a:prstGeom prst="rect">
             <a:avLst/>
@@ -3047,8 +3047,8 @@
         </p:nvSpPr>
         <p:spPr>
           <a:xfrm>
-            <a:off x="432038" y="1344242"/>
-            <a:ext cx="7776687" cy="3802019"/>
+            <a:off x="457202" y="1344242"/>
+            <a:ext cx="8229600" cy="3802019"/>
           </a:xfrm>
           <a:prstGeom prst="rect">
             <a:avLst/>
@@ -3109,8 +3109,8 @@
         </p:nvSpPr>
         <p:spPr>
           <a:xfrm>
-            <a:off x="432039" y="5339630"/>
-            <a:ext cx="2016178" cy="306722"/>
+            <a:off x="457201" y="5339630"/>
+            <a:ext cx="2133600" cy="306722"/>
           </a:xfrm>
           <a:prstGeom prst="rect">
             <a:avLst/>
@@ -3133,7 +3133,7 @@
             <a:fld id="{1D8BD707-D9CF-40AE-B4C6-C98DA3205C09}" type="datetimeFigureOut">
               <a:rPr lang="en-US" smtClean="0"/>
               <a:pPr/>
-              <a:t>7/28/2012</a:t>
+              <a:t>2/9/2013</a:t>
             </a:fld>
             <a:endParaRPr lang="en-US"/>
           </a:p>
@@ -3151,8 +3151,8 @@
         </p:nvSpPr>
         <p:spPr>
           <a:xfrm>
-            <a:off x="2952262" y="5339630"/>
-            <a:ext cx="2736242" cy="306722"/>
+            <a:off x="3124202" y="5339630"/>
+            <a:ext cx="2895600" cy="306722"/>
           </a:xfrm>
           <a:prstGeom prst="rect">
             <a:avLst/>
@@ -3188,8 +3188,8 @@
         </p:nvSpPr>
         <p:spPr>
           <a:xfrm>
-            <a:off x="6192548" y="5339630"/>
-            <a:ext cx="2016178" cy="306722"/>
+            <a:off x="6553201" y="5339630"/>
+            <a:ext cx="2133600" cy="306722"/>
           </a:xfrm>
           <a:prstGeom prst="rect">
             <a:avLst/>
@@ -3506,13 +3506,449 @@
       </p:grpSpPr>
       <p:sp>
         <p:nvSpPr>
-          <p:cNvPr id="173" name="Rounded Rectangle 172"/>
+          <p:cNvPr id="5" name="laptop"/>
+          <p:cNvSpPr>
+            <a:spLocks noEditPoints="1" noChangeArrowheads="1"/>
+          </p:cNvSpPr>
+          <p:nvPr/>
+        </p:nvSpPr>
+        <p:spPr bwMode="auto">
+          <a:xfrm>
+            <a:off x="457199" y="1053848"/>
+            <a:ext cx="1272365" cy="988472"/>
+          </a:xfrm>
+          <a:custGeom>
+            <a:avLst/>
+            <a:gdLst>
+              <a:gd name="T0" fmla="*/ 3362 w 21600"/>
+              <a:gd name="T1" fmla="*/ 0 h 21600"/>
+              <a:gd name="T2" fmla="*/ 3362 w 21600"/>
+              <a:gd name="T3" fmla="*/ 7173 h 21600"/>
+              <a:gd name="T4" fmla="*/ 18327 w 21600"/>
+              <a:gd name="T5" fmla="*/ 0 h 21600"/>
+              <a:gd name="T6" fmla="*/ 18327 w 21600"/>
+              <a:gd name="T7" fmla="*/ 7173 h 21600"/>
+              <a:gd name="T8" fmla="*/ 10800 w 21600"/>
+              <a:gd name="T9" fmla="*/ 0 h 21600"/>
+              <a:gd name="T10" fmla="*/ 10800 w 21600"/>
+              <a:gd name="T11" fmla="*/ 21600 h 21600"/>
+              <a:gd name="T12" fmla="*/ 0 w 21600"/>
+              <a:gd name="T13" fmla="*/ 21600 h 21600"/>
+              <a:gd name="T14" fmla="*/ 21600 w 21600"/>
+              <a:gd name="T15" fmla="*/ 21600 h 21600"/>
+              <a:gd name="T16" fmla="*/ 4445 w 21600"/>
+              <a:gd name="T17" fmla="*/ 1858 h 21600"/>
+              <a:gd name="T18" fmla="*/ 17311 w 21600"/>
+              <a:gd name="T19" fmla="*/ 12323 h 21600"/>
+            </a:gdLst>
+            <a:ahLst/>
+            <a:cxnLst>
+              <a:cxn ang="0">
+                <a:pos x="T0" y="T1"/>
+              </a:cxn>
+              <a:cxn ang="0">
+                <a:pos x="T2" y="T3"/>
+              </a:cxn>
+              <a:cxn ang="0">
+                <a:pos x="T4" y="T5"/>
+              </a:cxn>
+              <a:cxn ang="0">
+                <a:pos x="T6" y="T7"/>
+              </a:cxn>
+              <a:cxn ang="0">
+                <a:pos x="T8" y="T9"/>
+              </a:cxn>
+              <a:cxn ang="0">
+                <a:pos x="T10" y="T11"/>
+              </a:cxn>
+              <a:cxn ang="0">
+                <a:pos x="T12" y="T13"/>
+              </a:cxn>
+              <a:cxn ang="0">
+                <a:pos x="T14" y="T15"/>
+              </a:cxn>
+            </a:cxnLst>
+            <a:rect l="T16" t="T17" r="T18" b="T19"/>
+            <a:pathLst>
+              <a:path w="21600" h="21600" extrusionOk="0">
+                <a:moveTo>
+                  <a:pt x="3362" y="0"/>
+                </a:moveTo>
+                <a:lnTo>
+                  <a:pt x="18327" y="0"/>
+                </a:lnTo>
+                <a:lnTo>
+                  <a:pt x="18327" y="14347"/>
+                </a:lnTo>
+                <a:lnTo>
+                  <a:pt x="3362" y="14347"/>
+                </a:lnTo>
+                <a:lnTo>
+                  <a:pt x="3362" y="0"/>
+                </a:lnTo>
+                <a:close/>
+              </a:path>
+              <a:path w="21600" h="21600" extrusionOk="0">
+                <a:moveTo>
+                  <a:pt x="3340" y="15068"/>
+                </a:moveTo>
+                <a:lnTo>
+                  <a:pt x="0" y="19877"/>
+                </a:lnTo>
+                <a:lnTo>
+                  <a:pt x="21600" y="19877"/>
+                </a:lnTo>
+                <a:lnTo>
+                  <a:pt x="18327" y="15068"/>
+                </a:lnTo>
+                <a:lnTo>
+                  <a:pt x="3340" y="15068"/>
+                </a:lnTo>
+                <a:close/>
+              </a:path>
+              <a:path w="21600" h="21600" extrusionOk="0">
+                <a:moveTo>
+                  <a:pt x="0" y="19877"/>
+                </a:moveTo>
+                <a:lnTo>
+                  <a:pt x="0" y="21600"/>
+                </a:lnTo>
+                <a:lnTo>
+                  <a:pt x="21600" y="21600"/>
+                </a:lnTo>
+                <a:lnTo>
+                  <a:pt x="21600" y="19877"/>
+                </a:lnTo>
+                <a:lnTo>
+                  <a:pt x="0" y="19877"/>
+                </a:lnTo>
+                <a:close/>
+              </a:path>
+              <a:path w="21600" h="21600" extrusionOk="0">
+                <a:moveTo>
+                  <a:pt x="4186" y="1523"/>
+                </a:moveTo>
+                <a:lnTo>
+                  <a:pt x="17547" y="1523"/>
+                </a:lnTo>
+                <a:lnTo>
+                  <a:pt x="17547" y="12744"/>
+                </a:lnTo>
+                <a:lnTo>
+                  <a:pt x="4186" y="12744"/>
+                </a:lnTo>
+                <a:lnTo>
+                  <a:pt x="4186" y="1523"/>
+                </a:lnTo>
+                <a:close/>
+              </a:path>
+              <a:path w="21600" h="21600" extrusionOk="0">
+                <a:moveTo>
+                  <a:pt x="3318" y="15549"/>
+                </a:moveTo>
+                <a:lnTo>
+                  <a:pt x="2917" y="16110"/>
+                </a:lnTo>
+                <a:lnTo>
+                  <a:pt x="18727" y="16110"/>
+                </a:lnTo>
+                <a:lnTo>
+                  <a:pt x="18327" y="15549"/>
+                </a:lnTo>
+                <a:lnTo>
+                  <a:pt x="3318" y="15549"/>
+                </a:lnTo>
+                <a:close/>
+              </a:path>
+              <a:path w="21600" h="21600" extrusionOk="0">
+                <a:moveTo>
+                  <a:pt x="6213" y="18314"/>
+                </a:moveTo>
+                <a:lnTo>
+                  <a:pt x="5946" y="18875"/>
+                </a:lnTo>
+                <a:lnTo>
+                  <a:pt x="15766" y="18875"/>
+                </a:lnTo>
+                <a:lnTo>
+                  <a:pt x="15499" y="18314"/>
+                </a:lnTo>
+                <a:lnTo>
+                  <a:pt x="6213" y="18314"/>
+                </a:lnTo>
+                <a:close/>
+              </a:path>
+              <a:path w="21600" h="21600" extrusionOk="0">
+                <a:moveTo>
+                  <a:pt x="2828" y="16471"/>
+                </a:moveTo>
+                <a:lnTo>
+                  <a:pt x="2405" y="17072"/>
+                </a:lnTo>
+                <a:lnTo>
+                  <a:pt x="19284" y="17072"/>
+                </a:lnTo>
+                <a:lnTo>
+                  <a:pt x="18839" y="16471"/>
+                </a:lnTo>
+                <a:lnTo>
+                  <a:pt x="2828" y="16471"/>
+                </a:lnTo>
+                <a:close/>
+              </a:path>
+              <a:path w="21600" h="21600" extrusionOk="0">
+                <a:moveTo>
+                  <a:pt x="2316" y="17352"/>
+                </a:moveTo>
+                <a:lnTo>
+                  <a:pt x="1871" y="17953"/>
+                </a:lnTo>
+                <a:lnTo>
+                  <a:pt x="19863" y="17953"/>
+                </a:lnTo>
+                <a:lnTo>
+                  <a:pt x="19395" y="17352"/>
+                </a:lnTo>
+                <a:lnTo>
+                  <a:pt x="2316" y="17352"/>
+                </a:lnTo>
+                <a:close/>
+              </a:path>
+            </a:pathLst>
+          </a:custGeom>
+          <a:solidFill>
+            <a:schemeClr val="bg1"/>
+          </a:solidFill>
+          <a:ln w="38100">
+            <a:solidFill>
+              <a:schemeClr val="bg1">
+                <a:lumMod val="85000"/>
+              </a:schemeClr>
+            </a:solidFill>
+            <a:miter lim="800000"/>
+            <a:headEnd/>
+            <a:tailEnd/>
+          </a:ln>
+        </p:spPr>
+        <p:txBody>
+          <a:bodyPr vert="horz" wrap="square" lIns="91440" tIns="45720" rIns="91440" bIns="45720" numCol="1" anchor="t" anchorCtr="0" compatLnSpc="1">
+            <a:prstTxWarp prst="textNoShape">
+              <a:avLst/>
+            </a:prstTxWarp>
+          </a:bodyPr>
+          <a:lstStyle/>
+          <a:p>
+            <a:endParaRPr lang="en-US"/>
+          </a:p>
+        </p:txBody>
+      </p:sp>
+      <p:sp>
+        <p:nvSpPr>
+          <p:cNvPr id="80" name="Cloud 79"/>
           <p:cNvSpPr/>
           <p:nvPr/>
         </p:nvSpPr>
         <p:spPr>
           <a:xfrm>
-            <a:off x="3482181" y="3947319"/>
+            <a:off x="7941267" y="1350987"/>
+            <a:ext cx="1186265" cy="462732"/>
+          </a:xfrm>
+          <a:prstGeom prst="cloud">
+            <a:avLst/>
+          </a:prstGeom>
+          <a:solidFill>
+            <a:schemeClr val="bg1"/>
+          </a:solidFill>
+          <a:ln>
+            <a:solidFill>
+              <a:schemeClr val="bg1">
+                <a:lumMod val="85000"/>
+              </a:schemeClr>
+            </a:solidFill>
+          </a:ln>
+        </p:spPr>
+        <p:style>
+          <a:lnRef idx="2">
+            <a:schemeClr val="accent1">
+              <a:shade val="50000"/>
+            </a:schemeClr>
+          </a:lnRef>
+          <a:fillRef idx="1">
+            <a:schemeClr val="accent1"/>
+          </a:fillRef>
+          <a:effectRef idx="0">
+            <a:schemeClr val="accent1"/>
+          </a:effectRef>
+          <a:fontRef idx="minor">
+            <a:schemeClr val="lt1"/>
+          </a:fontRef>
+        </p:style>
+        <p:txBody>
+          <a:bodyPr lIns="0" rIns="0" bIns="0" rtlCol="0" anchor="ctr"/>
+          <a:lstStyle/>
+          <a:p>
+            <a:pPr algn="ctr"/>
+            <a:r>
+              <a:rPr lang="en-US" sz="1400" b="1" dirty="0" err="1">
+                <a:solidFill>
+                  <a:schemeClr val="bg1">
+                    <a:lumMod val="65000"/>
+                  </a:schemeClr>
+                </a:solidFill>
+              </a:rPr>
+              <a:t>Appspot</a:t>
+            </a:r>
+            <a:endParaRPr lang="en-US" sz="1400" b="1" dirty="0">
+              <a:solidFill>
+                <a:schemeClr val="bg1">
+                  <a:lumMod val="65000"/>
+                </a:schemeClr>
+              </a:solidFill>
+            </a:endParaRPr>
+          </a:p>
+        </p:txBody>
+      </p:sp>
+      <p:sp>
+        <p:nvSpPr>
+          <p:cNvPr id="81" name="Cloud 80"/>
+          <p:cNvSpPr/>
+          <p:nvPr/>
+        </p:nvSpPr>
+        <p:spPr>
+          <a:xfrm>
+            <a:off x="5476710" y="1432719"/>
+            <a:ext cx="1609890" cy="462732"/>
+          </a:xfrm>
+          <a:prstGeom prst="cloud">
+            <a:avLst/>
+          </a:prstGeom>
+          <a:solidFill>
+            <a:schemeClr val="bg1"/>
+          </a:solidFill>
+          <a:ln>
+            <a:solidFill>
+              <a:schemeClr val="bg1">
+                <a:lumMod val="85000"/>
+              </a:schemeClr>
+            </a:solidFill>
+          </a:ln>
+        </p:spPr>
+        <p:style>
+          <a:lnRef idx="2">
+            <a:schemeClr val="accent1">
+              <a:shade val="50000"/>
+            </a:schemeClr>
+          </a:lnRef>
+          <a:fillRef idx="1">
+            <a:schemeClr val="accent1"/>
+          </a:fillRef>
+          <a:effectRef idx="0">
+            <a:schemeClr val="accent1"/>
+          </a:effectRef>
+          <a:fontRef idx="minor">
+            <a:schemeClr val="lt1"/>
+          </a:fontRef>
+        </p:style>
+        <p:txBody>
+          <a:bodyPr lIns="0" rIns="0" bIns="0" rtlCol="0" anchor="ctr"/>
+          <a:lstStyle/>
+          <a:p>
+            <a:pPr algn="ctr"/>
+            <a:r>
+              <a:rPr lang="en-US" sz="1400" b="1" dirty="0" err="1" smtClean="0">
+                <a:solidFill>
+                  <a:schemeClr val="bg1">
+                    <a:lumMod val="65000"/>
+                  </a:schemeClr>
+                </a:solidFill>
+              </a:rPr>
+              <a:t>GoogleCode</a:t>
+            </a:r>
+            <a:endParaRPr lang="en-US" sz="1400" b="1" dirty="0">
+              <a:solidFill>
+                <a:schemeClr val="bg1">
+                  <a:lumMod val="65000"/>
+                </a:schemeClr>
+              </a:solidFill>
+            </a:endParaRPr>
+          </a:p>
+        </p:txBody>
+      </p:sp>
+      <p:sp>
+        <p:nvSpPr>
+          <p:cNvPr id="82" name="Cloud 81"/>
+          <p:cNvSpPr/>
+          <p:nvPr/>
+        </p:nvSpPr>
+        <p:spPr>
+          <a:xfrm>
+            <a:off x="2895600" y="1432719"/>
+            <a:ext cx="1609890" cy="462732"/>
+          </a:xfrm>
+          <a:prstGeom prst="cloud">
+            <a:avLst/>
+          </a:prstGeom>
+          <a:solidFill>
+            <a:schemeClr val="bg1"/>
+          </a:solidFill>
+          <a:ln>
+            <a:solidFill>
+              <a:schemeClr val="bg1">
+                <a:lumMod val="85000"/>
+              </a:schemeClr>
+            </a:solidFill>
+          </a:ln>
+        </p:spPr>
+        <p:style>
+          <a:lnRef idx="2">
+            <a:schemeClr val="accent1">
+              <a:shade val="50000"/>
+            </a:schemeClr>
+          </a:lnRef>
+          <a:fillRef idx="1">
+            <a:schemeClr val="accent1"/>
+          </a:fillRef>
+          <a:effectRef idx="0">
+            <a:schemeClr val="accent1"/>
+          </a:effectRef>
+          <a:fontRef idx="minor">
+            <a:schemeClr val="lt1"/>
+          </a:fontRef>
+        </p:style>
+        <p:txBody>
+          <a:bodyPr lIns="0" rIns="0" bIns="0" rtlCol="0" anchor="ctr"/>
+          <a:lstStyle/>
+          <a:p>
+            <a:pPr algn="ctr"/>
+            <a:r>
+              <a:rPr lang="en-US" sz="1400" b="1" dirty="0" err="1" smtClean="0">
+                <a:solidFill>
+                  <a:schemeClr val="bg1">
+                    <a:lumMod val="65000"/>
+                  </a:schemeClr>
+                </a:solidFill>
+              </a:rPr>
+              <a:t>GoogleCode</a:t>
+            </a:r>
+            <a:endParaRPr lang="en-US" sz="1400" b="1" dirty="0">
+              <a:solidFill>
+                <a:schemeClr val="bg1">
+                  <a:lumMod val="65000"/>
+                </a:schemeClr>
+              </a:solidFill>
+            </a:endParaRPr>
+          </a:p>
+        </p:txBody>
+      </p:sp>
+      <p:sp>
+        <p:nvSpPr>
+          <p:cNvPr id="83" name="Rounded Rectangle 82"/>
+          <p:cNvSpPr/>
+          <p:nvPr/>
+        </p:nvSpPr>
+        <p:spPr>
+          <a:xfrm>
+            <a:off x="3962400" y="3947319"/>
             <a:ext cx="5029200" cy="1737518"/>
           </a:xfrm>
           <a:prstGeom prst="roundRect">
@@ -3559,28 +3995,27 @@
       </p:sp>
       <p:sp>
         <p:nvSpPr>
-          <p:cNvPr id="58" name="Can 57"/>
+          <p:cNvPr id="84" name="Can 83"/>
           <p:cNvSpPr/>
           <p:nvPr/>
         </p:nvSpPr>
         <p:spPr>
           <a:xfrm>
-            <a:off x="2491581" y="826096"/>
-            <a:ext cx="1066800" cy="762000"/>
+            <a:off x="3200400" y="826096"/>
+            <a:ext cx="1184858" cy="762000"/>
           </a:xfrm>
           <a:prstGeom prst="can">
             <a:avLst/>
           </a:prstGeom>
           <a:solidFill>
-            <a:schemeClr val="bg1">
-              <a:lumMod val="65000"/>
+            <a:schemeClr val="accent2">
+              <a:lumMod val="60000"/>
+              <a:lumOff val="40000"/>
             </a:schemeClr>
           </a:solidFill>
           <a:ln>
             <a:solidFill>
-              <a:schemeClr val="bg1">
-                <a:lumMod val="65000"/>
-              </a:schemeClr>
+              <a:srgbClr val="D28280"/>
             </a:solidFill>
           </a:ln>
         </p:spPr>
@@ -3606,44 +4041,43 @@
           <a:p>
             <a:pPr algn="ctr"/>
             <a:r>
-              <a:rPr lang="en-US" sz="1600" b="1" dirty="0" smtClean="0"/>
-              <a:t>Review</a:t>
+              <a:rPr lang="en-US" sz="1600" b="1" dirty="0"/>
+              <a:t>Contributor</a:t>
             </a:r>
           </a:p>
           <a:p>
             <a:pPr algn="ctr"/>
             <a:r>
-              <a:rPr lang="en-US" sz="1600" dirty="0" smtClean="0"/>
+              <a:rPr lang="en-US" sz="1600" b="1" dirty="0"/>
               <a:t>Repo</a:t>
             </a:r>
-            <a:endParaRPr lang="en-US" sz="1600" dirty="0"/>
-          </a:p>
-        </p:txBody>
-      </p:sp>
-      <p:sp>
-        <p:nvSpPr>
-          <p:cNvPr id="59" name="Can 58"/>
+            <a:endParaRPr lang="en-US" sz="1600" b="1" dirty="0"/>
+          </a:p>
+        </p:txBody>
+      </p:sp>
+      <p:sp>
+        <p:nvSpPr>
+          <p:cNvPr id="85" name="Can 84"/>
           <p:cNvSpPr/>
           <p:nvPr/>
         </p:nvSpPr>
         <p:spPr>
           <a:xfrm>
-            <a:off x="4929981" y="826096"/>
-            <a:ext cx="1066800" cy="762000"/>
+            <a:off x="5853514" y="826096"/>
+            <a:ext cx="1107933" cy="762000"/>
           </a:xfrm>
           <a:prstGeom prst="can">
             <a:avLst/>
           </a:prstGeom>
           <a:solidFill>
-            <a:schemeClr val="bg1">
-              <a:lumMod val="65000"/>
+            <a:schemeClr val="accent2">
+              <a:lumMod val="60000"/>
+              <a:lumOff val="40000"/>
             </a:schemeClr>
           </a:solidFill>
           <a:ln>
             <a:solidFill>
-              <a:schemeClr val="bg1">
-                <a:lumMod val="65000"/>
-              </a:schemeClr>
+              <a:srgbClr val="D28280"/>
             </a:solidFill>
           </a:ln>
         </p:spPr>
@@ -3670,8 +4104,9 @@
             <a:pPr algn="ctr"/>
             <a:r>
               <a:rPr lang="en-US" sz="1600" b="1" dirty="0" smtClean="0"/>
-              <a:t>Release</a:t>
-            </a:r>
+              <a:t>Committer</a:t>
+            </a:r>
+            <a:endParaRPr lang="en-US" sz="1600" b="1" dirty="0" smtClean="0"/>
           </a:p>
           <a:p>
             <a:pPr algn="ctr"/>
@@ -3684,7 +4119,7 @@
       </p:sp>
       <p:pic>
         <p:nvPicPr>
-          <p:cNvPr id="2050" name="Picture 2" descr="http://screenshots.en.sftcdn.net/en/scrn/70000/70210/google-app-engine-1.jpg"/>
+          <p:cNvPr id="86" name="Picture 2" descr="http://screenshots.en.sftcdn.net/en/scrn/70000/70210/google-app-engine-1.jpg"/>
           <p:cNvPicPr>
             <a:picLocks noChangeAspect="1" noChangeArrowheads="1"/>
           </p:cNvPicPr>
@@ -3702,7 +4137,13 @@
                 </a:srgbClr>
               </a:clrTo>
             </a:clrChange>
-            <a:grayscl/>
+            <a:duotone>
+              <a:schemeClr val="accent2">
+                <a:shade val="45000"/>
+                <a:satMod val="135000"/>
+              </a:schemeClr>
+              <a:prstClr val="white"/>
+            </a:duotone>
           </a:blip>
           <a:srcRect/>
           <a:stretch>
@@ -3711,7 +4152,7 @@
         </p:blipFill>
         <p:spPr bwMode="auto">
           <a:xfrm>
-            <a:off x="7349331" y="597496"/>
+            <a:off x="8058150" y="597496"/>
             <a:ext cx="1085850" cy="1085850"/>
           </a:xfrm>
           <a:prstGeom prst="rect">
@@ -3722,13 +4163,13 @@
       </p:pic>
       <p:grpSp>
         <p:nvGrpSpPr>
-          <p:cNvPr id="65" name="Group 64"/>
+          <p:cNvPr id="87" name="Group 86"/>
           <p:cNvGrpSpPr/>
           <p:nvPr/>
         </p:nvGrpSpPr>
         <p:grpSpPr>
           <a:xfrm>
-            <a:off x="434181" y="902296"/>
+            <a:off x="304800" y="902296"/>
             <a:ext cx="304800" cy="533400"/>
             <a:chOff x="2339181" y="3718719"/>
             <a:chExt cx="304800" cy="533400"/>
@@ -3742,7 +4183,7 @@
         </p:grpSpPr>
         <p:sp>
           <p:nvSpPr>
-            <p:cNvPr id="63" name="Flowchart: Connector 62"/>
+            <p:cNvPr id="88" name="Flowchart: Connector 87"/>
             <p:cNvSpPr/>
             <p:nvPr/>
           </p:nvSpPr>
@@ -3788,7 +4229,7 @@
         </p:sp>
         <p:sp>
           <p:nvSpPr>
-            <p:cNvPr id="64" name="Flowchart: Delay 63"/>
+            <p:cNvPr id="89" name="Flowchart: Delay 88"/>
             <p:cNvSpPr/>
             <p:nvPr/>
           </p:nvSpPr>
@@ -3835,13 +4276,13 @@
       </p:grpSp>
       <p:grpSp>
         <p:nvGrpSpPr>
-          <p:cNvPr id="68" name="Group 67"/>
+          <p:cNvPr id="90" name="Group 89"/>
           <p:cNvGrpSpPr/>
           <p:nvPr/>
         </p:nvGrpSpPr>
         <p:grpSpPr>
           <a:xfrm>
-            <a:off x="2415381" y="2578696"/>
+            <a:off x="3200400" y="2847777"/>
             <a:ext cx="304800" cy="533400"/>
             <a:chOff x="2339181" y="3718719"/>
             <a:chExt cx="304800" cy="533400"/>
@@ -3849,7 +4290,7 @@
         </p:grpSpPr>
         <p:sp>
           <p:nvSpPr>
-            <p:cNvPr id="69" name="Flowchart: Connector 68"/>
+            <p:cNvPr id="91" name="Flowchart: Connector 90"/>
             <p:cNvSpPr/>
             <p:nvPr/>
           </p:nvSpPr>
@@ -3889,7 +4330,7 @@
         </p:sp>
         <p:sp>
           <p:nvSpPr>
-            <p:cNvPr id="70" name="Flowchart: Delay 69"/>
+            <p:cNvPr id="93" name="Flowchart: Delay 92"/>
             <p:cNvSpPr/>
             <p:nvPr/>
           </p:nvSpPr>
@@ -3930,13 +4371,13 @@
       </p:grpSp>
       <p:sp>
         <p:nvSpPr>
-          <p:cNvPr id="71" name="TextBox 70"/>
+          <p:cNvPr id="94" name="TextBox 93"/>
           <p:cNvSpPr txBox="1"/>
           <p:nvPr/>
         </p:nvSpPr>
         <p:spPr>
           <a:xfrm>
-            <a:off x="2110581" y="3185319"/>
+            <a:off x="2895600" y="3454400"/>
             <a:ext cx="914400" cy="340519"/>
           </a:xfrm>
           <a:prstGeom prst="roundRect">
@@ -3973,13 +4414,13 @@
       </p:sp>
       <p:grpSp>
         <p:nvGrpSpPr>
-          <p:cNvPr id="72" name="Group 71"/>
+          <p:cNvPr id="95" name="Group 94"/>
           <p:cNvGrpSpPr/>
           <p:nvPr/>
         </p:nvGrpSpPr>
         <p:grpSpPr>
           <a:xfrm>
-            <a:off x="4167981" y="2578696"/>
+            <a:off x="4953000" y="2847777"/>
             <a:ext cx="304800" cy="533400"/>
             <a:chOff x="2339181" y="3718719"/>
             <a:chExt cx="304800" cy="533400"/>
@@ -3987,7 +4428,7 @@
         </p:grpSpPr>
         <p:sp>
           <p:nvSpPr>
-            <p:cNvPr id="73" name="Flowchart: Connector 72"/>
+            <p:cNvPr id="96" name="Flowchart: Connector 95"/>
             <p:cNvSpPr/>
             <p:nvPr/>
           </p:nvSpPr>
@@ -4027,7 +4468,7 @@
         </p:sp>
         <p:sp>
           <p:nvSpPr>
-            <p:cNvPr id="74" name="Flowchart: Delay 73"/>
+            <p:cNvPr id="100" name="Flowchart: Delay 99"/>
             <p:cNvSpPr/>
             <p:nvPr/>
           </p:nvSpPr>
@@ -4068,13 +4509,13 @@
       </p:grpSp>
       <p:sp>
         <p:nvSpPr>
-          <p:cNvPr id="75" name="TextBox 74"/>
+          <p:cNvPr id="101" name="TextBox 100"/>
           <p:cNvSpPr txBox="1"/>
           <p:nvPr/>
         </p:nvSpPr>
         <p:spPr>
           <a:xfrm>
-            <a:off x="3863181" y="3185319"/>
+            <a:off x="4648200" y="3454400"/>
             <a:ext cx="1066800" cy="340519"/>
           </a:xfrm>
           <a:prstGeom prst="roundRect">
@@ -4104,13 +4545,13 @@
       </p:sp>
       <p:grpSp>
         <p:nvGrpSpPr>
-          <p:cNvPr id="76" name="Group 75"/>
+          <p:cNvPr id="104" name="Group 103"/>
           <p:cNvGrpSpPr/>
           <p:nvPr/>
         </p:nvGrpSpPr>
         <p:grpSpPr>
           <a:xfrm>
-            <a:off x="6682581" y="2578696"/>
+            <a:off x="7467600" y="2847777"/>
             <a:ext cx="304800" cy="533400"/>
             <a:chOff x="2339181" y="3718719"/>
             <a:chExt cx="304800" cy="533400"/>
@@ -4118,7 +4559,7 @@
         </p:grpSpPr>
         <p:sp>
           <p:nvSpPr>
-            <p:cNvPr id="77" name="Flowchart: Connector 76"/>
+            <p:cNvPr id="105" name="Flowchart: Connector 104"/>
             <p:cNvSpPr/>
             <p:nvPr/>
           </p:nvSpPr>
@@ -4158,7 +4599,7 @@
         </p:sp>
         <p:sp>
           <p:nvSpPr>
-            <p:cNvPr id="78" name="Flowchart: Delay 77"/>
+            <p:cNvPr id="106" name="Flowchart: Delay 105"/>
             <p:cNvSpPr/>
             <p:nvPr/>
           </p:nvSpPr>
@@ -4199,13 +4640,13 @@
       </p:grpSp>
       <p:sp>
         <p:nvSpPr>
-          <p:cNvPr id="79" name="TextBox 78"/>
+          <p:cNvPr id="108" name="TextBox 107"/>
           <p:cNvSpPr txBox="1"/>
           <p:nvPr/>
         </p:nvSpPr>
         <p:spPr>
           <a:xfrm>
-            <a:off x="6576237" y="3185319"/>
+            <a:off x="7361256" y="3454400"/>
             <a:ext cx="533400" cy="340519"/>
           </a:xfrm>
           <a:prstGeom prst="roundRect">
@@ -4237,13 +4678,13 @@
       </p:sp>
       <p:sp>
         <p:nvSpPr>
-          <p:cNvPr id="92" name="TextBox 91"/>
+          <p:cNvPr id="109" name="TextBox 108"/>
           <p:cNvSpPr txBox="1"/>
           <p:nvPr/>
         </p:nvSpPr>
         <p:spPr>
           <a:xfrm>
-            <a:off x="205581" y="1552377"/>
+            <a:off x="76200" y="1552377"/>
             <a:ext cx="533400" cy="340519"/>
           </a:xfrm>
           <a:prstGeom prst="roundRect">
@@ -4272,14 +4713,14 @@
       </p:sp>
       <p:sp>
         <p:nvSpPr>
-          <p:cNvPr id="97" name="TextBox 96"/>
+          <p:cNvPr id="110" name="TextBox 109"/>
           <p:cNvSpPr txBox="1"/>
           <p:nvPr/>
         </p:nvSpPr>
         <p:spPr>
           <a:xfrm>
-            <a:off x="738981" y="137319"/>
-            <a:ext cx="762000" cy="307777"/>
+            <a:off x="1523999" y="-15081"/>
+            <a:ext cx="1533097" cy="307777"/>
           </a:xfrm>
           <a:prstGeom prst="rect">
             <a:avLst/>
@@ -4298,7 +4739,15 @@
                   <a:srgbClr val="00B050"/>
                 </a:solidFill>
               </a:rPr>
-              <a:t>1. pull</a:t>
+              <a:t>1. </a:t>
+            </a:r>
+            <a:r>
+              <a:rPr lang="en-US" sz="1400" b="1" dirty="0" smtClean="0">
+                <a:solidFill>
+                  <a:srgbClr val="00B050"/>
+                </a:solidFill>
+              </a:rPr>
+              <a:t>pull</a:t>
             </a:r>
             <a:endParaRPr lang="en-US" sz="1400" b="1" dirty="0">
               <a:solidFill>
@@ -4310,13 +4759,13 @@
       </p:sp>
       <p:sp>
         <p:nvSpPr>
-          <p:cNvPr id="98" name="Arc 97"/>
+          <p:cNvPr id="112" name="Arc 111"/>
           <p:cNvSpPr/>
           <p:nvPr/>
         </p:nvSpPr>
         <p:spPr>
           <a:xfrm>
-            <a:off x="662781" y="978496"/>
+            <a:off x="1447800" y="978496"/>
             <a:ext cx="381000" cy="304800"/>
           </a:xfrm>
           <a:prstGeom prst="arc">
@@ -4358,13 +4807,13 @@
       </p:sp>
       <p:sp>
         <p:nvSpPr>
-          <p:cNvPr id="99" name="TextBox 98"/>
+          <p:cNvPr id="114" name="TextBox 113"/>
           <p:cNvSpPr txBox="1"/>
           <p:nvPr/>
         </p:nvSpPr>
         <p:spPr>
           <a:xfrm>
-            <a:off x="1119981" y="749896"/>
+            <a:off x="1905000" y="749896"/>
             <a:ext cx="990600" cy="646331"/>
           </a:xfrm>
           <a:prstGeom prst="rect">
@@ -4421,13 +4870,13 @@
       </p:sp>
       <p:sp>
         <p:nvSpPr>
-          <p:cNvPr id="102" name="TextBox 101"/>
+          <p:cNvPr id="127" name="TextBox 126"/>
           <p:cNvSpPr txBox="1"/>
           <p:nvPr/>
         </p:nvSpPr>
         <p:spPr>
           <a:xfrm>
-            <a:off x="1119981" y="2154238"/>
+            <a:off x="1905000" y="2619104"/>
             <a:ext cx="685800" cy="215444"/>
           </a:xfrm>
           <a:prstGeom prst="rect">
@@ -4459,13 +4908,13 @@
       </p:sp>
       <p:cxnSp>
         <p:nvCxnSpPr>
-          <p:cNvPr id="103" name="Straight Arrow Connector 102"/>
+          <p:cNvPr id="128" name="Straight Arrow Connector 127"/>
           <p:cNvCxnSpPr/>
           <p:nvPr/>
         </p:nvCxnSpPr>
         <p:spPr>
           <a:xfrm flipV="1">
-            <a:off x="2567781" y="1773238"/>
+            <a:off x="3352800" y="2042319"/>
             <a:ext cx="228600" cy="685800"/>
           </a:xfrm>
           <a:prstGeom prst="straightConnector1">
@@ -4497,13 +4946,13 @@
       </p:cxnSp>
       <p:sp>
         <p:nvSpPr>
-          <p:cNvPr id="107" name="TextBox 106"/>
+          <p:cNvPr id="129" name="TextBox 128"/>
           <p:cNvSpPr txBox="1"/>
           <p:nvPr/>
         </p:nvSpPr>
         <p:spPr>
           <a:xfrm rot="17318509">
-            <a:off x="2087118" y="1989319"/>
+            <a:off x="2872137" y="2258400"/>
             <a:ext cx="843775" cy="215444"/>
           </a:xfrm>
           <a:prstGeom prst="rect">
@@ -4539,13 +4988,13 @@
       </p:sp>
       <p:sp>
         <p:nvSpPr>
-          <p:cNvPr id="111" name="Arc 110"/>
+          <p:cNvPr id="130" name="Arc 129"/>
           <p:cNvSpPr/>
           <p:nvPr/>
         </p:nvSpPr>
         <p:spPr>
           <a:xfrm>
-            <a:off x="738981" y="216496"/>
+            <a:off x="1524000" y="216496"/>
             <a:ext cx="4419600" cy="1219200"/>
           </a:xfrm>
           <a:prstGeom prst="arc">
@@ -4587,14 +5036,14 @@
       </p:sp>
       <p:sp>
         <p:nvSpPr>
-          <p:cNvPr id="113" name="Arc 112"/>
+          <p:cNvPr id="131" name="Arc 130"/>
           <p:cNvSpPr/>
           <p:nvPr/>
         </p:nvSpPr>
         <p:spPr>
           <a:xfrm flipV="1">
-            <a:off x="815181" y="1359496"/>
-            <a:ext cx="1600200" cy="718542"/>
+            <a:off x="1563511" y="1529307"/>
+            <a:ext cx="1600200" cy="1025723"/>
           </a:xfrm>
           <a:prstGeom prst="arc">
             <a:avLst>
@@ -4635,13 +5084,13 @@
       </p:sp>
       <p:sp>
         <p:nvSpPr>
-          <p:cNvPr id="115" name="Arc 114"/>
+          <p:cNvPr id="134" name="Arc 133"/>
           <p:cNvSpPr/>
           <p:nvPr/>
         </p:nvSpPr>
         <p:spPr>
           <a:xfrm rot="2715976" flipV="1">
-            <a:off x="2998146" y="1853413"/>
+            <a:off x="3783165" y="2018071"/>
             <a:ext cx="1356586" cy="381000"/>
           </a:xfrm>
           <a:prstGeom prst="arc">
@@ -4683,13 +5132,13 @@
       </p:sp>
       <p:sp>
         <p:nvSpPr>
-          <p:cNvPr id="116" name="TextBox 115"/>
+          <p:cNvPr id="135" name="TextBox 134"/>
           <p:cNvSpPr txBox="1"/>
           <p:nvPr/>
         </p:nvSpPr>
         <p:spPr>
           <a:xfrm rot="2360287">
-            <a:off x="3177381" y="2273896"/>
+            <a:off x="3962400" y="2542977"/>
             <a:ext cx="685800" cy="215444"/>
           </a:xfrm>
           <a:prstGeom prst="rect">
@@ -4721,13 +5170,13 @@
       </p:sp>
       <p:sp>
         <p:nvSpPr>
-          <p:cNvPr id="117" name="Arc 116"/>
+          <p:cNvPr id="136" name="Arc 135"/>
           <p:cNvSpPr/>
           <p:nvPr/>
         </p:nvSpPr>
         <p:spPr>
           <a:xfrm rot="16709798">
-            <a:off x="4156356" y="2332422"/>
+            <a:off x="4941375" y="2601503"/>
             <a:ext cx="381000" cy="304800"/>
           </a:xfrm>
           <a:prstGeom prst="arc">
@@ -4773,13 +5222,13 @@
       </p:sp>
       <p:sp>
         <p:nvSpPr>
-          <p:cNvPr id="118" name="TextBox 117"/>
+          <p:cNvPr id="137" name="TextBox 136"/>
           <p:cNvSpPr txBox="1"/>
           <p:nvPr/>
         </p:nvSpPr>
         <p:spPr>
           <a:xfrm>
-            <a:off x="4091781" y="1816696"/>
+            <a:off x="4876800" y="2085777"/>
             <a:ext cx="838200" cy="430887"/>
           </a:xfrm>
           <a:prstGeom prst="rect">
@@ -4826,13 +5275,13 @@
       </p:sp>
       <p:sp>
         <p:nvSpPr>
-          <p:cNvPr id="119" name="Arc 118"/>
+          <p:cNvPr id="140" name="Arc 139"/>
           <p:cNvSpPr/>
           <p:nvPr/>
         </p:nvSpPr>
         <p:spPr>
           <a:xfrm rot="19019392" flipV="1">
-            <a:off x="4344224" y="1923378"/>
+            <a:off x="5129243" y="2088036"/>
             <a:ext cx="1356586" cy="381000"/>
           </a:xfrm>
           <a:prstGeom prst="arc">
@@ -4874,13 +5323,13 @@
       </p:sp>
       <p:sp>
         <p:nvSpPr>
-          <p:cNvPr id="120" name="TextBox 119"/>
+          <p:cNvPr id="141" name="TextBox 140"/>
           <p:cNvSpPr txBox="1"/>
           <p:nvPr/>
         </p:nvSpPr>
         <p:spPr>
           <a:xfrm rot="18996887">
-            <a:off x="5009792" y="2290249"/>
+            <a:off x="5695298" y="2559330"/>
             <a:ext cx="685800" cy="215444"/>
           </a:xfrm>
           <a:prstGeom prst="rect">
@@ -4912,13 +5361,13 @@
       </p:sp>
       <p:sp>
         <p:nvSpPr>
-          <p:cNvPr id="121" name="Arc 120"/>
+          <p:cNvPr id="142" name="Arc 141"/>
           <p:cNvSpPr/>
           <p:nvPr/>
         </p:nvSpPr>
         <p:spPr>
           <a:xfrm rot="2715976" flipV="1">
-            <a:off x="5515779" y="1794935"/>
+            <a:off x="6300798" y="1959593"/>
             <a:ext cx="1356586" cy="381000"/>
           </a:xfrm>
           <a:prstGeom prst="arc">
@@ -4960,13 +5409,13 @@
       </p:sp>
       <p:sp>
         <p:nvSpPr>
-          <p:cNvPr id="122" name="TextBox 121"/>
+          <p:cNvPr id="143" name="TextBox 142"/>
           <p:cNvSpPr txBox="1"/>
           <p:nvPr/>
         </p:nvSpPr>
         <p:spPr>
           <a:xfrm rot="1991192">
-            <a:off x="5695014" y="2215418"/>
+            <a:off x="6480033" y="2484499"/>
             <a:ext cx="685800" cy="215444"/>
           </a:xfrm>
           <a:prstGeom prst="rect">
@@ -4998,13 +5447,13 @@
       </p:sp>
       <p:sp>
         <p:nvSpPr>
-          <p:cNvPr id="123" name="Arc 122"/>
+          <p:cNvPr id="148" name="Arc 147"/>
           <p:cNvSpPr/>
           <p:nvPr/>
         </p:nvSpPr>
         <p:spPr>
           <a:xfrm rot="16709798">
-            <a:off x="6673989" y="2273944"/>
+            <a:off x="7459008" y="2543025"/>
             <a:ext cx="381000" cy="304800"/>
           </a:xfrm>
           <a:prstGeom prst="arc">
@@ -5046,13 +5495,13 @@
       </p:sp>
       <p:sp>
         <p:nvSpPr>
-          <p:cNvPr id="124" name="TextBox 123"/>
+          <p:cNvPr id="149" name="TextBox 148"/>
           <p:cNvSpPr txBox="1"/>
           <p:nvPr/>
         </p:nvSpPr>
         <p:spPr>
           <a:xfrm>
-            <a:off x="6609414" y="1969096"/>
+            <a:off x="7394433" y="2238177"/>
             <a:ext cx="835167" cy="215444"/>
           </a:xfrm>
           <a:prstGeom prst="rect">
@@ -5084,13 +5533,13 @@
       </p:sp>
       <p:sp>
         <p:nvSpPr>
-          <p:cNvPr id="125" name="Arc 124"/>
+          <p:cNvPr id="151" name="Arc 150"/>
           <p:cNvSpPr/>
           <p:nvPr/>
         </p:nvSpPr>
         <p:spPr>
           <a:xfrm rot="19019392" flipV="1">
-            <a:off x="6861857" y="1864900"/>
+            <a:off x="7646876" y="2029558"/>
             <a:ext cx="1356586" cy="381000"/>
           </a:xfrm>
           <a:prstGeom prst="arc">
@@ -5132,13 +5581,13 @@
       </p:sp>
       <p:sp>
         <p:nvSpPr>
-          <p:cNvPr id="126" name="TextBox 125"/>
+          <p:cNvPr id="152" name="TextBox 151"/>
           <p:cNvSpPr txBox="1"/>
           <p:nvPr/>
         </p:nvSpPr>
         <p:spPr>
           <a:xfrm rot="18996887">
-            <a:off x="7506125" y="2178227"/>
+            <a:off x="8291144" y="2447308"/>
             <a:ext cx="841701" cy="215444"/>
           </a:xfrm>
           <a:prstGeom prst="rect">
@@ -5170,13 +5619,13 @@
       </p:sp>
       <p:sp>
         <p:nvSpPr>
-          <p:cNvPr id="132" name="Freeform 131"/>
+          <p:cNvPr id="153" name="Freeform 152"/>
           <p:cNvSpPr/>
           <p:nvPr/>
         </p:nvSpPr>
         <p:spPr>
           <a:xfrm>
-            <a:off x="944545" y="423418"/>
+            <a:off x="1729564" y="423418"/>
             <a:ext cx="3959051" cy="1273620"/>
           </a:xfrm>
           <a:custGeom>
@@ -5304,13 +5753,13 @@
       </p:sp>
       <p:sp>
         <p:nvSpPr>
-          <p:cNvPr id="133" name="TextBox 132"/>
+          <p:cNvPr id="155" name="TextBox 154"/>
           <p:cNvSpPr txBox="1"/>
           <p:nvPr/>
         </p:nvSpPr>
         <p:spPr>
           <a:xfrm>
-            <a:off x="1119981" y="1697038"/>
+            <a:off x="1905000" y="1697038"/>
             <a:ext cx="838200" cy="215444"/>
           </a:xfrm>
           <a:prstGeom prst="rect">
@@ -5330,7 +5779,15 @@
                   <a:srgbClr val="00B050"/>
                 </a:solidFill>
               </a:rPr>
-              <a:t>3.1 update</a:t>
+              <a:t>3.1 </a:t>
+            </a:r>
+            <a:r>
+              <a:rPr lang="en-US" sz="1400" b="1" dirty="0" smtClean="0">
+                <a:solidFill>
+                  <a:srgbClr val="00B050"/>
+                </a:solidFill>
+              </a:rPr>
+              <a:t>pull</a:t>
             </a:r>
             <a:endParaRPr lang="en-US" sz="1400" b="1" dirty="0">
               <a:solidFill>
@@ -5342,13 +5799,13 @@
       </p:sp>
       <p:cxnSp>
         <p:nvCxnSpPr>
-          <p:cNvPr id="138" name="Straight Connector 137"/>
+          <p:cNvPr id="156" name="Straight Connector 155"/>
           <p:cNvCxnSpPr/>
           <p:nvPr/>
         </p:nvCxnSpPr>
         <p:spPr>
           <a:xfrm>
-            <a:off x="4548981" y="5275460"/>
+            <a:off x="5029200" y="5275460"/>
             <a:ext cx="3657600" cy="0"/>
           </a:xfrm>
           <a:prstGeom prst="line">
@@ -5380,13 +5837,13 @@
       </p:cxnSp>
       <p:sp>
         <p:nvSpPr>
-          <p:cNvPr id="139" name="Flowchart: Connector 138"/>
+          <p:cNvPr id="157" name="Flowchart: Connector 156"/>
           <p:cNvSpPr/>
           <p:nvPr/>
         </p:nvSpPr>
         <p:spPr>
           <a:xfrm>
-            <a:off x="5082382" y="5199260"/>
+            <a:off x="5562601" y="5199260"/>
             <a:ext cx="152400" cy="152400"/>
           </a:xfrm>
           <a:prstGeom prst="flowChartConnector">
@@ -5432,13 +5889,13 @@
       </p:sp>
       <p:sp>
         <p:nvSpPr>
-          <p:cNvPr id="144" name="Flowchart: Connector 143"/>
+          <p:cNvPr id="159" name="Flowchart: Connector 158"/>
           <p:cNvSpPr/>
           <p:nvPr/>
         </p:nvSpPr>
         <p:spPr>
           <a:xfrm>
-            <a:off x="7673181" y="5199260"/>
+            <a:off x="8153400" y="5199260"/>
             <a:ext cx="152400" cy="152400"/>
           </a:xfrm>
           <a:prstGeom prst="flowChartConnector">
@@ -5472,13 +5929,13 @@
       </p:sp>
       <p:sp>
         <p:nvSpPr>
-          <p:cNvPr id="145" name="Flowchart: Connector 144"/>
+          <p:cNvPr id="161" name="Flowchart: Connector 160"/>
           <p:cNvSpPr/>
           <p:nvPr/>
         </p:nvSpPr>
         <p:spPr>
           <a:xfrm>
-            <a:off x="6453981" y="5199260"/>
+            <a:off x="6934200" y="5199260"/>
             <a:ext cx="152400" cy="152400"/>
           </a:xfrm>
           <a:prstGeom prst="flowChartConnector">
@@ -5524,13 +5981,13 @@
       </p:sp>
       <p:sp>
         <p:nvSpPr>
-          <p:cNvPr id="146" name="Flowchart: Connector 145"/>
+          <p:cNvPr id="162" name="Flowchart: Connector 161"/>
           <p:cNvSpPr/>
           <p:nvPr/>
         </p:nvSpPr>
         <p:spPr>
           <a:xfrm>
-            <a:off x="6834981" y="4589660"/>
+            <a:off x="7315200" y="4589660"/>
             <a:ext cx="152400" cy="152400"/>
           </a:xfrm>
           <a:prstGeom prst="flowChartConnector">
@@ -5575,13 +6032,13 @@
       </p:sp>
       <p:sp>
         <p:nvSpPr>
-          <p:cNvPr id="147" name="Flowchart: Connector 146"/>
+          <p:cNvPr id="164" name="Flowchart: Connector 163"/>
           <p:cNvSpPr/>
           <p:nvPr/>
         </p:nvSpPr>
         <p:spPr>
           <a:xfrm>
-            <a:off x="5615782" y="4589660"/>
+            <a:off x="6096001" y="4589660"/>
             <a:ext cx="152400" cy="152400"/>
           </a:xfrm>
           <a:prstGeom prst="flowChartConnector">
@@ -5626,16 +6083,16 @@
       </p:sp>
       <p:cxnSp>
         <p:nvCxnSpPr>
-          <p:cNvPr id="150" name="Shape 149"/>
+          <p:cNvPr id="167" name="Shape 149"/>
           <p:cNvCxnSpPr>
-            <a:stCxn id="139" idx="0"/>
-            <a:endCxn id="147" idx="2"/>
+            <a:stCxn id="157" idx="0"/>
+            <a:endCxn id="164" idx="2"/>
           </p:cNvCxnSpPr>
           <p:nvPr/>
         </p:nvCxnSpPr>
         <p:spPr>
           <a:xfrm rot="5400000" flipH="1" flipV="1">
-            <a:off x="5120482" y="4703960"/>
+            <a:off x="5600701" y="4703960"/>
             <a:ext cx="533400" cy="457200"/>
           </a:xfrm>
           <a:prstGeom prst="curvedConnector2">
@@ -5666,16 +6123,16 @@
       </p:cxnSp>
       <p:cxnSp>
         <p:nvCxnSpPr>
-          <p:cNvPr id="154" name="Shape 153"/>
+          <p:cNvPr id="169" name="Shape 153"/>
           <p:cNvCxnSpPr>
-            <a:stCxn id="146" idx="6"/>
-            <a:endCxn id="144" idx="1"/>
+            <a:stCxn id="162" idx="6"/>
+            <a:endCxn id="159" idx="1"/>
           </p:cNvCxnSpPr>
           <p:nvPr/>
         </p:nvCxnSpPr>
         <p:spPr>
           <a:xfrm>
-            <a:off x="6987381" y="4665860"/>
+            <a:off x="7467600" y="4665860"/>
             <a:ext cx="708118" cy="555718"/>
           </a:xfrm>
           <a:prstGeom prst="curvedConnector2">
@@ -5706,16 +6163,16 @@
       </p:cxnSp>
       <p:cxnSp>
         <p:nvCxnSpPr>
-          <p:cNvPr id="158" name="Straight Arrow Connector 157"/>
+          <p:cNvPr id="171" name="Straight Arrow Connector 170"/>
           <p:cNvCxnSpPr>
-            <a:stCxn id="147" idx="6"/>
-            <a:endCxn id="146" idx="2"/>
+            <a:stCxn id="164" idx="6"/>
+            <a:endCxn id="162" idx="2"/>
           </p:cNvCxnSpPr>
           <p:nvPr/>
         </p:nvCxnSpPr>
         <p:spPr>
           <a:xfrm>
-            <a:off x="5768182" y="4665860"/>
+            <a:off x="6248401" y="4665860"/>
             <a:ext cx="1066799" cy="0"/>
           </a:xfrm>
           <a:prstGeom prst="straightConnector1">
@@ -5746,16 +6203,16 @@
       </p:cxnSp>
       <p:cxnSp>
         <p:nvCxnSpPr>
-          <p:cNvPr id="160" name="Curved Connector 159"/>
+          <p:cNvPr id="172" name="Curved Connector 171"/>
           <p:cNvCxnSpPr>
-            <a:stCxn id="145" idx="7"/>
-            <a:endCxn id="146" idx="4"/>
+            <a:stCxn id="161" idx="7"/>
+            <a:endCxn id="162" idx="4"/>
           </p:cNvCxnSpPr>
           <p:nvPr/>
         </p:nvCxnSpPr>
         <p:spPr>
           <a:xfrm rot="5400000" flipH="1" flipV="1">
-            <a:off x="6507863" y="4818260"/>
+            <a:off x="6988082" y="4818260"/>
             <a:ext cx="479518" cy="327118"/>
           </a:xfrm>
           <a:prstGeom prst="curvedConnector3">
@@ -5789,13 +6246,13 @@
       </p:cxnSp>
       <p:sp>
         <p:nvSpPr>
-          <p:cNvPr id="163" name="TextBox 162"/>
+          <p:cNvPr id="174" name="TextBox 173"/>
           <p:cNvSpPr txBox="1"/>
           <p:nvPr/>
         </p:nvSpPr>
         <p:spPr>
           <a:xfrm rot="18268321">
-            <a:off x="4662895" y="4608370"/>
+            <a:off x="5143114" y="4608370"/>
             <a:ext cx="762000" cy="307777"/>
           </a:xfrm>
           <a:prstGeom prst="rect">
@@ -5827,13 +6284,13 @@
       </p:sp>
       <p:sp>
         <p:nvSpPr>
-          <p:cNvPr id="165" name="TextBox 164"/>
+          <p:cNvPr id="175" name="TextBox 174"/>
           <p:cNvSpPr txBox="1"/>
           <p:nvPr/>
         </p:nvSpPr>
         <p:spPr>
           <a:xfrm rot="2419831">
-            <a:off x="7273198" y="4522254"/>
+            <a:off x="7753417" y="4522254"/>
             <a:ext cx="762000" cy="307777"/>
           </a:xfrm>
           <a:prstGeom prst="rect">
@@ -5865,13 +6322,13 @@
       </p:sp>
       <p:sp>
         <p:nvSpPr>
-          <p:cNvPr id="166" name="TextBox 165"/>
+          <p:cNvPr id="176" name="TextBox 175"/>
           <p:cNvSpPr txBox="1"/>
           <p:nvPr/>
         </p:nvSpPr>
         <p:spPr>
           <a:xfrm>
-            <a:off x="5768181" y="4056260"/>
+            <a:off x="6248400" y="4056260"/>
             <a:ext cx="1295400" cy="523220"/>
           </a:xfrm>
           <a:prstGeom prst="rect">
@@ -5915,13 +6372,13 @@
       </p:sp>
       <p:sp>
         <p:nvSpPr>
-          <p:cNvPr id="168" name="TextBox 167"/>
+          <p:cNvPr id="177" name="TextBox 176"/>
           <p:cNvSpPr txBox="1"/>
           <p:nvPr/>
         </p:nvSpPr>
         <p:spPr>
           <a:xfrm>
-            <a:off x="5920581" y="4815283"/>
+            <a:off x="6355855" y="4858742"/>
             <a:ext cx="762000" cy="307777"/>
           </a:xfrm>
           <a:prstGeom prst="rect">
@@ -5935,13 +6392,14 @@
           </a:bodyPr>
           <a:lstStyle/>
           <a:p>
+            <a:pPr algn="r"/>
             <a:r>
               <a:rPr lang="en-US" sz="1400" b="1" dirty="0" smtClean="0">
                 <a:solidFill>
                   <a:srgbClr val="00B050"/>
                 </a:solidFill>
               </a:rPr>
-              <a:t>update</a:t>
+              <a:t>pull</a:t>
             </a:r>
             <a:endParaRPr lang="en-US" sz="1400" b="1" dirty="0">
               <a:solidFill>
@@ -5953,13 +6411,13 @@
       </p:sp>
       <p:sp>
         <p:nvSpPr>
-          <p:cNvPr id="170" name="TextBox 169"/>
+          <p:cNvPr id="178" name="TextBox 177"/>
           <p:cNvSpPr txBox="1"/>
           <p:nvPr/>
         </p:nvSpPr>
         <p:spPr>
           <a:xfrm>
-            <a:off x="3786981" y="4970660"/>
+            <a:off x="4267200" y="4970660"/>
             <a:ext cx="762000" cy="523220"/>
           </a:xfrm>
           <a:prstGeom prst="rect">
@@ -6012,10 +6470,152 @@
           </a:p>
         </p:txBody>
       </p:sp>
+      <p:cxnSp>
+        <p:nvCxnSpPr>
+          <p:cNvPr id="179" name="Straight Arrow Connector 178"/>
+          <p:cNvCxnSpPr/>
+          <p:nvPr/>
+        </p:nvCxnSpPr>
+        <p:spPr>
+          <a:xfrm flipH="1">
+            <a:off x="4572000" y="1328598"/>
+            <a:ext cx="914400" cy="0"/>
+          </a:xfrm>
+          <a:prstGeom prst="straightConnector1">
+            <a:avLst/>
+          </a:prstGeom>
+          <a:ln w="28575">
+            <a:solidFill>
+              <a:schemeClr val="bg1">
+                <a:lumMod val="65000"/>
+              </a:schemeClr>
+            </a:solidFill>
+            <a:tailEnd type="triangle"/>
+          </a:ln>
+        </p:spPr>
+        <p:style>
+          <a:lnRef idx="1">
+            <a:schemeClr val="accent1"/>
+          </a:lnRef>
+          <a:fillRef idx="0">
+            <a:schemeClr val="accent1"/>
+          </a:fillRef>
+          <a:effectRef idx="0">
+            <a:schemeClr val="accent1"/>
+          </a:effectRef>
+          <a:fontRef idx="minor">
+            <a:schemeClr val="tx1"/>
+          </a:fontRef>
+        </p:style>
+      </p:cxnSp>
+      <p:sp>
+        <p:nvSpPr>
+          <p:cNvPr id="180" name="TextBox 179"/>
+          <p:cNvSpPr txBox="1"/>
+          <p:nvPr/>
+        </p:nvSpPr>
+        <p:spPr>
+          <a:xfrm>
+            <a:off x="4385258" y="975519"/>
+            <a:ext cx="1482143" cy="307777"/>
+          </a:xfrm>
+          <a:prstGeom prst="rect">
+            <a:avLst/>
+          </a:prstGeom>
+          <a:noFill/>
+        </p:spPr>
+        <p:txBody>
+          <a:bodyPr wrap="square" rtlCol="0">
+            <a:spAutoFit/>
+          </a:bodyPr>
+          <a:lstStyle/>
+          <a:p>
+            <a:r>
+              <a:rPr lang="en-US" sz="1400" b="1" dirty="0" smtClean="0">
+                <a:solidFill>
+                  <a:schemeClr val="bg1">
+                    <a:lumMod val="65000"/>
+                  </a:schemeClr>
+                </a:solidFill>
+              </a:rPr>
+              <a:t>server-side clone</a:t>
+            </a:r>
+            <a:endParaRPr lang="en-US" sz="1400" b="1" dirty="0">
+              <a:solidFill>
+                <a:schemeClr val="bg1">
+                  <a:lumMod val="65000"/>
+                </a:schemeClr>
+              </a:solidFill>
+            </a:endParaRPr>
+          </a:p>
+        </p:txBody>
+      </p:sp>
+      <p:sp>
+        <p:nvSpPr>
+          <p:cNvPr id="181" name="Can 180"/>
+          <p:cNvSpPr/>
+          <p:nvPr/>
+        </p:nvSpPr>
+        <p:spPr>
+          <a:xfrm>
+            <a:off x="805543" y="902296"/>
+            <a:ext cx="685800" cy="650081"/>
+          </a:xfrm>
+          <a:prstGeom prst="can">
+            <a:avLst/>
+          </a:prstGeom>
+          <a:solidFill>
+            <a:schemeClr val="accent2">
+              <a:lumMod val="60000"/>
+              <a:lumOff val="40000"/>
+            </a:schemeClr>
+          </a:solidFill>
+          <a:ln>
+            <a:solidFill>
+              <a:srgbClr val="D28280"/>
+            </a:solidFill>
+          </a:ln>
+        </p:spPr>
+        <p:style>
+          <a:lnRef idx="2">
+            <a:schemeClr val="accent1">
+              <a:shade val="50000"/>
+            </a:schemeClr>
+          </a:lnRef>
+          <a:fillRef idx="1">
+            <a:schemeClr val="accent1"/>
+          </a:fillRef>
+          <a:effectRef idx="0">
+            <a:schemeClr val="accent1"/>
+          </a:effectRef>
+          <a:fontRef idx="minor">
+            <a:schemeClr val="lt1"/>
+          </a:fontRef>
+        </p:style>
+        <p:txBody>
+          <a:bodyPr rtlCol="0" anchor="ctr"/>
+          <a:lstStyle/>
+          <a:p>
+            <a:pPr algn="ctr"/>
+            <a:r>
+              <a:rPr lang="en-US" sz="1600" b="1" dirty="0"/>
+              <a:t>Local</a:t>
+            </a:r>
+          </a:p>
+          <a:p>
+            <a:pPr algn="ctr"/>
+            <a:r>
+              <a:rPr lang="en-US" sz="1600" b="1" dirty="0"/>
+              <a:t>Repo</a:t>
+            </a:r>
+            <a:endParaRPr lang="en-US" sz="1600" b="1" dirty="0"/>
+          </a:p>
+        </p:txBody>
+      </p:sp>
     </p:spTree>
     <p:extLst>
       <p:ext uri="{BB962C8B-B14F-4D97-AF65-F5344CB8AC3E}">
-        <p14:creationId xmlns:p14="http://schemas.microsoft.com/office/powerpoint/2010/main" xmlns="" val="2312643091"/>
+        <p14:creationId xmlns:p14="http://schemas.microsoft.com/office/powerpoint/2010/main" val="2312643091"/>
       </p:ext>
     </p:extLst>
   </p:cSld>

</xml_diff>

<commit_message>
Continuing Issue 625 [NullPointerException when viewing student:viewEvalReport for evaluations without p2p feedback enabled] Update Issue 625
Merge with default
</commit_message>
<xml_diff>
--- a/doc/diagrams/workflow.pptx
+++ b/doc/diagrams/workflow.pptx
@@ -10,7 +10,7 @@
   <p:sldIdLst>
     <p:sldId id="256" r:id="rId2"/>
   </p:sldIdLst>
-  <p:sldSz cx="8640763" cy="5761038"/>
+  <p:sldSz cx="9144000" cy="5761038"/>
   <p:notesSz cx="6858000" cy="9144000"/>
   <p:defaultTextStyle>
     <a:defPPr>
@@ -193,7 +193,7 @@
             <a:fld id="{DC50A2AC-D691-437C-A69B-81ECFE08AD4B}" type="datetimeFigureOut">
               <a:rPr lang="en-SG" smtClean="0"/>
               <a:pPr/>
-              <a:t>28/7/2012</a:t>
+              <a:t>9/2/2013</a:t>
             </a:fld>
             <a:endParaRPr lang="en-SG"/>
           </a:p>
@@ -211,8 +211,8 @@
         </p:nvSpPr>
         <p:spPr>
           <a:xfrm>
-            <a:off x="858838" y="685800"/>
-            <a:ext cx="5140325" cy="3429000"/>
+            <a:off x="708025" y="685800"/>
+            <a:ext cx="5441950" cy="3429000"/>
           </a:xfrm>
           <a:prstGeom prst="rect">
             <a:avLst/>
@@ -362,7 +362,7 @@
     </p:spTree>
     <p:extLst>
       <p:ext uri="{BB962C8B-B14F-4D97-AF65-F5344CB8AC3E}">
-        <p14:creationId xmlns:p14="http://schemas.microsoft.com/office/powerpoint/2010/main" xmlns="" val="2265103329"/>
+        <p14:creationId xmlns:p14="http://schemas.microsoft.com/office/powerpoint/2010/main" val="2265103329"/>
       </p:ext>
     </p:extLst>
   </p:cSld>
@@ -491,8 +491,8 @@
         </p:nvSpPr>
         <p:spPr>
           <a:xfrm>
-            <a:off x="858838" y="685800"/>
-            <a:ext cx="5140325" cy="3429000"/>
+            <a:off x="708025" y="685800"/>
+            <a:ext cx="5441950" cy="3429000"/>
           </a:xfrm>
         </p:spPr>
       </p:sp>
@@ -542,7 +542,7 @@
     </p:spTree>
     <p:extLst>
       <p:ext uri="{BB962C8B-B14F-4D97-AF65-F5344CB8AC3E}">
-        <p14:creationId xmlns:p14="http://schemas.microsoft.com/office/powerpoint/2010/main" xmlns="" val="1558229004"/>
+        <p14:creationId xmlns:p14="http://schemas.microsoft.com/office/powerpoint/2010/main" val="1558229004"/>
       </p:ext>
     </p:extLst>
   </p:cSld>
@@ -581,8 +581,8 @@
         </p:nvSpPr>
         <p:spPr>
           <a:xfrm>
-            <a:off x="648057" y="1789656"/>
-            <a:ext cx="7344649" cy="1234890"/>
+            <a:off x="685802" y="1789656"/>
+            <a:ext cx="7772400" cy="1234890"/>
           </a:xfrm>
         </p:spPr>
         <p:txBody>
@@ -609,8 +609,8 @@
         </p:nvSpPr>
         <p:spPr>
           <a:xfrm>
-            <a:off x="1296115" y="3264588"/>
-            <a:ext cx="6048534" cy="1472266"/>
+            <a:off x="1371601" y="3264588"/>
+            <a:ext cx="6400800" cy="1472266"/>
           </a:xfrm>
         </p:spPr>
         <p:txBody>
@@ -734,7 +734,7 @@
             <a:fld id="{1D8BD707-D9CF-40AE-B4C6-C98DA3205C09}" type="datetimeFigureOut">
               <a:rPr lang="en-US" smtClean="0"/>
               <a:pPr/>
-              <a:t>7/28/2012</a:t>
+              <a:t>2/9/2013</a:t>
             </a:fld>
             <a:endParaRPr lang="en-US"/>
           </a:p>
@@ -901,7 +901,7 @@
             <a:fld id="{1D8BD707-D9CF-40AE-B4C6-C98DA3205C09}" type="datetimeFigureOut">
               <a:rPr lang="en-US" smtClean="0"/>
               <a:pPr/>
-              <a:t>7/28/2012</a:t>
+              <a:t>2/9/2013</a:t>
             </a:fld>
             <a:endParaRPr lang="en-US"/>
           </a:p>
@@ -987,8 +987,8 @@
         </p:nvSpPr>
         <p:spPr>
           <a:xfrm>
-            <a:off x="6264553" y="230710"/>
-            <a:ext cx="1944172" cy="4915552"/>
+            <a:off x="6629401" y="230710"/>
+            <a:ext cx="2057400" cy="4915552"/>
           </a:xfrm>
         </p:spPr>
         <p:txBody>
@@ -1015,8 +1015,8 @@
         </p:nvSpPr>
         <p:spPr>
           <a:xfrm>
-            <a:off x="432039" y="230710"/>
-            <a:ext cx="5688502" cy="4915552"/>
+            <a:off x="457201" y="230710"/>
+            <a:ext cx="6019800" cy="4915552"/>
           </a:xfrm>
         </p:spPr>
         <p:txBody>
@@ -1078,7 +1078,7 @@
             <a:fld id="{1D8BD707-D9CF-40AE-B4C6-C98DA3205C09}" type="datetimeFigureOut">
               <a:rPr lang="en-US" smtClean="0"/>
               <a:pPr/>
-              <a:t>7/28/2012</a:t>
+              <a:t>2/9/2013</a:t>
             </a:fld>
             <a:endParaRPr lang="en-US"/>
           </a:p>
@@ -1245,7 +1245,7 @@
             <a:fld id="{1D8BD707-D9CF-40AE-B4C6-C98DA3205C09}" type="datetimeFigureOut">
               <a:rPr lang="en-US" smtClean="0"/>
               <a:pPr/>
-              <a:t>7/28/2012</a:t>
+              <a:t>2/9/2013</a:t>
             </a:fld>
             <a:endParaRPr lang="en-US"/>
           </a:p>
@@ -1331,8 +1331,8 @@
         </p:nvSpPr>
         <p:spPr>
           <a:xfrm>
-            <a:off x="682561" y="3702001"/>
-            <a:ext cx="7344649" cy="1144206"/>
+            <a:off x="722314" y="3702001"/>
+            <a:ext cx="7772400" cy="1144206"/>
           </a:xfrm>
         </p:spPr>
         <p:txBody>
@@ -1363,8 +1363,8 @@
         </p:nvSpPr>
         <p:spPr>
           <a:xfrm>
-            <a:off x="682561" y="2441774"/>
-            <a:ext cx="7344649" cy="1260227"/>
+            <a:off x="722314" y="2441774"/>
+            <a:ext cx="7772400" cy="1260227"/>
           </a:xfrm>
         </p:spPr>
         <p:txBody>
@@ -1488,7 +1488,7 @@
             <a:fld id="{1D8BD707-D9CF-40AE-B4C6-C98DA3205C09}" type="datetimeFigureOut">
               <a:rPr lang="en-US" smtClean="0"/>
               <a:pPr/>
-              <a:t>7/28/2012</a:t>
+              <a:t>2/9/2013</a:t>
             </a:fld>
             <a:endParaRPr lang="en-US"/>
           </a:p>
@@ -1597,8 +1597,8 @@
         </p:nvSpPr>
         <p:spPr>
           <a:xfrm>
-            <a:off x="432039" y="1344242"/>
-            <a:ext cx="3816337" cy="3802019"/>
+            <a:off x="457202" y="1344242"/>
+            <a:ext cx="4038600" cy="3802019"/>
           </a:xfrm>
         </p:spPr>
         <p:txBody>
@@ -1682,8 +1682,8 @@
         </p:nvSpPr>
         <p:spPr>
           <a:xfrm>
-            <a:off x="4392388" y="1344242"/>
-            <a:ext cx="3816337" cy="3802019"/>
+            <a:off x="4648201" y="1344242"/>
+            <a:ext cx="4038600" cy="3802019"/>
           </a:xfrm>
         </p:spPr>
         <p:txBody>
@@ -1773,7 +1773,7 @@
             <a:fld id="{1D8BD707-D9CF-40AE-B4C6-C98DA3205C09}" type="datetimeFigureOut">
               <a:rPr lang="en-US" smtClean="0"/>
               <a:pPr/>
-              <a:t>7/28/2012</a:t>
+              <a:t>2/9/2013</a:t>
             </a:fld>
             <a:endParaRPr lang="en-US"/>
           </a:p>
@@ -1886,8 +1886,8 @@
         </p:nvSpPr>
         <p:spPr>
           <a:xfrm>
-            <a:off x="432039" y="1289566"/>
-            <a:ext cx="3817838" cy="537430"/>
+            <a:off x="457201" y="1289566"/>
+            <a:ext cx="4040189" cy="537430"/>
           </a:xfrm>
         </p:spPr>
         <p:txBody>
@@ -1951,8 +1951,8 @@
         </p:nvSpPr>
         <p:spPr>
           <a:xfrm>
-            <a:off x="432039" y="1826997"/>
-            <a:ext cx="3817838" cy="3319265"/>
+            <a:off x="457201" y="1826997"/>
+            <a:ext cx="4040189" cy="3319265"/>
           </a:xfrm>
         </p:spPr>
         <p:txBody>
@@ -2036,8 +2036,8 @@
         </p:nvSpPr>
         <p:spPr>
           <a:xfrm>
-            <a:off x="4389389" y="1289566"/>
-            <a:ext cx="3819337" cy="537430"/>
+            <a:off x="4645028" y="1289566"/>
+            <a:ext cx="4041774" cy="537430"/>
           </a:xfrm>
         </p:spPr>
         <p:txBody>
@@ -2101,8 +2101,8 @@
         </p:nvSpPr>
         <p:spPr>
           <a:xfrm>
-            <a:off x="4389389" y="1826997"/>
-            <a:ext cx="3819337" cy="3319265"/>
+            <a:off x="4645028" y="1826997"/>
+            <a:ext cx="4041774" cy="3319265"/>
           </a:xfrm>
         </p:spPr>
         <p:txBody>
@@ -2192,7 +2192,7 @@
             <a:fld id="{1D8BD707-D9CF-40AE-B4C6-C98DA3205C09}" type="datetimeFigureOut">
               <a:rPr lang="en-US" smtClean="0"/>
               <a:pPr/>
-              <a:t>7/28/2012</a:t>
+              <a:t>2/9/2013</a:t>
             </a:fld>
             <a:endParaRPr lang="en-US"/>
           </a:p>
@@ -2307,7 +2307,7 @@
             <a:fld id="{1D8BD707-D9CF-40AE-B4C6-C98DA3205C09}" type="datetimeFigureOut">
               <a:rPr lang="en-US" smtClean="0"/>
               <a:pPr/>
-              <a:t>7/28/2012</a:t>
+              <a:t>2/9/2013</a:t>
             </a:fld>
             <a:endParaRPr lang="en-US"/>
           </a:p>
@@ -2399,7 +2399,7 @@
             <a:fld id="{1D8BD707-D9CF-40AE-B4C6-C98DA3205C09}" type="datetimeFigureOut">
               <a:rPr lang="en-US" smtClean="0"/>
               <a:pPr/>
-              <a:t>7/28/2012</a:t>
+              <a:t>2/9/2013</a:t>
             </a:fld>
             <a:endParaRPr lang="en-US"/>
           </a:p>
@@ -2485,8 +2485,8 @@
         </p:nvSpPr>
         <p:spPr>
           <a:xfrm>
-            <a:off x="432039" y="229375"/>
-            <a:ext cx="2842752" cy="976176"/>
+            <a:off x="457201" y="229375"/>
+            <a:ext cx="3008314" cy="976176"/>
           </a:xfrm>
         </p:spPr>
         <p:txBody>
@@ -2517,8 +2517,8 @@
         </p:nvSpPr>
         <p:spPr>
           <a:xfrm>
-            <a:off x="3378298" y="229375"/>
-            <a:ext cx="4830427" cy="4916886"/>
+            <a:off x="3575051" y="229375"/>
+            <a:ext cx="5111751" cy="4916886"/>
           </a:xfrm>
         </p:spPr>
         <p:txBody>
@@ -2602,8 +2602,8 @@
         </p:nvSpPr>
         <p:spPr>
           <a:xfrm>
-            <a:off x="432039" y="1205551"/>
-            <a:ext cx="2842752" cy="3940710"/>
+            <a:off x="457201" y="1205551"/>
+            <a:ext cx="3008314" cy="3940710"/>
           </a:xfrm>
         </p:spPr>
         <p:txBody>
@@ -2673,7 +2673,7 @@
             <a:fld id="{1D8BD707-D9CF-40AE-B4C6-C98DA3205C09}" type="datetimeFigureOut">
               <a:rPr lang="en-US" smtClean="0"/>
               <a:pPr/>
-              <a:t>7/28/2012</a:t>
+              <a:t>2/9/2013</a:t>
             </a:fld>
             <a:endParaRPr lang="en-US"/>
           </a:p>
@@ -2759,8 +2759,8 @@
         </p:nvSpPr>
         <p:spPr>
           <a:xfrm>
-            <a:off x="1693650" y="4032727"/>
-            <a:ext cx="5184458" cy="476086"/>
+            <a:off x="1792288" y="4032727"/>
+            <a:ext cx="5486400" cy="476086"/>
           </a:xfrm>
         </p:spPr>
         <p:txBody>
@@ -2791,8 +2791,8 @@
         </p:nvSpPr>
         <p:spPr>
           <a:xfrm>
-            <a:off x="1693650" y="514760"/>
-            <a:ext cx="5184458" cy="3456623"/>
+            <a:off x="1792288" y="514762"/>
+            <a:ext cx="5486400" cy="3456623"/>
           </a:xfrm>
         </p:spPr>
         <p:txBody>
@@ -2852,8 +2852,8 @@
         </p:nvSpPr>
         <p:spPr>
           <a:xfrm>
-            <a:off x="1693650" y="4508813"/>
-            <a:ext cx="5184458" cy="676121"/>
+            <a:off x="1792288" y="4508815"/>
+            <a:ext cx="5486400" cy="676121"/>
           </a:xfrm>
         </p:spPr>
         <p:txBody>
@@ -2923,7 +2923,7 @@
             <a:fld id="{1D8BD707-D9CF-40AE-B4C6-C98DA3205C09}" type="datetimeFigureOut">
               <a:rPr lang="en-US" smtClean="0"/>
               <a:pPr/>
-              <a:t>7/28/2012</a:t>
+              <a:t>2/9/2013</a:t>
             </a:fld>
             <a:endParaRPr lang="en-US"/>
           </a:p>
@@ -3014,8 +3014,8 @@
         </p:nvSpPr>
         <p:spPr>
           <a:xfrm>
-            <a:off x="432038" y="230709"/>
-            <a:ext cx="7776687" cy="960173"/>
+            <a:off x="457202" y="230709"/>
+            <a:ext cx="8229600" cy="960173"/>
           </a:xfrm>
           <a:prstGeom prst="rect">
             <a:avLst/>
@@ -3047,8 +3047,8 @@
         </p:nvSpPr>
         <p:spPr>
           <a:xfrm>
-            <a:off x="432038" y="1344242"/>
-            <a:ext cx="7776687" cy="3802019"/>
+            <a:off x="457202" y="1344242"/>
+            <a:ext cx="8229600" cy="3802019"/>
           </a:xfrm>
           <a:prstGeom prst="rect">
             <a:avLst/>
@@ -3109,8 +3109,8 @@
         </p:nvSpPr>
         <p:spPr>
           <a:xfrm>
-            <a:off x="432039" y="5339630"/>
-            <a:ext cx="2016178" cy="306722"/>
+            <a:off x="457201" y="5339630"/>
+            <a:ext cx="2133600" cy="306722"/>
           </a:xfrm>
           <a:prstGeom prst="rect">
             <a:avLst/>
@@ -3133,7 +3133,7 @@
             <a:fld id="{1D8BD707-D9CF-40AE-B4C6-C98DA3205C09}" type="datetimeFigureOut">
               <a:rPr lang="en-US" smtClean="0"/>
               <a:pPr/>
-              <a:t>7/28/2012</a:t>
+              <a:t>2/9/2013</a:t>
             </a:fld>
             <a:endParaRPr lang="en-US"/>
           </a:p>
@@ -3151,8 +3151,8 @@
         </p:nvSpPr>
         <p:spPr>
           <a:xfrm>
-            <a:off x="2952262" y="5339630"/>
-            <a:ext cx="2736242" cy="306722"/>
+            <a:off x="3124202" y="5339630"/>
+            <a:ext cx="2895600" cy="306722"/>
           </a:xfrm>
           <a:prstGeom prst="rect">
             <a:avLst/>
@@ -3188,8 +3188,8 @@
         </p:nvSpPr>
         <p:spPr>
           <a:xfrm>
-            <a:off x="6192548" y="5339630"/>
-            <a:ext cx="2016178" cy="306722"/>
+            <a:off x="6553201" y="5339630"/>
+            <a:ext cx="2133600" cy="306722"/>
           </a:xfrm>
           <a:prstGeom prst="rect">
             <a:avLst/>
@@ -3506,13 +3506,449 @@
       </p:grpSpPr>
       <p:sp>
         <p:nvSpPr>
-          <p:cNvPr id="173" name="Rounded Rectangle 172"/>
+          <p:cNvPr id="5" name="laptop"/>
+          <p:cNvSpPr>
+            <a:spLocks noEditPoints="1" noChangeArrowheads="1"/>
+          </p:cNvSpPr>
+          <p:nvPr/>
+        </p:nvSpPr>
+        <p:spPr bwMode="auto">
+          <a:xfrm>
+            <a:off x="457199" y="1053848"/>
+            <a:ext cx="1272365" cy="988472"/>
+          </a:xfrm>
+          <a:custGeom>
+            <a:avLst/>
+            <a:gdLst>
+              <a:gd name="T0" fmla="*/ 3362 w 21600"/>
+              <a:gd name="T1" fmla="*/ 0 h 21600"/>
+              <a:gd name="T2" fmla="*/ 3362 w 21600"/>
+              <a:gd name="T3" fmla="*/ 7173 h 21600"/>
+              <a:gd name="T4" fmla="*/ 18327 w 21600"/>
+              <a:gd name="T5" fmla="*/ 0 h 21600"/>
+              <a:gd name="T6" fmla="*/ 18327 w 21600"/>
+              <a:gd name="T7" fmla="*/ 7173 h 21600"/>
+              <a:gd name="T8" fmla="*/ 10800 w 21600"/>
+              <a:gd name="T9" fmla="*/ 0 h 21600"/>
+              <a:gd name="T10" fmla="*/ 10800 w 21600"/>
+              <a:gd name="T11" fmla="*/ 21600 h 21600"/>
+              <a:gd name="T12" fmla="*/ 0 w 21600"/>
+              <a:gd name="T13" fmla="*/ 21600 h 21600"/>
+              <a:gd name="T14" fmla="*/ 21600 w 21600"/>
+              <a:gd name="T15" fmla="*/ 21600 h 21600"/>
+              <a:gd name="T16" fmla="*/ 4445 w 21600"/>
+              <a:gd name="T17" fmla="*/ 1858 h 21600"/>
+              <a:gd name="T18" fmla="*/ 17311 w 21600"/>
+              <a:gd name="T19" fmla="*/ 12323 h 21600"/>
+            </a:gdLst>
+            <a:ahLst/>
+            <a:cxnLst>
+              <a:cxn ang="0">
+                <a:pos x="T0" y="T1"/>
+              </a:cxn>
+              <a:cxn ang="0">
+                <a:pos x="T2" y="T3"/>
+              </a:cxn>
+              <a:cxn ang="0">
+                <a:pos x="T4" y="T5"/>
+              </a:cxn>
+              <a:cxn ang="0">
+                <a:pos x="T6" y="T7"/>
+              </a:cxn>
+              <a:cxn ang="0">
+                <a:pos x="T8" y="T9"/>
+              </a:cxn>
+              <a:cxn ang="0">
+                <a:pos x="T10" y="T11"/>
+              </a:cxn>
+              <a:cxn ang="0">
+                <a:pos x="T12" y="T13"/>
+              </a:cxn>
+              <a:cxn ang="0">
+                <a:pos x="T14" y="T15"/>
+              </a:cxn>
+            </a:cxnLst>
+            <a:rect l="T16" t="T17" r="T18" b="T19"/>
+            <a:pathLst>
+              <a:path w="21600" h="21600" extrusionOk="0">
+                <a:moveTo>
+                  <a:pt x="3362" y="0"/>
+                </a:moveTo>
+                <a:lnTo>
+                  <a:pt x="18327" y="0"/>
+                </a:lnTo>
+                <a:lnTo>
+                  <a:pt x="18327" y="14347"/>
+                </a:lnTo>
+                <a:lnTo>
+                  <a:pt x="3362" y="14347"/>
+                </a:lnTo>
+                <a:lnTo>
+                  <a:pt x="3362" y="0"/>
+                </a:lnTo>
+                <a:close/>
+              </a:path>
+              <a:path w="21600" h="21600" extrusionOk="0">
+                <a:moveTo>
+                  <a:pt x="3340" y="15068"/>
+                </a:moveTo>
+                <a:lnTo>
+                  <a:pt x="0" y="19877"/>
+                </a:lnTo>
+                <a:lnTo>
+                  <a:pt x="21600" y="19877"/>
+                </a:lnTo>
+                <a:lnTo>
+                  <a:pt x="18327" y="15068"/>
+                </a:lnTo>
+                <a:lnTo>
+                  <a:pt x="3340" y="15068"/>
+                </a:lnTo>
+                <a:close/>
+              </a:path>
+              <a:path w="21600" h="21600" extrusionOk="0">
+                <a:moveTo>
+                  <a:pt x="0" y="19877"/>
+                </a:moveTo>
+                <a:lnTo>
+                  <a:pt x="0" y="21600"/>
+                </a:lnTo>
+                <a:lnTo>
+                  <a:pt x="21600" y="21600"/>
+                </a:lnTo>
+                <a:lnTo>
+                  <a:pt x="21600" y="19877"/>
+                </a:lnTo>
+                <a:lnTo>
+                  <a:pt x="0" y="19877"/>
+                </a:lnTo>
+                <a:close/>
+              </a:path>
+              <a:path w="21600" h="21600" extrusionOk="0">
+                <a:moveTo>
+                  <a:pt x="4186" y="1523"/>
+                </a:moveTo>
+                <a:lnTo>
+                  <a:pt x="17547" y="1523"/>
+                </a:lnTo>
+                <a:lnTo>
+                  <a:pt x="17547" y="12744"/>
+                </a:lnTo>
+                <a:lnTo>
+                  <a:pt x="4186" y="12744"/>
+                </a:lnTo>
+                <a:lnTo>
+                  <a:pt x="4186" y="1523"/>
+                </a:lnTo>
+                <a:close/>
+              </a:path>
+              <a:path w="21600" h="21600" extrusionOk="0">
+                <a:moveTo>
+                  <a:pt x="3318" y="15549"/>
+                </a:moveTo>
+                <a:lnTo>
+                  <a:pt x="2917" y="16110"/>
+                </a:lnTo>
+                <a:lnTo>
+                  <a:pt x="18727" y="16110"/>
+                </a:lnTo>
+                <a:lnTo>
+                  <a:pt x="18327" y="15549"/>
+                </a:lnTo>
+                <a:lnTo>
+                  <a:pt x="3318" y="15549"/>
+                </a:lnTo>
+                <a:close/>
+              </a:path>
+              <a:path w="21600" h="21600" extrusionOk="0">
+                <a:moveTo>
+                  <a:pt x="6213" y="18314"/>
+                </a:moveTo>
+                <a:lnTo>
+                  <a:pt x="5946" y="18875"/>
+                </a:lnTo>
+                <a:lnTo>
+                  <a:pt x="15766" y="18875"/>
+                </a:lnTo>
+                <a:lnTo>
+                  <a:pt x="15499" y="18314"/>
+                </a:lnTo>
+                <a:lnTo>
+                  <a:pt x="6213" y="18314"/>
+                </a:lnTo>
+                <a:close/>
+              </a:path>
+              <a:path w="21600" h="21600" extrusionOk="0">
+                <a:moveTo>
+                  <a:pt x="2828" y="16471"/>
+                </a:moveTo>
+                <a:lnTo>
+                  <a:pt x="2405" y="17072"/>
+                </a:lnTo>
+                <a:lnTo>
+                  <a:pt x="19284" y="17072"/>
+                </a:lnTo>
+                <a:lnTo>
+                  <a:pt x="18839" y="16471"/>
+                </a:lnTo>
+                <a:lnTo>
+                  <a:pt x="2828" y="16471"/>
+                </a:lnTo>
+                <a:close/>
+              </a:path>
+              <a:path w="21600" h="21600" extrusionOk="0">
+                <a:moveTo>
+                  <a:pt x="2316" y="17352"/>
+                </a:moveTo>
+                <a:lnTo>
+                  <a:pt x="1871" y="17953"/>
+                </a:lnTo>
+                <a:lnTo>
+                  <a:pt x="19863" y="17953"/>
+                </a:lnTo>
+                <a:lnTo>
+                  <a:pt x="19395" y="17352"/>
+                </a:lnTo>
+                <a:lnTo>
+                  <a:pt x="2316" y="17352"/>
+                </a:lnTo>
+                <a:close/>
+              </a:path>
+            </a:pathLst>
+          </a:custGeom>
+          <a:solidFill>
+            <a:schemeClr val="bg1"/>
+          </a:solidFill>
+          <a:ln w="38100">
+            <a:solidFill>
+              <a:schemeClr val="bg1">
+                <a:lumMod val="85000"/>
+              </a:schemeClr>
+            </a:solidFill>
+            <a:miter lim="800000"/>
+            <a:headEnd/>
+            <a:tailEnd/>
+          </a:ln>
+        </p:spPr>
+        <p:txBody>
+          <a:bodyPr vert="horz" wrap="square" lIns="91440" tIns="45720" rIns="91440" bIns="45720" numCol="1" anchor="t" anchorCtr="0" compatLnSpc="1">
+            <a:prstTxWarp prst="textNoShape">
+              <a:avLst/>
+            </a:prstTxWarp>
+          </a:bodyPr>
+          <a:lstStyle/>
+          <a:p>
+            <a:endParaRPr lang="en-US"/>
+          </a:p>
+        </p:txBody>
+      </p:sp>
+      <p:sp>
+        <p:nvSpPr>
+          <p:cNvPr id="80" name="Cloud 79"/>
           <p:cNvSpPr/>
           <p:nvPr/>
         </p:nvSpPr>
         <p:spPr>
           <a:xfrm>
-            <a:off x="3482181" y="3947319"/>
+            <a:off x="7941267" y="1350987"/>
+            <a:ext cx="1186265" cy="462732"/>
+          </a:xfrm>
+          <a:prstGeom prst="cloud">
+            <a:avLst/>
+          </a:prstGeom>
+          <a:solidFill>
+            <a:schemeClr val="bg1"/>
+          </a:solidFill>
+          <a:ln>
+            <a:solidFill>
+              <a:schemeClr val="bg1">
+                <a:lumMod val="85000"/>
+              </a:schemeClr>
+            </a:solidFill>
+          </a:ln>
+        </p:spPr>
+        <p:style>
+          <a:lnRef idx="2">
+            <a:schemeClr val="accent1">
+              <a:shade val="50000"/>
+            </a:schemeClr>
+          </a:lnRef>
+          <a:fillRef idx="1">
+            <a:schemeClr val="accent1"/>
+          </a:fillRef>
+          <a:effectRef idx="0">
+            <a:schemeClr val="accent1"/>
+          </a:effectRef>
+          <a:fontRef idx="minor">
+            <a:schemeClr val="lt1"/>
+          </a:fontRef>
+        </p:style>
+        <p:txBody>
+          <a:bodyPr lIns="0" rIns="0" bIns="0" rtlCol="0" anchor="ctr"/>
+          <a:lstStyle/>
+          <a:p>
+            <a:pPr algn="ctr"/>
+            <a:r>
+              <a:rPr lang="en-US" sz="1400" b="1" dirty="0" err="1">
+                <a:solidFill>
+                  <a:schemeClr val="bg1">
+                    <a:lumMod val="65000"/>
+                  </a:schemeClr>
+                </a:solidFill>
+              </a:rPr>
+              <a:t>Appspot</a:t>
+            </a:r>
+            <a:endParaRPr lang="en-US" sz="1400" b="1" dirty="0">
+              <a:solidFill>
+                <a:schemeClr val="bg1">
+                  <a:lumMod val="65000"/>
+                </a:schemeClr>
+              </a:solidFill>
+            </a:endParaRPr>
+          </a:p>
+        </p:txBody>
+      </p:sp>
+      <p:sp>
+        <p:nvSpPr>
+          <p:cNvPr id="81" name="Cloud 80"/>
+          <p:cNvSpPr/>
+          <p:nvPr/>
+        </p:nvSpPr>
+        <p:spPr>
+          <a:xfrm>
+            <a:off x="5476710" y="1432719"/>
+            <a:ext cx="1609890" cy="462732"/>
+          </a:xfrm>
+          <a:prstGeom prst="cloud">
+            <a:avLst/>
+          </a:prstGeom>
+          <a:solidFill>
+            <a:schemeClr val="bg1"/>
+          </a:solidFill>
+          <a:ln>
+            <a:solidFill>
+              <a:schemeClr val="bg1">
+                <a:lumMod val="85000"/>
+              </a:schemeClr>
+            </a:solidFill>
+          </a:ln>
+        </p:spPr>
+        <p:style>
+          <a:lnRef idx="2">
+            <a:schemeClr val="accent1">
+              <a:shade val="50000"/>
+            </a:schemeClr>
+          </a:lnRef>
+          <a:fillRef idx="1">
+            <a:schemeClr val="accent1"/>
+          </a:fillRef>
+          <a:effectRef idx="0">
+            <a:schemeClr val="accent1"/>
+          </a:effectRef>
+          <a:fontRef idx="minor">
+            <a:schemeClr val="lt1"/>
+          </a:fontRef>
+        </p:style>
+        <p:txBody>
+          <a:bodyPr lIns="0" rIns="0" bIns="0" rtlCol="0" anchor="ctr"/>
+          <a:lstStyle/>
+          <a:p>
+            <a:pPr algn="ctr"/>
+            <a:r>
+              <a:rPr lang="en-US" sz="1400" b="1" dirty="0" err="1" smtClean="0">
+                <a:solidFill>
+                  <a:schemeClr val="bg1">
+                    <a:lumMod val="65000"/>
+                  </a:schemeClr>
+                </a:solidFill>
+              </a:rPr>
+              <a:t>GoogleCode</a:t>
+            </a:r>
+            <a:endParaRPr lang="en-US" sz="1400" b="1" dirty="0">
+              <a:solidFill>
+                <a:schemeClr val="bg1">
+                  <a:lumMod val="65000"/>
+                </a:schemeClr>
+              </a:solidFill>
+            </a:endParaRPr>
+          </a:p>
+        </p:txBody>
+      </p:sp>
+      <p:sp>
+        <p:nvSpPr>
+          <p:cNvPr id="82" name="Cloud 81"/>
+          <p:cNvSpPr/>
+          <p:nvPr/>
+        </p:nvSpPr>
+        <p:spPr>
+          <a:xfrm>
+            <a:off x="2895600" y="1432719"/>
+            <a:ext cx="1609890" cy="462732"/>
+          </a:xfrm>
+          <a:prstGeom prst="cloud">
+            <a:avLst/>
+          </a:prstGeom>
+          <a:solidFill>
+            <a:schemeClr val="bg1"/>
+          </a:solidFill>
+          <a:ln>
+            <a:solidFill>
+              <a:schemeClr val="bg1">
+                <a:lumMod val="85000"/>
+              </a:schemeClr>
+            </a:solidFill>
+          </a:ln>
+        </p:spPr>
+        <p:style>
+          <a:lnRef idx="2">
+            <a:schemeClr val="accent1">
+              <a:shade val="50000"/>
+            </a:schemeClr>
+          </a:lnRef>
+          <a:fillRef idx="1">
+            <a:schemeClr val="accent1"/>
+          </a:fillRef>
+          <a:effectRef idx="0">
+            <a:schemeClr val="accent1"/>
+          </a:effectRef>
+          <a:fontRef idx="minor">
+            <a:schemeClr val="lt1"/>
+          </a:fontRef>
+        </p:style>
+        <p:txBody>
+          <a:bodyPr lIns="0" rIns="0" bIns="0" rtlCol="0" anchor="ctr"/>
+          <a:lstStyle/>
+          <a:p>
+            <a:pPr algn="ctr"/>
+            <a:r>
+              <a:rPr lang="en-US" sz="1400" b="1" dirty="0" err="1" smtClean="0">
+                <a:solidFill>
+                  <a:schemeClr val="bg1">
+                    <a:lumMod val="65000"/>
+                  </a:schemeClr>
+                </a:solidFill>
+              </a:rPr>
+              <a:t>GoogleCode</a:t>
+            </a:r>
+            <a:endParaRPr lang="en-US" sz="1400" b="1" dirty="0">
+              <a:solidFill>
+                <a:schemeClr val="bg1">
+                  <a:lumMod val="65000"/>
+                </a:schemeClr>
+              </a:solidFill>
+            </a:endParaRPr>
+          </a:p>
+        </p:txBody>
+      </p:sp>
+      <p:sp>
+        <p:nvSpPr>
+          <p:cNvPr id="83" name="Rounded Rectangle 82"/>
+          <p:cNvSpPr/>
+          <p:nvPr/>
+        </p:nvSpPr>
+        <p:spPr>
+          <a:xfrm>
+            <a:off x="3962400" y="3947319"/>
             <a:ext cx="5029200" cy="1737518"/>
           </a:xfrm>
           <a:prstGeom prst="roundRect">
@@ -3559,28 +3995,27 @@
       </p:sp>
       <p:sp>
         <p:nvSpPr>
-          <p:cNvPr id="58" name="Can 57"/>
+          <p:cNvPr id="84" name="Can 83"/>
           <p:cNvSpPr/>
           <p:nvPr/>
         </p:nvSpPr>
         <p:spPr>
           <a:xfrm>
-            <a:off x="2491581" y="826096"/>
-            <a:ext cx="1066800" cy="762000"/>
+            <a:off x="3200400" y="826096"/>
+            <a:ext cx="1184858" cy="762000"/>
           </a:xfrm>
           <a:prstGeom prst="can">
             <a:avLst/>
           </a:prstGeom>
           <a:solidFill>
-            <a:schemeClr val="bg1">
-              <a:lumMod val="65000"/>
+            <a:schemeClr val="accent2">
+              <a:lumMod val="60000"/>
+              <a:lumOff val="40000"/>
             </a:schemeClr>
           </a:solidFill>
           <a:ln>
             <a:solidFill>
-              <a:schemeClr val="bg1">
-                <a:lumMod val="65000"/>
-              </a:schemeClr>
+              <a:srgbClr val="D28280"/>
             </a:solidFill>
           </a:ln>
         </p:spPr>
@@ -3606,44 +4041,43 @@
           <a:p>
             <a:pPr algn="ctr"/>
             <a:r>
-              <a:rPr lang="en-US" sz="1600" b="1" dirty="0" smtClean="0"/>
-              <a:t>Review</a:t>
+              <a:rPr lang="en-US" sz="1600" b="1" dirty="0"/>
+              <a:t>Contributor</a:t>
             </a:r>
           </a:p>
           <a:p>
             <a:pPr algn="ctr"/>
             <a:r>
-              <a:rPr lang="en-US" sz="1600" dirty="0" smtClean="0"/>
+              <a:rPr lang="en-US" sz="1600" b="1" dirty="0"/>
               <a:t>Repo</a:t>
             </a:r>
-            <a:endParaRPr lang="en-US" sz="1600" dirty="0"/>
-          </a:p>
-        </p:txBody>
-      </p:sp>
-      <p:sp>
-        <p:nvSpPr>
-          <p:cNvPr id="59" name="Can 58"/>
+            <a:endParaRPr lang="en-US" sz="1600" b="1" dirty="0"/>
+          </a:p>
+        </p:txBody>
+      </p:sp>
+      <p:sp>
+        <p:nvSpPr>
+          <p:cNvPr id="85" name="Can 84"/>
           <p:cNvSpPr/>
           <p:nvPr/>
         </p:nvSpPr>
         <p:spPr>
           <a:xfrm>
-            <a:off x="4929981" y="826096"/>
-            <a:ext cx="1066800" cy="762000"/>
+            <a:off x="5853514" y="826096"/>
+            <a:ext cx="1107933" cy="762000"/>
           </a:xfrm>
           <a:prstGeom prst="can">
             <a:avLst/>
           </a:prstGeom>
           <a:solidFill>
-            <a:schemeClr val="bg1">
-              <a:lumMod val="65000"/>
+            <a:schemeClr val="accent2">
+              <a:lumMod val="60000"/>
+              <a:lumOff val="40000"/>
             </a:schemeClr>
           </a:solidFill>
           <a:ln>
             <a:solidFill>
-              <a:schemeClr val="bg1">
-                <a:lumMod val="65000"/>
-              </a:schemeClr>
+              <a:srgbClr val="D28280"/>
             </a:solidFill>
           </a:ln>
         </p:spPr>
@@ -3670,8 +4104,9 @@
             <a:pPr algn="ctr"/>
             <a:r>
               <a:rPr lang="en-US" sz="1600" b="1" dirty="0" smtClean="0"/>
-              <a:t>Release</a:t>
-            </a:r>
+              <a:t>Committer</a:t>
+            </a:r>
+            <a:endParaRPr lang="en-US" sz="1600" b="1" dirty="0" smtClean="0"/>
           </a:p>
           <a:p>
             <a:pPr algn="ctr"/>
@@ -3684,7 +4119,7 @@
       </p:sp>
       <p:pic>
         <p:nvPicPr>
-          <p:cNvPr id="2050" name="Picture 2" descr="http://screenshots.en.sftcdn.net/en/scrn/70000/70210/google-app-engine-1.jpg"/>
+          <p:cNvPr id="86" name="Picture 2" descr="http://screenshots.en.sftcdn.net/en/scrn/70000/70210/google-app-engine-1.jpg"/>
           <p:cNvPicPr>
             <a:picLocks noChangeAspect="1" noChangeArrowheads="1"/>
           </p:cNvPicPr>
@@ -3702,7 +4137,13 @@
                 </a:srgbClr>
               </a:clrTo>
             </a:clrChange>
-            <a:grayscl/>
+            <a:duotone>
+              <a:schemeClr val="accent2">
+                <a:shade val="45000"/>
+                <a:satMod val="135000"/>
+              </a:schemeClr>
+              <a:prstClr val="white"/>
+            </a:duotone>
           </a:blip>
           <a:srcRect/>
           <a:stretch>
@@ -3711,7 +4152,7 @@
         </p:blipFill>
         <p:spPr bwMode="auto">
           <a:xfrm>
-            <a:off x="7349331" y="597496"/>
+            <a:off x="8058150" y="597496"/>
             <a:ext cx="1085850" cy="1085850"/>
           </a:xfrm>
           <a:prstGeom prst="rect">
@@ -3722,13 +4163,13 @@
       </p:pic>
       <p:grpSp>
         <p:nvGrpSpPr>
-          <p:cNvPr id="65" name="Group 64"/>
+          <p:cNvPr id="87" name="Group 86"/>
           <p:cNvGrpSpPr/>
           <p:nvPr/>
         </p:nvGrpSpPr>
         <p:grpSpPr>
           <a:xfrm>
-            <a:off x="434181" y="902296"/>
+            <a:off x="304800" y="902296"/>
             <a:ext cx="304800" cy="533400"/>
             <a:chOff x="2339181" y="3718719"/>
             <a:chExt cx="304800" cy="533400"/>
@@ -3742,7 +4183,7 @@
         </p:grpSpPr>
         <p:sp>
           <p:nvSpPr>
-            <p:cNvPr id="63" name="Flowchart: Connector 62"/>
+            <p:cNvPr id="88" name="Flowchart: Connector 87"/>
             <p:cNvSpPr/>
             <p:nvPr/>
           </p:nvSpPr>
@@ -3788,7 +4229,7 @@
         </p:sp>
         <p:sp>
           <p:nvSpPr>
-            <p:cNvPr id="64" name="Flowchart: Delay 63"/>
+            <p:cNvPr id="89" name="Flowchart: Delay 88"/>
             <p:cNvSpPr/>
             <p:nvPr/>
           </p:nvSpPr>
@@ -3835,13 +4276,13 @@
       </p:grpSp>
       <p:grpSp>
         <p:nvGrpSpPr>
-          <p:cNvPr id="68" name="Group 67"/>
+          <p:cNvPr id="90" name="Group 89"/>
           <p:cNvGrpSpPr/>
           <p:nvPr/>
         </p:nvGrpSpPr>
         <p:grpSpPr>
           <a:xfrm>
-            <a:off x="2415381" y="2578696"/>
+            <a:off x="3200400" y="2847777"/>
             <a:ext cx="304800" cy="533400"/>
             <a:chOff x="2339181" y="3718719"/>
             <a:chExt cx="304800" cy="533400"/>
@@ -3849,7 +4290,7 @@
         </p:grpSpPr>
         <p:sp>
           <p:nvSpPr>
-            <p:cNvPr id="69" name="Flowchart: Connector 68"/>
+            <p:cNvPr id="91" name="Flowchart: Connector 90"/>
             <p:cNvSpPr/>
             <p:nvPr/>
           </p:nvSpPr>
@@ -3889,7 +4330,7 @@
         </p:sp>
         <p:sp>
           <p:nvSpPr>
-            <p:cNvPr id="70" name="Flowchart: Delay 69"/>
+            <p:cNvPr id="93" name="Flowchart: Delay 92"/>
             <p:cNvSpPr/>
             <p:nvPr/>
           </p:nvSpPr>
@@ -3930,13 +4371,13 @@
       </p:grpSp>
       <p:sp>
         <p:nvSpPr>
-          <p:cNvPr id="71" name="TextBox 70"/>
+          <p:cNvPr id="94" name="TextBox 93"/>
           <p:cNvSpPr txBox="1"/>
           <p:nvPr/>
         </p:nvSpPr>
         <p:spPr>
           <a:xfrm>
-            <a:off x="2110581" y="3185319"/>
+            <a:off x="2895600" y="3454400"/>
             <a:ext cx="914400" cy="340519"/>
           </a:xfrm>
           <a:prstGeom prst="roundRect">
@@ -3973,13 +4414,13 @@
       </p:sp>
       <p:grpSp>
         <p:nvGrpSpPr>
-          <p:cNvPr id="72" name="Group 71"/>
+          <p:cNvPr id="95" name="Group 94"/>
           <p:cNvGrpSpPr/>
           <p:nvPr/>
         </p:nvGrpSpPr>
         <p:grpSpPr>
           <a:xfrm>
-            <a:off x="4167981" y="2578696"/>
+            <a:off x="4953000" y="2847777"/>
             <a:ext cx="304800" cy="533400"/>
             <a:chOff x="2339181" y="3718719"/>
             <a:chExt cx="304800" cy="533400"/>
@@ -3987,7 +4428,7 @@
         </p:grpSpPr>
         <p:sp>
           <p:nvSpPr>
-            <p:cNvPr id="73" name="Flowchart: Connector 72"/>
+            <p:cNvPr id="96" name="Flowchart: Connector 95"/>
             <p:cNvSpPr/>
             <p:nvPr/>
           </p:nvSpPr>
@@ -4027,7 +4468,7 @@
         </p:sp>
         <p:sp>
           <p:nvSpPr>
-            <p:cNvPr id="74" name="Flowchart: Delay 73"/>
+            <p:cNvPr id="100" name="Flowchart: Delay 99"/>
             <p:cNvSpPr/>
             <p:nvPr/>
           </p:nvSpPr>
@@ -4068,13 +4509,13 @@
       </p:grpSp>
       <p:sp>
         <p:nvSpPr>
-          <p:cNvPr id="75" name="TextBox 74"/>
+          <p:cNvPr id="101" name="TextBox 100"/>
           <p:cNvSpPr txBox="1"/>
           <p:nvPr/>
         </p:nvSpPr>
         <p:spPr>
           <a:xfrm>
-            <a:off x="3863181" y="3185319"/>
+            <a:off x="4648200" y="3454400"/>
             <a:ext cx="1066800" cy="340519"/>
           </a:xfrm>
           <a:prstGeom prst="roundRect">
@@ -4104,13 +4545,13 @@
       </p:sp>
       <p:grpSp>
         <p:nvGrpSpPr>
-          <p:cNvPr id="76" name="Group 75"/>
+          <p:cNvPr id="104" name="Group 103"/>
           <p:cNvGrpSpPr/>
           <p:nvPr/>
         </p:nvGrpSpPr>
         <p:grpSpPr>
           <a:xfrm>
-            <a:off x="6682581" y="2578696"/>
+            <a:off x="7467600" y="2847777"/>
             <a:ext cx="304800" cy="533400"/>
             <a:chOff x="2339181" y="3718719"/>
             <a:chExt cx="304800" cy="533400"/>
@@ -4118,7 +4559,7 @@
         </p:grpSpPr>
         <p:sp>
           <p:nvSpPr>
-            <p:cNvPr id="77" name="Flowchart: Connector 76"/>
+            <p:cNvPr id="105" name="Flowchart: Connector 104"/>
             <p:cNvSpPr/>
             <p:nvPr/>
           </p:nvSpPr>
@@ -4158,7 +4599,7 @@
         </p:sp>
         <p:sp>
           <p:nvSpPr>
-            <p:cNvPr id="78" name="Flowchart: Delay 77"/>
+            <p:cNvPr id="106" name="Flowchart: Delay 105"/>
             <p:cNvSpPr/>
             <p:nvPr/>
           </p:nvSpPr>
@@ -4199,13 +4640,13 @@
       </p:grpSp>
       <p:sp>
         <p:nvSpPr>
-          <p:cNvPr id="79" name="TextBox 78"/>
+          <p:cNvPr id="108" name="TextBox 107"/>
           <p:cNvSpPr txBox="1"/>
           <p:nvPr/>
         </p:nvSpPr>
         <p:spPr>
           <a:xfrm>
-            <a:off x="6576237" y="3185319"/>
+            <a:off x="7361256" y="3454400"/>
             <a:ext cx="533400" cy="340519"/>
           </a:xfrm>
           <a:prstGeom prst="roundRect">
@@ -4237,13 +4678,13 @@
       </p:sp>
       <p:sp>
         <p:nvSpPr>
-          <p:cNvPr id="92" name="TextBox 91"/>
+          <p:cNvPr id="109" name="TextBox 108"/>
           <p:cNvSpPr txBox="1"/>
           <p:nvPr/>
         </p:nvSpPr>
         <p:spPr>
           <a:xfrm>
-            <a:off x="205581" y="1552377"/>
+            <a:off x="76200" y="1552377"/>
             <a:ext cx="533400" cy="340519"/>
           </a:xfrm>
           <a:prstGeom prst="roundRect">
@@ -4272,14 +4713,14 @@
       </p:sp>
       <p:sp>
         <p:nvSpPr>
-          <p:cNvPr id="97" name="TextBox 96"/>
+          <p:cNvPr id="110" name="TextBox 109"/>
           <p:cNvSpPr txBox="1"/>
           <p:nvPr/>
         </p:nvSpPr>
         <p:spPr>
           <a:xfrm>
-            <a:off x="738981" y="137319"/>
-            <a:ext cx="762000" cy="307777"/>
+            <a:off x="1523999" y="-15081"/>
+            <a:ext cx="1533097" cy="307777"/>
           </a:xfrm>
           <a:prstGeom prst="rect">
             <a:avLst/>
@@ -4298,7 +4739,15 @@
                   <a:srgbClr val="00B050"/>
                 </a:solidFill>
               </a:rPr>
-              <a:t>1. pull</a:t>
+              <a:t>1. </a:t>
+            </a:r>
+            <a:r>
+              <a:rPr lang="en-US" sz="1400" b="1" dirty="0" smtClean="0">
+                <a:solidFill>
+                  <a:srgbClr val="00B050"/>
+                </a:solidFill>
+              </a:rPr>
+              <a:t>pull</a:t>
             </a:r>
             <a:endParaRPr lang="en-US" sz="1400" b="1" dirty="0">
               <a:solidFill>
@@ -4310,13 +4759,13 @@
       </p:sp>
       <p:sp>
         <p:nvSpPr>
-          <p:cNvPr id="98" name="Arc 97"/>
+          <p:cNvPr id="112" name="Arc 111"/>
           <p:cNvSpPr/>
           <p:nvPr/>
         </p:nvSpPr>
         <p:spPr>
           <a:xfrm>
-            <a:off x="662781" y="978496"/>
+            <a:off x="1447800" y="978496"/>
             <a:ext cx="381000" cy="304800"/>
           </a:xfrm>
           <a:prstGeom prst="arc">
@@ -4358,13 +4807,13 @@
       </p:sp>
       <p:sp>
         <p:nvSpPr>
-          <p:cNvPr id="99" name="TextBox 98"/>
+          <p:cNvPr id="114" name="TextBox 113"/>
           <p:cNvSpPr txBox="1"/>
           <p:nvPr/>
         </p:nvSpPr>
         <p:spPr>
           <a:xfrm>
-            <a:off x="1119981" y="749896"/>
+            <a:off x="1905000" y="749896"/>
             <a:ext cx="990600" cy="646331"/>
           </a:xfrm>
           <a:prstGeom prst="rect">
@@ -4421,13 +4870,13 @@
       </p:sp>
       <p:sp>
         <p:nvSpPr>
-          <p:cNvPr id="102" name="TextBox 101"/>
+          <p:cNvPr id="127" name="TextBox 126"/>
           <p:cNvSpPr txBox="1"/>
           <p:nvPr/>
         </p:nvSpPr>
         <p:spPr>
           <a:xfrm>
-            <a:off x="1119981" y="2154238"/>
+            <a:off x="1905000" y="2619104"/>
             <a:ext cx="685800" cy="215444"/>
           </a:xfrm>
           <a:prstGeom prst="rect">
@@ -4459,13 +4908,13 @@
       </p:sp>
       <p:cxnSp>
         <p:nvCxnSpPr>
-          <p:cNvPr id="103" name="Straight Arrow Connector 102"/>
+          <p:cNvPr id="128" name="Straight Arrow Connector 127"/>
           <p:cNvCxnSpPr/>
           <p:nvPr/>
         </p:nvCxnSpPr>
         <p:spPr>
           <a:xfrm flipV="1">
-            <a:off x="2567781" y="1773238"/>
+            <a:off x="3352800" y="2042319"/>
             <a:ext cx="228600" cy="685800"/>
           </a:xfrm>
           <a:prstGeom prst="straightConnector1">
@@ -4497,13 +4946,13 @@
       </p:cxnSp>
       <p:sp>
         <p:nvSpPr>
-          <p:cNvPr id="107" name="TextBox 106"/>
+          <p:cNvPr id="129" name="TextBox 128"/>
           <p:cNvSpPr txBox="1"/>
           <p:nvPr/>
         </p:nvSpPr>
         <p:spPr>
           <a:xfrm rot="17318509">
-            <a:off x="2087118" y="1989319"/>
+            <a:off x="2872137" y="2258400"/>
             <a:ext cx="843775" cy="215444"/>
           </a:xfrm>
           <a:prstGeom prst="rect">
@@ -4539,13 +4988,13 @@
       </p:sp>
       <p:sp>
         <p:nvSpPr>
-          <p:cNvPr id="111" name="Arc 110"/>
+          <p:cNvPr id="130" name="Arc 129"/>
           <p:cNvSpPr/>
           <p:nvPr/>
         </p:nvSpPr>
         <p:spPr>
           <a:xfrm>
-            <a:off x="738981" y="216496"/>
+            <a:off x="1524000" y="216496"/>
             <a:ext cx="4419600" cy="1219200"/>
           </a:xfrm>
           <a:prstGeom prst="arc">
@@ -4587,14 +5036,14 @@
       </p:sp>
       <p:sp>
         <p:nvSpPr>
-          <p:cNvPr id="113" name="Arc 112"/>
+          <p:cNvPr id="131" name="Arc 130"/>
           <p:cNvSpPr/>
           <p:nvPr/>
         </p:nvSpPr>
         <p:spPr>
           <a:xfrm flipV="1">
-            <a:off x="815181" y="1359496"/>
-            <a:ext cx="1600200" cy="718542"/>
+            <a:off x="1563511" y="1529307"/>
+            <a:ext cx="1600200" cy="1025723"/>
           </a:xfrm>
           <a:prstGeom prst="arc">
             <a:avLst>
@@ -4635,13 +5084,13 @@
       </p:sp>
       <p:sp>
         <p:nvSpPr>
-          <p:cNvPr id="115" name="Arc 114"/>
+          <p:cNvPr id="134" name="Arc 133"/>
           <p:cNvSpPr/>
           <p:nvPr/>
         </p:nvSpPr>
         <p:spPr>
           <a:xfrm rot="2715976" flipV="1">
-            <a:off x="2998146" y="1853413"/>
+            <a:off x="3783165" y="2018071"/>
             <a:ext cx="1356586" cy="381000"/>
           </a:xfrm>
           <a:prstGeom prst="arc">
@@ -4683,13 +5132,13 @@
       </p:sp>
       <p:sp>
         <p:nvSpPr>
-          <p:cNvPr id="116" name="TextBox 115"/>
+          <p:cNvPr id="135" name="TextBox 134"/>
           <p:cNvSpPr txBox="1"/>
           <p:nvPr/>
         </p:nvSpPr>
         <p:spPr>
           <a:xfrm rot="2360287">
-            <a:off x="3177381" y="2273896"/>
+            <a:off x="3962400" y="2542977"/>
             <a:ext cx="685800" cy="215444"/>
           </a:xfrm>
           <a:prstGeom prst="rect">
@@ -4721,13 +5170,13 @@
       </p:sp>
       <p:sp>
         <p:nvSpPr>
-          <p:cNvPr id="117" name="Arc 116"/>
+          <p:cNvPr id="136" name="Arc 135"/>
           <p:cNvSpPr/>
           <p:nvPr/>
         </p:nvSpPr>
         <p:spPr>
           <a:xfrm rot="16709798">
-            <a:off x="4156356" y="2332422"/>
+            <a:off x="4941375" y="2601503"/>
             <a:ext cx="381000" cy="304800"/>
           </a:xfrm>
           <a:prstGeom prst="arc">
@@ -4773,13 +5222,13 @@
       </p:sp>
       <p:sp>
         <p:nvSpPr>
-          <p:cNvPr id="118" name="TextBox 117"/>
+          <p:cNvPr id="137" name="TextBox 136"/>
           <p:cNvSpPr txBox="1"/>
           <p:nvPr/>
         </p:nvSpPr>
         <p:spPr>
           <a:xfrm>
-            <a:off x="4091781" y="1816696"/>
+            <a:off x="4876800" y="2085777"/>
             <a:ext cx="838200" cy="430887"/>
           </a:xfrm>
           <a:prstGeom prst="rect">
@@ -4826,13 +5275,13 @@
       </p:sp>
       <p:sp>
         <p:nvSpPr>
-          <p:cNvPr id="119" name="Arc 118"/>
+          <p:cNvPr id="140" name="Arc 139"/>
           <p:cNvSpPr/>
           <p:nvPr/>
         </p:nvSpPr>
         <p:spPr>
           <a:xfrm rot="19019392" flipV="1">
-            <a:off x="4344224" y="1923378"/>
+            <a:off x="5129243" y="2088036"/>
             <a:ext cx="1356586" cy="381000"/>
           </a:xfrm>
           <a:prstGeom prst="arc">
@@ -4874,13 +5323,13 @@
       </p:sp>
       <p:sp>
         <p:nvSpPr>
-          <p:cNvPr id="120" name="TextBox 119"/>
+          <p:cNvPr id="141" name="TextBox 140"/>
           <p:cNvSpPr txBox="1"/>
           <p:nvPr/>
         </p:nvSpPr>
         <p:spPr>
           <a:xfrm rot="18996887">
-            <a:off x="5009792" y="2290249"/>
+            <a:off x="5695298" y="2559330"/>
             <a:ext cx="685800" cy="215444"/>
           </a:xfrm>
           <a:prstGeom prst="rect">
@@ -4912,13 +5361,13 @@
       </p:sp>
       <p:sp>
         <p:nvSpPr>
-          <p:cNvPr id="121" name="Arc 120"/>
+          <p:cNvPr id="142" name="Arc 141"/>
           <p:cNvSpPr/>
           <p:nvPr/>
         </p:nvSpPr>
         <p:spPr>
           <a:xfrm rot="2715976" flipV="1">
-            <a:off x="5515779" y="1794935"/>
+            <a:off x="6300798" y="1959593"/>
             <a:ext cx="1356586" cy="381000"/>
           </a:xfrm>
           <a:prstGeom prst="arc">
@@ -4960,13 +5409,13 @@
       </p:sp>
       <p:sp>
         <p:nvSpPr>
-          <p:cNvPr id="122" name="TextBox 121"/>
+          <p:cNvPr id="143" name="TextBox 142"/>
           <p:cNvSpPr txBox="1"/>
           <p:nvPr/>
         </p:nvSpPr>
         <p:spPr>
           <a:xfrm rot="1991192">
-            <a:off x="5695014" y="2215418"/>
+            <a:off x="6480033" y="2484499"/>
             <a:ext cx="685800" cy="215444"/>
           </a:xfrm>
           <a:prstGeom prst="rect">
@@ -4998,13 +5447,13 @@
       </p:sp>
       <p:sp>
         <p:nvSpPr>
-          <p:cNvPr id="123" name="Arc 122"/>
+          <p:cNvPr id="148" name="Arc 147"/>
           <p:cNvSpPr/>
           <p:nvPr/>
         </p:nvSpPr>
         <p:spPr>
           <a:xfrm rot="16709798">
-            <a:off x="6673989" y="2273944"/>
+            <a:off x="7459008" y="2543025"/>
             <a:ext cx="381000" cy="304800"/>
           </a:xfrm>
           <a:prstGeom prst="arc">
@@ -5046,13 +5495,13 @@
       </p:sp>
       <p:sp>
         <p:nvSpPr>
-          <p:cNvPr id="124" name="TextBox 123"/>
+          <p:cNvPr id="149" name="TextBox 148"/>
           <p:cNvSpPr txBox="1"/>
           <p:nvPr/>
         </p:nvSpPr>
         <p:spPr>
           <a:xfrm>
-            <a:off x="6609414" y="1969096"/>
+            <a:off x="7394433" y="2238177"/>
             <a:ext cx="835167" cy="215444"/>
           </a:xfrm>
           <a:prstGeom prst="rect">
@@ -5084,13 +5533,13 @@
       </p:sp>
       <p:sp>
         <p:nvSpPr>
-          <p:cNvPr id="125" name="Arc 124"/>
+          <p:cNvPr id="151" name="Arc 150"/>
           <p:cNvSpPr/>
           <p:nvPr/>
         </p:nvSpPr>
         <p:spPr>
           <a:xfrm rot="19019392" flipV="1">
-            <a:off x="6861857" y="1864900"/>
+            <a:off x="7646876" y="2029558"/>
             <a:ext cx="1356586" cy="381000"/>
           </a:xfrm>
           <a:prstGeom prst="arc">
@@ -5132,13 +5581,13 @@
       </p:sp>
       <p:sp>
         <p:nvSpPr>
-          <p:cNvPr id="126" name="TextBox 125"/>
+          <p:cNvPr id="152" name="TextBox 151"/>
           <p:cNvSpPr txBox="1"/>
           <p:nvPr/>
         </p:nvSpPr>
         <p:spPr>
           <a:xfrm rot="18996887">
-            <a:off x="7506125" y="2178227"/>
+            <a:off x="8291144" y="2447308"/>
             <a:ext cx="841701" cy="215444"/>
           </a:xfrm>
           <a:prstGeom prst="rect">
@@ -5170,13 +5619,13 @@
       </p:sp>
       <p:sp>
         <p:nvSpPr>
-          <p:cNvPr id="132" name="Freeform 131"/>
+          <p:cNvPr id="153" name="Freeform 152"/>
           <p:cNvSpPr/>
           <p:nvPr/>
         </p:nvSpPr>
         <p:spPr>
           <a:xfrm>
-            <a:off x="944545" y="423418"/>
+            <a:off x="1729564" y="423418"/>
             <a:ext cx="3959051" cy="1273620"/>
           </a:xfrm>
           <a:custGeom>
@@ -5304,13 +5753,13 @@
       </p:sp>
       <p:sp>
         <p:nvSpPr>
-          <p:cNvPr id="133" name="TextBox 132"/>
+          <p:cNvPr id="155" name="TextBox 154"/>
           <p:cNvSpPr txBox="1"/>
           <p:nvPr/>
         </p:nvSpPr>
         <p:spPr>
           <a:xfrm>
-            <a:off x="1119981" y="1697038"/>
+            <a:off x="1905000" y="1697038"/>
             <a:ext cx="838200" cy="215444"/>
           </a:xfrm>
           <a:prstGeom prst="rect">
@@ -5330,7 +5779,15 @@
                   <a:srgbClr val="00B050"/>
                 </a:solidFill>
               </a:rPr>
-              <a:t>3.1 update</a:t>
+              <a:t>3.1 </a:t>
+            </a:r>
+            <a:r>
+              <a:rPr lang="en-US" sz="1400" b="1" dirty="0" smtClean="0">
+                <a:solidFill>
+                  <a:srgbClr val="00B050"/>
+                </a:solidFill>
+              </a:rPr>
+              <a:t>pull</a:t>
             </a:r>
             <a:endParaRPr lang="en-US" sz="1400" b="1" dirty="0">
               <a:solidFill>
@@ -5342,13 +5799,13 @@
       </p:sp>
       <p:cxnSp>
         <p:nvCxnSpPr>
-          <p:cNvPr id="138" name="Straight Connector 137"/>
+          <p:cNvPr id="156" name="Straight Connector 155"/>
           <p:cNvCxnSpPr/>
           <p:nvPr/>
         </p:nvCxnSpPr>
         <p:spPr>
           <a:xfrm>
-            <a:off x="4548981" y="5275460"/>
+            <a:off x="5029200" y="5275460"/>
             <a:ext cx="3657600" cy="0"/>
           </a:xfrm>
           <a:prstGeom prst="line">
@@ -5380,13 +5837,13 @@
       </p:cxnSp>
       <p:sp>
         <p:nvSpPr>
-          <p:cNvPr id="139" name="Flowchart: Connector 138"/>
+          <p:cNvPr id="157" name="Flowchart: Connector 156"/>
           <p:cNvSpPr/>
           <p:nvPr/>
         </p:nvSpPr>
         <p:spPr>
           <a:xfrm>
-            <a:off x="5082382" y="5199260"/>
+            <a:off x="5562601" y="5199260"/>
             <a:ext cx="152400" cy="152400"/>
           </a:xfrm>
           <a:prstGeom prst="flowChartConnector">
@@ -5432,13 +5889,13 @@
       </p:sp>
       <p:sp>
         <p:nvSpPr>
-          <p:cNvPr id="144" name="Flowchart: Connector 143"/>
+          <p:cNvPr id="159" name="Flowchart: Connector 158"/>
           <p:cNvSpPr/>
           <p:nvPr/>
         </p:nvSpPr>
         <p:spPr>
           <a:xfrm>
-            <a:off x="7673181" y="5199260"/>
+            <a:off x="8153400" y="5199260"/>
             <a:ext cx="152400" cy="152400"/>
           </a:xfrm>
           <a:prstGeom prst="flowChartConnector">
@@ -5472,13 +5929,13 @@
       </p:sp>
       <p:sp>
         <p:nvSpPr>
-          <p:cNvPr id="145" name="Flowchart: Connector 144"/>
+          <p:cNvPr id="161" name="Flowchart: Connector 160"/>
           <p:cNvSpPr/>
           <p:nvPr/>
         </p:nvSpPr>
         <p:spPr>
           <a:xfrm>
-            <a:off x="6453981" y="5199260"/>
+            <a:off x="6934200" y="5199260"/>
             <a:ext cx="152400" cy="152400"/>
           </a:xfrm>
           <a:prstGeom prst="flowChartConnector">
@@ -5524,13 +5981,13 @@
       </p:sp>
       <p:sp>
         <p:nvSpPr>
-          <p:cNvPr id="146" name="Flowchart: Connector 145"/>
+          <p:cNvPr id="162" name="Flowchart: Connector 161"/>
           <p:cNvSpPr/>
           <p:nvPr/>
         </p:nvSpPr>
         <p:spPr>
           <a:xfrm>
-            <a:off x="6834981" y="4589660"/>
+            <a:off x="7315200" y="4589660"/>
             <a:ext cx="152400" cy="152400"/>
           </a:xfrm>
           <a:prstGeom prst="flowChartConnector">
@@ -5575,13 +6032,13 @@
       </p:sp>
       <p:sp>
         <p:nvSpPr>
-          <p:cNvPr id="147" name="Flowchart: Connector 146"/>
+          <p:cNvPr id="164" name="Flowchart: Connector 163"/>
           <p:cNvSpPr/>
           <p:nvPr/>
         </p:nvSpPr>
         <p:spPr>
           <a:xfrm>
-            <a:off x="5615782" y="4589660"/>
+            <a:off x="6096001" y="4589660"/>
             <a:ext cx="152400" cy="152400"/>
           </a:xfrm>
           <a:prstGeom prst="flowChartConnector">
@@ -5626,16 +6083,16 @@
       </p:sp>
       <p:cxnSp>
         <p:nvCxnSpPr>
-          <p:cNvPr id="150" name="Shape 149"/>
+          <p:cNvPr id="167" name="Shape 149"/>
           <p:cNvCxnSpPr>
-            <a:stCxn id="139" idx="0"/>
-            <a:endCxn id="147" idx="2"/>
+            <a:stCxn id="157" idx="0"/>
+            <a:endCxn id="164" idx="2"/>
           </p:cNvCxnSpPr>
           <p:nvPr/>
         </p:nvCxnSpPr>
         <p:spPr>
           <a:xfrm rot="5400000" flipH="1" flipV="1">
-            <a:off x="5120482" y="4703960"/>
+            <a:off x="5600701" y="4703960"/>
             <a:ext cx="533400" cy="457200"/>
           </a:xfrm>
           <a:prstGeom prst="curvedConnector2">
@@ -5666,16 +6123,16 @@
       </p:cxnSp>
       <p:cxnSp>
         <p:nvCxnSpPr>
-          <p:cNvPr id="154" name="Shape 153"/>
+          <p:cNvPr id="169" name="Shape 153"/>
           <p:cNvCxnSpPr>
-            <a:stCxn id="146" idx="6"/>
-            <a:endCxn id="144" idx="1"/>
+            <a:stCxn id="162" idx="6"/>
+            <a:endCxn id="159" idx="1"/>
           </p:cNvCxnSpPr>
           <p:nvPr/>
         </p:nvCxnSpPr>
         <p:spPr>
           <a:xfrm>
-            <a:off x="6987381" y="4665860"/>
+            <a:off x="7467600" y="4665860"/>
             <a:ext cx="708118" cy="555718"/>
           </a:xfrm>
           <a:prstGeom prst="curvedConnector2">
@@ -5706,16 +6163,16 @@
       </p:cxnSp>
       <p:cxnSp>
         <p:nvCxnSpPr>
-          <p:cNvPr id="158" name="Straight Arrow Connector 157"/>
+          <p:cNvPr id="171" name="Straight Arrow Connector 170"/>
           <p:cNvCxnSpPr>
-            <a:stCxn id="147" idx="6"/>
-            <a:endCxn id="146" idx="2"/>
+            <a:stCxn id="164" idx="6"/>
+            <a:endCxn id="162" idx="2"/>
           </p:cNvCxnSpPr>
           <p:nvPr/>
         </p:nvCxnSpPr>
         <p:spPr>
           <a:xfrm>
-            <a:off x="5768182" y="4665860"/>
+            <a:off x="6248401" y="4665860"/>
             <a:ext cx="1066799" cy="0"/>
           </a:xfrm>
           <a:prstGeom prst="straightConnector1">
@@ -5746,16 +6203,16 @@
       </p:cxnSp>
       <p:cxnSp>
         <p:nvCxnSpPr>
-          <p:cNvPr id="160" name="Curved Connector 159"/>
+          <p:cNvPr id="172" name="Curved Connector 171"/>
           <p:cNvCxnSpPr>
-            <a:stCxn id="145" idx="7"/>
-            <a:endCxn id="146" idx="4"/>
+            <a:stCxn id="161" idx="7"/>
+            <a:endCxn id="162" idx="4"/>
           </p:cNvCxnSpPr>
           <p:nvPr/>
         </p:nvCxnSpPr>
         <p:spPr>
           <a:xfrm rot="5400000" flipH="1" flipV="1">
-            <a:off x="6507863" y="4818260"/>
+            <a:off x="6988082" y="4818260"/>
             <a:ext cx="479518" cy="327118"/>
           </a:xfrm>
           <a:prstGeom prst="curvedConnector3">
@@ -5789,13 +6246,13 @@
       </p:cxnSp>
       <p:sp>
         <p:nvSpPr>
-          <p:cNvPr id="163" name="TextBox 162"/>
+          <p:cNvPr id="174" name="TextBox 173"/>
           <p:cNvSpPr txBox="1"/>
           <p:nvPr/>
         </p:nvSpPr>
         <p:spPr>
           <a:xfrm rot="18268321">
-            <a:off x="4662895" y="4608370"/>
+            <a:off x="5143114" y="4608370"/>
             <a:ext cx="762000" cy="307777"/>
           </a:xfrm>
           <a:prstGeom prst="rect">
@@ -5827,13 +6284,13 @@
       </p:sp>
       <p:sp>
         <p:nvSpPr>
-          <p:cNvPr id="165" name="TextBox 164"/>
+          <p:cNvPr id="175" name="TextBox 174"/>
           <p:cNvSpPr txBox="1"/>
           <p:nvPr/>
         </p:nvSpPr>
         <p:spPr>
           <a:xfrm rot="2419831">
-            <a:off x="7273198" y="4522254"/>
+            <a:off x="7753417" y="4522254"/>
             <a:ext cx="762000" cy="307777"/>
           </a:xfrm>
           <a:prstGeom prst="rect">
@@ -5865,13 +6322,13 @@
       </p:sp>
       <p:sp>
         <p:nvSpPr>
-          <p:cNvPr id="166" name="TextBox 165"/>
+          <p:cNvPr id="176" name="TextBox 175"/>
           <p:cNvSpPr txBox="1"/>
           <p:nvPr/>
         </p:nvSpPr>
         <p:spPr>
           <a:xfrm>
-            <a:off x="5768181" y="4056260"/>
+            <a:off x="6248400" y="4056260"/>
             <a:ext cx="1295400" cy="523220"/>
           </a:xfrm>
           <a:prstGeom prst="rect">
@@ -5915,13 +6372,13 @@
       </p:sp>
       <p:sp>
         <p:nvSpPr>
-          <p:cNvPr id="168" name="TextBox 167"/>
+          <p:cNvPr id="177" name="TextBox 176"/>
           <p:cNvSpPr txBox="1"/>
           <p:nvPr/>
         </p:nvSpPr>
         <p:spPr>
           <a:xfrm>
-            <a:off x="5920581" y="4815283"/>
+            <a:off x="6355855" y="4858742"/>
             <a:ext cx="762000" cy="307777"/>
           </a:xfrm>
           <a:prstGeom prst="rect">
@@ -5935,13 +6392,14 @@
           </a:bodyPr>
           <a:lstStyle/>
           <a:p>
+            <a:pPr algn="r"/>
             <a:r>
               <a:rPr lang="en-US" sz="1400" b="1" dirty="0" smtClean="0">
                 <a:solidFill>
                   <a:srgbClr val="00B050"/>
                 </a:solidFill>
               </a:rPr>
-              <a:t>update</a:t>
+              <a:t>pull</a:t>
             </a:r>
             <a:endParaRPr lang="en-US" sz="1400" b="1" dirty="0">
               <a:solidFill>
@@ -5953,13 +6411,13 @@
       </p:sp>
       <p:sp>
         <p:nvSpPr>
-          <p:cNvPr id="170" name="TextBox 169"/>
+          <p:cNvPr id="178" name="TextBox 177"/>
           <p:cNvSpPr txBox="1"/>
           <p:nvPr/>
         </p:nvSpPr>
         <p:spPr>
           <a:xfrm>
-            <a:off x="3786981" y="4970660"/>
+            <a:off x="4267200" y="4970660"/>
             <a:ext cx="762000" cy="523220"/>
           </a:xfrm>
           <a:prstGeom prst="rect">
@@ -6012,10 +6470,152 @@
           </a:p>
         </p:txBody>
       </p:sp>
+      <p:cxnSp>
+        <p:nvCxnSpPr>
+          <p:cNvPr id="179" name="Straight Arrow Connector 178"/>
+          <p:cNvCxnSpPr/>
+          <p:nvPr/>
+        </p:nvCxnSpPr>
+        <p:spPr>
+          <a:xfrm flipH="1">
+            <a:off x="4572000" y="1328598"/>
+            <a:ext cx="914400" cy="0"/>
+          </a:xfrm>
+          <a:prstGeom prst="straightConnector1">
+            <a:avLst/>
+          </a:prstGeom>
+          <a:ln w="28575">
+            <a:solidFill>
+              <a:schemeClr val="bg1">
+                <a:lumMod val="65000"/>
+              </a:schemeClr>
+            </a:solidFill>
+            <a:tailEnd type="triangle"/>
+          </a:ln>
+        </p:spPr>
+        <p:style>
+          <a:lnRef idx="1">
+            <a:schemeClr val="accent1"/>
+          </a:lnRef>
+          <a:fillRef idx="0">
+            <a:schemeClr val="accent1"/>
+          </a:fillRef>
+          <a:effectRef idx="0">
+            <a:schemeClr val="accent1"/>
+          </a:effectRef>
+          <a:fontRef idx="minor">
+            <a:schemeClr val="tx1"/>
+          </a:fontRef>
+        </p:style>
+      </p:cxnSp>
+      <p:sp>
+        <p:nvSpPr>
+          <p:cNvPr id="180" name="TextBox 179"/>
+          <p:cNvSpPr txBox="1"/>
+          <p:nvPr/>
+        </p:nvSpPr>
+        <p:spPr>
+          <a:xfrm>
+            <a:off x="4385258" y="975519"/>
+            <a:ext cx="1482143" cy="307777"/>
+          </a:xfrm>
+          <a:prstGeom prst="rect">
+            <a:avLst/>
+          </a:prstGeom>
+          <a:noFill/>
+        </p:spPr>
+        <p:txBody>
+          <a:bodyPr wrap="square" rtlCol="0">
+            <a:spAutoFit/>
+          </a:bodyPr>
+          <a:lstStyle/>
+          <a:p>
+            <a:r>
+              <a:rPr lang="en-US" sz="1400" b="1" dirty="0" smtClean="0">
+                <a:solidFill>
+                  <a:schemeClr val="bg1">
+                    <a:lumMod val="65000"/>
+                  </a:schemeClr>
+                </a:solidFill>
+              </a:rPr>
+              <a:t>server-side clone</a:t>
+            </a:r>
+            <a:endParaRPr lang="en-US" sz="1400" b="1" dirty="0">
+              <a:solidFill>
+                <a:schemeClr val="bg1">
+                  <a:lumMod val="65000"/>
+                </a:schemeClr>
+              </a:solidFill>
+            </a:endParaRPr>
+          </a:p>
+        </p:txBody>
+      </p:sp>
+      <p:sp>
+        <p:nvSpPr>
+          <p:cNvPr id="181" name="Can 180"/>
+          <p:cNvSpPr/>
+          <p:nvPr/>
+        </p:nvSpPr>
+        <p:spPr>
+          <a:xfrm>
+            <a:off x="805543" y="902296"/>
+            <a:ext cx="685800" cy="650081"/>
+          </a:xfrm>
+          <a:prstGeom prst="can">
+            <a:avLst/>
+          </a:prstGeom>
+          <a:solidFill>
+            <a:schemeClr val="accent2">
+              <a:lumMod val="60000"/>
+              <a:lumOff val="40000"/>
+            </a:schemeClr>
+          </a:solidFill>
+          <a:ln>
+            <a:solidFill>
+              <a:srgbClr val="D28280"/>
+            </a:solidFill>
+          </a:ln>
+        </p:spPr>
+        <p:style>
+          <a:lnRef idx="2">
+            <a:schemeClr val="accent1">
+              <a:shade val="50000"/>
+            </a:schemeClr>
+          </a:lnRef>
+          <a:fillRef idx="1">
+            <a:schemeClr val="accent1"/>
+          </a:fillRef>
+          <a:effectRef idx="0">
+            <a:schemeClr val="accent1"/>
+          </a:effectRef>
+          <a:fontRef idx="minor">
+            <a:schemeClr val="lt1"/>
+          </a:fontRef>
+        </p:style>
+        <p:txBody>
+          <a:bodyPr rtlCol="0" anchor="ctr"/>
+          <a:lstStyle/>
+          <a:p>
+            <a:pPr algn="ctr"/>
+            <a:r>
+              <a:rPr lang="en-US" sz="1600" b="1" dirty="0"/>
+              <a:t>Local</a:t>
+            </a:r>
+          </a:p>
+          <a:p>
+            <a:pPr algn="ctr"/>
+            <a:r>
+              <a:rPr lang="en-US" sz="1600" b="1" dirty="0"/>
+              <a:t>Repo</a:t>
+            </a:r>
+            <a:endParaRPr lang="en-US" sz="1600" b="1" dirty="0"/>
+          </a:p>
+        </p:txBody>
+      </p:sp>
     </p:spTree>
     <p:extLst>
       <p:ext uri="{BB962C8B-B14F-4D97-AF65-F5344CB8AC3E}">
-        <p14:creationId xmlns:p14="http://schemas.microsoft.com/office/powerpoint/2010/main" xmlns="" val="2312643091"/>
+        <p14:creationId xmlns:p14="http://schemas.microsoft.com/office/powerpoint/2010/main" val="2312643091"/>
       </p:ext>
     </p:extLst>
   </p:cSld>

</xml_diff>

<commit_message>
Continuing/Syncing Issue 507 [after adding student, email not sented] Update Issue 507 Refactored InstructorCourseDetailsPageUiTest and EmailAccount. Merged default
</commit_message>
<xml_diff>
--- a/doc/diagrams/workflow.pptx
+++ b/doc/diagrams/workflow.pptx
@@ -10,7 +10,7 @@
   <p:sldIdLst>
     <p:sldId id="256" r:id="rId2"/>
   </p:sldIdLst>
-  <p:sldSz cx="8640763" cy="5761038"/>
+  <p:sldSz cx="9144000" cy="5761038"/>
   <p:notesSz cx="6858000" cy="9144000"/>
   <p:defaultTextStyle>
     <a:defPPr>
@@ -193,7 +193,7 @@
             <a:fld id="{DC50A2AC-D691-437C-A69B-81ECFE08AD4B}" type="datetimeFigureOut">
               <a:rPr lang="en-SG" smtClean="0"/>
               <a:pPr/>
-              <a:t>28/7/2012</a:t>
+              <a:t>9/2/2013</a:t>
             </a:fld>
             <a:endParaRPr lang="en-SG"/>
           </a:p>
@@ -211,8 +211,8 @@
         </p:nvSpPr>
         <p:spPr>
           <a:xfrm>
-            <a:off x="858838" y="685800"/>
-            <a:ext cx="5140325" cy="3429000"/>
+            <a:off x="708025" y="685800"/>
+            <a:ext cx="5441950" cy="3429000"/>
           </a:xfrm>
           <a:prstGeom prst="rect">
             <a:avLst/>
@@ -362,7 +362,7 @@
     </p:spTree>
     <p:extLst>
       <p:ext uri="{BB962C8B-B14F-4D97-AF65-F5344CB8AC3E}">
-        <p14:creationId xmlns:p14="http://schemas.microsoft.com/office/powerpoint/2010/main" xmlns="" val="2265103329"/>
+        <p14:creationId xmlns:p14="http://schemas.microsoft.com/office/powerpoint/2010/main" val="2265103329"/>
       </p:ext>
     </p:extLst>
   </p:cSld>
@@ -491,8 +491,8 @@
         </p:nvSpPr>
         <p:spPr>
           <a:xfrm>
-            <a:off x="858838" y="685800"/>
-            <a:ext cx="5140325" cy="3429000"/>
+            <a:off x="708025" y="685800"/>
+            <a:ext cx="5441950" cy="3429000"/>
           </a:xfrm>
         </p:spPr>
       </p:sp>
@@ -542,7 +542,7 @@
     </p:spTree>
     <p:extLst>
       <p:ext uri="{BB962C8B-B14F-4D97-AF65-F5344CB8AC3E}">
-        <p14:creationId xmlns:p14="http://schemas.microsoft.com/office/powerpoint/2010/main" xmlns="" val="1558229004"/>
+        <p14:creationId xmlns:p14="http://schemas.microsoft.com/office/powerpoint/2010/main" val="1558229004"/>
       </p:ext>
     </p:extLst>
   </p:cSld>
@@ -581,8 +581,8 @@
         </p:nvSpPr>
         <p:spPr>
           <a:xfrm>
-            <a:off x="648057" y="1789656"/>
-            <a:ext cx="7344649" cy="1234890"/>
+            <a:off x="685802" y="1789656"/>
+            <a:ext cx="7772400" cy="1234890"/>
           </a:xfrm>
         </p:spPr>
         <p:txBody>
@@ -609,8 +609,8 @@
         </p:nvSpPr>
         <p:spPr>
           <a:xfrm>
-            <a:off x="1296115" y="3264588"/>
-            <a:ext cx="6048534" cy="1472266"/>
+            <a:off x="1371601" y="3264588"/>
+            <a:ext cx="6400800" cy="1472266"/>
           </a:xfrm>
         </p:spPr>
         <p:txBody>
@@ -734,7 +734,7 @@
             <a:fld id="{1D8BD707-D9CF-40AE-B4C6-C98DA3205C09}" type="datetimeFigureOut">
               <a:rPr lang="en-US" smtClean="0"/>
               <a:pPr/>
-              <a:t>7/28/2012</a:t>
+              <a:t>2/9/2013</a:t>
             </a:fld>
             <a:endParaRPr lang="en-US"/>
           </a:p>
@@ -901,7 +901,7 @@
             <a:fld id="{1D8BD707-D9CF-40AE-B4C6-C98DA3205C09}" type="datetimeFigureOut">
               <a:rPr lang="en-US" smtClean="0"/>
               <a:pPr/>
-              <a:t>7/28/2012</a:t>
+              <a:t>2/9/2013</a:t>
             </a:fld>
             <a:endParaRPr lang="en-US"/>
           </a:p>
@@ -987,8 +987,8 @@
         </p:nvSpPr>
         <p:spPr>
           <a:xfrm>
-            <a:off x="6264553" y="230710"/>
-            <a:ext cx="1944172" cy="4915552"/>
+            <a:off x="6629401" y="230710"/>
+            <a:ext cx="2057400" cy="4915552"/>
           </a:xfrm>
         </p:spPr>
         <p:txBody>
@@ -1015,8 +1015,8 @@
         </p:nvSpPr>
         <p:spPr>
           <a:xfrm>
-            <a:off x="432039" y="230710"/>
-            <a:ext cx="5688502" cy="4915552"/>
+            <a:off x="457201" y="230710"/>
+            <a:ext cx="6019800" cy="4915552"/>
           </a:xfrm>
         </p:spPr>
         <p:txBody>
@@ -1078,7 +1078,7 @@
             <a:fld id="{1D8BD707-D9CF-40AE-B4C6-C98DA3205C09}" type="datetimeFigureOut">
               <a:rPr lang="en-US" smtClean="0"/>
               <a:pPr/>
-              <a:t>7/28/2012</a:t>
+              <a:t>2/9/2013</a:t>
             </a:fld>
             <a:endParaRPr lang="en-US"/>
           </a:p>
@@ -1245,7 +1245,7 @@
             <a:fld id="{1D8BD707-D9CF-40AE-B4C6-C98DA3205C09}" type="datetimeFigureOut">
               <a:rPr lang="en-US" smtClean="0"/>
               <a:pPr/>
-              <a:t>7/28/2012</a:t>
+              <a:t>2/9/2013</a:t>
             </a:fld>
             <a:endParaRPr lang="en-US"/>
           </a:p>
@@ -1331,8 +1331,8 @@
         </p:nvSpPr>
         <p:spPr>
           <a:xfrm>
-            <a:off x="682561" y="3702001"/>
-            <a:ext cx="7344649" cy="1144206"/>
+            <a:off x="722314" y="3702001"/>
+            <a:ext cx="7772400" cy="1144206"/>
           </a:xfrm>
         </p:spPr>
         <p:txBody>
@@ -1363,8 +1363,8 @@
         </p:nvSpPr>
         <p:spPr>
           <a:xfrm>
-            <a:off x="682561" y="2441774"/>
-            <a:ext cx="7344649" cy="1260227"/>
+            <a:off x="722314" y="2441774"/>
+            <a:ext cx="7772400" cy="1260227"/>
           </a:xfrm>
         </p:spPr>
         <p:txBody>
@@ -1488,7 +1488,7 @@
             <a:fld id="{1D8BD707-D9CF-40AE-B4C6-C98DA3205C09}" type="datetimeFigureOut">
               <a:rPr lang="en-US" smtClean="0"/>
               <a:pPr/>
-              <a:t>7/28/2012</a:t>
+              <a:t>2/9/2013</a:t>
             </a:fld>
             <a:endParaRPr lang="en-US"/>
           </a:p>
@@ -1597,8 +1597,8 @@
         </p:nvSpPr>
         <p:spPr>
           <a:xfrm>
-            <a:off x="432039" y="1344242"/>
-            <a:ext cx="3816337" cy="3802019"/>
+            <a:off x="457202" y="1344242"/>
+            <a:ext cx="4038600" cy="3802019"/>
           </a:xfrm>
         </p:spPr>
         <p:txBody>
@@ -1682,8 +1682,8 @@
         </p:nvSpPr>
         <p:spPr>
           <a:xfrm>
-            <a:off x="4392388" y="1344242"/>
-            <a:ext cx="3816337" cy="3802019"/>
+            <a:off x="4648201" y="1344242"/>
+            <a:ext cx="4038600" cy="3802019"/>
           </a:xfrm>
         </p:spPr>
         <p:txBody>
@@ -1773,7 +1773,7 @@
             <a:fld id="{1D8BD707-D9CF-40AE-B4C6-C98DA3205C09}" type="datetimeFigureOut">
               <a:rPr lang="en-US" smtClean="0"/>
               <a:pPr/>
-              <a:t>7/28/2012</a:t>
+              <a:t>2/9/2013</a:t>
             </a:fld>
             <a:endParaRPr lang="en-US"/>
           </a:p>
@@ -1886,8 +1886,8 @@
         </p:nvSpPr>
         <p:spPr>
           <a:xfrm>
-            <a:off x="432039" y="1289566"/>
-            <a:ext cx="3817838" cy="537430"/>
+            <a:off x="457201" y="1289566"/>
+            <a:ext cx="4040189" cy="537430"/>
           </a:xfrm>
         </p:spPr>
         <p:txBody>
@@ -1951,8 +1951,8 @@
         </p:nvSpPr>
         <p:spPr>
           <a:xfrm>
-            <a:off x="432039" y="1826997"/>
-            <a:ext cx="3817838" cy="3319265"/>
+            <a:off x="457201" y="1826997"/>
+            <a:ext cx="4040189" cy="3319265"/>
           </a:xfrm>
         </p:spPr>
         <p:txBody>
@@ -2036,8 +2036,8 @@
         </p:nvSpPr>
         <p:spPr>
           <a:xfrm>
-            <a:off x="4389389" y="1289566"/>
-            <a:ext cx="3819337" cy="537430"/>
+            <a:off x="4645028" y="1289566"/>
+            <a:ext cx="4041774" cy="537430"/>
           </a:xfrm>
         </p:spPr>
         <p:txBody>
@@ -2101,8 +2101,8 @@
         </p:nvSpPr>
         <p:spPr>
           <a:xfrm>
-            <a:off x="4389389" y="1826997"/>
-            <a:ext cx="3819337" cy="3319265"/>
+            <a:off x="4645028" y="1826997"/>
+            <a:ext cx="4041774" cy="3319265"/>
           </a:xfrm>
         </p:spPr>
         <p:txBody>
@@ -2192,7 +2192,7 @@
             <a:fld id="{1D8BD707-D9CF-40AE-B4C6-C98DA3205C09}" type="datetimeFigureOut">
               <a:rPr lang="en-US" smtClean="0"/>
               <a:pPr/>
-              <a:t>7/28/2012</a:t>
+              <a:t>2/9/2013</a:t>
             </a:fld>
             <a:endParaRPr lang="en-US"/>
           </a:p>
@@ -2307,7 +2307,7 @@
             <a:fld id="{1D8BD707-D9CF-40AE-B4C6-C98DA3205C09}" type="datetimeFigureOut">
               <a:rPr lang="en-US" smtClean="0"/>
               <a:pPr/>
-              <a:t>7/28/2012</a:t>
+              <a:t>2/9/2013</a:t>
             </a:fld>
             <a:endParaRPr lang="en-US"/>
           </a:p>
@@ -2399,7 +2399,7 @@
             <a:fld id="{1D8BD707-D9CF-40AE-B4C6-C98DA3205C09}" type="datetimeFigureOut">
               <a:rPr lang="en-US" smtClean="0"/>
               <a:pPr/>
-              <a:t>7/28/2012</a:t>
+              <a:t>2/9/2013</a:t>
             </a:fld>
             <a:endParaRPr lang="en-US"/>
           </a:p>
@@ -2485,8 +2485,8 @@
         </p:nvSpPr>
         <p:spPr>
           <a:xfrm>
-            <a:off x="432039" y="229375"/>
-            <a:ext cx="2842752" cy="976176"/>
+            <a:off x="457201" y="229375"/>
+            <a:ext cx="3008314" cy="976176"/>
           </a:xfrm>
         </p:spPr>
         <p:txBody>
@@ -2517,8 +2517,8 @@
         </p:nvSpPr>
         <p:spPr>
           <a:xfrm>
-            <a:off x="3378298" y="229375"/>
-            <a:ext cx="4830427" cy="4916886"/>
+            <a:off x="3575051" y="229375"/>
+            <a:ext cx="5111751" cy="4916886"/>
           </a:xfrm>
         </p:spPr>
         <p:txBody>
@@ -2602,8 +2602,8 @@
         </p:nvSpPr>
         <p:spPr>
           <a:xfrm>
-            <a:off x="432039" y="1205551"/>
-            <a:ext cx="2842752" cy="3940710"/>
+            <a:off x="457201" y="1205551"/>
+            <a:ext cx="3008314" cy="3940710"/>
           </a:xfrm>
         </p:spPr>
         <p:txBody>
@@ -2673,7 +2673,7 @@
             <a:fld id="{1D8BD707-D9CF-40AE-B4C6-C98DA3205C09}" type="datetimeFigureOut">
               <a:rPr lang="en-US" smtClean="0"/>
               <a:pPr/>
-              <a:t>7/28/2012</a:t>
+              <a:t>2/9/2013</a:t>
             </a:fld>
             <a:endParaRPr lang="en-US"/>
           </a:p>
@@ -2759,8 +2759,8 @@
         </p:nvSpPr>
         <p:spPr>
           <a:xfrm>
-            <a:off x="1693650" y="4032727"/>
-            <a:ext cx="5184458" cy="476086"/>
+            <a:off x="1792288" y="4032727"/>
+            <a:ext cx="5486400" cy="476086"/>
           </a:xfrm>
         </p:spPr>
         <p:txBody>
@@ -2791,8 +2791,8 @@
         </p:nvSpPr>
         <p:spPr>
           <a:xfrm>
-            <a:off x="1693650" y="514760"/>
-            <a:ext cx="5184458" cy="3456623"/>
+            <a:off x="1792288" y="514762"/>
+            <a:ext cx="5486400" cy="3456623"/>
           </a:xfrm>
         </p:spPr>
         <p:txBody>
@@ -2852,8 +2852,8 @@
         </p:nvSpPr>
         <p:spPr>
           <a:xfrm>
-            <a:off x="1693650" y="4508813"/>
-            <a:ext cx="5184458" cy="676121"/>
+            <a:off x="1792288" y="4508815"/>
+            <a:ext cx="5486400" cy="676121"/>
           </a:xfrm>
         </p:spPr>
         <p:txBody>
@@ -2923,7 +2923,7 @@
             <a:fld id="{1D8BD707-D9CF-40AE-B4C6-C98DA3205C09}" type="datetimeFigureOut">
               <a:rPr lang="en-US" smtClean="0"/>
               <a:pPr/>
-              <a:t>7/28/2012</a:t>
+              <a:t>2/9/2013</a:t>
             </a:fld>
             <a:endParaRPr lang="en-US"/>
           </a:p>
@@ -3014,8 +3014,8 @@
         </p:nvSpPr>
         <p:spPr>
           <a:xfrm>
-            <a:off x="432038" y="230709"/>
-            <a:ext cx="7776687" cy="960173"/>
+            <a:off x="457202" y="230709"/>
+            <a:ext cx="8229600" cy="960173"/>
           </a:xfrm>
           <a:prstGeom prst="rect">
             <a:avLst/>
@@ -3047,8 +3047,8 @@
         </p:nvSpPr>
         <p:spPr>
           <a:xfrm>
-            <a:off x="432038" y="1344242"/>
-            <a:ext cx="7776687" cy="3802019"/>
+            <a:off x="457202" y="1344242"/>
+            <a:ext cx="8229600" cy="3802019"/>
           </a:xfrm>
           <a:prstGeom prst="rect">
             <a:avLst/>
@@ -3109,8 +3109,8 @@
         </p:nvSpPr>
         <p:spPr>
           <a:xfrm>
-            <a:off x="432039" y="5339630"/>
-            <a:ext cx="2016178" cy="306722"/>
+            <a:off x="457201" y="5339630"/>
+            <a:ext cx="2133600" cy="306722"/>
           </a:xfrm>
           <a:prstGeom prst="rect">
             <a:avLst/>
@@ -3133,7 +3133,7 @@
             <a:fld id="{1D8BD707-D9CF-40AE-B4C6-C98DA3205C09}" type="datetimeFigureOut">
               <a:rPr lang="en-US" smtClean="0"/>
               <a:pPr/>
-              <a:t>7/28/2012</a:t>
+              <a:t>2/9/2013</a:t>
             </a:fld>
             <a:endParaRPr lang="en-US"/>
           </a:p>
@@ -3151,8 +3151,8 @@
         </p:nvSpPr>
         <p:spPr>
           <a:xfrm>
-            <a:off x="2952262" y="5339630"/>
-            <a:ext cx="2736242" cy="306722"/>
+            <a:off x="3124202" y="5339630"/>
+            <a:ext cx="2895600" cy="306722"/>
           </a:xfrm>
           <a:prstGeom prst="rect">
             <a:avLst/>
@@ -3188,8 +3188,8 @@
         </p:nvSpPr>
         <p:spPr>
           <a:xfrm>
-            <a:off x="6192548" y="5339630"/>
-            <a:ext cx="2016178" cy="306722"/>
+            <a:off x="6553201" y="5339630"/>
+            <a:ext cx="2133600" cy="306722"/>
           </a:xfrm>
           <a:prstGeom prst="rect">
             <a:avLst/>
@@ -3506,13 +3506,449 @@
       </p:grpSpPr>
       <p:sp>
         <p:nvSpPr>
-          <p:cNvPr id="173" name="Rounded Rectangle 172"/>
+          <p:cNvPr id="5" name="laptop"/>
+          <p:cNvSpPr>
+            <a:spLocks noEditPoints="1" noChangeArrowheads="1"/>
+          </p:cNvSpPr>
+          <p:nvPr/>
+        </p:nvSpPr>
+        <p:spPr bwMode="auto">
+          <a:xfrm>
+            <a:off x="457199" y="1053848"/>
+            <a:ext cx="1272365" cy="988472"/>
+          </a:xfrm>
+          <a:custGeom>
+            <a:avLst/>
+            <a:gdLst>
+              <a:gd name="T0" fmla="*/ 3362 w 21600"/>
+              <a:gd name="T1" fmla="*/ 0 h 21600"/>
+              <a:gd name="T2" fmla="*/ 3362 w 21600"/>
+              <a:gd name="T3" fmla="*/ 7173 h 21600"/>
+              <a:gd name="T4" fmla="*/ 18327 w 21600"/>
+              <a:gd name="T5" fmla="*/ 0 h 21600"/>
+              <a:gd name="T6" fmla="*/ 18327 w 21600"/>
+              <a:gd name="T7" fmla="*/ 7173 h 21600"/>
+              <a:gd name="T8" fmla="*/ 10800 w 21600"/>
+              <a:gd name="T9" fmla="*/ 0 h 21600"/>
+              <a:gd name="T10" fmla="*/ 10800 w 21600"/>
+              <a:gd name="T11" fmla="*/ 21600 h 21600"/>
+              <a:gd name="T12" fmla="*/ 0 w 21600"/>
+              <a:gd name="T13" fmla="*/ 21600 h 21600"/>
+              <a:gd name="T14" fmla="*/ 21600 w 21600"/>
+              <a:gd name="T15" fmla="*/ 21600 h 21600"/>
+              <a:gd name="T16" fmla="*/ 4445 w 21600"/>
+              <a:gd name="T17" fmla="*/ 1858 h 21600"/>
+              <a:gd name="T18" fmla="*/ 17311 w 21600"/>
+              <a:gd name="T19" fmla="*/ 12323 h 21600"/>
+            </a:gdLst>
+            <a:ahLst/>
+            <a:cxnLst>
+              <a:cxn ang="0">
+                <a:pos x="T0" y="T1"/>
+              </a:cxn>
+              <a:cxn ang="0">
+                <a:pos x="T2" y="T3"/>
+              </a:cxn>
+              <a:cxn ang="0">
+                <a:pos x="T4" y="T5"/>
+              </a:cxn>
+              <a:cxn ang="0">
+                <a:pos x="T6" y="T7"/>
+              </a:cxn>
+              <a:cxn ang="0">
+                <a:pos x="T8" y="T9"/>
+              </a:cxn>
+              <a:cxn ang="0">
+                <a:pos x="T10" y="T11"/>
+              </a:cxn>
+              <a:cxn ang="0">
+                <a:pos x="T12" y="T13"/>
+              </a:cxn>
+              <a:cxn ang="0">
+                <a:pos x="T14" y="T15"/>
+              </a:cxn>
+            </a:cxnLst>
+            <a:rect l="T16" t="T17" r="T18" b="T19"/>
+            <a:pathLst>
+              <a:path w="21600" h="21600" extrusionOk="0">
+                <a:moveTo>
+                  <a:pt x="3362" y="0"/>
+                </a:moveTo>
+                <a:lnTo>
+                  <a:pt x="18327" y="0"/>
+                </a:lnTo>
+                <a:lnTo>
+                  <a:pt x="18327" y="14347"/>
+                </a:lnTo>
+                <a:lnTo>
+                  <a:pt x="3362" y="14347"/>
+                </a:lnTo>
+                <a:lnTo>
+                  <a:pt x="3362" y="0"/>
+                </a:lnTo>
+                <a:close/>
+              </a:path>
+              <a:path w="21600" h="21600" extrusionOk="0">
+                <a:moveTo>
+                  <a:pt x="3340" y="15068"/>
+                </a:moveTo>
+                <a:lnTo>
+                  <a:pt x="0" y="19877"/>
+                </a:lnTo>
+                <a:lnTo>
+                  <a:pt x="21600" y="19877"/>
+                </a:lnTo>
+                <a:lnTo>
+                  <a:pt x="18327" y="15068"/>
+                </a:lnTo>
+                <a:lnTo>
+                  <a:pt x="3340" y="15068"/>
+                </a:lnTo>
+                <a:close/>
+              </a:path>
+              <a:path w="21600" h="21600" extrusionOk="0">
+                <a:moveTo>
+                  <a:pt x="0" y="19877"/>
+                </a:moveTo>
+                <a:lnTo>
+                  <a:pt x="0" y="21600"/>
+                </a:lnTo>
+                <a:lnTo>
+                  <a:pt x="21600" y="21600"/>
+                </a:lnTo>
+                <a:lnTo>
+                  <a:pt x="21600" y="19877"/>
+                </a:lnTo>
+                <a:lnTo>
+                  <a:pt x="0" y="19877"/>
+                </a:lnTo>
+                <a:close/>
+              </a:path>
+              <a:path w="21600" h="21600" extrusionOk="0">
+                <a:moveTo>
+                  <a:pt x="4186" y="1523"/>
+                </a:moveTo>
+                <a:lnTo>
+                  <a:pt x="17547" y="1523"/>
+                </a:lnTo>
+                <a:lnTo>
+                  <a:pt x="17547" y="12744"/>
+                </a:lnTo>
+                <a:lnTo>
+                  <a:pt x="4186" y="12744"/>
+                </a:lnTo>
+                <a:lnTo>
+                  <a:pt x="4186" y="1523"/>
+                </a:lnTo>
+                <a:close/>
+              </a:path>
+              <a:path w="21600" h="21600" extrusionOk="0">
+                <a:moveTo>
+                  <a:pt x="3318" y="15549"/>
+                </a:moveTo>
+                <a:lnTo>
+                  <a:pt x="2917" y="16110"/>
+                </a:lnTo>
+                <a:lnTo>
+                  <a:pt x="18727" y="16110"/>
+                </a:lnTo>
+                <a:lnTo>
+                  <a:pt x="18327" y="15549"/>
+                </a:lnTo>
+                <a:lnTo>
+                  <a:pt x="3318" y="15549"/>
+                </a:lnTo>
+                <a:close/>
+              </a:path>
+              <a:path w="21600" h="21600" extrusionOk="0">
+                <a:moveTo>
+                  <a:pt x="6213" y="18314"/>
+                </a:moveTo>
+                <a:lnTo>
+                  <a:pt x="5946" y="18875"/>
+                </a:lnTo>
+                <a:lnTo>
+                  <a:pt x="15766" y="18875"/>
+                </a:lnTo>
+                <a:lnTo>
+                  <a:pt x="15499" y="18314"/>
+                </a:lnTo>
+                <a:lnTo>
+                  <a:pt x="6213" y="18314"/>
+                </a:lnTo>
+                <a:close/>
+              </a:path>
+              <a:path w="21600" h="21600" extrusionOk="0">
+                <a:moveTo>
+                  <a:pt x="2828" y="16471"/>
+                </a:moveTo>
+                <a:lnTo>
+                  <a:pt x="2405" y="17072"/>
+                </a:lnTo>
+                <a:lnTo>
+                  <a:pt x="19284" y="17072"/>
+                </a:lnTo>
+                <a:lnTo>
+                  <a:pt x="18839" y="16471"/>
+                </a:lnTo>
+                <a:lnTo>
+                  <a:pt x="2828" y="16471"/>
+                </a:lnTo>
+                <a:close/>
+              </a:path>
+              <a:path w="21600" h="21600" extrusionOk="0">
+                <a:moveTo>
+                  <a:pt x="2316" y="17352"/>
+                </a:moveTo>
+                <a:lnTo>
+                  <a:pt x="1871" y="17953"/>
+                </a:lnTo>
+                <a:lnTo>
+                  <a:pt x="19863" y="17953"/>
+                </a:lnTo>
+                <a:lnTo>
+                  <a:pt x="19395" y="17352"/>
+                </a:lnTo>
+                <a:lnTo>
+                  <a:pt x="2316" y="17352"/>
+                </a:lnTo>
+                <a:close/>
+              </a:path>
+            </a:pathLst>
+          </a:custGeom>
+          <a:solidFill>
+            <a:schemeClr val="bg1"/>
+          </a:solidFill>
+          <a:ln w="38100">
+            <a:solidFill>
+              <a:schemeClr val="bg1">
+                <a:lumMod val="85000"/>
+              </a:schemeClr>
+            </a:solidFill>
+            <a:miter lim="800000"/>
+            <a:headEnd/>
+            <a:tailEnd/>
+          </a:ln>
+        </p:spPr>
+        <p:txBody>
+          <a:bodyPr vert="horz" wrap="square" lIns="91440" tIns="45720" rIns="91440" bIns="45720" numCol="1" anchor="t" anchorCtr="0" compatLnSpc="1">
+            <a:prstTxWarp prst="textNoShape">
+              <a:avLst/>
+            </a:prstTxWarp>
+          </a:bodyPr>
+          <a:lstStyle/>
+          <a:p>
+            <a:endParaRPr lang="en-US"/>
+          </a:p>
+        </p:txBody>
+      </p:sp>
+      <p:sp>
+        <p:nvSpPr>
+          <p:cNvPr id="80" name="Cloud 79"/>
           <p:cNvSpPr/>
           <p:nvPr/>
         </p:nvSpPr>
         <p:spPr>
           <a:xfrm>
-            <a:off x="3482181" y="3947319"/>
+            <a:off x="7941267" y="1350987"/>
+            <a:ext cx="1186265" cy="462732"/>
+          </a:xfrm>
+          <a:prstGeom prst="cloud">
+            <a:avLst/>
+          </a:prstGeom>
+          <a:solidFill>
+            <a:schemeClr val="bg1"/>
+          </a:solidFill>
+          <a:ln>
+            <a:solidFill>
+              <a:schemeClr val="bg1">
+                <a:lumMod val="85000"/>
+              </a:schemeClr>
+            </a:solidFill>
+          </a:ln>
+        </p:spPr>
+        <p:style>
+          <a:lnRef idx="2">
+            <a:schemeClr val="accent1">
+              <a:shade val="50000"/>
+            </a:schemeClr>
+          </a:lnRef>
+          <a:fillRef idx="1">
+            <a:schemeClr val="accent1"/>
+          </a:fillRef>
+          <a:effectRef idx="0">
+            <a:schemeClr val="accent1"/>
+          </a:effectRef>
+          <a:fontRef idx="minor">
+            <a:schemeClr val="lt1"/>
+          </a:fontRef>
+        </p:style>
+        <p:txBody>
+          <a:bodyPr lIns="0" rIns="0" bIns="0" rtlCol="0" anchor="ctr"/>
+          <a:lstStyle/>
+          <a:p>
+            <a:pPr algn="ctr"/>
+            <a:r>
+              <a:rPr lang="en-US" sz="1400" b="1" dirty="0" err="1">
+                <a:solidFill>
+                  <a:schemeClr val="bg1">
+                    <a:lumMod val="65000"/>
+                  </a:schemeClr>
+                </a:solidFill>
+              </a:rPr>
+              <a:t>Appspot</a:t>
+            </a:r>
+            <a:endParaRPr lang="en-US" sz="1400" b="1" dirty="0">
+              <a:solidFill>
+                <a:schemeClr val="bg1">
+                  <a:lumMod val="65000"/>
+                </a:schemeClr>
+              </a:solidFill>
+            </a:endParaRPr>
+          </a:p>
+        </p:txBody>
+      </p:sp>
+      <p:sp>
+        <p:nvSpPr>
+          <p:cNvPr id="81" name="Cloud 80"/>
+          <p:cNvSpPr/>
+          <p:nvPr/>
+        </p:nvSpPr>
+        <p:spPr>
+          <a:xfrm>
+            <a:off x="5476710" y="1432719"/>
+            <a:ext cx="1609890" cy="462732"/>
+          </a:xfrm>
+          <a:prstGeom prst="cloud">
+            <a:avLst/>
+          </a:prstGeom>
+          <a:solidFill>
+            <a:schemeClr val="bg1"/>
+          </a:solidFill>
+          <a:ln>
+            <a:solidFill>
+              <a:schemeClr val="bg1">
+                <a:lumMod val="85000"/>
+              </a:schemeClr>
+            </a:solidFill>
+          </a:ln>
+        </p:spPr>
+        <p:style>
+          <a:lnRef idx="2">
+            <a:schemeClr val="accent1">
+              <a:shade val="50000"/>
+            </a:schemeClr>
+          </a:lnRef>
+          <a:fillRef idx="1">
+            <a:schemeClr val="accent1"/>
+          </a:fillRef>
+          <a:effectRef idx="0">
+            <a:schemeClr val="accent1"/>
+          </a:effectRef>
+          <a:fontRef idx="minor">
+            <a:schemeClr val="lt1"/>
+          </a:fontRef>
+        </p:style>
+        <p:txBody>
+          <a:bodyPr lIns="0" rIns="0" bIns="0" rtlCol="0" anchor="ctr"/>
+          <a:lstStyle/>
+          <a:p>
+            <a:pPr algn="ctr"/>
+            <a:r>
+              <a:rPr lang="en-US" sz="1400" b="1" dirty="0" err="1" smtClean="0">
+                <a:solidFill>
+                  <a:schemeClr val="bg1">
+                    <a:lumMod val="65000"/>
+                  </a:schemeClr>
+                </a:solidFill>
+              </a:rPr>
+              <a:t>GoogleCode</a:t>
+            </a:r>
+            <a:endParaRPr lang="en-US" sz="1400" b="1" dirty="0">
+              <a:solidFill>
+                <a:schemeClr val="bg1">
+                  <a:lumMod val="65000"/>
+                </a:schemeClr>
+              </a:solidFill>
+            </a:endParaRPr>
+          </a:p>
+        </p:txBody>
+      </p:sp>
+      <p:sp>
+        <p:nvSpPr>
+          <p:cNvPr id="82" name="Cloud 81"/>
+          <p:cNvSpPr/>
+          <p:nvPr/>
+        </p:nvSpPr>
+        <p:spPr>
+          <a:xfrm>
+            <a:off x="2895600" y="1432719"/>
+            <a:ext cx="1609890" cy="462732"/>
+          </a:xfrm>
+          <a:prstGeom prst="cloud">
+            <a:avLst/>
+          </a:prstGeom>
+          <a:solidFill>
+            <a:schemeClr val="bg1"/>
+          </a:solidFill>
+          <a:ln>
+            <a:solidFill>
+              <a:schemeClr val="bg1">
+                <a:lumMod val="85000"/>
+              </a:schemeClr>
+            </a:solidFill>
+          </a:ln>
+        </p:spPr>
+        <p:style>
+          <a:lnRef idx="2">
+            <a:schemeClr val="accent1">
+              <a:shade val="50000"/>
+            </a:schemeClr>
+          </a:lnRef>
+          <a:fillRef idx="1">
+            <a:schemeClr val="accent1"/>
+          </a:fillRef>
+          <a:effectRef idx="0">
+            <a:schemeClr val="accent1"/>
+          </a:effectRef>
+          <a:fontRef idx="minor">
+            <a:schemeClr val="lt1"/>
+          </a:fontRef>
+        </p:style>
+        <p:txBody>
+          <a:bodyPr lIns="0" rIns="0" bIns="0" rtlCol="0" anchor="ctr"/>
+          <a:lstStyle/>
+          <a:p>
+            <a:pPr algn="ctr"/>
+            <a:r>
+              <a:rPr lang="en-US" sz="1400" b="1" dirty="0" err="1" smtClean="0">
+                <a:solidFill>
+                  <a:schemeClr val="bg1">
+                    <a:lumMod val="65000"/>
+                  </a:schemeClr>
+                </a:solidFill>
+              </a:rPr>
+              <a:t>GoogleCode</a:t>
+            </a:r>
+            <a:endParaRPr lang="en-US" sz="1400" b="1" dirty="0">
+              <a:solidFill>
+                <a:schemeClr val="bg1">
+                  <a:lumMod val="65000"/>
+                </a:schemeClr>
+              </a:solidFill>
+            </a:endParaRPr>
+          </a:p>
+        </p:txBody>
+      </p:sp>
+      <p:sp>
+        <p:nvSpPr>
+          <p:cNvPr id="83" name="Rounded Rectangle 82"/>
+          <p:cNvSpPr/>
+          <p:nvPr/>
+        </p:nvSpPr>
+        <p:spPr>
+          <a:xfrm>
+            <a:off x="3962400" y="3947319"/>
             <a:ext cx="5029200" cy="1737518"/>
           </a:xfrm>
           <a:prstGeom prst="roundRect">
@@ -3559,28 +3995,27 @@
       </p:sp>
       <p:sp>
         <p:nvSpPr>
-          <p:cNvPr id="58" name="Can 57"/>
+          <p:cNvPr id="84" name="Can 83"/>
           <p:cNvSpPr/>
           <p:nvPr/>
         </p:nvSpPr>
         <p:spPr>
           <a:xfrm>
-            <a:off x="2491581" y="826096"/>
-            <a:ext cx="1066800" cy="762000"/>
+            <a:off x="3200400" y="826096"/>
+            <a:ext cx="1184858" cy="762000"/>
           </a:xfrm>
           <a:prstGeom prst="can">
             <a:avLst/>
           </a:prstGeom>
           <a:solidFill>
-            <a:schemeClr val="bg1">
-              <a:lumMod val="65000"/>
+            <a:schemeClr val="accent2">
+              <a:lumMod val="60000"/>
+              <a:lumOff val="40000"/>
             </a:schemeClr>
           </a:solidFill>
           <a:ln>
             <a:solidFill>
-              <a:schemeClr val="bg1">
-                <a:lumMod val="65000"/>
-              </a:schemeClr>
+              <a:srgbClr val="D28280"/>
             </a:solidFill>
           </a:ln>
         </p:spPr>
@@ -3606,44 +4041,43 @@
           <a:p>
             <a:pPr algn="ctr"/>
             <a:r>
-              <a:rPr lang="en-US" sz="1600" b="1" dirty="0" smtClean="0"/>
-              <a:t>Review</a:t>
+              <a:rPr lang="en-US" sz="1600" b="1" dirty="0"/>
+              <a:t>Contributor</a:t>
             </a:r>
           </a:p>
           <a:p>
             <a:pPr algn="ctr"/>
             <a:r>
-              <a:rPr lang="en-US" sz="1600" dirty="0" smtClean="0"/>
+              <a:rPr lang="en-US" sz="1600" b="1" dirty="0"/>
               <a:t>Repo</a:t>
             </a:r>
-            <a:endParaRPr lang="en-US" sz="1600" dirty="0"/>
-          </a:p>
-        </p:txBody>
-      </p:sp>
-      <p:sp>
-        <p:nvSpPr>
-          <p:cNvPr id="59" name="Can 58"/>
+            <a:endParaRPr lang="en-US" sz="1600" b="1" dirty="0"/>
+          </a:p>
+        </p:txBody>
+      </p:sp>
+      <p:sp>
+        <p:nvSpPr>
+          <p:cNvPr id="85" name="Can 84"/>
           <p:cNvSpPr/>
           <p:nvPr/>
         </p:nvSpPr>
         <p:spPr>
           <a:xfrm>
-            <a:off x="4929981" y="826096"/>
-            <a:ext cx="1066800" cy="762000"/>
+            <a:off x="5853514" y="826096"/>
+            <a:ext cx="1107933" cy="762000"/>
           </a:xfrm>
           <a:prstGeom prst="can">
             <a:avLst/>
           </a:prstGeom>
           <a:solidFill>
-            <a:schemeClr val="bg1">
-              <a:lumMod val="65000"/>
+            <a:schemeClr val="accent2">
+              <a:lumMod val="60000"/>
+              <a:lumOff val="40000"/>
             </a:schemeClr>
           </a:solidFill>
           <a:ln>
             <a:solidFill>
-              <a:schemeClr val="bg1">
-                <a:lumMod val="65000"/>
-              </a:schemeClr>
+              <a:srgbClr val="D28280"/>
             </a:solidFill>
           </a:ln>
         </p:spPr>
@@ -3670,8 +4104,9 @@
             <a:pPr algn="ctr"/>
             <a:r>
               <a:rPr lang="en-US" sz="1600" b="1" dirty="0" smtClean="0"/>
-              <a:t>Release</a:t>
-            </a:r>
+              <a:t>Committer</a:t>
+            </a:r>
+            <a:endParaRPr lang="en-US" sz="1600" b="1" dirty="0" smtClean="0"/>
           </a:p>
           <a:p>
             <a:pPr algn="ctr"/>
@@ -3684,7 +4119,7 @@
       </p:sp>
       <p:pic>
         <p:nvPicPr>
-          <p:cNvPr id="2050" name="Picture 2" descr="http://screenshots.en.sftcdn.net/en/scrn/70000/70210/google-app-engine-1.jpg"/>
+          <p:cNvPr id="86" name="Picture 2" descr="http://screenshots.en.sftcdn.net/en/scrn/70000/70210/google-app-engine-1.jpg"/>
           <p:cNvPicPr>
             <a:picLocks noChangeAspect="1" noChangeArrowheads="1"/>
           </p:cNvPicPr>
@@ -3702,7 +4137,13 @@
                 </a:srgbClr>
               </a:clrTo>
             </a:clrChange>
-            <a:grayscl/>
+            <a:duotone>
+              <a:schemeClr val="accent2">
+                <a:shade val="45000"/>
+                <a:satMod val="135000"/>
+              </a:schemeClr>
+              <a:prstClr val="white"/>
+            </a:duotone>
           </a:blip>
           <a:srcRect/>
           <a:stretch>
@@ -3711,7 +4152,7 @@
         </p:blipFill>
         <p:spPr bwMode="auto">
           <a:xfrm>
-            <a:off x="7349331" y="597496"/>
+            <a:off x="8058150" y="597496"/>
             <a:ext cx="1085850" cy="1085850"/>
           </a:xfrm>
           <a:prstGeom prst="rect">
@@ -3722,13 +4163,13 @@
       </p:pic>
       <p:grpSp>
         <p:nvGrpSpPr>
-          <p:cNvPr id="65" name="Group 64"/>
+          <p:cNvPr id="87" name="Group 86"/>
           <p:cNvGrpSpPr/>
           <p:nvPr/>
         </p:nvGrpSpPr>
         <p:grpSpPr>
           <a:xfrm>
-            <a:off x="434181" y="902296"/>
+            <a:off x="304800" y="902296"/>
             <a:ext cx="304800" cy="533400"/>
             <a:chOff x="2339181" y="3718719"/>
             <a:chExt cx="304800" cy="533400"/>
@@ -3742,7 +4183,7 @@
         </p:grpSpPr>
         <p:sp>
           <p:nvSpPr>
-            <p:cNvPr id="63" name="Flowchart: Connector 62"/>
+            <p:cNvPr id="88" name="Flowchart: Connector 87"/>
             <p:cNvSpPr/>
             <p:nvPr/>
           </p:nvSpPr>
@@ -3788,7 +4229,7 @@
         </p:sp>
         <p:sp>
           <p:nvSpPr>
-            <p:cNvPr id="64" name="Flowchart: Delay 63"/>
+            <p:cNvPr id="89" name="Flowchart: Delay 88"/>
             <p:cNvSpPr/>
             <p:nvPr/>
           </p:nvSpPr>
@@ -3835,13 +4276,13 @@
       </p:grpSp>
       <p:grpSp>
         <p:nvGrpSpPr>
-          <p:cNvPr id="68" name="Group 67"/>
+          <p:cNvPr id="90" name="Group 89"/>
           <p:cNvGrpSpPr/>
           <p:nvPr/>
         </p:nvGrpSpPr>
         <p:grpSpPr>
           <a:xfrm>
-            <a:off x="2415381" y="2578696"/>
+            <a:off x="3200400" y="2847777"/>
             <a:ext cx="304800" cy="533400"/>
             <a:chOff x="2339181" y="3718719"/>
             <a:chExt cx="304800" cy="533400"/>
@@ -3849,7 +4290,7 @@
         </p:grpSpPr>
         <p:sp>
           <p:nvSpPr>
-            <p:cNvPr id="69" name="Flowchart: Connector 68"/>
+            <p:cNvPr id="91" name="Flowchart: Connector 90"/>
             <p:cNvSpPr/>
             <p:nvPr/>
           </p:nvSpPr>
@@ -3889,7 +4330,7 @@
         </p:sp>
         <p:sp>
           <p:nvSpPr>
-            <p:cNvPr id="70" name="Flowchart: Delay 69"/>
+            <p:cNvPr id="93" name="Flowchart: Delay 92"/>
             <p:cNvSpPr/>
             <p:nvPr/>
           </p:nvSpPr>
@@ -3930,13 +4371,13 @@
       </p:grpSp>
       <p:sp>
         <p:nvSpPr>
-          <p:cNvPr id="71" name="TextBox 70"/>
+          <p:cNvPr id="94" name="TextBox 93"/>
           <p:cNvSpPr txBox="1"/>
           <p:nvPr/>
         </p:nvSpPr>
         <p:spPr>
           <a:xfrm>
-            <a:off x="2110581" y="3185319"/>
+            <a:off x="2895600" y="3454400"/>
             <a:ext cx="914400" cy="340519"/>
           </a:xfrm>
           <a:prstGeom prst="roundRect">
@@ -3973,13 +4414,13 @@
       </p:sp>
       <p:grpSp>
         <p:nvGrpSpPr>
-          <p:cNvPr id="72" name="Group 71"/>
+          <p:cNvPr id="95" name="Group 94"/>
           <p:cNvGrpSpPr/>
           <p:nvPr/>
         </p:nvGrpSpPr>
         <p:grpSpPr>
           <a:xfrm>
-            <a:off x="4167981" y="2578696"/>
+            <a:off x="4953000" y="2847777"/>
             <a:ext cx="304800" cy="533400"/>
             <a:chOff x="2339181" y="3718719"/>
             <a:chExt cx="304800" cy="533400"/>
@@ -3987,7 +4428,7 @@
         </p:grpSpPr>
         <p:sp>
           <p:nvSpPr>
-            <p:cNvPr id="73" name="Flowchart: Connector 72"/>
+            <p:cNvPr id="96" name="Flowchart: Connector 95"/>
             <p:cNvSpPr/>
             <p:nvPr/>
           </p:nvSpPr>
@@ -4027,7 +4468,7 @@
         </p:sp>
         <p:sp>
           <p:nvSpPr>
-            <p:cNvPr id="74" name="Flowchart: Delay 73"/>
+            <p:cNvPr id="100" name="Flowchart: Delay 99"/>
             <p:cNvSpPr/>
             <p:nvPr/>
           </p:nvSpPr>
@@ -4068,13 +4509,13 @@
       </p:grpSp>
       <p:sp>
         <p:nvSpPr>
-          <p:cNvPr id="75" name="TextBox 74"/>
+          <p:cNvPr id="101" name="TextBox 100"/>
           <p:cNvSpPr txBox="1"/>
           <p:nvPr/>
         </p:nvSpPr>
         <p:spPr>
           <a:xfrm>
-            <a:off x="3863181" y="3185319"/>
+            <a:off x="4648200" y="3454400"/>
             <a:ext cx="1066800" cy="340519"/>
           </a:xfrm>
           <a:prstGeom prst="roundRect">
@@ -4104,13 +4545,13 @@
       </p:sp>
       <p:grpSp>
         <p:nvGrpSpPr>
-          <p:cNvPr id="76" name="Group 75"/>
+          <p:cNvPr id="104" name="Group 103"/>
           <p:cNvGrpSpPr/>
           <p:nvPr/>
         </p:nvGrpSpPr>
         <p:grpSpPr>
           <a:xfrm>
-            <a:off x="6682581" y="2578696"/>
+            <a:off x="7467600" y="2847777"/>
             <a:ext cx="304800" cy="533400"/>
             <a:chOff x="2339181" y="3718719"/>
             <a:chExt cx="304800" cy="533400"/>
@@ -4118,7 +4559,7 @@
         </p:grpSpPr>
         <p:sp>
           <p:nvSpPr>
-            <p:cNvPr id="77" name="Flowchart: Connector 76"/>
+            <p:cNvPr id="105" name="Flowchart: Connector 104"/>
             <p:cNvSpPr/>
             <p:nvPr/>
           </p:nvSpPr>
@@ -4158,7 +4599,7 @@
         </p:sp>
         <p:sp>
           <p:nvSpPr>
-            <p:cNvPr id="78" name="Flowchart: Delay 77"/>
+            <p:cNvPr id="106" name="Flowchart: Delay 105"/>
             <p:cNvSpPr/>
             <p:nvPr/>
           </p:nvSpPr>
@@ -4199,13 +4640,13 @@
       </p:grpSp>
       <p:sp>
         <p:nvSpPr>
-          <p:cNvPr id="79" name="TextBox 78"/>
+          <p:cNvPr id="108" name="TextBox 107"/>
           <p:cNvSpPr txBox="1"/>
           <p:nvPr/>
         </p:nvSpPr>
         <p:spPr>
           <a:xfrm>
-            <a:off x="6576237" y="3185319"/>
+            <a:off x="7361256" y="3454400"/>
             <a:ext cx="533400" cy="340519"/>
           </a:xfrm>
           <a:prstGeom prst="roundRect">
@@ -4237,13 +4678,13 @@
       </p:sp>
       <p:sp>
         <p:nvSpPr>
-          <p:cNvPr id="92" name="TextBox 91"/>
+          <p:cNvPr id="109" name="TextBox 108"/>
           <p:cNvSpPr txBox="1"/>
           <p:nvPr/>
         </p:nvSpPr>
         <p:spPr>
           <a:xfrm>
-            <a:off x="205581" y="1552377"/>
+            <a:off x="76200" y="1552377"/>
             <a:ext cx="533400" cy="340519"/>
           </a:xfrm>
           <a:prstGeom prst="roundRect">
@@ -4272,14 +4713,14 @@
       </p:sp>
       <p:sp>
         <p:nvSpPr>
-          <p:cNvPr id="97" name="TextBox 96"/>
+          <p:cNvPr id="110" name="TextBox 109"/>
           <p:cNvSpPr txBox="1"/>
           <p:nvPr/>
         </p:nvSpPr>
         <p:spPr>
           <a:xfrm>
-            <a:off x="738981" y="137319"/>
-            <a:ext cx="762000" cy="307777"/>
+            <a:off x="1523999" y="-15081"/>
+            <a:ext cx="1533097" cy="307777"/>
           </a:xfrm>
           <a:prstGeom prst="rect">
             <a:avLst/>
@@ -4298,7 +4739,15 @@
                   <a:srgbClr val="00B050"/>
                 </a:solidFill>
               </a:rPr>
-              <a:t>1. pull</a:t>
+              <a:t>1. </a:t>
+            </a:r>
+            <a:r>
+              <a:rPr lang="en-US" sz="1400" b="1" dirty="0" smtClean="0">
+                <a:solidFill>
+                  <a:srgbClr val="00B050"/>
+                </a:solidFill>
+              </a:rPr>
+              <a:t>pull</a:t>
             </a:r>
             <a:endParaRPr lang="en-US" sz="1400" b="1" dirty="0">
               <a:solidFill>
@@ -4310,13 +4759,13 @@
       </p:sp>
       <p:sp>
         <p:nvSpPr>
-          <p:cNvPr id="98" name="Arc 97"/>
+          <p:cNvPr id="112" name="Arc 111"/>
           <p:cNvSpPr/>
           <p:nvPr/>
         </p:nvSpPr>
         <p:spPr>
           <a:xfrm>
-            <a:off x="662781" y="978496"/>
+            <a:off x="1447800" y="978496"/>
             <a:ext cx="381000" cy="304800"/>
           </a:xfrm>
           <a:prstGeom prst="arc">
@@ -4358,13 +4807,13 @@
       </p:sp>
       <p:sp>
         <p:nvSpPr>
-          <p:cNvPr id="99" name="TextBox 98"/>
+          <p:cNvPr id="114" name="TextBox 113"/>
           <p:cNvSpPr txBox="1"/>
           <p:nvPr/>
         </p:nvSpPr>
         <p:spPr>
           <a:xfrm>
-            <a:off x="1119981" y="749896"/>
+            <a:off x="1905000" y="749896"/>
             <a:ext cx="990600" cy="646331"/>
           </a:xfrm>
           <a:prstGeom prst="rect">
@@ -4421,13 +4870,13 @@
       </p:sp>
       <p:sp>
         <p:nvSpPr>
-          <p:cNvPr id="102" name="TextBox 101"/>
+          <p:cNvPr id="127" name="TextBox 126"/>
           <p:cNvSpPr txBox="1"/>
           <p:nvPr/>
         </p:nvSpPr>
         <p:spPr>
           <a:xfrm>
-            <a:off x="1119981" y="2154238"/>
+            <a:off x="1905000" y="2619104"/>
             <a:ext cx="685800" cy="215444"/>
           </a:xfrm>
           <a:prstGeom prst="rect">
@@ -4459,13 +4908,13 @@
       </p:sp>
       <p:cxnSp>
         <p:nvCxnSpPr>
-          <p:cNvPr id="103" name="Straight Arrow Connector 102"/>
+          <p:cNvPr id="128" name="Straight Arrow Connector 127"/>
           <p:cNvCxnSpPr/>
           <p:nvPr/>
         </p:nvCxnSpPr>
         <p:spPr>
           <a:xfrm flipV="1">
-            <a:off x="2567781" y="1773238"/>
+            <a:off x="3352800" y="2042319"/>
             <a:ext cx="228600" cy="685800"/>
           </a:xfrm>
           <a:prstGeom prst="straightConnector1">
@@ -4497,13 +4946,13 @@
       </p:cxnSp>
       <p:sp>
         <p:nvSpPr>
-          <p:cNvPr id="107" name="TextBox 106"/>
+          <p:cNvPr id="129" name="TextBox 128"/>
           <p:cNvSpPr txBox="1"/>
           <p:nvPr/>
         </p:nvSpPr>
         <p:spPr>
           <a:xfrm rot="17318509">
-            <a:off x="2087118" y="1989319"/>
+            <a:off x="2872137" y="2258400"/>
             <a:ext cx="843775" cy="215444"/>
           </a:xfrm>
           <a:prstGeom prst="rect">
@@ -4539,13 +4988,13 @@
       </p:sp>
       <p:sp>
         <p:nvSpPr>
-          <p:cNvPr id="111" name="Arc 110"/>
+          <p:cNvPr id="130" name="Arc 129"/>
           <p:cNvSpPr/>
           <p:nvPr/>
         </p:nvSpPr>
         <p:spPr>
           <a:xfrm>
-            <a:off x="738981" y="216496"/>
+            <a:off x="1524000" y="216496"/>
             <a:ext cx="4419600" cy="1219200"/>
           </a:xfrm>
           <a:prstGeom prst="arc">
@@ -4587,14 +5036,14 @@
       </p:sp>
       <p:sp>
         <p:nvSpPr>
-          <p:cNvPr id="113" name="Arc 112"/>
+          <p:cNvPr id="131" name="Arc 130"/>
           <p:cNvSpPr/>
           <p:nvPr/>
         </p:nvSpPr>
         <p:spPr>
           <a:xfrm flipV="1">
-            <a:off x="815181" y="1359496"/>
-            <a:ext cx="1600200" cy="718542"/>
+            <a:off x="1563511" y="1529307"/>
+            <a:ext cx="1600200" cy="1025723"/>
           </a:xfrm>
           <a:prstGeom prst="arc">
             <a:avLst>
@@ -4635,13 +5084,13 @@
       </p:sp>
       <p:sp>
         <p:nvSpPr>
-          <p:cNvPr id="115" name="Arc 114"/>
+          <p:cNvPr id="134" name="Arc 133"/>
           <p:cNvSpPr/>
           <p:nvPr/>
         </p:nvSpPr>
         <p:spPr>
           <a:xfrm rot="2715976" flipV="1">
-            <a:off x="2998146" y="1853413"/>
+            <a:off x="3783165" y="2018071"/>
             <a:ext cx="1356586" cy="381000"/>
           </a:xfrm>
           <a:prstGeom prst="arc">
@@ -4683,13 +5132,13 @@
       </p:sp>
       <p:sp>
         <p:nvSpPr>
-          <p:cNvPr id="116" name="TextBox 115"/>
+          <p:cNvPr id="135" name="TextBox 134"/>
           <p:cNvSpPr txBox="1"/>
           <p:nvPr/>
         </p:nvSpPr>
         <p:spPr>
           <a:xfrm rot="2360287">
-            <a:off x="3177381" y="2273896"/>
+            <a:off x="3962400" y="2542977"/>
             <a:ext cx="685800" cy="215444"/>
           </a:xfrm>
           <a:prstGeom prst="rect">
@@ -4721,13 +5170,13 @@
       </p:sp>
       <p:sp>
         <p:nvSpPr>
-          <p:cNvPr id="117" name="Arc 116"/>
+          <p:cNvPr id="136" name="Arc 135"/>
           <p:cNvSpPr/>
           <p:nvPr/>
         </p:nvSpPr>
         <p:spPr>
           <a:xfrm rot="16709798">
-            <a:off x="4156356" y="2332422"/>
+            <a:off x="4941375" y="2601503"/>
             <a:ext cx="381000" cy="304800"/>
           </a:xfrm>
           <a:prstGeom prst="arc">
@@ -4773,13 +5222,13 @@
       </p:sp>
       <p:sp>
         <p:nvSpPr>
-          <p:cNvPr id="118" name="TextBox 117"/>
+          <p:cNvPr id="137" name="TextBox 136"/>
           <p:cNvSpPr txBox="1"/>
           <p:nvPr/>
         </p:nvSpPr>
         <p:spPr>
           <a:xfrm>
-            <a:off x="4091781" y="1816696"/>
+            <a:off x="4876800" y="2085777"/>
             <a:ext cx="838200" cy="430887"/>
           </a:xfrm>
           <a:prstGeom prst="rect">
@@ -4826,13 +5275,13 @@
       </p:sp>
       <p:sp>
         <p:nvSpPr>
-          <p:cNvPr id="119" name="Arc 118"/>
+          <p:cNvPr id="140" name="Arc 139"/>
           <p:cNvSpPr/>
           <p:nvPr/>
         </p:nvSpPr>
         <p:spPr>
           <a:xfrm rot="19019392" flipV="1">
-            <a:off x="4344224" y="1923378"/>
+            <a:off x="5129243" y="2088036"/>
             <a:ext cx="1356586" cy="381000"/>
           </a:xfrm>
           <a:prstGeom prst="arc">
@@ -4874,13 +5323,13 @@
       </p:sp>
       <p:sp>
         <p:nvSpPr>
-          <p:cNvPr id="120" name="TextBox 119"/>
+          <p:cNvPr id="141" name="TextBox 140"/>
           <p:cNvSpPr txBox="1"/>
           <p:nvPr/>
         </p:nvSpPr>
         <p:spPr>
           <a:xfrm rot="18996887">
-            <a:off x="5009792" y="2290249"/>
+            <a:off x="5695298" y="2559330"/>
             <a:ext cx="685800" cy="215444"/>
           </a:xfrm>
           <a:prstGeom prst="rect">
@@ -4912,13 +5361,13 @@
       </p:sp>
       <p:sp>
         <p:nvSpPr>
-          <p:cNvPr id="121" name="Arc 120"/>
+          <p:cNvPr id="142" name="Arc 141"/>
           <p:cNvSpPr/>
           <p:nvPr/>
         </p:nvSpPr>
         <p:spPr>
           <a:xfrm rot="2715976" flipV="1">
-            <a:off x="5515779" y="1794935"/>
+            <a:off x="6300798" y="1959593"/>
             <a:ext cx="1356586" cy="381000"/>
           </a:xfrm>
           <a:prstGeom prst="arc">
@@ -4960,13 +5409,13 @@
       </p:sp>
       <p:sp>
         <p:nvSpPr>
-          <p:cNvPr id="122" name="TextBox 121"/>
+          <p:cNvPr id="143" name="TextBox 142"/>
           <p:cNvSpPr txBox="1"/>
           <p:nvPr/>
         </p:nvSpPr>
         <p:spPr>
           <a:xfrm rot="1991192">
-            <a:off x="5695014" y="2215418"/>
+            <a:off x="6480033" y="2484499"/>
             <a:ext cx="685800" cy="215444"/>
           </a:xfrm>
           <a:prstGeom prst="rect">
@@ -4998,13 +5447,13 @@
       </p:sp>
       <p:sp>
         <p:nvSpPr>
-          <p:cNvPr id="123" name="Arc 122"/>
+          <p:cNvPr id="148" name="Arc 147"/>
           <p:cNvSpPr/>
           <p:nvPr/>
         </p:nvSpPr>
         <p:spPr>
           <a:xfrm rot="16709798">
-            <a:off x="6673989" y="2273944"/>
+            <a:off x="7459008" y="2543025"/>
             <a:ext cx="381000" cy="304800"/>
           </a:xfrm>
           <a:prstGeom prst="arc">
@@ -5046,13 +5495,13 @@
       </p:sp>
       <p:sp>
         <p:nvSpPr>
-          <p:cNvPr id="124" name="TextBox 123"/>
+          <p:cNvPr id="149" name="TextBox 148"/>
           <p:cNvSpPr txBox="1"/>
           <p:nvPr/>
         </p:nvSpPr>
         <p:spPr>
           <a:xfrm>
-            <a:off x="6609414" y="1969096"/>
+            <a:off x="7394433" y="2238177"/>
             <a:ext cx="835167" cy="215444"/>
           </a:xfrm>
           <a:prstGeom prst="rect">
@@ -5084,13 +5533,13 @@
       </p:sp>
       <p:sp>
         <p:nvSpPr>
-          <p:cNvPr id="125" name="Arc 124"/>
+          <p:cNvPr id="151" name="Arc 150"/>
           <p:cNvSpPr/>
           <p:nvPr/>
         </p:nvSpPr>
         <p:spPr>
           <a:xfrm rot="19019392" flipV="1">
-            <a:off x="6861857" y="1864900"/>
+            <a:off x="7646876" y="2029558"/>
             <a:ext cx="1356586" cy="381000"/>
           </a:xfrm>
           <a:prstGeom prst="arc">
@@ -5132,13 +5581,13 @@
       </p:sp>
       <p:sp>
         <p:nvSpPr>
-          <p:cNvPr id="126" name="TextBox 125"/>
+          <p:cNvPr id="152" name="TextBox 151"/>
           <p:cNvSpPr txBox="1"/>
           <p:nvPr/>
         </p:nvSpPr>
         <p:spPr>
           <a:xfrm rot="18996887">
-            <a:off x="7506125" y="2178227"/>
+            <a:off x="8291144" y="2447308"/>
             <a:ext cx="841701" cy="215444"/>
           </a:xfrm>
           <a:prstGeom prst="rect">
@@ -5170,13 +5619,13 @@
       </p:sp>
       <p:sp>
         <p:nvSpPr>
-          <p:cNvPr id="132" name="Freeform 131"/>
+          <p:cNvPr id="153" name="Freeform 152"/>
           <p:cNvSpPr/>
           <p:nvPr/>
         </p:nvSpPr>
         <p:spPr>
           <a:xfrm>
-            <a:off x="944545" y="423418"/>
+            <a:off x="1729564" y="423418"/>
             <a:ext cx="3959051" cy="1273620"/>
           </a:xfrm>
           <a:custGeom>
@@ -5304,13 +5753,13 @@
       </p:sp>
       <p:sp>
         <p:nvSpPr>
-          <p:cNvPr id="133" name="TextBox 132"/>
+          <p:cNvPr id="155" name="TextBox 154"/>
           <p:cNvSpPr txBox="1"/>
           <p:nvPr/>
         </p:nvSpPr>
         <p:spPr>
           <a:xfrm>
-            <a:off x="1119981" y="1697038"/>
+            <a:off x="1905000" y="1697038"/>
             <a:ext cx="838200" cy="215444"/>
           </a:xfrm>
           <a:prstGeom prst="rect">
@@ -5330,7 +5779,15 @@
                   <a:srgbClr val="00B050"/>
                 </a:solidFill>
               </a:rPr>
-              <a:t>3.1 update</a:t>
+              <a:t>3.1 </a:t>
+            </a:r>
+            <a:r>
+              <a:rPr lang="en-US" sz="1400" b="1" dirty="0" smtClean="0">
+                <a:solidFill>
+                  <a:srgbClr val="00B050"/>
+                </a:solidFill>
+              </a:rPr>
+              <a:t>pull</a:t>
             </a:r>
             <a:endParaRPr lang="en-US" sz="1400" b="1" dirty="0">
               <a:solidFill>
@@ -5342,13 +5799,13 @@
       </p:sp>
       <p:cxnSp>
         <p:nvCxnSpPr>
-          <p:cNvPr id="138" name="Straight Connector 137"/>
+          <p:cNvPr id="156" name="Straight Connector 155"/>
           <p:cNvCxnSpPr/>
           <p:nvPr/>
         </p:nvCxnSpPr>
         <p:spPr>
           <a:xfrm>
-            <a:off x="4548981" y="5275460"/>
+            <a:off x="5029200" y="5275460"/>
             <a:ext cx="3657600" cy="0"/>
           </a:xfrm>
           <a:prstGeom prst="line">
@@ -5380,13 +5837,13 @@
       </p:cxnSp>
       <p:sp>
         <p:nvSpPr>
-          <p:cNvPr id="139" name="Flowchart: Connector 138"/>
+          <p:cNvPr id="157" name="Flowchart: Connector 156"/>
           <p:cNvSpPr/>
           <p:nvPr/>
         </p:nvSpPr>
         <p:spPr>
           <a:xfrm>
-            <a:off x="5082382" y="5199260"/>
+            <a:off x="5562601" y="5199260"/>
             <a:ext cx="152400" cy="152400"/>
           </a:xfrm>
           <a:prstGeom prst="flowChartConnector">
@@ -5432,13 +5889,13 @@
       </p:sp>
       <p:sp>
         <p:nvSpPr>
-          <p:cNvPr id="144" name="Flowchart: Connector 143"/>
+          <p:cNvPr id="159" name="Flowchart: Connector 158"/>
           <p:cNvSpPr/>
           <p:nvPr/>
         </p:nvSpPr>
         <p:spPr>
           <a:xfrm>
-            <a:off x="7673181" y="5199260"/>
+            <a:off x="8153400" y="5199260"/>
             <a:ext cx="152400" cy="152400"/>
           </a:xfrm>
           <a:prstGeom prst="flowChartConnector">
@@ -5472,13 +5929,13 @@
       </p:sp>
       <p:sp>
         <p:nvSpPr>
-          <p:cNvPr id="145" name="Flowchart: Connector 144"/>
+          <p:cNvPr id="161" name="Flowchart: Connector 160"/>
           <p:cNvSpPr/>
           <p:nvPr/>
         </p:nvSpPr>
         <p:spPr>
           <a:xfrm>
-            <a:off x="6453981" y="5199260"/>
+            <a:off x="6934200" y="5199260"/>
             <a:ext cx="152400" cy="152400"/>
           </a:xfrm>
           <a:prstGeom prst="flowChartConnector">
@@ -5524,13 +5981,13 @@
       </p:sp>
       <p:sp>
         <p:nvSpPr>
-          <p:cNvPr id="146" name="Flowchart: Connector 145"/>
+          <p:cNvPr id="162" name="Flowchart: Connector 161"/>
           <p:cNvSpPr/>
           <p:nvPr/>
         </p:nvSpPr>
         <p:spPr>
           <a:xfrm>
-            <a:off x="6834981" y="4589660"/>
+            <a:off x="7315200" y="4589660"/>
             <a:ext cx="152400" cy="152400"/>
           </a:xfrm>
           <a:prstGeom prst="flowChartConnector">
@@ -5575,13 +6032,13 @@
       </p:sp>
       <p:sp>
         <p:nvSpPr>
-          <p:cNvPr id="147" name="Flowchart: Connector 146"/>
+          <p:cNvPr id="164" name="Flowchart: Connector 163"/>
           <p:cNvSpPr/>
           <p:nvPr/>
         </p:nvSpPr>
         <p:spPr>
           <a:xfrm>
-            <a:off x="5615782" y="4589660"/>
+            <a:off x="6096001" y="4589660"/>
             <a:ext cx="152400" cy="152400"/>
           </a:xfrm>
           <a:prstGeom prst="flowChartConnector">
@@ -5626,16 +6083,16 @@
       </p:sp>
       <p:cxnSp>
         <p:nvCxnSpPr>
-          <p:cNvPr id="150" name="Shape 149"/>
+          <p:cNvPr id="167" name="Shape 149"/>
           <p:cNvCxnSpPr>
-            <a:stCxn id="139" idx="0"/>
-            <a:endCxn id="147" idx="2"/>
+            <a:stCxn id="157" idx="0"/>
+            <a:endCxn id="164" idx="2"/>
           </p:cNvCxnSpPr>
           <p:nvPr/>
         </p:nvCxnSpPr>
         <p:spPr>
           <a:xfrm rot="5400000" flipH="1" flipV="1">
-            <a:off x="5120482" y="4703960"/>
+            <a:off x="5600701" y="4703960"/>
             <a:ext cx="533400" cy="457200"/>
           </a:xfrm>
           <a:prstGeom prst="curvedConnector2">
@@ -5666,16 +6123,16 @@
       </p:cxnSp>
       <p:cxnSp>
         <p:nvCxnSpPr>
-          <p:cNvPr id="154" name="Shape 153"/>
+          <p:cNvPr id="169" name="Shape 153"/>
           <p:cNvCxnSpPr>
-            <a:stCxn id="146" idx="6"/>
-            <a:endCxn id="144" idx="1"/>
+            <a:stCxn id="162" idx="6"/>
+            <a:endCxn id="159" idx="1"/>
           </p:cNvCxnSpPr>
           <p:nvPr/>
         </p:nvCxnSpPr>
         <p:spPr>
           <a:xfrm>
-            <a:off x="6987381" y="4665860"/>
+            <a:off x="7467600" y="4665860"/>
             <a:ext cx="708118" cy="555718"/>
           </a:xfrm>
           <a:prstGeom prst="curvedConnector2">
@@ -5706,16 +6163,16 @@
       </p:cxnSp>
       <p:cxnSp>
         <p:nvCxnSpPr>
-          <p:cNvPr id="158" name="Straight Arrow Connector 157"/>
+          <p:cNvPr id="171" name="Straight Arrow Connector 170"/>
           <p:cNvCxnSpPr>
-            <a:stCxn id="147" idx="6"/>
-            <a:endCxn id="146" idx="2"/>
+            <a:stCxn id="164" idx="6"/>
+            <a:endCxn id="162" idx="2"/>
           </p:cNvCxnSpPr>
           <p:nvPr/>
         </p:nvCxnSpPr>
         <p:spPr>
           <a:xfrm>
-            <a:off x="5768182" y="4665860"/>
+            <a:off x="6248401" y="4665860"/>
             <a:ext cx="1066799" cy="0"/>
           </a:xfrm>
           <a:prstGeom prst="straightConnector1">
@@ -5746,16 +6203,16 @@
       </p:cxnSp>
       <p:cxnSp>
         <p:nvCxnSpPr>
-          <p:cNvPr id="160" name="Curved Connector 159"/>
+          <p:cNvPr id="172" name="Curved Connector 171"/>
           <p:cNvCxnSpPr>
-            <a:stCxn id="145" idx="7"/>
-            <a:endCxn id="146" idx="4"/>
+            <a:stCxn id="161" idx="7"/>
+            <a:endCxn id="162" idx="4"/>
           </p:cNvCxnSpPr>
           <p:nvPr/>
         </p:nvCxnSpPr>
         <p:spPr>
           <a:xfrm rot="5400000" flipH="1" flipV="1">
-            <a:off x="6507863" y="4818260"/>
+            <a:off x="6988082" y="4818260"/>
             <a:ext cx="479518" cy="327118"/>
           </a:xfrm>
           <a:prstGeom prst="curvedConnector3">
@@ -5789,13 +6246,13 @@
       </p:cxnSp>
       <p:sp>
         <p:nvSpPr>
-          <p:cNvPr id="163" name="TextBox 162"/>
+          <p:cNvPr id="174" name="TextBox 173"/>
           <p:cNvSpPr txBox="1"/>
           <p:nvPr/>
         </p:nvSpPr>
         <p:spPr>
           <a:xfrm rot="18268321">
-            <a:off x="4662895" y="4608370"/>
+            <a:off x="5143114" y="4608370"/>
             <a:ext cx="762000" cy="307777"/>
           </a:xfrm>
           <a:prstGeom prst="rect">
@@ -5827,13 +6284,13 @@
       </p:sp>
       <p:sp>
         <p:nvSpPr>
-          <p:cNvPr id="165" name="TextBox 164"/>
+          <p:cNvPr id="175" name="TextBox 174"/>
           <p:cNvSpPr txBox="1"/>
           <p:nvPr/>
         </p:nvSpPr>
         <p:spPr>
           <a:xfrm rot="2419831">
-            <a:off x="7273198" y="4522254"/>
+            <a:off x="7753417" y="4522254"/>
             <a:ext cx="762000" cy="307777"/>
           </a:xfrm>
           <a:prstGeom prst="rect">
@@ -5865,13 +6322,13 @@
       </p:sp>
       <p:sp>
         <p:nvSpPr>
-          <p:cNvPr id="166" name="TextBox 165"/>
+          <p:cNvPr id="176" name="TextBox 175"/>
           <p:cNvSpPr txBox="1"/>
           <p:nvPr/>
         </p:nvSpPr>
         <p:spPr>
           <a:xfrm>
-            <a:off x="5768181" y="4056260"/>
+            <a:off x="6248400" y="4056260"/>
             <a:ext cx="1295400" cy="523220"/>
           </a:xfrm>
           <a:prstGeom prst="rect">
@@ -5915,13 +6372,13 @@
       </p:sp>
       <p:sp>
         <p:nvSpPr>
-          <p:cNvPr id="168" name="TextBox 167"/>
+          <p:cNvPr id="177" name="TextBox 176"/>
           <p:cNvSpPr txBox="1"/>
           <p:nvPr/>
         </p:nvSpPr>
         <p:spPr>
           <a:xfrm>
-            <a:off x="5920581" y="4815283"/>
+            <a:off x="6355855" y="4858742"/>
             <a:ext cx="762000" cy="307777"/>
           </a:xfrm>
           <a:prstGeom prst="rect">
@@ -5935,13 +6392,14 @@
           </a:bodyPr>
           <a:lstStyle/>
           <a:p>
+            <a:pPr algn="r"/>
             <a:r>
               <a:rPr lang="en-US" sz="1400" b="1" dirty="0" smtClean="0">
                 <a:solidFill>
                   <a:srgbClr val="00B050"/>
                 </a:solidFill>
               </a:rPr>
-              <a:t>update</a:t>
+              <a:t>pull</a:t>
             </a:r>
             <a:endParaRPr lang="en-US" sz="1400" b="1" dirty="0">
               <a:solidFill>
@@ -5953,13 +6411,13 @@
       </p:sp>
       <p:sp>
         <p:nvSpPr>
-          <p:cNvPr id="170" name="TextBox 169"/>
+          <p:cNvPr id="178" name="TextBox 177"/>
           <p:cNvSpPr txBox="1"/>
           <p:nvPr/>
         </p:nvSpPr>
         <p:spPr>
           <a:xfrm>
-            <a:off x="3786981" y="4970660"/>
+            <a:off x="4267200" y="4970660"/>
             <a:ext cx="762000" cy="523220"/>
           </a:xfrm>
           <a:prstGeom prst="rect">
@@ -6012,10 +6470,152 @@
           </a:p>
         </p:txBody>
       </p:sp>
+      <p:cxnSp>
+        <p:nvCxnSpPr>
+          <p:cNvPr id="179" name="Straight Arrow Connector 178"/>
+          <p:cNvCxnSpPr/>
+          <p:nvPr/>
+        </p:nvCxnSpPr>
+        <p:spPr>
+          <a:xfrm flipH="1">
+            <a:off x="4572000" y="1328598"/>
+            <a:ext cx="914400" cy="0"/>
+          </a:xfrm>
+          <a:prstGeom prst="straightConnector1">
+            <a:avLst/>
+          </a:prstGeom>
+          <a:ln w="28575">
+            <a:solidFill>
+              <a:schemeClr val="bg1">
+                <a:lumMod val="65000"/>
+              </a:schemeClr>
+            </a:solidFill>
+            <a:tailEnd type="triangle"/>
+          </a:ln>
+        </p:spPr>
+        <p:style>
+          <a:lnRef idx="1">
+            <a:schemeClr val="accent1"/>
+          </a:lnRef>
+          <a:fillRef idx="0">
+            <a:schemeClr val="accent1"/>
+          </a:fillRef>
+          <a:effectRef idx="0">
+            <a:schemeClr val="accent1"/>
+          </a:effectRef>
+          <a:fontRef idx="minor">
+            <a:schemeClr val="tx1"/>
+          </a:fontRef>
+        </p:style>
+      </p:cxnSp>
+      <p:sp>
+        <p:nvSpPr>
+          <p:cNvPr id="180" name="TextBox 179"/>
+          <p:cNvSpPr txBox="1"/>
+          <p:nvPr/>
+        </p:nvSpPr>
+        <p:spPr>
+          <a:xfrm>
+            <a:off x="4385258" y="975519"/>
+            <a:ext cx="1482143" cy="307777"/>
+          </a:xfrm>
+          <a:prstGeom prst="rect">
+            <a:avLst/>
+          </a:prstGeom>
+          <a:noFill/>
+        </p:spPr>
+        <p:txBody>
+          <a:bodyPr wrap="square" rtlCol="0">
+            <a:spAutoFit/>
+          </a:bodyPr>
+          <a:lstStyle/>
+          <a:p>
+            <a:r>
+              <a:rPr lang="en-US" sz="1400" b="1" dirty="0" smtClean="0">
+                <a:solidFill>
+                  <a:schemeClr val="bg1">
+                    <a:lumMod val="65000"/>
+                  </a:schemeClr>
+                </a:solidFill>
+              </a:rPr>
+              <a:t>server-side clone</a:t>
+            </a:r>
+            <a:endParaRPr lang="en-US" sz="1400" b="1" dirty="0">
+              <a:solidFill>
+                <a:schemeClr val="bg1">
+                  <a:lumMod val="65000"/>
+                </a:schemeClr>
+              </a:solidFill>
+            </a:endParaRPr>
+          </a:p>
+        </p:txBody>
+      </p:sp>
+      <p:sp>
+        <p:nvSpPr>
+          <p:cNvPr id="181" name="Can 180"/>
+          <p:cNvSpPr/>
+          <p:nvPr/>
+        </p:nvSpPr>
+        <p:spPr>
+          <a:xfrm>
+            <a:off x="805543" y="902296"/>
+            <a:ext cx="685800" cy="650081"/>
+          </a:xfrm>
+          <a:prstGeom prst="can">
+            <a:avLst/>
+          </a:prstGeom>
+          <a:solidFill>
+            <a:schemeClr val="accent2">
+              <a:lumMod val="60000"/>
+              <a:lumOff val="40000"/>
+            </a:schemeClr>
+          </a:solidFill>
+          <a:ln>
+            <a:solidFill>
+              <a:srgbClr val="D28280"/>
+            </a:solidFill>
+          </a:ln>
+        </p:spPr>
+        <p:style>
+          <a:lnRef idx="2">
+            <a:schemeClr val="accent1">
+              <a:shade val="50000"/>
+            </a:schemeClr>
+          </a:lnRef>
+          <a:fillRef idx="1">
+            <a:schemeClr val="accent1"/>
+          </a:fillRef>
+          <a:effectRef idx="0">
+            <a:schemeClr val="accent1"/>
+          </a:effectRef>
+          <a:fontRef idx="minor">
+            <a:schemeClr val="lt1"/>
+          </a:fontRef>
+        </p:style>
+        <p:txBody>
+          <a:bodyPr rtlCol="0" anchor="ctr"/>
+          <a:lstStyle/>
+          <a:p>
+            <a:pPr algn="ctr"/>
+            <a:r>
+              <a:rPr lang="en-US" sz="1600" b="1" dirty="0"/>
+              <a:t>Local</a:t>
+            </a:r>
+          </a:p>
+          <a:p>
+            <a:pPr algn="ctr"/>
+            <a:r>
+              <a:rPr lang="en-US" sz="1600" b="1" dirty="0"/>
+              <a:t>Repo</a:t>
+            </a:r>
+            <a:endParaRPr lang="en-US" sz="1600" b="1" dirty="0"/>
+          </a:p>
+        </p:txBody>
+      </p:sp>
     </p:spTree>
     <p:extLst>
       <p:ext uri="{BB962C8B-B14F-4D97-AF65-F5344CB8AC3E}">
-        <p14:creationId xmlns:p14="http://schemas.microsoft.com/office/powerpoint/2010/main" xmlns="" val="2312643091"/>
+        <p14:creationId xmlns:p14="http://schemas.microsoft.com/office/powerpoint/2010/main" val="2312643091"/>
       </p:ext>
     </p:extLst>
   </p:cSld>

</xml_diff>

<commit_message>
Continuing Issue 602 [add timestamp to Accounts] Update Issue 602 merge with default (revision 74477ebf847a)
</commit_message>
<xml_diff>
--- a/doc/diagrams/workflow.pptx
+++ b/doc/diagrams/workflow.pptx
@@ -10,7 +10,7 @@
   <p:sldIdLst>
     <p:sldId id="256" r:id="rId2"/>
   </p:sldIdLst>
-  <p:sldSz cx="8640763" cy="5761038"/>
+  <p:sldSz cx="9144000" cy="5761038"/>
   <p:notesSz cx="6858000" cy="9144000"/>
   <p:defaultTextStyle>
     <a:defPPr>
@@ -193,7 +193,7 @@
             <a:fld id="{DC50A2AC-D691-437C-A69B-81ECFE08AD4B}" type="datetimeFigureOut">
               <a:rPr lang="en-SG" smtClean="0"/>
               <a:pPr/>
-              <a:t>28/7/2012</a:t>
+              <a:t>9/2/2013</a:t>
             </a:fld>
             <a:endParaRPr lang="en-SG"/>
           </a:p>
@@ -211,8 +211,8 @@
         </p:nvSpPr>
         <p:spPr>
           <a:xfrm>
-            <a:off x="858838" y="685800"/>
-            <a:ext cx="5140325" cy="3429000"/>
+            <a:off x="708025" y="685800"/>
+            <a:ext cx="5441950" cy="3429000"/>
           </a:xfrm>
           <a:prstGeom prst="rect">
             <a:avLst/>
@@ -362,7 +362,7 @@
     </p:spTree>
     <p:extLst>
       <p:ext uri="{BB962C8B-B14F-4D97-AF65-F5344CB8AC3E}">
-        <p14:creationId xmlns:p14="http://schemas.microsoft.com/office/powerpoint/2010/main" xmlns="" val="2265103329"/>
+        <p14:creationId xmlns:p14="http://schemas.microsoft.com/office/powerpoint/2010/main" val="2265103329"/>
       </p:ext>
     </p:extLst>
   </p:cSld>
@@ -491,8 +491,8 @@
         </p:nvSpPr>
         <p:spPr>
           <a:xfrm>
-            <a:off x="858838" y="685800"/>
-            <a:ext cx="5140325" cy="3429000"/>
+            <a:off x="708025" y="685800"/>
+            <a:ext cx="5441950" cy="3429000"/>
           </a:xfrm>
         </p:spPr>
       </p:sp>
@@ -542,7 +542,7 @@
     </p:spTree>
     <p:extLst>
       <p:ext uri="{BB962C8B-B14F-4D97-AF65-F5344CB8AC3E}">
-        <p14:creationId xmlns:p14="http://schemas.microsoft.com/office/powerpoint/2010/main" xmlns="" val="1558229004"/>
+        <p14:creationId xmlns:p14="http://schemas.microsoft.com/office/powerpoint/2010/main" val="1558229004"/>
       </p:ext>
     </p:extLst>
   </p:cSld>
@@ -581,8 +581,8 @@
         </p:nvSpPr>
         <p:spPr>
           <a:xfrm>
-            <a:off x="648057" y="1789656"/>
-            <a:ext cx="7344649" cy="1234890"/>
+            <a:off x="685802" y="1789656"/>
+            <a:ext cx="7772400" cy="1234890"/>
           </a:xfrm>
         </p:spPr>
         <p:txBody>
@@ -609,8 +609,8 @@
         </p:nvSpPr>
         <p:spPr>
           <a:xfrm>
-            <a:off x="1296115" y="3264588"/>
-            <a:ext cx="6048534" cy="1472266"/>
+            <a:off x="1371601" y="3264588"/>
+            <a:ext cx="6400800" cy="1472266"/>
           </a:xfrm>
         </p:spPr>
         <p:txBody>
@@ -734,7 +734,7 @@
             <a:fld id="{1D8BD707-D9CF-40AE-B4C6-C98DA3205C09}" type="datetimeFigureOut">
               <a:rPr lang="en-US" smtClean="0"/>
               <a:pPr/>
-              <a:t>7/28/2012</a:t>
+              <a:t>2/9/2013</a:t>
             </a:fld>
             <a:endParaRPr lang="en-US"/>
           </a:p>
@@ -901,7 +901,7 @@
             <a:fld id="{1D8BD707-D9CF-40AE-B4C6-C98DA3205C09}" type="datetimeFigureOut">
               <a:rPr lang="en-US" smtClean="0"/>
               <a:pPr/>
-              <a:t>7/28/2012</a:t>
+              <a:t>2/9/2013</a:t>
             </a:fld>
             <a:endParaRPr lang="en-US"/>
           </a:p>
@@ -987,8 +987,8 @@
         </p:nvSpPr>
         <p:spPr>
           <a:xfrm>
-            <a:off x="6264553" y="230710"/>
-            <a:ext cx="1944172" cy="4915552"/>
+            <a:off x="6629401" y="230710"/>
+            <a:ext cx="2057400" cy="4915552"/>
           </a:xfrm>
         </p:spPr>
         <p:txBody>
@@ -1015,8 +1015,8 @@
         </p:nvSpPr>
         <p:spPr>
           <a:xfrm>
-            <a:off x="432039" y="230710"/>
-            <a:ext cx="5688502" cy="4915552"/>
+            <a:off x="457201" y="230710"/>
+            <a:ext cx="6019800" cy="4915552"/>
           </a:xfrm>
         </p:spPr>
         <p:txBody>
@@ -1078,7 +1078,7 @@
             <a:fld id="{1D8BD707-D9CF-40AE-B4C6-C98DA3205C09}" type="datetimeFigureOut">
               <a:rPr lang="en-US" smtClean="0"/>
               <a:pPr/>
-              <a:t>7/28/2012</a:t>
+              <a:t>2/9/2013</a:t>
             </a:fld>
             <a:endParaRPr lang="en-US"/>
           </a:p>
@@ -1245,7 +1245,7 @@
             <a:fld id="{1D8BD707-D9CF-40AE-B4C6-C98DA3205C09}" type="datetimeFigureOut">
               <a:rPr lang="en-US" smtClean="0"/>
               <a:pPr/>
-              <a:t>7/28/2012</a:t>
+              <a:t>2/9/2013</a:t>
             </a:fld>
             <a:endParaRPr lang="en-US"/>
           </a:p>
@@ -1331,8 +1331,8 @@
         </p:nvSpPr>
         <p:spPr>
           <a:xfrm>
-            <a:off x="682561" y="3702001"/>
-            <a:ext cx="7344649" cy="1144206"/>
+            <a:off x="722314" y="3702001"/>
+            <a:ext cx="7772400" cy="1144206"/>
           </a:xfrm>
         </p:spPr>
         <p:txBody>
@@ -1363,8 +1363,8 @@
         </p:nvSpPr>
         <p:spPr>
           <a:xfrm>
-            <a:off x="682561" y="2441774"/>
-            <a:ext cx="7344649" cy="1260227"/>
+            <a:off x="722314" y="2441774"/>
+            <a:ext cx="7772400" cy="1260227"/>
           </a:xfrm>
         </p:spPr>
         <p:txBody>
@@ -1488,7 +1488,7 @@
             <a:fld id="{1D8BD707-D9CF-40AE-B4C6-C98DA3205C09}" type="datetimeFigureOut">
               <a:rPr lang="en-US" smtClean="0"/>
               <a:pPr/>
-              <a:t>7/28/2012</a:t>
+              <a:t>2/9/2013</a:t>
             </a:fld>
             <a:endParaRPr lang="en-US"/>
           </a:p>
@@ -1597,8 +1597,8 @@
         </p:nvSpPr>
         <p:spPr>
           <a:xfrm>
-            <a:off x="432039" y="1344242"/>
-            <a:ext cx="3816337" cy="3802019"/>
+            <a:off x="457202" y="1344242"/>
+            <a:ext cx="4038600" cy="3802019"/>
           </a:xfrm>
         </p:spPr>
         <p:txBody>
@@ -1682,8 +1682,8 @@
         </p:nvSpPr>
         <p:spPr>
           <a:xfrm>
-            <a:off x="4392388" y="1344242"/>
-            <a:ext cx="3816337" cy="3802019"/>
+            <a:off x="4648201" y="1344242"/>
+            <a:ext cx="4038600" cy="3802019"/>
           </a:xfrm>
         </p:spPr>
         <p:txBody>
@@ -1773,7 +1773,7 @@
             <a:fld id="{1D8BD707-D9CF-40AE-B4C6-C98DA3205C09}" type="datetimeFigureOut">
               <a:rPr lang="en-US" smtClean="0"/>
               <a:pPr/>
-              <a:t>7/28/2012</a:t>
+              <a:t>2/9/2013</a:t>
             </a:fld>
             <a:endParaRPr lang="en-US"/>
           </a:p>
@@ -1886,8 +1886,8 @@
         </p:nvSpPr>
         <p:spPr>
           <a:xfrm>
-            <a:off x="432039" y="1289566"/>
-            <a:ext cx="3817838" cy="537430"/>
+            <a:off x="457201" y="1289566"/>
+            <a:ext cx="4040189" cy="537430"/>
           </a:xfrm>
         </p:spPr>
         <p:txBody>
@@ -1951,8 +1951,8 @@
         </p:nvSpPr>
         <p:spPr>
           <a:xfrm>
-            <a:off x="432039" y="1826997"/>
-            <a:ext cx="3817838" cy="3319265"/>
+            <a:off x="457201" y="1826997"/>
+            <a:ext cx="4040189" cy="3319265"/>
           </a:xfrm>
         </p:spPr>
         <p:txBody>
@@ -2036,8 +2036,8 @@
         </p:nvSpPr>
         <p:spPr>
           <a:xfrm>
-            <a:off x="4389389" y="1289566"/>
-            <a:ext cx="3819337" cy="537430"/>
+            <a:off x="4645028" y="1289566"/>
+            <a:ext cx="4041774" cy="537430"/>
           </a:xfrm>
         </p:spPr>
         <p:txBody>
@@ -2101,8 +2101,8 @@
         </p:nvSpPr>
         <p:spPr>
           <a:xfrm>
-            <a:off x="4389389" y="1826997"/>
-            <a:ext cx="3819337" cy="3319265"/>
+            <a:off x="4645028" y="1826997"/>
+            <a:ext cx="4041774" cy="3319265"/>
           </a:xfrm>
         </p:spPr>
         <p:txBody>
@@ -2192,7 +2192,7 @@
             <a:fld id="{1D8BD707-D9CF-40AE-B4C6-C98DA3205C09}" type="datetimeFigureOut">
               <a:rPr lang="en-US" smtClean="0"/>
               <a:pPr/>
-              <a:t>7/28/2012</a:t>
+              <a:t>2/9/2013</a:t>
             </a:fld>
             <a:endParaRPr lang="en-US"/>
           </a:p>
@@ -2307,7 +2307,7 @@
             <a:fld id="{1D8BD707-D9CF-40AE-B4C6-C98DA3205C09}" type="datetimeFigureOut">
               <a:rPr lang="en-US" smtClean="0"/>
               <a:pPr/>
-              <a:t>7/28/2012</a:t>
+              <a:t>2/9/2013</a:t>
             </a:fld>
             <a:endParaRPr lang="en-US"/>
           </a:p>
@@ -2399,7 +2399,7 @@
             <a:fld id="{1D8BD707-D9CF-40AE-B4C6-C98DA3205C09}" type="datetimeFigureOut">
               <a:rPr lang="en-US" smtClean="0"/>
               <a:pPr/>
-              <a:t>7/28/2012</a:t>
+              <a:t>2/9/2013</a:t>
             </a:fld>
             <a:endParaRPr lang="en-US"/>
           </a:p>
@@ -2485,8 +2485,8 @@
         </p:nvSpPr>
         <p:spPr>
           <a:xfrm>
-            <a:off x="432039" y="229375"/>
-            <a:ext cx="2842752" cy="976176"/>
+            <a:off x="457201" y="229375"/>
+            <a:ext cx="3008314" cy="976176"/>
           </a:xfrm>
         </p:spPr>
         <p:txBody>
@@ -2517,8 +2517,8 @@
         </p:nvSpPr>
         <p:spPr>
           <a:xfrm>
-            <a:off x="3378298" y="229375"/>
-            <a:ext cx="4830427" cy="4916886"/>
+            <a:off x="3575051" y="229375"/>
+            <a:ext cx="5111751" cy="4916886"/>
           </a:xfrm>
         </p:spPr>
         <p:txBody>
@@ -2602,8 +2602,8 @@
         </p:nvSpPr>
         <p:spPr>
           <a:xfrm>
-            <a:off x="432039" y="1205551"/>
-            <a:ext cx="2842752" cy="3940710"/>
+            <a:off x="457201" y="1205551"/>
+            <a:ext cx="3008314" cy="3940710"/>
           </a:xfrm>
         </p:spPr>
         <p:txBody>
@@ -2673,7 +2673,7 @@
             <a:fld id="{1D8BD707-D9CF-40AE-B4C6-C98DA3205C09}" type="datetimeFigureOut">
               <a:rPr lang="en-US" smtClean="0"/>
               <a:pPr/>
-              <a:t>7/28/2012</a:t>
+              <a:t>2/9/2013</a:t>
             </a:fld>
             <a:endParaRPr lang="en-US"/>
           </a:p>
@@ -2759,8 +2759,8 @@
         </p:nvSpPr>
         <p:spPr>
           <a:xfrm>
-            <a:off x="1693650" y="4032727"/>
-            <a:ext cx="5184458" cy="476086"/>
+            <a:off x="1792288" y="4032727"/>
+            <a:ext cx="5486400" cy="476086"/>
           </a:xfrm>
         </p:spPr>
         <p:txBody>
@@ -2791,8 +2791,8 @@
         </p:nvSpPr>
         <p:spPr>
           <a:xfrm>
-            <a:off x="1693650" y="514760"/>
-            <a:ext cx="5184458" cy="3456623"/>
+            <a:off x="1792288" y="514762"/>
+            <a:ext cx="5486400" cy="3456623"/>
           </a:xfrm>
         </p:spPr>
         <p:txBody>
@@ -2852,8 +2852,8 @@
         </p:nvSpPr>
         <p:spPr>
           <a:xfrm>
-            <a:off x="1693650" y="4508813"/>
-            <a:ext cx="5184458" cy="676121"/>
+            <a:off x="1792288" y="4508815"/>
+            <a:ext cx="5486400" cy="676121"/>
           </a:xfrm>
         </p:spPr>
         <p:txBody>
@@ -2923,7 +2923,7 @@
             <a:fld id="{1D8BD707-D9CF-40AE-B4C6-C98DA3205C09}" type="datetimeFigureOut">
               <a:rPr lang="en-US" smtClean="0"/>
               <a:pPr/>
-              <a:t>7/28/2012</a:t>
+              <a:t>2/9/2013</a:t>
             </a:fld>
             <a:endParaRPr lang="en-US"/>
           </a:p>
@@ -3014,8 +3014,8 @@
         </p:nvSpPr>
         <p:spPr>
           <a:xfrm>
-            <a:off x="432038" y="230709"/>
-            <a:ext cx="7776687" cy="960173"/>
+            <a:off x="457202" y="230709"/>
+            <a:ext cx="8229600" cy="960173"/>
           </a:xfrm>
           <a:prstGeom prst="rect">
             <a:avLst/>
@@ -3047,8 +3047,8 @@
         </p:nvSpPr>
         <p:spPr>
           <a:xfrm>
-            <a:off x="432038" y="1344242"/>
-            <a:ext cx="7776687" cy="3802019"/>
+            <a:off x="457202" y="1344242"/>
+            <a:ext cx="8229600" cy="3802019"/>
           </a:xfrm>
           <a:prstGeom prst="rect">
             <a:avLst/>
@@ -3109,8 +3109,8 @@
         </p:nvSpPr>
         <p:spPr>
           <a:xfrm>
-            <a:off x="432039" y="5339630"/>
-            <a:ext cx="2016178" cy="306722"/>
+            <a:off x="457201" y="5339630"/>
+            <a:ext cx="2133600" cy="306722"/>
           </a:xfrm>
           <a:prstGeom prst="rect">
             <a:avLst/>
@@ -3133,7 +3133,7 @@
             <a:fld id="{1D8BD707-D9CF-40AE-B4C6-C98DA3205C09}" type="datetimeFigureOut">
               <a:rPr lang="en-US" smtClean="0"/>
               <a:pPr/>
-              <a:t>7/28/2012</a:t>
+              <a:t>2/9/2013</a:t>
             </a:fld>
             <a:endParaRPr lang="en-US"/>
           </a:p>
@@ -3151,8 +3151,8 @@
         </p:nvSpPr>
         <p:spPr>
           <a:xfrm>
-            <a:off x="2952262" y="5339630"/>
-            <a:ext cx="2736242" cy="306722"/>
+            <a:off x="3124202" y="5339630"/>
+            <a:ext cx="2895600" cy="306722"/>
           </a:xfrm>
           <a:prstGeom prst="rect">
             <a:avLst/>
@@ -3188,8 +3188,8 @@
         </p:nvSpPr>
         <p:spPr>
           <a:xfrm>
-            <a:off x="6192548" y="5339630"/>
-            <a:ext cx="2016178" cy="306722"/>
+            <a:off x="6553201" y="5339630"/>
+            <a:ext cx="2133600" cy="306722"/>
           </a:xfrm>
           <a:prstGeom prst="rect">
             <a:avLst/>
@@ -3506,13 +3506,449 @@
       </p:grpSpPr>
       <p:sp>
         <p:nvSpPr>
-          <p:cNvPr id="173" name="Rounded Rectangle 172"/>
+          <p:cNvPr id="5" name="laptop"/>
+          <p:cNvSpPr>
+            <a:spLocks noEditPoints="1" noChangeArrowheads="1"/>
+          </p:cNvSpPr>
+          <p:nvPr/>
+        </p:nvSpPr>
+        <p:spPr bwMode="auto">
+          <a:xfrm>
+            <a:off x="457199" y="1053848"/>
+            <a:ext cx="1272365" cy="988472"/>
+          </a:xfrm>
+          <a:custGeom>
+            <a:avLst/>
+            <a:gdLst>
+              <a:gd name="T0" fmla="*/ 3362 w 21600"/>
+              <a:gd name="T1" fmla="*/ 0 h 21600"/>
+              <a:gd name="T2" fmla="*/ 3362 w 21600"/>
+              <a:gd name="T3" fmla="*/ 7173 h 21600"/>
+              <a:gd name="T4" fmla="*/ 18327 w 21600"/>
+              <a:gd name="T5" fmla="*/ 0 h 21600"/>
+              <a:gd name="T6" fmla="*/ 18327 w 21600"/>
+              <a:gd name="T7" fmla="*/ 7173 h 21600"/>
+              <a:gd name="T8" fmla="*/ 10800 w 21600"/>
+              <a:gd name="T9" fmla="*/ 0 h 21600"/>
+              <a:gd name="T10" fmla="*/ 10800 w 21600"/>
+              <a:gd name="T11" fmla="*/ 21600 h 21600"/>
+              <a:gd name="T12" fmla="*/ 0 w 21600"/>
+              <a:gd name="T13" fmla="*/ 21600 h 21600"/>
+              <a:gd name="T14" fmla="*/ 21600 w 21600"/>
+              <a:gd name="T15" fmla="*/ 21600 h 21600"/>
+              <a:gd name="T16" fmla="*/ 4445 w 21600"/>
+              <a:gd name="T17" fmla="*/ 1858 h 21600"/>
+              <a:gd name="T18" fmla="*/ 17311 w 21600"/>
+              <a:gd name="T19" fmla="*/ 12323 h 21600"/>
+            </a:gdLst>
+            <a:ahLst/>
+            <a:cxnLst>
+              <a:cxn ang="0">
+                <a:pos x="T0" y="T1"/>
+              </a:cxn>
+              <a:cxn ang="0">
+                <a:pos x="T2" y="T3"/>
+              </a:cxn>
+              <a:cxn ang="0">
+                <a:pos x="T4" y="T5"/>
+              </a:cxn>
+              <a:cxn ang="0">
+                <a:pos x="T6" y="T7"/>
+              </a:cxn>
+              <a:cxn ang="0">
+                <a:pos x="T8" y="T9"/>
+              </a:cxn>
+              <a:cxn ang="0">
+                <a:pos x="T10" y="T11"/>
+              </a:cxn>
+              <a:cxn ang="0">
+                <a:pos x="T12" y="T13"/>
+              </a:cxn>
+              <a:cxn ang="0">
+                <a:pos x="T14" y="T15"/>
+              </a:cxn>
+            </a:cxnLst>
+            <a:rect l="T16" t="T17" r="T18" b="T19"/>
+            <a:pathLst>
+              <a:path w="21600" h="21600" extrusionOk="0">
+                <a:moveTo>
+                  <a:pt x="3362" y="0"/>
+                </a:moveTo>
+                <a:lnTo>
+                  <a:pt x="18327" y="0"/>
+                </a:lnTo>
+                <a:lnTo>
+                  <a:pt x="18327" y="14347"/>
+                </a:lnTo>
+                <a:lnTo>
+                  <a:pt x="3362" y="14347"/>
+                </a:lnTo>
+                <a:lnTo>
+                  <a:pt x="3362" y="0"/>
+                </a:lnTo>
+                <a:close/>
+              </a:path>
+              <a:path w="21600" h="21600" extrusionOk="0">
+                <a:moveTo>
+                  <a:pt x="3340" y="15068"/>
+                </a:moveTo>
+                <a:lnTo>
+                  <a:pt x="0" y="19877"/>
+                </a:lnTo>
+                <a:lnTo>
+                  <a:pt x="21600" y="19877"/>
+                </a:lnTo>
+                <a:lnTo>
+                  <a:pt x="18327" y="15068"/>
+                </a:lnTo>
+                <a:lnTo>
+                  <a:pt x="3340" y="15068"/>
+                </a:lnTo>
+                <a:close/>
+              </a:path>
+              <a:path w="21600" h="21600" extrusionOk="0">
+                <a:moveTo>
+                  <a:pt x="0" y="19877"/>
+                </a:moveTo>
+                <a:lnTo>
+                  <a:pt x="0" y="21600"/>
+                </a:lnTo>
+                <a:lnTo>
+                  <a:pt x="21600" y="21600"/>
+                </a:lnTo>
+                <a:lnTo>
+                  <a:pt x="21600" y="19877"/>
+                </a:lnTo>
+                <a:lnTo>
+                  <a:pt x="0" y="19877"/>
+                </a:lnTo>
+                <a:close/>
+              </a:path>
+              <a:path w="21600" h="21600" extrusionOk="0">
+                <a:moveTo>
+                  <a:pt x="4186" y="1523"/>
+                </a:moveTo>
+                <a:lnTo>
+                  <a:pt x="17547" y="1523"/>
+                </a:lnTo>
+                <a:lnTo>
+                  <a:pt x="17547" y="12744"/>
+                </a:lnTo>
+                <a:lnTo>
+                  <a:pt x="4186" y="12744"/>
+                </a:lnTo>
+                <a:lnTo>
+                  <a:pt x="4186" y="1523"/>
+                </a:lnTo>
+                <a:close/>
+              </a:path>
+              <a:path w="21600" h="21600" extrusionOk="0">
+                <a:moveTo>
+                  <a:pt x="3318" y="15549"/>
+                </a:moveTo>
+                <a:lnTo>
+                  <a:pt x="2917" y="16110"/>
+                </a:lnTo>
+                <a:lnTo>
+                  <a:pt x="18727" y="16110"/>
+                </a:lnTo>
+                <a:lnTo>
+                  <a:pt x="18327" y="15549"/>
+                </a:lnTo>
+                <a:lnTo>
+                  <a:pt x="3318" y="15549"/>
+                </a:lnTo>
+                <a:close/>
+              </a:path>
+              <a:path w="21600" h="21600" extrusionOk="0">
+                <a:moveTo>
+                  <a:pt x="6213" y="18314"/>
+                </a:moveTo>
+                <a:lnTo>
+                  <a:pt x="5946" y="18875"/>
+                </a:lnTo>
+                <a:lnTo>
+                  <a:pt x="15766" y="18875"/>
+                </a:lnTo>
+                <a:lnTo>
+                  <a:pt x="15499" y="18314"/>
+                </a:lnTo>
+                <a:lnTo>
+                  <a:pt x="6213" y="18314"/>
+                </a:lnTo>
+                <a:close/>
+              </a:path>
+              <a:path w="21600" h="21600" extrusionOk="0">
+                <a:moveTo>
+                  <a:pt x="2828" y="16471"/>
+                </a:moveTo>
+                <a:lnTo>
+                  <a:pt x="2405" y="17072"/>
+                </a:lnTo>
+                <a:lnTo>
+                  <a:pt x="19284" y="17072"/>
+                </a:lnTo>
+                <a:lnTo>
+                  <a:pt x="18839" y="16471"/>
+                </a:lnTo>
+                <a:lnTo>
+                  <a:pt x="2828" y="16471"/>
+                </a:lnTo>
+                <a:close/>
+              </a:path>
+              <a:path w="21600" h="21600" extrusionOk="0">
+                <a:moveTo>
+                  <a:pt x="2316" y="17352"/>
+                </a:moveTo>
+                <a:lnTo>
+                  <a:pt x="1871" y="17953"/>
+                </a:lnTo>
+                <a:lnTo>
+                  <a:pt x="19863" y="17953"/>
+                </a:lnTo>
+                <a:lnTo>
+                  <a:pt x="19395" y="17352"/>
+                </a:lnTo>
+                <a:lnTo>
+                  <a:pt x="2316" y="17352"/>
+                </a:lnTo>
+                <a:close/>
+              </a:path>
+            </a:pathLst>
+          </a:custGeom>
+          <a:solidFill>
+            <a:schemeClr val="bg1"/>
+          </a:solidFill>
+          <a:ln w="38100">
+            <a:solidFill>
+              <a:schemeClr val="bg1">
+                <a:lumMod val="85000"/>
+              </a:schemeClr>
+            </a:solidFill>
+            <a:miter lim="800000"/>
+            <a:headEnd/>
+            <a:tailEnd/>
+          </a:ln>
+        </p:spPr>
+        <p:txBody>
+          <a:bodyPr vert="horz" wrap="square" lIns="91440" tIns="45720" rIns="91440" bIns="45720" numCol="1" anchor="t" anchorCtr="0" compatLnSpc="1">
+            <a:prstTxWarp prst="textNoShape">
+              <a:avLst/>
+            </a:prstTxWarp>
+          </a:bodyPr>
+          <a:lstStyle/>
+          <a:p>
+            <a:endParaRPr lang="en-US"/>
+          </a:p>
+        </p:txBody>
+      </p:sp>
+      <p:sp>
+        <p:nvSpPr>
+          <p:cNvPr id="80" name="Cloud 79"/>
           <p:cNvSpPr/>
           <p:nvPr/>
         </p:nvSpPr>
         <p:spPr>
           <a:xfrm>
-            <a:off x="3482181" y="3947319"/>
+            <a:off x="7941267" y="1350987"/>
+            <a:ext cx="1186265" cy="462732"/>
+          </a:xfrm>
+          <a:prstGeom prst="cloud">
+            <a:avLst/>
+          </a:prstGeom>
+          <a:solidFill>
+            <a:schemeClr val="bg1"/>
+          </a:solidFill>
+          <a:ln>
+            <a:solidFill>
+              <a:schemeClr val="bg1">
+                <a:lumMod val="85000"/>
+              </a:schemeClr>
+            </a:solidFill>
+          </a:ln>
+        </p:spPr>
+        <p:style>
+          <a:lnRef idx="2">
+            <a:schemeClr val="accent1">
+              <a:shade val="50000"/>
+            </a:schemeClr>
+          </a:lnRef>
+          <a:fillRef idx="1">
+            <a:schemeClr val="accent1"/>
+          </a:fillRef>
+          <a:effectRef idx="0">
+            <a:schemeClr val="accent1"/>
+          </a:effectRef>
+          <a:fontRef idx="minor">
+            <a:schemeClr val="lt1"/>
+          </a:fontRef>
+        </p:style>
+        <p:txBody>
+          <a:bodyPr lIns="0" rIns="0" bIns="0" rtlCol="0" anchor="ctr"/>
+          <a:lstStyle/>
+          <a:p>
+            <a:pPr algn="ctr"/>
+            <a:r>
+              <a:rPr lang="en-US" sz="1400" b="1" dirty="0" err="1">
+                <a:solidFill>
+                  <a:schemeClr val="bg1">
+                    <a:lumMod val="65000"/>
+                  </a:schemeClr>
+                </a:solidFill>
+              </a:rPr>
+              <a:t>Appspot</a:t>
+            </a:r>
+            <a:endParaRPr lang="en-US" sz="1400" b="1" dirty="0">
+              <a:solidFill>
+                <a:schemeClr val="bg1">
+                  <a:lumMod val="65000"/>
+                </a:schemeClr>
+              </a:solidFill>
+            </a:endParaRPr>
+          </a:p>
+        </p:txBody>
+      </p:sp>
+      <p:sp>
+        <p:nvSpPr>
+          <p:cNvPr id="81" name="Cloud 80"/>
+          <p:cNvSpPr/>
+          <p:nvPr/>
+        </p:nvSpPr>
+        <p:spPr>
+          <a:xfrm>
+            <a:off x="5476710" y="1432719"/>
+            <a:ext cx="1609890" cy="462732"/>
+          </a:xfrm>
+          <a:prstGeom prst="cloud">
+            <a:avLst/>
+          </a:prstGeom>
+          <a:solidFill>
+            <a:schemeClr val="bg1"/>
+          </a:solidFill>
+          <a:ln>
+            <a:solidFill>
+              <a:schemeClr val="bg1">
+                <a:lumMod val="85000"/>
+              </a:schemeClr>
+            </a:solidFill>
+          </a:ln>
+        </p:spPr>
+        <p:style>
+          <a:lnRef idx="2">
+            <a:schemeClr val="accent1">
+              <a:shade val="50000"/>
+            </a:schemeClr>
+          </a:lnRef>
+          <a:fillRef idx="1">
+            <a:schemeClr val="accent1"/>
+          </a:fillRef>
+          <a:effectRef idx="0">
+            <a:schemeClr val="accent1"/>
+          </a:effectRef>
+          <a:fontRef idx="minor">
+            <a:schemeClr val="lt1"/>
+          </a:fontRef>
+        </p:style>
+        <p:txBody>
+          <a:bodyPr lIns="0" rIns="0" bIns="0" rtlCol="0" anchor="ctr"/>
+          <a:lstStyle/>
+          <a:p>
+            <a:pPr algn="ctr"/>
+            <a:r>
+              <a:rPr lang="en-US" sz="1400" b="1" dirty="0" err="1" smtClean="0">
+                <a:solidFill>
+                  <a:schemeClr val="bg1">
+                    <a:lumMod val="65000"/>
+                  </a:schemeClr>
+                </a:solidFill>
+              </a:rPr>
+              <a:t>GoogleCode</a:t>
+            </a:r>
+            <a:endParaRPr lang="en-US" sz="1400" b="1" dirty="0">
+              <a:solidFill>
+                <a:schemeClr val="bg1">
+                  <a:lumMod val="65000"/>
+                </a:schemeClr>
+              </a:solidFill>
+            </a:endParaRPr>
+          </a:p>
+        </p:txBody>
+      </p:sp>
+      <p:sp>
+        <p:nvSpPr>
+          <p:cNvPr id="82" name="Cloud 81"/>
+          <p:cNvSpPr/>
+          <p:nvPr/>
+        </p:nvSpPr>
+        <p:spPr>
+          <a:xfrm>
+            <a:off x="2895600" y="1432719"/>
+            <a:ext cx="1609890" cy="462732"/>
+          </a:xfrm>
+          <a:prstGeom prst="cloud">
+            <a:avLst/>
+          </a:prstGeom>
+          <a:solidFill>
+            <a:schemeClr val="bg1"/>
+          </a:solidFill>
+          <a:ln>
+            <a:solidFill>
+              <a:schemeClr val="bg1">
+                <a:lumMod val="85000"/>
+              </a:schemeClr>
+            </a:solidFill>
+          </a:ln>
+        </p:spPr>
+        <p:style>
+          <a:lnRef idx="2">
+            <a:schemeClr val="accent1">
+              <a:shade val="50000"/>
+            </a:schemeClr>
+          </a:lnRef>
+          <a:fillRef idx="1">
+            <a:schemeClr val="accent1"/>
+          </a:fillRef>
+          <a:effectRef idx="0">
+            <a:schemeClr val="accent1"/>
+          </a:effectRef>
+          <a:fontRef idx="minor">
+            <a:schemeClr val="lt1"/>
+          </a:fontRef>
+        </p:style>
+        <p:txBody>
+          <a:bodyPr lIns="0" rIns="0" bIns="0" rtlCol="0" anchor="ctr"/>
+          <a:lstStyle/>
+          <a:p>
+            <a:pPr algn="ctr"/>
+            <a:r>
+              <a:rPr lang="en-US" sz="1400" b="1" dirty="0" err="1" smtClean="0">
+                <a:solidFill>
+                  <a:schemeClr val="bg1">
+                    <a:lumMod val="65000"/>
+                  </a:schemeClr>
+                </a:solidFill>
+              </a:rPr>
+              <a:t>GoogleCode</a:t>
+            </a:r>
+            <a:endParaRPr lang="en-US" sz="1400" b="1" dirty="0">
+              <a:solidFill>
+                <a:schemeClr val="bg1">
+                  <a:lumMod val="65000"/>
+                </a:schemeClr>
+              </a:solidFill>
+            </a:endParaRPr>
+          </a:p>
+        </p:txBody>
+      </p:sp>
+      <p:sp>
+        <p:nvSpPr>
+          <p:cNvPr id="83" name="Rounded Rectangle 82"/>
+          <p:cNvSpPr/>
+          <p:nvPr/>
+        </p:nvSpPr>
+        <p:spPr>
+          <a:xfrm>
+            <a:off x="3962400" y="3947319"/>
             <a:ext cx="5029200" cy="1737518"/>
           </a:xfrm>
           <a:prstGeom prst="roundRect">
@@ -3559,28 +3995,27 @@
       </p:sp>
       <p:sp>
         <p:nvSpPr>
-          <p:cNvPr id="58" name="Can 57"/>
+          <p:cNvPr id="84" name="Can 83"/>
           <p:cNvSpPr/>
           <p:nvPr/>
         </p:nvSpPr>
         <p:spPr>
           <a:xfrm>
-            <a:off x="2491581" y="826096"/>
-            <a:ext cx="1066800" cy="762000"/>
+            <a:off x="3200400" y="826096"/>
+            <a:ext cx="1184858" cy="762000"/>
           </a:xfrm>
           <a:prstGeom prst="can">
             <a:avLst/>
           </a:prstGeom>
           <a:solidFill>
-            <a:schemeClr val="bg1">
-              <a:lumMod val="65000"/>
+            <a:schemeClr val="accent2">
+              <a:lumMod val="60000"/>
+              <a:lumOff val="40000"/>
             </a:schemeClr>
           </a:solidFill>
           <a:ln>
             <a:solidFill>
-              <a:schemeClr val="bg1">
-                <a:lumMod val="65000"/>
-              </a:schemeClr>
+              <a:srgbClr val="D28280"/>
             </a:solidFill>
           </a:ln>
         </p:spPr>
@@ -3606,44 +4041,43 @@
           <a:p>
             <a:pPr algn="ctr"/>
             <a:r>
-              <a:rPr lang="en-US" sz="1600" b="1" dirty="0" smtClean="0"/>
-              <a:t>Review</a:t>
+              <a:rPr lang="en-US" sz="1600" b="1" dirty="0"/>
+              <a:t>Contributor</a:t>
             </a:r>
           </a:p>
           <a:p>
             <a:pPr algn="ctr"/>
             <a:r>
-              <a:rPr lang="en-US" sz="1600" dirty="0" smtClean="0"/>
+              <a:rPr lang="en-US" sz="1600" b="1" dirty="0"/>
               <a:t>Repo</a:t>
             </a:r>
-            <a:endParaRPr lang="en-US" sz="1600" dirty="0"/>
-          </a:p>
-        </p:txBody>
-      </p:sp>
-      <p:sp>
-        <p:nvSpPr>
-          <p:cNvPr id="59" name="Can 58"/>
+            <a:endParaRPr lang="en-US" sz="1600" b="1" dirty="0"/>
+          </a:p>
+        </p:txBody>
+      </p:sp>
+      <p:sp>
+        <p:nvSpPr>
+          <p:cNvPr id="85" name="Can 84"/>
           <p:cNvSpPr/>
           <p:nvPr/>
         </p:nvSpPr>
         <p:spPr>
           <a:xfrm>
-            <a:off x="4929981" y="826096"/>
-            <a:ext cx="1066800" cy="762000"/>
+            <a:off x="5853514" y="826096"/>
+            <a:ext cx="1107933" cy="762000"/>
           </a:xfrm>
           <a:prstGeom prst="can">
             <a:avLst/>
           </a:prstGeom>
           <a:solidFill>
-            <a:schemeClr val="bg1">
-              <a:lumMod val="65000"/>
+            <a:schemeClr val="accent2">
+              <a:lumMod val="60000"/>
+              <a:lumOff val="40000"/>
             </a:schemeClr>
           </a:solidFill>
           <a:ln>
             <a:solidFill>
-              <a:schemeClr val="bg1">
-                <a:lumMod val="65000"/>
-              </a:schemeClr>
+              <a:srgbClr val="D28280"/>
             </a:solidFill>
           </a:ln>
         </p:spPr>
@@ -3670,8 +4104,9 @@
             <a:pPr algn="ctr"/>
             <a:r>
               <a:rPr lang="en-US" sz="1600" b="1" dirty="0" smtClean="0"/>
-              <a:t>Release</a:t>
-            </a:r>
+              <a:t>Committer</a:t>
+            </a:r>
+            <a:endParaRPr lang="en-US" sz="1600" b="1" dirty="0" smtClean="0"/>
           </a:p>
           <a:p>
             <a:pPr algn="ctr"/>
@@ -3684,7 +4119,7 @@
       </p:sp>
       <p:pic>
         <p:nvPicPr>
-          <p:cNvPr id="2050" name="Picture 2" descr="http://screenshots.en.sftcdn.net/en/scrn/70000/70210/google-app-engine-1.jpg"/>
+          <p:cNvPr id="86" name="Picture 2" descr="http://screenshots.en.sftcdn.net/en/scrn/70000/70210/google-app-engine-1.jpg"/>
           <p:cNvPicPr>
             <a:picLocks noChangeAspect="1" noChangeArrowheads="1"/>
           </p:cNvPicPr>
@@ -3702,7 +4137,13 @@
                 </a:srgbClr>
               </a:clrTo>
             </a:clrChange>
-            <a:grayscl/>
+            <a:duotone>
+              <a:schemeClr val="accent2">
+                <a:shade val="45000"/>
+                <a:satMod val="135000"/>
+              </a:schemeClr>
+              <a:prstClr val="white"/>
+            </a:duotone>
           </a:blip>
           <a:srcRect/>
           <a:stretch>
@@ -3711,7 +4152,7 @@
         </p:blipFill>
         <p:spPr bwMode="auto">
           <a:xfrm>
-            <a:off x="7349331" y="597496"/>
+            <a:off x="8058150" y="597496"/>
             <a:ext cx="1085850" cy="1085850"/>
           </a:xfrm>
           <a:prstGeom prst="rect">
@@ -3722,13 +4163,13 @@
       </p:pic>
       <p:grpSp>
         <p:nvGrpSpPr>
-          <p:cNvPr id="65" name="Group 64"/>
+          <p:cNvPr id="87" name="Group 86"/>
           <p:cNvGrpSpPr/>
           <p:nvPr/>
         </p:nvGrpSpPr>
         <p:grpSpPr>
           <a:xfrm>
-            <a:off x="434181" y="902296"/>
+            <a:off x="304800" y="902296"/>
             <a:ext cx="304800" cy="533400"/>
             <a:chOff x="2339181" y="3718719"/>
             <a:chExt cx="304800" cy="533400"/>
@@ -3742,7 +4183,7 @@
         </p:grpSpPr>
         <p:sp>
           <p:nvSpPr>
-            <p:cNvPr id="63" name="Flowchart: Connector 62"/>
+            <p:cNvPr id="88" name="Flowchart: Connector 87"/>
             <p:cNvSpPr/>
             <p:nvPr/>
           </p:nvSpPr>
@@ -3788,7 +4229,7 @@
         </p:sp>
         <p:sp>
           <p:nvSpPr>
-            <p:cNvPr id="64" name="Flowchart: Delay 63"/>
+            <p:cNvPr id="89" name="Flowchart: Delay 88"/>
             <p:cNvSpPr/>
             <p:nvPr/>
           </p:nvSpPr>
@@ -3835,13 +4276,13 @@
       </p:grpSp>
       <p:grpSp>
         <p:nvGrpSpPr>
-          <p:cNvPr id="68" name="Group 67"/>
+          <p:cNvPr id="90" name="Group 89"/>
           <p:cNvGrpSpPr/>
           <p:nvPr/>
         </p:nvGrpSpPr>
         <p:grpSpPr>
           <a:xfrm>
-            <a:off x="2415381" y="2578696"/>
+            <a:off x="3200400" y="2847777"/>
             <a:ext cx="304800" cy="533400"/>
             <a:chOff x="2339181" y="3718719"/>
             <a:chExt cx="304800" cy="533400"/>
@@ -3849,7 +4290,7 @@
         </p:grpSpPr>
         <p:sp>
           <p:nvSpPr>
-            <p:cNvPr id="69" name="Flowchart: Connector 68"/>
+            <p:cNvPr id="91" name="Flowchart: Connector 90"/>
             <p:cNvSpPr/>
             <p:nvPr/>
           </p:nvSpPr>
@@ -3889,7 +4330,7 @@
         </p:sp>
         <p:sp>
           <p:nvSpPr>
-            <p:cNvPr id="70" name="Flowchart: Delay 69"/>
+            <p:cNvPr id="93" name="Flowchart: Delay 92"/>
             <p:cNvSpPr/>
             <p:nvPr/>
           </p:nvSpPr>
@@ -3930,13 +4371,13 @@
       </p:grpSp>
       <p:sp>
         <p:nvSpPr>
-          <p:cNvPr id="71" name="TextBox 70"/>
+          <p:cNvPr id="94" name="TextBox 93"/>
           <p:cNvSpPr txBox="1"/>
           <p:nvPr/>
         </p:nvSpPr>
         <p:spPr>
           <a:xfrm>
-            <a:off x="2110581" y="3185319"/>
+            <a:off x="2895600" y="3454400"/>
             <a:ext cx="914400" cy="340519"/>
           </a:xfrm>
           <a:prstGeom prst="roundRect">
@@ -3973,13 +4414,13 @@
       </p:sp>
       <p:grpSp>
         <p:nvGrpSpPr>
-          <p:cNvPr id="72" name="Group 71"/>
+          <p:cNvPr id="95" name="Group 94"/>
           <p:cNvGrpSpPr/>
           <p:nvPr/>
         </p:nvGrpSpPr>
         <p:grpSpPr>
           <a:xfrm>
-            <a:off x="4167981" y="2578696"/>
+            <a:off x="4953000" y="2847777"/>
             <a:ext cx="304800" cy="533400"/>
             <a:chOff x="2339181" y="3718719"/>
             <a:chExt cx="304800" cy="533400"/>
@@ -3987,7 +4428,7 @@
         </p:grpSpPr>
         <p:sp>
           <p:nvSpPr>
-            <p:cNvPr id="73" name="Flowchart: Connector 72"/>
+            <p:cNvPr id="96" name="Flowchart: Connector 95"/>
             <p:cNvSpPr/>
             <p:nvPr/>
           </p:nvSpPr>
@@ -4027,7 +4468,7 @@
         </p:sp>
         <p:sp>
           <p:nvSpPr>
-            <p:cNvPr id="74" name="Flowchart: Delay 73"/>
+            <p:cNvPr id="100" name="Flowchart: Delay 99"/>
             <p:cNvSpPr/>
             <p:nvPr/>
           </p:nvSpPr>
@@ -4068,13 +4509,13 @@
       </p:grpSp>
       <p:sp>
         <p:nvSpPr>
-          <p:cNvPr id="75" name="TextBox 74"/>
+          <p:cNvPr id="101" name="TextBox 100"/>
           <p:cNvSpPr txBox="1"/>
           <p:nvPr/>
         </p:nvSpPr>
         <p:spPr>
           <a:xfrm>
-            <a:off x="3863181" y="3185319"/>
+            <a:off x="4648200" y="3454400"/>
             <a:ext cx="1066800" cy="340519"/>
           </a:xfrm>
           <a:prstGeom prst="roundRect">
@@ -4104,13 +4545,13 @@
       </p:sp>
       <p:grpSp>
         <p:nvGrpSpPr>
-          <p:cNvPr id="76" name="Group 75"/>
+          <p:cNvPr id="104" name="Group 103"/>
           <p:cNvGrpSpPr/>
           <p:nvPr/>
         </p:nvGrpSpPr>
         <p:grpSpPr>
           <a:xfrm>
-            <a:off x="6682581" y="2578696"/>
+            <a:off x="7467600" y="2847777"/>
             <a:ext cx="304800" cy="533400"/>
             <a:chOff x="2339181" y="3718719"/>
             <a:chExt cx="304800" cy="533400"/>
@@ -4118,7 +4559,7 @@
         </p:grpSpPr>
         <p:sp>
           <p:nvSpPr>
-            <p:cNvPr id="77" name="Flowchart: Connector 76"/>
+            <p:cNvPr id="105" name="Flowchart: Connector 104"/>
             <p:cNvSpPr/>
             <p:nvPr/>
           </p:nvSpPr>
@@ -4158,7 +4599,7 @@
         </p:sp>
         <p:sp>
           <p:nvSpPr>
-            <p:cNvPr id="78" name="Flowchart: Delay 77"/>
+            <p:cNvPr id="106" name="Flowchart: Delay 105"/>
             <p:cNvSpPr/>
             <p:nvPr/>
           </p:nvSpPr>
@@ -4199,13 +4640,13 @@
       </p:grpSp>
       <p:sp>
         <p:nvSpPr>
-          <p:cNvPr id="79" name="TextBox 78"/>
+          <p:cNvPr id="108" name="TextBox 107"/>
           <p:cNvSpPr txBox="1"/>
           <p:nvPr/>
         </p:nvSpPr>
         <p:spPr>
           <a:xfrm>
-            <a:off x="6576237" y="3185319"/>
+            <a:off x="7361256" y="3454400"/>
             <a:ext cx="533400" cy="340519"/>
           </a:xfrm>
           <a:prstGeom prst="roundRect">
@@ -4237,13 +4678,13 @@
       </p:sp>
       <p:sp>
         <p:nvSpPr>
-          <p:cNvPr id="92" name="TextBox 91"/>
+          <p:cNvPr id="109" name="TextBox 108"/>
           <p:cNvSpPr txBox="1"/>
           <p:nvPr/>
         </p:nvSpPr>
         <p:spPr>
           <a:xfrm>
-            <a:off x="205581" y="1552377"/>
+            <a:off x="76200" y="1552377"/>
             <a:ext cx="533400" cy="340519"/>
           </a:xfrm>
           <a:prstGeom prst="roundRect">
@@ -4272,14 +4713,14 @@
       </p:sp>
       <p:sp>
         <p:nvSpPr>
-          <p:cNvPr id="97" name="TextBox 96"/>
+          <p:cNvPr id="110" name="TextBox 109"/>
           <p:cNvSpPr txBox="1"/>
           <p:nvPr/>
         </p:nvSpPr>
         <p:spPr>
           <a:xfrm>
-            <a:off x="738981" y="137319"/>
-            <a:ext cx="762000" cy="307777"/>
+            <a:off x="1523999" y="-15081"/>
+            <a:ext cx="1533097" cy="307777"/>
           </a:xfrm>
           <a:prstGeom prst="rect">
             <a:avLst/>
@@ -4298,7 +4739,15 @@
                   <a:srgbClr val="00B050"/>
                 </a:solidFill>
               </a:rPr>
-              <a:t>1. pull</a:t>
+              <a:t>1. </a:t>
+            </a:r>
+            <a:r>
+              <a:rPr lang="en-US" sz="1400" b="1" dirty="0" smtClean="0">
+                <a:solidFill>
+                  <a:srgbClr val="00B050"/>
+                </a:solidFill>
+              </a:rPr>
+              <a:t>pull</a:t>
             </a:r>
             <a:endParaRPr lang="en-US" sz="1400" b="1" dirty="0">
               <a:solidFill>
@@ -4310,13 +4759,13 @@
       </p:sp>
       <p:sp>
         <p:nvSpPr>
-          <p:cNvPr id="98" name="Arc 97"/>
+          <p:cNvPr id="112" name="Arc 111"/>
           <p:cNvSpPr/>
           <p:nvPr/>
         </p:nvSpPr>
         <p:spPr>
           <a:xfrm>
-            <a:off x="662781" y="978496"/>
+            <a:off x="1447800" y="978496"/>
             <a:ext cx="381000" cy="304800"/>
           </a:xfrm>
           <a:prstGeom prst="arc">
@@ -4358,13 +4807,13 @@
       </p:sp>
       <p:sp>
         <p:nvSpPr>
-          <p:cNvPr id="99" name="TextBox 98"/>
+          <p:cNvPr id="114" name="TextBox 113"/>
           <p:cNvSpPr txBox="1"/>
           <p:nvPr/>
         </p:nvSpPr>
         <p:spPr>
           <a:xfrm>
-            <a:off x="1119981" y="749896"/>
+            <a:off x="1905000" y="749896"/>
             <a:ext cx="990600" cy="646331"/>
           </a:xfrm>
           <a:prstGeom prst="rect">
@@ -4421,13 +4870,13 @@
       </p:sp>
       <p:sp>
         <p:nvSpPr>
-          <p:cNvPr id="102" name="TextBox 101"/>
+          <p:cNvPr id="127" name="TextBox 126"/>
           <p:cNvSpPr txBox="1"/>
           <p:nvPr/>
         </p:nvSpPr>
         <p:spPr>
           <a:xfrm>
-            <a:off x="1119981" y="2154238"/>
+            <a:off x="1905000" y="2619104"/>
             <a:ext cx="685800" cy="215444"/>
           </a:xfrm>
           <a:prstGeom prst="rect">
@@ -4459,13 +4908,13 @@
       </p:sp>
       <p:cxnSp>
         <p:nvCxnSpPr>
-          <p:cNvPr id="103" name="Straight Arrow Connector 102"/>
+          <p:cNvPr id="128" name="Straight Arrow Connector 127"/>
           <p:cNvCxnSpPr/>
           <p:nvPr/>
         </p:nvCxnSpPr>
         <p:spPr>
           <a:xfrm flipV="1">
-            <a:off x="2567781" y="1773238"/>
+            <a:off x="3352800" y="2042319"/>
             <a:ext cx="228600" cy="685800"/>
           </a:xfrm>
           <a:prstGeom prst="straightConnector1">
@@ -4497,13 +4946,13 @@
       </p:cxnSp>
       <p:sp>
         <p:nvSpPr>
-          <p:cNvPr id="107" name="TextBox 106"/>
+          <p:cNvPr id="129" name="TextBox 128"/>
           <p:cNvSpPr txBox="1"/>
           <p:nvPr/>
         </p:nvSpPr>
         <p:spPr>
           <a:xfrm rot="17318509">
-            <a:off x="2087118" y="1989319"/>
+            <a:off x="2872137" y="2258400"/>
             <a:ext cx="843775" cy="215444"/>
           </a:xfrm>
           <a:prstGeom prst="rect">
@@ -4539,13 +4988,13 @@
       </p:sp>
       <p:sp>
         <p:nvSpPr>
-          <p:cNvPr id="111" name="Arc 110"/>
+          <p:cNvPr id="130" name="Arc 129"/>
           <p:cNvSpPr/>
           <p:nvPr/>
         </p:nvSpPr>
         <p:spPr>
           <a:xfrm>
-            <a:off x="738981" y="216496"/>
+            <a:off x="1524000" y="216496"/>
             <a:ext cx="4419600" cy="1219200"/>
           </a:xfrm>
           <a:prstGeom prst="arc">
@@ -4587,14 +5036,14 @@
       </p:sp>
       <p:sp>
         <p:nvSpPr>
-          <p:cNvPr id="113" name="Arc 112"/>
+          <p:cNvPr id="131" name="Arc 130"/>
           <p:cNvSpPr/>
           <p:nvPr/>
         </p:nvSpPr>
         <p:spPr>
           <a:xfrm flipV="1">
-            <a:off x="815181" y="1359496"/>
-            <a:ext cx="1600200" cy="718542"/>
+            <a:off x="1563511" y="1529307"/>
+            <a:ext cx="1600200" cy="1025723"/>
           </a:xfrm>
           <a:prstGeom prst="arc">
             <a:avLst>
@@ -4635,13 +5084,13 @@
       </p:sp>
       <p:sp>
         <p:nvSpPr>
-          <p:cNvPr id="115" name="Arc 114"/>
+          <p:cNvPr id="134" name="Arc 133"/>
           <p:cNvSpPr/>
           <p:nvPr/>
         </p:nvSpPr>
         <p:spPr>
           <a:xfrm rot="2715976" flipV="1">
-            <a:off x="2998146" y="1853413"/>
+            <a:off x="3783165" y="2018071"/>
             <a:ext cx="1356586" cy="381000"/>
           </a:xfrm>
           <a:prstGeom prst="arc">
@@ -4683,13 +5132,13 @@
       </p:sp>
       <p:sp>
         <p:nvSpPr>
-          <p:cNvPr id="116" name="TextBox 115"/>
+          <p:cNvPr id="135" name="TextBox 134"/>
           <p:cNvSpPr txBox="1"/>
           <p:nvPr/>
         </p:nvSpPr>
         <p:spPr>
           <a:xfrm rot="2360287">
-            <a:off x="3177381" y="2273896"/>
+            <a:off x="3962400" y="2542977"/>
             <a:ext cx="685800" cy="215444"/>
           </a:xfrm>
           <a:prstGeom prst="rect">
@@ -4721,13 +5170,13 @@
       </p:sp>
       <p:sp>
         <p:nvSpPr>
-          <p:cNvPr id="117" name="Arc 116"/>
+          <p:cNvPr id="136" name="Arc 135"/>
           <p:cNvSpPr/>
           <p:nvPr/>
         </p:nvSpPr>
         <p:spPr>
           <a:xfrm rot="16709798">
-            <a:off x="4156356" y="2332422"/>
+            <a:off x="4941375" y="2601503"/>
             <a:ext cx="381000" cy="304800"/>
           </a:xfrm>
           <a:prstGeom prst="arc">
@@ -4773,13 +5222,13 @@
       </p:sp>
       <p:sp>
         <p:nvSpPr>
-          <p:cNvPr id="118" name="TextBox 117"/>
+          <p:cNvPr id="137" name="TextBox 136"/>
           <p:cNvSpPr txBox="1"/>
           <p:nvPr/>
         </p:nvSpPr>
         <p:spPr>
           <a:xfrm>
-            <a:off x="4091781" y="1816696"/>
+            <a:off x="4876800" y="2085777"/>
             <a:ext cx="838200" cy="430887"/>
           </a:xfrm>
           <a:prstGeom prst="rect">
@@ -4826,13 +5275,13 @@
       </p:sp>
       <p:sp>
         <p:nvSpPr>
-          <p:cNvPr id="119" name="Arc 118"/>
+          <p:cNvPr id="140" name="Arc 139"/>
           <p:cNvSpPr/>
           <p:nvPr/>
         </p:nvSpPr>
         <p:spPr>
           <a:xfrm rot="19019392" flipV="1">
-            <a:off x="4344224" y="1923378"/>
+            <a:off x="5129243" y="2088036"/>
             <a:ext cx="1356586" cy="381000"/>
           </a:xfrm>
           <a:prstGeom prst="arc">
@@ -4874,13 +5323,13 @@
       </p:sp>
       <p:sp>
         <p:nvSpPr>
-          <p:cNvPr id="120" name="TextBox 119"/>
+          <p:cNvPr id="141" name="TextBox 140"/>
           <p:cNvSpPr txBox="1"/>
           <p:nvPr/>
         </p:nvSpPr>
         <p:spPr>
           <a:xfrm rot="18996887">
-            <a:off x="5009792" y="2290249"/>
+            <a:off x="5695298" y="2559330"/>
             <a:ext cx="685800" cy="215444"/>
           </a:xfrm>
           <a:prstGeom prst="rect">
@@ -4912,13 +5361,13 @@
       </p:sp>
       <p:sp>
         <p:nvSpPr>
-          <p:cNvPr id="121" name="Arc 120"/>
+          <p:cNvPr id="142" name="Arc 141"/>
           <p:cNvSpPr/>
           <p:nvPr/>
         </p:nvSpPr>
         <p:spPr>
           <a:xfrm rot="2715976" flipV="1">
-            <a:off x="5515779" y="1794935"/>
+            <a:off x="6300798" y="1959593"/>
             <a:ext cx="1356586" cy="381000"/>
           </a:xfrm>
           <a:prstGeom prst="arc">
@@ -4960,13 +5409,13 @@
       </p:sp>
       <p:sp>
         <p:nvSpPr>
-          <p:cNvPr id="122" name="TextBox 121"/>
+          <p:cNvPr id="143" name="TextBox 142"/>
           <p:cNvSpPr txBox="1"/>
           <p:nvPr/>
         </p:nvSpPr>
         <p:spPr>
           <a:xfrm rot="1991192">
-            <a:off x="5695014" y="2215418"/>
+            <a:off x="6480033" y="2484499"/>
             <a:ext cx="685800" cy="215444"/>
           </a:xfrm>
           <a:prstGeom prst="rect">
@@ -4998,13 +5447,13 @@
       </p:sp>
       <p:sp>
         <p:nvSpPr>
-          <p:cNvPr id="123" name="Arc 122"/>
+          <p:cNvPr id="148" name="Arc 147"/>
           <p:cNvSpPr/>
           <p:nvPr/>
         </p:nvSpPr>
         <p:spPr>
           <a:xfrm rot="16709798">
-            <a:off x="6673989" y="2273944"/>
+            <a:off x="7459008" y="2543025"/>
             <a:ext cx="381000" cy="304800"/>
           </a:xfrm>
           <a:prstGeom prst="arc">
@@ -5046,13 +5495,13 @@
       </p:sp>
       <p:sp>
         <p:nvSpPr>
-          <p:cNvPr id="124" name="TextBox 123"/>
+          <p:cNvPr id="149" name="TextBox 148"/>
           <p:cNvSpPr txBox="1"/>
           <p:nvPr/>
         </p:nvSpPr>
         <p:spPr>
           <a:xfrm>
-            <a:off x="6609414" y="1969096"/>
+            <a:off x="7394433" y="2238177"/>
             <a:ext cx="835167" cy="215444"/>
           </a:xfrm>
           <a:prstGeom prst="rect">
@@ -5084,13 +5533,13 @@
       </p:sp>
       <p:sp>
         <p:nvSpPr>
-          <p:cNvPr id="125" name="Arc 124"/>
+          <p:cNvPr id="151" name="Arc 150"/>
           <p:cNvSpPr/>
           <p:nvPr/>
         </p:nvSpPr>
         <p:spPr>
           <a:xfrm rot="19019392" flipV="1">
-            <a:off x="6861857" y="1864900"/>
+            <a:off x="7646876" y="2029558"/>
             <a:ext cx="1356586" cy="381000"/>
           </a:xfrm>
           <a:prstGeom prst="arc">
@@ -5132,13 +5581,13 @@
       </p:sp>
       <p:sp>
         <p:nvSpPr>
-          <p:cNvPr id="126" name="TextBox 125"/>
+          <p:cNvPr id="152" name="TextBox 151"/>
           <p:cNvSpPr txBox="1"/>
           <p:nvPr/>
         </p:nvSpPr>
         <p:spPr>
           <a:xfrm rot="18996887">
-            <a:off x="7506125" y="2178227"/>
+            <a:off x="8291144" y="2447308"/>
             <a:ext cx="841701" cy="215444"/>
           </a:xfrm>
           <a:prstGeom prst="rect">
@@ -5170,13 +5619,13 @@
       </p:sp>
       <p:sp>
         <p:nvSpPr>
-          <p:cNvPr id="132" name="Freeform 131"/>
+          <p:cNvPr id="153" name="Freeform 152"/>
           <p:cNvSpPr/>
           <p:nvPr/>
         </p:nvSpPr>
         <p:spPr>
           <a:xfrm>
-            <a:off x="944545" y="423418"/>
+            <a:off x="1729564" y="423418"/>
             <a:ext cx="3959051" cy="1273620"/>
           </a:xfrm>
           <a:custGeom>
@@ -5304,13 +5753,13 @@
       </p:sp>
       <p:sp>
         <p:nvSpPr>
-          <p:cNvPr id="133" name="TextBox 132"/>
+          <p:cNvPr id="155" name="TextBox 154"/>
           <p:cNvSpPr txBox="1"/>
           <p:nvPr/>
         </p:nvSpPr>
         <p:spPr>
           <a:xfrm>
-            <a:off x="1119981" y="1697038"/>
+            <a:off x="1905000" y="1697038"/>
             <a:ext cx="838200" cy="215444"/>
           </a:xfrm>
           <a:prstGeom prst="rect">
@@ -5330,7 +5779,15 @@
                   <a:srgbClr val="00B050"/>
                 </a:solidFill>
               </a:rPr>
-              <a:t>3.1 update</a:t>
+              <a:t>3.1 </a:t>
+            </a:r>
+            <a:r>
+              <a:rPr lang="en-US" sz="1400" b="1" dirty="0" smtClean="0">
+                <a:solidFill>
+                  <a:srgbClr val="00B050"/>
+                </a:solidFill>
+              </a:rPr>
+              <a:t>pull</a:t>
             </a:r>
             <a:endParaRPr lang="en-US" sz="1400" b="1" dirty="0">
               <a:solidFill>
@@ -5342,13 +5799,13 @@
       </p:sp>
       <p:cxnSp>
         <p:nvCxnSpPr>
-          <p:cNvPr id="138" name="Straight Connector 137"/>
+          <p:cNvPr id="156" name="Straight Connector 155"/>
           <p:cNvCxnSpPr/>
           <p:nvPr/>
         </p:nvCxnSpPr>
         <p:spPr>
           <a:xfrm>
-            <a:off x="4548981" y="5275460"/>
+            <a:off x="5029200" y="5275460"/>
             <a:ext cx="3657600" cy="0"/>
           </a:xfrm>
           <a:prstGeom prst="line">
@@ -5380,13 +5837,13 @@
       </p:cxnSp>
       <p:sp>
         <p:nvSpPr>
-          <p:cNvPr id="139" name="Flowchart: Connector 138"/>
+          <p:cNvPr id="157" name="Flowchart: Connector 156"/>
           <p:cNvSpPr/>
           <p:nvPr/>
         </p:nvSpPr>
         <p:spPr>
           <a:xfrm>
-            <a:off x="5082382" y="5199260"/>
+            <a:off x="5562601" y="5199260"/>
             <a:ext cx="152400" cy="152400"/>
           </a:xfrm>
           <a:prstGeom prst="flowChartConnector">
@@ -5432,13 +5889,13 @@
       </p:sp>
       <p:sp>
         <p:nvSpPr>
-          <p:cNvPr id="144" name="Flowchart: Connector 143"/>
+          <p:cNvPr id="159" name="Flowchart: Connector 158"/>
           <p:cNvSpPr/>
           <p:nvPr/>
         </p:nvSpPr>
         <p:spPr>
           <a:xfrm>
-            <a:off x="7673181" y="5199260"/>
+            <a:off x="8153400" y="5199260"/>
             <a:ext cx="152400" cy="152400"/>
           </a:xfrm>
           <a:prstGeom prst="flowChartConnector">
@@ -5472,13 +5929,13 @@
       </p:sp>
       <p:sp>
         <p:nvSpPr>
-          <p:cNvPr id="145" name="Flowchart: Connector 144"/>
+          <p:cNvPr id="161" name="Flowchart: Connector 160"/>
           <p:cNvSpPr/>
           <p:nvPr/>
         </p:nvSpPr>
         <p:spPr>
           <a:xfrm>
-            <a:off x="6453981" y="5199260"/>
+            <a:off x="6934200" y="5199260"/>
             <a:ext cx="152400" cy="152400"/>
           </a:xfrm>
           <a:prstGeom prst="flowChartConnector">
@@ -5524,13 +5981,13 @@
       </p:sp>
       <p:sp>
         <p:nvSpPr>
-          <p:cNvPr id="146" name="Flowchart: Connector 145"/>
+          <p:cNvPr id="162" name="Flowchart: Connector 161"/>
           <p:cNvSpPr/>
           <p:nvPr/>
         </p:nvSpPr>
         <p:spPr>
           <a:xfrm>
-            <a:off x="6834981" y="4589660"/>
+            <a:off x="7315200" y="4589660"/>
             <a:ext cx="152400" cy="152400"/>
           </a:xfrm>
           <a:prstGeom prst="flowChartConnector">
@@ -5575,13 +6032,13 @@
       </p:sp>
       <p:sp>
         <p:nvSpPr>
-          <p:cNvPr id="147" name="Flowchart: Connector 146"/>
+          <p:cNvPr id="164" name="Flowchart: Connector 163"/>
           <p:cNvSpPr/>
           <p:nvPr/>
         </p:nvSpPr>
         <p:spPr>
           <a:xfrm>
-            <a:off x="5615782" y="4589660"/>
+            <a:off x="6096001" y="4589660"/>
             <a:ext cx="152400" cy="152400"/>
           </a:xfrm>
           <a:prstGeom prst="flowChartConnector">
@@ -5626,16 +6083,16 @@
       </p:sp>
       <p:cxnSp>
         <p:nvCxnSpPr>
-          <p:cNvPr id="150" name="Shape 149"/>
+          <p:cNvPr id="167" name="Shape 149"/>
           <p:cNvCxnSpPr>
-            <a:stCxn id="139" idx="0"/>
-            <a:endCxn id="147" idx="2"/>
+            <a:stCxn id="157" idx="0"/>
+            <a:endCxn id="164" idx="2"/>
           </p:cNvCxnSpPr>
           <p:nvPr/>
         </p:nvCxnSpPr>
         <p:spPr>
           <a:xfrm rot="5400000" flipH="1" flipV="1">
-            <a:off x="5120482" y="4703960"/>
+            <a:off x="5600701" y="4703960"/>
             <a:ext cx="533400" cy="457200"/>
           </a:xfrm>
           <a:prstGeom prst="curvedConnector2">
@@ -5666,16 +6123,16 @@
       </p:cxnSp>
       <p:cxnSp>
         <p:nvCxnSpPr>
-          <p:cNvPr id="154" name="Shape 153"/>
+          <p:cNvPr id="169" name="Shape 153"/>
           <p:cNvCxnSpPr>
-            <a:stCxn id="146" idx="6"/>
-            <a:endCxn id="144" idx="1"/>
+            <a:stCxn id="162" idx="6"/>
+            <a:endCxn id="159" idx="1"/>
           </p:cNvCxnSpPr>
           <p:nvPr/>
         </p:nvCxnSpPr>
         <p:spPr>
           <a:xfrm>
-            <a:off x="6987381" y="4665860"/>
+            <a:off x="7467600" y="4665860"/>
             <a:ext cx="708118" cy="555718"/>
           </a:xfrm>
           <a:prstGeom prst="curvedConnector2">
@@ -5706,16 +6163,16 @@
       </p:cxnSp>
       <p:cxnSp>
         <p:nvCxnSpPr>
-          <p:cNvPr id="158" name="Straight Arrow Connector 157"/>
+          <p:cNvPr id="171" name="Straight Arrow Connector 170"/>
           <p:cNvCxnSpPr>
-            <a:stCxn id="147" idx="6"/>
-            <a:endCxn id="146" idx="2"/>
+            <a:stCxn id="164" idx="6"/>
+            <a:endCxn id="162" idx="2"/>
           </p:cNvCxnSpPr>
           <p:nvPr/>
         </p:nvCxnSpPr>
         <p:spPr>
           <a:xfrm>
-            <a:off x="5768182" y="4665860"/>
+            <a:off x="6248401" y="4665860"/>
             <a:ext cx="1066799" cy="0"/>
           </a:xfrm>
           <a:prstGeom prst="straightConnector1">
@@ -5746,16 +6203,16 @@
       </p:cxnSp>
       <p:cxnSp>
         <p:nvCxnSpPr>
-          <p:cNvPr id="160" name="Curved Connector 159"/>
+          <p:cNvPr id="172" name="Curved Connector 171"/>
           <p:cNvCxnSpPr>
-            <a:stCxn id="145" idx="7"/>
-            <a:endCxn id="146" idx="4"/>
+            <a:stCxn id="161" idx="7"/>
+            <a:endCxn id="162" idx="4"/>
           </p:cNvCxnSpPr>
           <p:nvPr/>
         </p:nvCxnSpPr>
         <p:spPr>
           <a:xfrm rot="5400000" flipH="1" flipV="1">
-            <a:off x="6507863" y="4818260"/>
+            <a:off x="6988082" y="4818260"/>
             <a:ext cx="479518" cy="327118"/>
           </a:xfrm>
           <a:prstGeom prst="curvedConnector3">
@@ -5789,13 +6246,13 @@
       </p:cxnSp>
       <p:sp>
         <p:nvSpPr>
-          <p:cNvPr id="163" name="TextBox 162"/>
+          <p:cNvPr id="174" name="TextBox 173"/>
           <p:cNvSpPr txBox="1"/>
           <p:nvPr/>
         </p:nvSpPr>
         <p:spPr>
           <a:xfrm rot="18268321">
-            <a:off x="4662895" y="4608370"/>
+            <a:off x="5143114" y="4608370"/>
             <a:ext cx="762000" cy="307777"/>
           </a:xfrm>
           <a:prstGeom prst="rect">
@@ -5827,13 +6284,13 @@
       </p:sp>
       <p:sp>
         <p:nvSpPr>
-          <p:cNvPr id="165" name="TextBox 164"/>
+          <p:cNvPr id="175" name="TextBox 174"/>
           <p:cNvSpPr txBox="1"/>
           <p:nvPr/>
         </p:nvSpPr>
         <p:spPr>
           <a:xfrm rot="2419831">
-            <a:off x="7273198" y="4522254"/>
+            <a:off x="7753417" y="4522254"/>
             <a:ext cx="762000" cy="307777"/>
           </a:xfrm>
           <a:prstGeom prst="rect">
@@ -5865,13 +6322,13 @@
       </p:sp>
       <p:sp>
         <p:nvSpPr>
-          <p:cNvPr id="166" name="TextBox 165"/>
+          <p:cNvPr id="176" name="TextBox 175"/>
           <p:cNvSpPr txBox="1"/>
           <p:nvPr/>
         </p:nvSpPr>
         <p:spPr>
           <a:xfrm>
-            <a:off x="5768181" y="4056260"/>
+            <a:off x="6248400" y="4056260"/>
             <a:ext cx="1295400" cy="523220"/>
           </a:xfrm>
           <a:prstGeom prst="rect">
@@ -5915,13 +6372,13 @@
       </p:sp>
       <p:sp>
         <p:nvSpPr>
-          <p:cNvPr id="168" name="TextBox 167"/>
+          <p:cNvPr id="177" name="TextBox 176"/>
           <p:cNvSpPr txBox="1"/>
           <p:nvPr/>
         </p:nvSpPr>
         <p:spPr>
           <a:xfrm>
-            <a:off x="5920581" y="4815283"/>
+            <a:off x="6355855" y="4858742"/>
             <a:ext cx="762000" cy="307777"/>
           </a:xfrm>
           <a:prstGeom prst="rect">
@@ -5935,13 +6392,14 @@
           </a:bodyPr>
           <a:lstStyle/>
           <a:p>
+            <a:pPr algn="r"/>
             <a:r>
               <a:rPr lang="en-US" sz="1400" b="1" dirty="0" smtClean="0">
                 <a:solidFill>
                   <a:srgbClr val="00B050"/>
                 </a:solidFill>
               </a:rPr>
-              <a:t>update</a:t>
+              <a:t>pull</a:t>
             </a:r>
             <a:endParaRPr lang="en-US" sz="1400" b="1" dirty="0">
               <a:solidFill>
@@ -5953,13 +6411,13 @@
       </p:sp>
       <p:sp>
         <p:nvSpPr>
-          <p:cNvPr id="170" name="TextBox 169"/>
+          <p:cNvPr id="178" name="TextBox 177"/>
           <p:cNvSpPr txBox="1"/>
           <p:nvPr/>
         </p:nvSpPr>
         <p:spPr>
           <a:xfrm>
-            <a:off x="3786981" y="4970660"/>
+            <a:off x="4267200" y="4970660"/>
             <a:ext cx="762000" cy="523220"/>
           </a:xfrm>
           <a:prstGeom prst="rect">
@@ -6012,10 +6470,152 @@
           </a:p>
         </p:txBody>
       </p:sp>
+      <p:cxnSp>
+        <p:nvCxnSpPr>
+          <p:cNvPr id="179" name="Straight Arrow Connector 178"/>
+          <p:cNvCxnSpPr/>
+          <p:nvPr/>
+        </p:nvCxnSpPr>
+        <p:spPr>
+          <a:xfrm flipH="1">
+            <a:off x="4572000" y="1328598"/>
+            <a:ext cx="914400" cy="0"/>
+          </a:xfrm>
+          <a:prstGeom prst="straightConnector1">
+            <a:avLst/>
+          </a:prstGeom>
+          <a:ln w="28575">
+            <a:solidFill>
+              <a:schemeClr val="bg1">
+                <a:lumMod val="65000"/>
+              </a:schemeClr>
+            </a:solidFill>
+            <a:tailEnd type="triangle"/>
+          </a:ln>
+        </p:spPr>
+        <p:style>
+          <a:lnRef idx="1">
+            <a:schemeClr val="accent1"/>
+          </a:lnRef>
+          <a:fillRef idx="0">
+            <a:schemeClr val="accent1"/>
+          </a:fillRef>
+          <a:effectRef idx="0">
+            <a:schemeClr val="accent1"/>
+          </a:effectRef>
+          <a:fontRef idx="minor">
+            <a:schemeClr val="tx1"/>
+          </a:fontRef>
+        </p:style>
+      </p:cxnSp>
+      <p:sp>
+        <p:nvSpPr>
+          <p:cNvPr id="180" name="TextBox 179"/>
+          <p:cNvSpPr txBox="1"/>
+          <p:nvPr/>
+        </p:nvSpPr>
+        <p:spPr>
+          <a:xfrm>
+            <a:off x="4385258" y="975519"/>
+            <a:ext cx="1482143" cy="307777"/>
+          </a:xfrm>
+          <a:prstGeom prst="rect">
+            <a:avLst/>
+          </a:prstGeom>
+          <a:noFill/>
+        </p:spPr>
+        <p:txBody>
+          <a:bodyPr wrap="square" rtlCol="0">
+            <a:spAutoFit/>
+          </a:bodyPr>
+          <a:lstStyle/>
+          <a:p>
+            <a:r>
+              <a:rPr lang="en-US" sz="1400" b="1" dirty="0" smtClean="0">
+                <a:solidFill>
+                  <a:schemeClr val="bg1">
+                    <a:lumMod val="65000"/>
+                  </a:schemeClr>
+                </a:solidFill>
+              </a:rPr>
+              <a:t>server-side clone</a:t>
+            </a:r>
+            <a:endParaRPr lang="en-US" sz="1400" b="1" dirty="0">
+              <a:solidFill>
+                <a:schemeClr val="bg1">
+                  <a:lumMod val="65000"/>
+                </a:schemeClr>
+              </a:solidFill>
+            </a:endParaRPr>
+          </a:p>
+        </p:txBody>
+      </p:sp>
+      <p:sp>
+        <p:nvSpPr>
+          <p:cNvPr id="181" name="Can 180"/>
+          <p:cNvSpPr/>
+          <p:nvPr/>
+        </p:nvSpPr>
+        <p:spPr>
+          <a:xfrm>
+            <a:off x="805543" y="902296"/>
+            <a:ext cx="685800" cy="650081"/>
+          </a:xfrm>
+          <a:prstGeom prst="can">
+            <a:avLst/>
+          </a:prstGeom>
+          <a:solidFill>
+            <a:schemeClr val="accent2">
+              <a:lumMod val="60000"/>
+              <a:lumOff val="40000"/>
+            </a:schemeClr>
+          </a:solidFill>
+          <a:ln>
+            <a:solidFill>
+              <a:srgbClr val="D28280"/>
+            </a:solidFill>
+          </a:ln>
+        </p:spPr>
+        <p:style>
+          <a:lnRef idx="2">
+            <a:schemeClr val="accent1">
+              <a:shade val="50000"/>
+            </a:schemeClr>
+          </a:lnRef>
+          <a:fillRef idx="1">
+            <a:schemeClr val="accent1"/>
+          </a:fillRef>
+          <a:effectRef idx="0">
+            <a:schemeClr val="accent1"/>
+          </a:effectRef>
+          <a:fontRef idx="minor">
+            <a:schemeClr val="lt1"/>
+          </a:fontRef>
+        </p:style>
+        <p:txBody>
+          <a:bodyPr rtlCol="0" anchor="ctr"/>
+          <a:lstStyle/>
+          <a:p>
+            <a:pPr algn="ctr"/>
+            <a:r>
+              <a:rPr lang="en-US" sz="1600" b="1" dirty="0"/>
+              <a:t>Local</a:t>
+            </a:r>
+          </a:p>
+          <a:p>
+            <a:pPr algn="ctr"/>
+            <a:r>
+              <a:rPr lang="en-US" sz="1600" b="1" dirty="0"/>
+              <a:t>Repo</a:t>
+            </a:r>
+            <a:endParaRPr lang="en-US" sz="1600" b="1" dirty="0"/>
+          </a:p>
+        </p:txBody>
+      </p:sp>
     </p:spTree>
     <p:extLst>
       <p:ext uri="{BB962C8B-B14F-4D97-AF65-F5344CB8AC3E}">
-        <p14:creationId xmlns:p14="http://schemas.microsoft.com/office/powerpoint/2010/main" xmlns="" val="2312643091"/>
+        <p14:creationId xmlns:p14="http://schemas.microsoft.com/office/powerpoint/2010/main" val="2312643091"/>
       </p:ext>
     </p:extLst>
   </p:cSld>

</xml_diff>

<commit_message>
Syncing Issue423 [Increase maximum recommended class size to 250] merged default
</commit_message>
<xml_diff>
--- a/doc/diagrams/workflow.pptx
+++ b/doc/diagrams/workflow.pptx
@@ -10,7 +10,7 @@
   <p:sldIdLst>
     <p:sldId id="256" r:id="rId2"/>
   </p:sldIdLst>
-  <p:sldSz cx="8640763" cy="5761038"/>
+  <p:sldSz cx="9144000" cy="5761038"/>
   <p:notesSz cx="6858000" cy="9144000"/>
   <p:defaultTextStyle>
     <a:defPPr>
@@ -193,7 +193,7 @@
             <a:fld id="{DC50A2AC-D691-437C-A69B-81ECFE08AD4B}" type="datetimeFigureOut">
               <a:rPr lang="en-SG" smtClean="0"/>
               <a:pPr/>
-              <a:t>28/7/2012</a:t>
+              <a:t>9/2/2013</a:t>
             </a:fld>
             <a:endParaRPr lang="en-SG"/>
           </a:p>
@@ -211,8 +211,8 @@
         </p:nvSpPr>
         <p:spPr>
           <a:xfrm>
-            <a:off x="858838" y="685800"/>
-            <a:ext cx="5140325" cy="3429000"/>
+            <a:off x="708025" y="685800"/>
+            <a:ext cx="5441950" cy="3429000"/>
           </a:xfrm>
           <a:prstGeom prst="rect">
             <a:avLst/>
@@ -362,7 +362,7 @@
     </p:spTree>
     <p:extLst>
       <p:ext uri="{BB962C8B-B14F-4D97-AF65-F5344CB8AC3E}">
-        <p14:creationId xmlns:p14="http://schemas.microsoft.com/office/powerpoint/2010/main" xmlns="" val="2265103329"/>
+        <p14:creationId xmlns:p14="http://schemas.microsoft.com/office/powerpoint/2010/main" val="2265103329"/>
       </p:ext>
     </p:extLst>
   </p:cSld>
@@ -491,8 +491,8 @@
         </p:nvSpPr>
         <p:spPr>
           <a:xfrm>
-            <a:off x="858838" y="685800"/>
-            <a:ext cx="5140325" cy="3429000"/>
+            <a:off x="708025" y="685800"/>
+            <a:ext cx="5441950" cy="3429000"/>
           </a:xfrm>
         </p:spPr>
       </p:sp>
@@ -542,7 +542,7 @@
     </p:spTree>
     <p:extLst>
       <p:ext uri="{BB962C8B-B14F-4D97-AF65-F5344CB8AC3E}">
-        <p14:creationId xmlns:p14="http://schemas.microsoft.com/office/powerpoint/2010/main" xmlns="" val="1558229004"/>
+        <p14:creationId xmlns:p14="http://schemas.microsoft.com/office/powerpoint/2010/main" val="1558229004"/>
       </p:ext>
     </p:extLst>
   </p:cSld>
@@ -581,8 +581,8 @@
         </p:nvSpPr>
         <p:spPr>
           <a:xfrm>
-            <a:off x="648057" y="1789656"/>
-            <a:ext cx="7344649" cy="1234890"/>
+            <a:off x="685802" y="1789656"/>
+            <a:ext cx="7772400" cy="1234890"/>
           </a:xfrm>
         </p:spPr>
         <p:txBody>
@@ -609,8 +609,8 @@
         </p:nvSpPr>
         <p:spPr>
           <a:xfrm>
-            <a:off x="1296115" y="3264588"/>
-            <a:ext cx="6048534" cy="1472266"/>
+            <a:off x="1371601" y="3264588"/>
+            <a:ext cx="6400800" cy="1472266"/>
           </a:xfrm>
         </p:spPr>
         <p:txBody>
@@ -734,7 +734,7 @@
             <a:fld id="{1D8BD707-D9CF-40AE-B4C6-C98DA3205C09}" type="datetimeFigureOut">
               <a:rPr lang="en-US" smtClean="0"/>
               <a:pPr/>
-              <a:t>7/28/2012</a:t>
+              <a:t>2/9/2013</a:t>
             </a:fld>
             <a:endParaRPr lang="en-US"/>
           </a:p>
@@ -901,7 +901,7 @@
             <a:fld id="{1D8BD707-D9CF-40AE-B4C6-C98DA3205C09}" type="datetimeFigureOut">
               <a:rPr lang="en-US" smtClean="0"/>
               <a:pPr/>
-              <a:t>7/28/2012</a:t>
+              <a:t>2/9/2013</a:t>
             </a:fld>
             <a:endParaRPr lang="en-US"/>
           </a:p>
@@ -987,8 +987,8 @@
         </p:nvSpPr>
         <p:spPr>
           <a:xfrm>
-            <a:off x="6264553" y="230710"/>
-            <a:ext cx="1944172" cy="4915552"/>
+            <a:off x="6629401" y="230710"/>
+            <a:ext cx="2057400" cy="4915552"/>
           </a:xfrm>
         </p:spPr>
         <p:txBody>
@@ -1015,8 +1015,8 @@
         </p:nvSpPr>
         <p:spPr>
           <a:xfrm>
-            <a:off x="432039" y="230710"/>
-            <a:ext cx="5688502" cy="4915552"/>
+            <a:off x="457201" y="230710"/>
+            <a:ext cx="6019800" cy="4915552"/>
           </a:xfrm>
         </p:spPr>
         <p:txBody>
@@ -1078,7 +1078,7 @@
             <a:fld id="{1D8BD707-D9CF-40AE-B4C6-C98DA3205C09}" type="datetimeFigureOut">
               <a:rPr lang="en-US" smtClean="0"/>
               <a:pPr/>
-              <a:t>7/28/2012</a:t>
+              <a:t>2/9/2013</a:t>
             </a:fld>
             <a:endParaRPr lang="en-US"/>
           </a:p>
@@ -1245,7 +1245,7 @@
             <a:fld id="{1D8BD707-D9CF-40AE-B4C6-C98DA3205C09}" type="datetimeFigureOut">
               <a:rPr lang="en-US" smtClean="0"/>
               <a:pPr/>
-              <a:t>7/28/2012</a:t>
+              <a:t>2/9/2013</a:t>
             </a:fld>
             <a:endParaRPr lang="en-US"/>
           </a:p>
@@ -1331,8 +1331,8 @@
         </p:nvSpPr>
         <p:spPr>
           <a:xfrm>
-            <a:off x="682561" y="3702001"/>
-            <a:ext cx="7344649" cy="1144206"/>
+            <a:off x="722314" y="3702001"/>
+            <a:ext cx="7772400" cy="1144206"/>
           </a:xfrm>
         </p:spPr>
         <p:txBody>
@@ -1363,8 +1363,8 @@
         </p:nvSpPr>
         <p:spPr>
           <a:xfrm>
-            <a:off x="682561" y="2441774"/>
-            <a:ext cx="7344649" cy="1260227"/>
+            <a:off x="722314" y="2441774"/>
+            <a:ext cx="7772400" cy="1260227"/>
           </a:xfrm>
         </p:spPr>
         <p:txBody>
@@ -1488,7 +1488,7 @@
             <a:fld id="{1D8BD707-D9CF-40AE-B4C6-C98DA3205C09}" type="datetimeFigureOut">
               <a:rPr lang="en-US" smtClean="0"/>
               <a:pPr/>
-              <a:t>7/28/2012</a:t>
+              <a:t>2/9/2013</a:t>
             </a:fld>
             <a:endParaRPr lang="en-US"/>
           </a:p>
@@ -1597,8 +1597,8 @@
         </p:nvSpPr>
         <p:spPr>
           <a:xfrm>
-            <a:off x="432039" y="1344242"/>
-            <a:ext cx="3816337" cy="3802019"/>
+            <a:off x="457202" y="1344242"/>
+            <a:ext cx="4038600" cy="3802019"/>
           </a:xfrm>
         </p:spPr>
         <p:txBody>
@@ -1682,8 +1682,8 @@
         </p:nvSpPr>
         <p:spPr>
           <a:xfrm>
-            <a:off x="4392388" y="1344242"/>
-            <a:ext cx="3816337" cy="3802019"/>
+            <a:off x="4648201" y="1344242"/>
+            <a:ext cx="4038600" cy="3802019"/>
           </a:xfrm>
         </p:spPr>
         <p:txBody>
@@ -1773,7 +1773,7 @@
             <a:fld id="{1D8BD707-D9CF-40AE-B4C6-C98DA3205C09}" type="datetimeFigureOut">
               <a:rPr lang="en-US" smtClean="0"/>
               <a:pPr/>
-              <a:t>7/28/2012</a:t>
+              <a:t>2/9/2013</a:t>
             </a:fld>
             <a:endParaRPr lang="en-US"/>
           </a:p>
@@ -1886,8 +1886,8 @@
         </p:nvSpPr>
         <p:spPr>
           <a:xfrm>
-            <a:off x="432039" y="1289566"/>
-            <a:ext cx="3817838" cy="537430"/>
+            <a:off x="457201" y="1289566"/>
+            <a:ext cx="4040189" cy="537430"/>
           </a:xfrm>
         </p:spPr>
         <p:txBody>
@@ -1951,8 +1951,8 @@
         </p:nvSpPr>
         <p:spPr>
           <a:xfrm>
-            <a:off x="432039" y="1826997"/>
-            <a:ext cx="3817838" cy="3319265"/>
+            <a:off x="457201" y="1826997"/>
+            <a:ext cx="4040189" cy="3319265"/>
           </a:xfrm>
         </p:spPr>
         <p:txBody>
@@ -2036,8 +2036,8 @@
         </p:nvSpPr>
         <p:spPr>
           <a:xfrm>
-            <a:off x="4389389" y="1289566"/>
-            <a:ext cx="3819337" cy="537430"/>
+            <a:off x="4645028" y="1289566"/>
+            <a:ext cx="4041774" cy="537430"/>
           </a:xfrm>
         </p:spPr>
         <p:txBody>
@@ -2101,8 +2101,8 @@
         </p:nvSpPr>
         <p:spPr>
           <a:xfrm>
-            <a:off x="4389389" y="1826997"/>
-            <a:ext cx="3819337" cy="3319265"/>
+            <a:off x="4645028" y="1826997"/>
+            <a:ext cx="4041774" cy="3319265"/>
           </a:xfrm>
         </p:spPr>
         <p:txBody>
@@ -2192,7 +2192,7 @@
             <a:fld id="{1D8BD707-D9CF-40AE-B4C6-C98DA3205C09}" type="datetimeFigureOut">
               <a:rPr lang="en-US" smtClean="0"/>
               <a:pPr/>
-              <a:t>7/28/2012</a:t>
+              <a:t>2/9/2013</a:t>
             </a:fld>
             <a:endParaRPr lang="en-US"/>
           </a:p>
@@ -2307,7 +2307,7 @@
             <a:fld id="{1D8BD707-D9CF-40AE-B4C6-C98DA3205C09}" type="datetimeFigureOut">
               <a:rPr lang="en-US" smtClean="0"/>
               <a:pPr/>
-              <a:t>7/28/2012</a:t>
+              <a:t>2/9/2013</a:t>
             </a:fld>
             <a:endParaRPr lang="en-US"/>
           </a:p>
@@ -2399,7 +2399,7 @@
             <a:fld id="{1D8BD707-D9CF-40AE-B4C6-C98DA3205C09}" type="datetimeFigureOut">
               <a:rPr lang="en-US" smtClean="0"/>
               <a:pPr/>
-              <a:t>7/28/2012</a:t>
+              <a:t>2/9/2013</a:t>
             </a:fld>
             <a:endParaRPr lang="en-US"/>
           </a:p>
@@ -2485,8 +2485,8 @@
         </p:nvSpPr>
         <p:spPr>
           <a:xfrm>
-            <a:off x="432039" y="229375"/>
-            <a:ext cx="2842752" cy="976176"/>
+            <a:off x="457201" y="229375"/>
+            <a:ext cx="3008314" cy="976176"/>
           </a:xfrm>
         </p:spPr>
         <p:txBody>
@@ -2517,8 +2517,8 @@
         </p:nvSpPr>
         <p:spPr>
           <a:xfrm>
-            <a:off x="3378298" y="229375"/>
-            <a:ext cx="4830427" cy="4916886"/>
+            <a:off x="3575051" y="229375"/>
+            <a:ext cx="5111751" cy="4916886"/>
           </a:xfrm>
         </p:spPr>
         <p:txBody>
@@ -2602,8 +2602,8 @@
         </p:nvSpPr>
         <p:spPr>
           <a:xfrm>
-            <a:off x="432039" y="1205551"/>
-            <a:ext cx="2842752" cy="3940710"/>
+            <a:off x="457201" y="1205551"/>
+            <a:ext cx="3008314" cy="3940710"/>
           </a:xfrm>
         </p:spPr>
         <p:txBody>
@@ -2673,7 +2673,7 @@
             <a:fld id="{1D8BD707-D9CF-40AE-B4C6-C98DA3205C09}" type="datetimeFigureOut">
               <a:rPr lang="en-US" smtClean="0"/>
               <a:pPr/>
-              <a:t>7/28/2012</a:t>
+              <a:t>2/9/2013</a:t>
             </a:fld>
             <a:endParaRPr lang="en-US"/>
           </a:p>
@@ -2759,8 +2759,8 @@
         </p:nvSpPr>
         <p:spPr>
           <a:xfrm>
-            <a:off x="1693650" y="4032727"/>
-            <a:ext cx="5184458" cy="476086"/>
+            <a:off x="1792288" y="4032727"/>
+            <a:ext cx="5486400" cy="476086"/>
           </a:xfrm>
         </p:spPr>
         <p:txBody>
@@ -2791,8 +2791,8 @@
         </p:nvSpPr>
         <p:spPr>
           <a:xfrm>
-            <a:off x="1693650" y="514760"/>
-            <a:ext cx="5184458" cy="3456623"/>
+            <a:off x="1792288" y="514762"/>
+            <a:ext cx="5486400" cy="3456623"/>
           </a:xfrm>
         </p:spPr>
         <p:txBody>
@@ -2852,8 +2852,8 @@
         </p:nvSpPr>
         <p:spPr>
           <a:xfrm>
-            <a:off x="1693650" y="4508813"/>
-            <a:ext cx="5184458" cy="676121"/>
+            <a:off x="1792288" y="4508815"/>
+            <a:ext cx="5486400" cy="676121"/>
           </a:xfrm>
         </p:spPr>
         <p:txBody>
@@ -2923,7 +2923,7 @@
             <a:fld id="{1D8BD707-D9CF-40AE-B4C6-C98DA3205C09}" type="datetimeFigureOut">
               <a:rPr lang="en-US" smtClean="0"/>
               <a:pPr/>
-              <a:t>7/28/2012</a:t>
+              <a:t>2/9/2013</a:t>
             </a:fld>
             <a:endParaRPr lang="en-US"/>
           </a:p>
@@ -3014,8 +3014,8 @@
         </p:nvSpPr>
         <p:spPr>
           <a:xfrm>
-            <a:off x="432038" y="230709"/>
-            <a:ext cx="7776687" cy="960173"/>
+            <a:off x="457202" y="230709"/>
+            <a:ext cx="8229600" cy="960173"/>
           </a:xfrm>
           <a:prstGeom prst="rect">
             <a:avLst/>
@@ -3047,8 +3047,8 @@
         </p:nvSpPr>
         <p:spPr>
           <a:xfrm>
-            <a:off x="432038" y="1344242"/>
-            <a:ext cx="7776687" cy="3802019"/>
+            <a:off x="457202" y="1344242"/>
+            <a:ext cx="8229600" cy="3802019"/>
           </a:xfrm>
           <a:prstGeom prst="rect">
             <a:avLst/>
@@ -3109,8 +3109,8 @@
         </p:nvSpPr>
         <p:spPr>
           <a:xfrm>
-            <a:off x="432039" y="5339630"/>
-            <a:ext cx="2016178" cy="306722"/>
+            <a:off x="457201" y="5339630"/>
+            <a:ext cx="2133600" cy="306722"/>
           </a:xfrm>
           <a:prstGeom prst="rect">
             <a:avLst/>
@@ -3133,7 +3133,7 @@
             <a:fld id="{1D8BD707-D9CF-40AE-B4C6-C98DA3205C09}" type="datetimeFigureOut">
               <a:rPr lang="en-US" smtClean="0"/>
               <a:pPr/>
-              <a:t>7/28/2012</a:t>
+              <a:t>2/9/2013</a:t>
             </a:fld>
             <a:endParaRPr lang="en-US"/>
           </a:p>
@@ -3151,8 +3151,8 @@
         </p:nvSpPr>
         <p:spPr>
           <a:xfrm>
-            <a:off x="2952262" y="5339630"/>
-            <a:ext cx="2736242" cy="306722"/>
+            <a:off x="3124202" y="5339630"/>
+            <a:ext cx="2895600" cy="306722"/>
           </a:xfrm>
           <a:prstGeom prst="rect">
             <a:avLst/>
@@ -3188,8 +3188,8 @@
         </p:nvSpPr>
         <p:spPr>
           <a:xfrm>
-            <a:off x="6192548" y="5339630"/>
-            <a:ext cx="2016178" cy="306722"/>
+            <a:off x="6553201" y="5339630"/>
+            <a:ext cx="2133600" cy="306722"/>
           </a:xfrm>
           <a:prstGeom prst="rect">
             <a:avLst/>
@@ -3506,13 +3506,449 @@
       </p:grpSpPr>
       <p:sp>
         <p:nvSpPr>
-          <p:cNvPr id="173" name="Rounded Rectangle 172"/>
+          <p:cNvPr id="5" name="laptop"/>
+          <p:cNvSpPr>
+            <a:spLocks noEditPoints="1" noChangeArrowheads="1"/>
+          </p:cNvSpPr>
+          <p:nvPr/>
+        </p:nvSpPr>
+        <p:spPr bwMode="auto">
+          <a:xfrm>
+            <a:off x="457199" y="1053848"/>
+            <a:ext cx="1272365" cy="988472"/>
+          </a:xfrm>
+          <a:custGeom>
+            <a:avLst/>
+            <a:gdLst>
+              <a:gd name="T0" fmla="*/ 3362 w 21600"/>
+              <a:gd name="T1" fmla="*/ 0 h 21600"/>
+              <a:gd name="T2" fmla="*/ 3362 w 21600"/>
+              <a:gd name="T3" fmla="*/ 7173 h 21600"/>
+              <a:gd name="T4" fmla="*/ 18327 w 21600"/>
+              <a:gd name="T5" fmla="*/ 0 h 21600"/>
+              <a:gd name="T6" fmla="*/ 18327 w 21600"/>
+              <a:gd name="T7" fmla="*/ 7173 h 21600"/>
+              <a:gd name="T8" fmla="*/ 10800 w 21600"/>
+              <a:gd name="T9" fmla="*/ 0 h 21600"/>
+              <a:gd name="T10" fmla="*/ 10800 w 21600"/>
+              <a:gd name="T11" fmla="*/ 21600 h 21600"/>
+              <a:gd name="T12" fmla="*/ 0 w 21600"/>
+              <a:gd name="T13" fmla="*/ 21600 h 21600"/>
+              <a:gd name="T14" fmla="*/ 21600 w 21600"/>
+              <a:gd name="T15" fmla="*/ 21600 h 21600"/>
+              <a:gd name="T16" fmla="*/ 4445 w 21600"/>
+              <a:gd name="T17" fmla="*/ 1858 h 21600"/>
+              <a:gd name="T18" fmla="*/ 17311 w 21600"/>
+              <a:gd name="T19" fmla="*/ 12323 h 21600"/>
+            </a:gdLst>
+            <a:ahLst/>
+            <a:cxnLst>
+              <a:cxn ang="0">
+                <a:pos x="T0" y="T1"/>
+              </a:cxn>
+              <a:cxn ang="0">
+                <a:pos x="T2" y="T3"/>
+              </a:cxn>
+              <a:cxn ang="0">
+                <a:pos x="T4" y="T5"/>
+              </a:cxn>
+              <a:cxn ang="0">
+                <a:pos x="T6" y="T7"/>
+              </a:cxn>
+              <a:cxn ang="0">
+                <a:pos x="T8" y="T9"/>
+              </a:cxn>
+              <a:cxn ang="0">
+                <a:pos x="T10" y="T11"/>
+              </a:cxn>
+              <a:cxn ang="0">
+                <a:pos x="T12" y="T13"/>
+              </a:cxn>
+              <a:cxn ang="0">
+                <a:pos x="T14" y="T15"/>
+              </a:cxn>
+            </a:cxnLst>
+            <a:rect l="T16" t="T17" r="T18" b="T19"/>
+            <a:pathLst>
+              <a:path w="21600" h="21600" extrusionOk="0">
+                <a:moveTo>
+                  <a:pt x="3362" y="0"/>
+                </a:moveTo>
+                <a:lnTo>
+                  <a:pt x="18327" y="0"/>
+                </a:lnTo>
+                <a:lnTo>
+                  <a:pt x="18327" y="14347"/>
+                </a:lnTo>
+                <a:lnTo>
+                  <a:pt x="3362" y="14347"/>
+                </a:lnTo>
+                <a:lnTo>
+                  <a:pt x="3362" y="0"/>
+                </a:lnTo>
+                <a:close/>
+              </a:path>
+              <a:path w="21600" h="21600" extrusionOk="0">
+                <a:moveTo>
+                  <a:pt x="3340" y="15068"/>
+                </a:moveTo>
+                <a:lnTo>
+                  <a:pt x="0" y="19877"/>
+                </a:lnTo>
+                <a:lnTo>
+                  <a:pt x="21600" y="19877"/>
+                </a:lnTo>
+                <a:lnTo>
+                  <a:pt x="18327" y="15068"/>
+                </a:lnTo>
+                <a:lnTo>
+                  <a:pt x="3340" y="15068"/>
+                </a:lnTo>
+                <a:close/>
+              </a:path>
+              <a:path w="21600" h="21600" extrusionOk="0">
+                <a:moveTo>
+                  <a:pt x="0" y="19877"/>
+                </a:moveTo>
+                <a:lnTo>
+                  <a:pt x="0" y="21600"/>
+                </a:lnTo>
+                <a:lnTo>
+                  <a:pt x="21600" y="21600"/>
+                </a:lnTo>
+                <a:lnTo>
+                  <a:pt x="21600" y="19877"/>
+                </a:lnTo>
+                <a:lnTo>
+                  <a:pt x="0" y="19877"/>
+                </a:lnTo>
+                <a:close/>
+              </a:path>
+              <a:path w="21600" h="21600" extrusionOk="0">
+                <a:moveTo>
+                  <a:pt x="4186" y="1523"/>
+                </a:moveTo>
+                <a:lnTo>
+                  <a:pt x="17547" y="1523"/>
+                </a:lnTo>
+                <a:lnTo>
+                  <a:pt x="17547" y="12744"/>
+                </a:lnTo>
+                <a:lnTo>
+                  <a:pt x="4186" y="12744"/>
+                </a:lnTo>
+                <a:lnTo>
+                  <a:pt x="4186" y="1523"/>
+                </a:lnTo>
+                <a:close/>
+              </a:path>
+              <a:path w="21600" h="21600" extrusionOk="0">
+                <a:moveTo>
+                  <a:pt x="3318" y="15549"/>
+                </a:moveTo>
+                <a:lnTo>
+                  <a:pt x="2917" y="16110"/>
+                </a:lnTo>
+                <a:lnTo>
+                  <a:pt x="18727" y="16110"/>
+                </a:lnTo>
+                <a:lnTo>
+                  <a:pt x="18327" y="15549"/>
+                </a:lnTo>
+                <a:lnTo>
+                  <a:pt x="3318" y="15549"/>
+                </a:lnTo>
+                <a:close/>
+              </a:path>
+              <a:path w="21600" h="21600" extrusionOk="0">
+                <a:moveTo>
+                  <a:pt x="6213" y="18314"/>
+                </a:moveTo>
+                <a:lnTo>
+                  <a:pt x="5946" y="18875"/>
+                </a:lnTo>
+                <a:lnTo>
+                  <a:pt x="15766" y="18875"/>
+                </a:lnTo>
+                <a:lnTo>
+                  <a:pt x="15499" y="18314"/>
+                </a:lnTo>
+                <a:lnTo>
+                  <a:pt x="6213" y="18314"/>
+                </a:lnTo>
+                <a:close/>
+              </a:path>
+              <a:path w="21600" h="21600" extrusionOk="0">
+                <a:moveTo>
+                  <a:pt x="2828" y="16471"/>
+                </a:moveTo>
+                <a:lnTo>
+                  <a:pt x="2405" y="17072"/>
+                </a:lnTo>
+                <a:lnTo>
+                  <a:pt x="19284" y="17072"/>
+                </a:lnTo>
+                <a:lnTo>
+                  <a:pt x="18839" y="16471"/>
+                </a:lnTo>
+                <a:lnTo>
+                  <a:pt x="2828" y="16471"/>
+                </a:lnTo>
+                <a:close/>
+              </a:path>
+              <a:path w="21600" h="21600" extrusionOk="0">
+                <a:moveTo>
+                  <a:pt x="2316" y="17352"/>
+                </a:moveTo>
+                <a:lnTo>
+                  <a:pt x="1871" y="17953"/>
+                </a:lnTo>
+                <a:lnTo>
+                  <a:pt x="19863" y="17953"/>
+                </a:lnTo>
+                <a:lnTo>
+                  <a:pt x="19395" y="17352"/>
+                </a:lnTo>
+                <a:lnTo>
+                  <a:pt x="2316" y="17352"/>
+                </a:lnTo>
+                <a:close/>
+              </a:path>
+            </a:pathLst>
+          </a:custGeom>
+          <a:solidFill>
+            <a:schemeClr val="bg1"/>
+          </a:solidFill>
+          <a:ln w="38100">
+            <a:solidFill>
+              <a:schemeClr val="bg1">
+                <a:lumMod val="85000"/>
+              </a:schemeClr>
+            </a:solidFill>
+            <a:miter lim="800000"/>
+            <a:headEnd/>
+            <a:tailEnd/>
+          </a:ln>
+        </p:spPr>
+        <p:txBody>
+          <a:bodyPr vert="horz" wrap="square" lIns="91440" tIns="45720" rIns="91440" bIns="45720" numCol="1" anchor="t" anchorCtr="0" compatLnSpc="1">
+            <a:prstTxWarp prst="textNoShape">
+              <a:avLst/>
+            </a:prstTxWarp>
+          </a:bodyPr>
+          <a:lstStyle/>
+          <a:p>
+            <a:endParaRPr lang="en-US"/>
+          </a:p>
+        </p:txBody>
+      </p:sp>
+      <p:sp>
+        <p:nvSpPr>
+          <p:cNvPr id="80" name="Cloud 79"/>
           <p:cNvSpPr/>
           <p:nvPr/>
         </p:nvSpPr>
         <p:spPr>
           <a:xfrm>
-            <a:off x="3482181" y="3947319"/>
+            <a:off x="7941267" y="1350987"/>
+            <a:ext cx="1186265" cy="462732"/>
+          </a:xfrm>
+          <a:prstGeom prst="cloud">
+            <a:avLst/>
+          </a:prstGeom>
+          <a:solidFill>
+            <a:schemeClr val="bg1"/>
+          </a:solidFill>
+          <a:ln>
+            <a:solidFill>
+              <a:schemeClr val="bg1">
+                <a:lumMod val="85000"/>
+              </a:schemeClr>
+            </a:solidFill>
+          </a:ln>
+        </p:spPr>
+        <p:style>
+          <a:lnRef idx="2">
+            <a:schemeClr val="accent1">
+              <a:shade val="50000"/>
+            </a:schemeClr>
+          </a:lnRef>
+          <a:fillRef idx="1">
+            <a:schemeClr val="accent1"/>
+          </a:fillRef>
+          <a:effectRef idx="0">
+            <a:schemeClr val="accent1"/>
+          </a:effectRef>
+          <a:fontRef idx="minor">
+            <a:schemeClr val="lt1"/>
+          </a:fontRef>
+        </p:style>
+        <p:txBody>
+          <a:bodyPr lIns="0" rIns="0" bIns="0" rtlCol="0" anchor="ctr"/>
+          <a:lstStyle/>
+          <a:p>
+            <a:pPr algn="ctr"/>
+            <a:r>
+              <a:rPr lang="en-US" sz="1400" b="1" dirty="0" err="1">
+                <a:solidFill>
+                  <a:schemeClr val="bg1">
+                    <a:lumMod val="65000"/>
+                  </a:schemeClr>
+                </a:solidFill>
+              </a:rPr>
+              <a:t>Appspot</a:t>
+            </a:r>
+            <a:endParaRPr lang="en-US" sz="1400" b="1" dirty="0">
+              <a:solidFill>
+                <a:schemeClr val="bg1">
+                  <a:lumMod val="65000"/>
+                </a:schemeClr>
+              </a:solidFill>
+            </a:endParaRPr>
+          </a:p>
+        </p:txBody>
+      </p:sp>
+      <p:sp>
+        <p:nvSpPr>
+          <p:cNvPr id="81" name="Cloud 80"/>
+          <p:cNvSpPr/>
+          <p:nvPr/>
+        </p:nvSpPr>
+        <p:spPr>
+          <a:xfrm>
+            <a:off x="5476710" y="1432719"/>
+            <a:ext cx="1609890" cy="462732"/>
+          </a:xfrm>
+          <a:prstGeom prst="cloud">
+            <a:avLst/>
+          </a:prstGeom>
+          <a:solidFill>
+            <a:schemeClr val="bg1"/>
+          </a:solidFill>
+          <a:ln>
+            <a:solidFill>
+              <a:schemeClr val="bg1">
+                <a:lumMod val="85000"/>
+              </a:schemeClr>
+            </a:solidFill>
+          </a:ln>
+        </p:spPr>
+        <p:style>
+          <a:lnRef idx="2">
+            <a:schemeClr val="accent1">
+              <a:shade val="50000"/>
+            </a:schemeClr>
+          </a:lnRef>
+          <a:fillRef idx="1">
+            <a:schemeClr val="accent1"/>
+          </a:fillRef>
+          <a:effectRef idx="0">
+            <a:schemeClr val="accent1"/>
+          </a:effectRef>
+          <a:fontRef idx="minor">
+            <a:schemeClr val="lt1"/>
+          </a:fontRef>
+        </p:style>
+        <p:txBody>
+          <a:bodyPr lIns="0" rIns="0" bIns="0" rtlCol="0" anchor="ctr"/>
+          <a:lstStyle/>
+          <a:p>
+            <a:pPr algn="ctr"/>
+            <a:r>
+              <a:rPr lang="en-US" sz="1400" b="1" dirty="0" err="1" smtClean="0">
+                <a:solidFill>
+                  <a:schemeClr val="bg1">
+                    <a:lumMod val="65000"/>
+                  </a:schemeClr>
+                </a:solidFill>
+              </a:rPr>
+              <a:t>GoogleCode</a:t>
+            </a:r>
+            <a:endParaRPr lang="en-US" sz="1400" b="1" dirty="0">
+              <a:solidFill>
+                <a:schemeClr val="bg1">
+                  <a:lumMod val="65000"/>
+                </a:schemeClr>
+              </a:solidFill>
+            </a:endParaRPr>
+          </a:p>
+        </p:txBody>
+      </p:sp>
+      <p:sp>
+        <p:nvSpPr>
+          <p:cNvPr id="82" name="Cloud 81"/>
+          <p:cNvSpPr/>
+          <p:nvPr/>
+        </p:nvSpPr>
+        <p:spPr>
+          <a:xfrm>
+            <a:off x="2895600" y="1432719"/>
+            <a:ext cx="1609890" cy="462732"/>
+          </a:xfrm>
+          <a:prstGeom prst="cloud">
+            <a:avLst/>
+          </a:prstGeom>
+          <a:solidFill>
+            <a:schemeClr val="bg1"/>
+          </a:solidFill>
+          <a:ln>
+            <a:solidFill>
+              <a:schemeClr val="bg1">
+                <a:lumMod val="85000"/>
+              </a:schemeClr>
+            </a:solidFill>
+          </a:ln>
+        </p:spPr>
+        <p:style>
+          <a:lnRef idx="2">
+            <a:schemeClr val="accent1">
+              <a:shade val="50000"/>
+            </a:schemeClr>
+          </a:lnRef>
+          <a:fillRef idx="1">
+            <a:schemeClr val="accent1"/>
+          </a:fillRef>
+          <a:effectRef idx="0">
+            <a:schemeClr val="accent1"/>
+          </a:effectRef>
+          <a:fontRef idx="minor">
+            <a:schemeClr val="lt1"/>
+          </a:fontRef>
+        </p:style>
+        <p:txBody>
+          <a:bodyPr lIns="0" rIns="0" bIns="0" rtlCol="0" anchor="ctr"/>
+          <a:lstStyle/>
+          <a:p>
+            <a:pPr algn="ctr"/>
+            <a:r>
+              <a:rPr lang="en-US" sz="1400" b="1" dirty="0" err="1" smtClean="0">
+                <a:solidFill>
+                  <a:schemeClr val="bg1">
+                    <a:lumMod val="65000"/>
+                  </a:schemeClr>
+                </a:solidFill>
+              </a:rPr>
+              <a:t>GoogleCode</a:t>
+            </a:r>
+            <a:endParaRPr lang="en-US" sz="1400" b="1" dirty="0">
+              <a:solidFill>
+                <a:schemeClr val="bg1">
+                  <a:lumMod val="65000"/>
+                </a:schemeClr>
+              </a:solidFill>
+            </a:endParaRPr>
+          </a:p>
+        </p:txBody>
+      </p:sp>
+      <p:sp>
+        <p:nvSpPr>
+          <p:cNvPr id="83" name="Rounded Rectangle 82"/>
+          <p:cNvSpPr/>
+          <p:nvPr/>
+        </p:nvSpPr>
+        <p:spPr>
+          <a:xfrm>
+            <a:off x="3962400" y="3947319"/>
             <a:ext cx="5029200" cy="1737518"/>
           </a:xfrm>
           <a:prstGeom prst="roundRect">
@@ -3559,28 +3995,27 @@
       </p:sp>
       <p:sp>
         <p:nvSpPr>
-          <p:cNvPr id="58" name="Can 57"/>
+          <p:cNvPr id="84" name="Can 83"/>
           <p:cNvSpPr/>
           <p:nvPr/>
         </p:nvSpPr>
         <p:spPr>
           <a:xfrm>
-            <a:off x="2491581" y="826096"/>
-            <a:ext cx="1066800" cy="762000"/>
+            <a:off x="3200400" y="826096"/>
+            <a:ext cx="1184858" cy="762000"/>
           </a:xfrm>
           <a:prstGeom prst="can">
             <a:avLst/>
           </a:prstGeom>
           <a:solidFill>
-            <a:schemeClr val="bg1">
-              <a:lumMod val="65000"/>
+            <a:schemeClr val="accent2">
+              <a:lumMod val="60000"/>
+              <a:lumOff val="40000"/>
             </a:schemeClr>
           </a:solidFill>
           <a:ln>
             <a:solidFill>
-              <a:schemeClr val="bg1">
-                <a:lumMod val="65000"/>
-              </a:schemeClr>
+              <a:srgbClr val="D28280"/>
             </a:solidFill>
           </a:ln>
         </p:spPr>
@@ -3606,44 +4041,43 @@
           <a:p>
             <a:pPr algn="ctr"/>
             <a:r>
-              <a:rPr lang="en-US" sz="1600" b="1" dirty="0" smtClean="0"/>
-              <a:t>Review</a:t>
+              <a:rPr lang="en-US" sz="1600" b="1" dirty="0"/>
+              <a:t>Contributor</a:t>
             </a:r>
           </a:p>
           <a:p>
             <a:pPr algn="ctr"/>
             <a:r>
-              <a:rPr lang="en-US" sz="1600" dirty="0" smtClean="0"/>
+              <a:rPr lang="en-US" sz="1600" b="1" dirty="0"/>
               <a:t>Repo</a:t>
             </a:r>
-            <a:endParaRPr lang="en-US" sz="1600" dirty="0"/>
-          </a:p>
-        </p:txBody>
-      </p:sp>
-      <p:sp>
-        <p:nvSpPr>
-          <p:cNvPr id="59" name="Can 58"/>
+            <a:endParaRPr lang="en-US" sz="1600" b="1" dirty="0"/>
+          </a:p>
+        </p:txBody>
+      </p:sp>
+      <p:sp>
+        <p:nvSpPr>
+          <p:cNvPr id="85" name="Can 84"/>
           <p:cNvSpPr/>
           <p:nvPr/>
         </p:nvSpPr>
         <p:spPr>
           <a:xfrm>
-            <a:off x="4929981" y="826096"/>
-            <a:ext cx="1066800" cy="762000"/>
+            <a:off x="5853514" y="826096"/>
+            <a:ext cx="1107933" cy="762000"/>
           </a:xfrm>
           <a:prstGeom prst="can">
             <a:avLst/>
           </a:prstGeom>
           <a:solidFill>
-            <a:schemeClr val="bg1">
-              <a:lumMod val="65000"/>
+            <a:schemeClr val="accent2">
+              <a:lumMod val="60000"/>
+              <a:lumOff val="40000"/>
             </a:schemeClr>
           </a:solidFill>
           <a:ln>
             <a:solidFill>
-              <a:schemeClr val="bg1">
-                <a:lumMod val="65000"/>
-              </a:schemeClr>
+              <a:srgbClr val="D28280"/>
             </a:solidFill>
           </a:ln>
         </p:spPr>
@@ -3670,8 +4104,9 @@
             <a:pPr algn="ctr"/>
             <a:r>
               <a:rPr lang="en-US" sz="1600" b="1" dirty="0" smtClean="0"/>
-              <a:t>Release</a:t>
-            </a:r>
+              <a:t>Committer</a:t>
+            </a:r>
+            <a:endParaRPr lang="en-US" sz="1600" b="1" dirty="0" smtClean="0"/>
           </a:p>
           <a:p>
             <a:pPr algn="ctr"/>
@@ -3684,7 +4119,7 @@
       </p:sp>
       <p:pic>
         <p:nvPicPr>
-          <p:cNvPr id="2050" name="Picture 2" descr="http://screenshots.en.sftcdn.net/en/scrn/70000/70210/google-app-engine-1.jpg"/>
+          <p:cNvPr id="86" name="Picture 2" descr="http://screenshots.en.sftcdn.net/en/scrn/70000/70210/google-app-engine-1.jpg"/>
           <p:cNvPicPr>
             <a:picLocks noChangeAspect="1" noChangeArrowheads="1"/>
           </p:cNvPicPr>
@@ -3702,7 +4137,13 @@
                 </a:srgbClr>
               </a:clrTo>
             </a:clrChange>
-            <a:grayscl/>
+            <a:duotone>
+              <a:schemeClr val="accent2">
+                <a:shade val="45000"/>
+                <a:satMod val="135000"/>
+              </a:schemeClr>
+              <a:prstClr val="white"/>
+            </a:duotone>
           </a:blip>
           <a:srcRect/>
           <a:stretch>
@@ -3711,7 +4152,7 @@
         </p:blipFill>
         <p:spPr bwMode="auto">
           <a:xfrm>
-            <a:off x="7349331" y="597496"/>
+            <a:off x="8058150" y="597496"/>
             <a:ext cx="1085850" cy="1085850"/>
           </a:xfrm>
           <a:prstGeom prst="rect">
@@ -3722,13 +4163,13 @@
       </p:pic>
       <p:grpSp>
         <p:nvGrpSpPr>
-          <p:cNvPr id="65" name="Group 64"/>
+          <p:cNvPr id="87" name="Group 86"/>
           <p:cNvGrpSpPr/>
           <p:nvPr/>
         </p:nvGrpSpPr>
         <p:grpSpPr>
           <a:xfrm>
-            <a:off x="434181" y="902296"/>
+            <a:off x="304800" y="902296"/>
             <a:ext cx="304800" cy="533400"/>
             <a:chOff x="2339181" y="3718719"/>
             <a:chExt cx="304800" cy="533400"/>
@@ -3742,7 +4183,7 @@
         </p:grpSpPr>
         <p:sp>
           <p:nvSpPr>
-            <p:cNvPr id="63" name="Flowchart: Connector 62"/>
+            <p:cNvPr id="88" name="Flowchart: Connector 87"/>
             <p:cNvSpPr/>
             <p:nvPr/>
           </p:nvSpPr>
@@ -3788,7 +4229,7 @@
         </p:sp>
         <p:sp>
           <p:nvSpPr>
-            <p:cNvPr id="64" name="Flowchart: Delay 63"/>
+            <p:cNvPr id="89" name="Flowchart: Delay 88"/>
             <p:cNvSpPr/>
             <p:nvPr/>
           </p:nvSpPr>
@@ -3835,13 +4276,13 @@
       </p:grpSp>
       <p:grpSp>
         <p:nvGrpSpPr>
-          <p:cNvPr id="68" name="Group 67"/>
+          <p:cNvPr id="90" name="Group 89"/>
           <p:cNvGrpSpPr/>
           <p:nvPr/>
         </p:nvGrpSpPr>
         <p:grpSpPr>
           <a:xfrm>
-            <a:off x="2415381" y="2578696"/>
+            <a:off x="3200400" y="2847777"/>
             <a:ext cx="304800" cy="533400"/>
             <a:chOff x="2339181" y="3718719"/>
             <a:chExt cx="304800" cy="533400"/>
@@ -3849,7 +4290,7 @@
         </p:grpSpPr>
         <p:sp>
           <p:nvSpPr>
-            <p:cNvPr id="69" name="Flowchart: Connector 68"/>
+            <p:cNvPr id="91" name="Flowchart: Connector 90"/>
             <p:cNvSpPr/>
             <p:nvPr/>
           </p:nvSpPr>
@@ -3889,7 +4330,7 @@
         </p:sp>
         <p:sp>
           <p:nvSpPr>
-            <p:cNvPr id="70" name="Flowchart: Delay 69"/>
+            <p:cNvPr id="93" name="Flowchart: Delay 92"/>
             <p:cNvSpPr/>
             <p:nvPr/>
           </p:nvSpPr>
@@ -3930,13 +4371,13 @@
       </p:grpSp>
       <p:sp>
         <p:nvSpPr>
-          <p:cNvPr id="71" name="TextBox 70"/>
+          <p:cNvPr id="94" name="TextBox 93"/>
           <p:cNvSpPr txBox="1"/>
           <p:nvPr/>
         </p:nvSpPr>
         <p:spPr>
           <a:xfrm>
-            <a:off x="2110581" y="3185319"/>
+            <a:off x="2895600" y="3454400"/>
             <a:ext cx="914400" cy="340519"/>
           </a:xfrm>
           <a:prstGeom prst="roundRect">
@@ -3973,13 +4414,13 @@
       </p:sp>
       <p:grpSp>
         <p:nvGrpSpPr>
-          <p:cNvPr id="72" name="Group 71"/>
+          <p:cNvPr id="95" name="Group 94"/>
           <p:cNvGrpSpPr/>
           <p:nvPr/>
         </p:nvGrpSpPr>
         <p:grpSpPr>
           <a:xfrm>
-            <a:off x="4167981" y="2578696"/>
+            <a:off x="4953000" y="2847777"/>
             <a:ext cx="304800" cy="533400"/>
             <a:chOff x="2339181" y="3718719"/>
             <a:chExt cx="304800" cy="533400"/>
@@ -3987,7 +4428,7 @@
         </p:grpSpPr>
         <p:sp>
           <p:nvSpPr>
-            <p:cNvPr id="73" name="Flowchart: Connector 72"/>
+            <p:cNvPr id="96" name="Flowchart: Connector 95"/>
             <p:cNvSpPr/>
             <p:nvPr/>
           </p:nvSpPr>
@@ -4027,7 +4468,7 @@
         </p:sp>
         <p:sp>
           <p:nvSpPr>
-            <p:cNvPr id="74" name="Flowchart: Delay 73"/>
+            <p:cNvPr id="100" name="Flowchart: Delay 99"/>
             <p:cNvSpPr/>
             <p:nvPr/>
           </p:nvSpPr>
@@ -4068,13 +4509,13 @@
       </p:grpSp>
       <p:sp>
         <p:nvSpPr>
-          <p:cNvPr id="75" name="TextBox 74"/>
+          <p:cNvPr id="101" name="TextBox 100"/>
           <p:cNvSpPr txBox="1"/>
           <p:nvPr/>
         </p:nvSpPr>
         <p:spPr>
           <a:xfrm>
-            <a:off x="3863181" y="3185319"/>
+            <a:off x="4648200" y="3454400"/>
             <a:ext cx="1066800" cy="340519"/>
           </a:xfrm>
           <a:prstGeom prst="roundRect">
@@ -4104,13 +4545,13 @@
       </p:sp>
       <p:grpSp>
         <p:nvGrpSpPr>
-          <p:cNvPr id="76" name="Group 75"/>
+          <p:cNvPr id="104" name="Group 103"/>
           <p:cNvGrpSpPr/>
           <p:nvPr/>
         </p:nvGrpSpPr>
         <p:grpSpPr>
           <a:xfrm>
-            <a:off x="6682581" y="2578696"/>
+            <a:off x="7467600" y="2847777"/>
             <a:ext cx="304800" cy="533400"/>
             <a:chOff x="2339181" y="3718719"/>
             <a:chExt cx="304800" cy="533400"/>
@@ -4118,7 +4559,7 @@
         </p:grpSpPr>
         <p:sp>
           <p:nvSpPr>
-            <p:cNvPr id="77" name="Flowchart: Connector 76"/>
+            <p:cNvPr id="105" name="Flowchart: Connector 104"/>
             <p:cNvSpPr/>
             <p:nvPr/>
           </p:nvSpPr>
@@ -4158,7 +4599,7 @@
         </p:sp>
         <p:sp>
           <p:nvSpPr>
-            <p:cNvPr id="78" name="Flowchart: Delay 77"/>
+            <p:cNvPr id="106" name="Flowchart: Delay 105"/>
             <p:cNvSpPr/>
             <p:nvPr/>
           </p:nvSpPr>
@@ -4199,13 +4640,13 @@
       </p:grpSp>
       <p:sp>
         <p:nvSpPr>
-          <p:cNvPr id="79" name="TextBox 78"/>
+          <p:cNvPr id="108" name="TextBox 107"/>
           <p:cNvSpPr txBox="1"/>
           <p:nvPr/>
         </p:nvSpPr>
         <p:spPr>
           <a:xfrm>
-            <a:off x="6576237" y="3185319"/>
+            <a:off x="7361256" y="3454400"/>
             <a:ext cx="533400" cy="340519"/>
           </a:xfrm>
           <a:prstGeom prst="roundRect">
@@ -4237,13 +4678,13 @@
       </p:sp>
       <p:sp>
         <p:nvSpPr>
-          <p:cNvPr id="92" name="TextBox 91"/>
+          <p:cNvPr id="109" name="TextBox 108"/>
           <p:cNvSpPr txBox="1"/>
           <p:nvPr/>
         </p:nvSpPr>
         <p:spPr>
           <a:xfrm>
-            <a:off x="205581" y="1552377"/>
+            <a:off x="76200" y="1552377"/>
             <a:ext cx="533400" cy="340519"/>
           </a:xfrm>
           <a:prstGeom prst="roundRect">
@@ -4272,14 +4713,14 @@
       </p:sp>
       <p:sp>
         <p:nvSpPr>
-          <p:cNvPr id="97" name="TextBox 96"/>
+          <p:cNvPr id="110" name="TextBox 109"/>
           <p:cNvSpPr txBox="1"/>
           <p:nvPr/>
         </p:nvSpPr>
         <p:spPr>
           <a:xfrm>
-            <a:off x="738981" y="137319"/>
-            <a:ext cx="762000" cy="307777"/>
+            <a:off x="1523999" y="-15081"/>
+            <a:ext cx="1533097" cy="307777"/>
           </a:xfrm>
           <a:prstGeom prst="rect">
             <a:avLst/>
@@ -4298,7 +4739,15 @@
                   <a:srgbClr val="00B050"/>
                 </a:solidFill>
               </a:rPr>
-              <a:t>1. pull</a:t>
+              <a:t>1. </a:t>
+            </a:r>
+            <a:r>
+              <a:rPr lang="en-US" sz="1400" b="1" dirty="0" smtClean="0">
+                <a:solidFill>
+                  <a:srgbClr val="00B050"/>
+                </a:solidFill>
+              </a:rPr>
+              <a:t>pull</a:t>
             </a:r>
             <a:endParaRPr lang="en-US" sz="1400" b="1" dirty="0">
               <a:solidFill>
@@ -4310,13 +4759,13 @@
       </p:sp>
       <p:sp>
         <p:nvSpPr>
-          <p:cNvPr id="98" name="Arc 97"/>
+          <p:cNvPr id="112" name="Arc 111"/>
           <p:cNvSpPr/>
           <p:nvPr/>
         </p:nvSpPr>
         <p:spPr>
           <a:xfrm>
-            <a:off x="662781" y="978496"/>
+            <a:off x="1447800" y="978496"/>
             <a:ext cx="381000" cy="304800"/>
           </a:xfrm>
           <a:prstGeom prst="arc">
@@ -4358,13 +4807,13 @@
       </p:sp>
       <p:sp>
         <p:nvSpPr>
-          <p:cNvPr id="99" name="TextBox 98"/>
+          <p:cNvPr id="114" name="TextBox 113"/>
           <p:cNvSpPr txBox="1"/>
           <p:nvPr/>
         </p:nvSpPr>
         <p:spPr>
           <a:xfrm>
-            <a:off x="1119981" y="749896"/>
+            <a:off x="1905000" y="749896"/>
             <a:ext cx="990600" cy="646331"/>
           </a:xfrm>
           <a:prstGeom prst="rect">
@@ -4421,13 +4870,13 @@
       </p:sp>
       <p:sp>
         <p:nvSpPr>
-          <p:cNvPr id="102" name="TextBox 101"/>
+          <p:cNvPr id="127" name="TextBox 126"/>
           <p:cNvSpPr txBox="1"/>
           <p:nvPr/>
         </p:nvSpPr>
         <p:spPr>
           <a:xfrm>
-            <a:off x="1119981" y="2154238"/>
+            <a:off x="1905000" y="2619104"/>
             <a:ext cx="685800" cy="215444"/>
           </a:xfrm>
           <a:prstGeom prst="rect">
@@ -4459,13 +4908,13 @@
       </p:sp>
       <p:cxnSp>
         <p:nvCxnSpPr>
-          <p:cNvPr id="103" name="Straight Arrow Connector 102"/>
+          <p:cNvPr id="128" name="Straight Arrow Connector 127"/>
           <p:cNvCxnSpPr/>
           <p:nvPr/>
         </p:nvCxnSpPr>
         <p:spPr>
           <a:xfrm flipV="1">
-            <a:off x="2567781" y="1773238"/>
+            <a:off x="3352800" y="2042319"/>
             <a:ext cx="228600" cy="685800"/>
           </a:xfrm>
           <a:prstGeom prst="straightConnector1">
@@ -4497,13 +4946,13 @@
       </p:cxnSp>
       <p:sp>
         <p:nvSpPr>
-          <p:cNvPr id="107" name="TextBox 106"/>
+          <p:cNvPr id="129" name="TextBox 128"/>
           <p:cNvSpPr txBox="1"/>
           <p:nvPr/>
         </p:nvSpPr>
         <p:spPr>
           <a:xfrm rot="17318509">
-            <a:off x="2087118" y="1989319"/>
+            <a:off x="2872137" y="2258400"/>
             <a:ext cx="843775" cy="215444"/>
           </a:xfrm>
           <a:prstGeom prst="rect">
@@ -4539,13 +4988,13 @@
       </p:sp>
       <p:sp>
         <p:nvSpPr>
-          <p:cNvPr id="111" name="Arc 110"/>
+          <p:cNvPr id="130" name="Arc 129"/>
           <p:cNvSpPr/>
           <p:nvPr/>
         </p:nvSpPr>
         <p:spPr>
           <a:xfrm>
-            <a:off x="738981" y="216496"/>
+            <a:off x="1524000" y="216496"/>
             <a:ext cx="4419600" cy="1219200"/>
           </a:xfrm>
           <a:prstGeom prst="arc">
@@ -4587,14 +5036,14 @@
       </p:sp>
       <p:sp>
         <p:nvSpPr>
-          <p:cNvPr id="113" name="Arc 112"/>
+          <p:cNvPr id="131" name="Arc 130"/>
           <p:cNvSpPr/>
           <p:nvPr/>
         </p:nvSpPr>
         <p:spPr>
           <a:xfrm flipV="1">
-            <a:off x="815181" y="1359496"/>
-            <a:ext cx="1600200" cy="718542"/>
+            <a:off x="1563511" y="1529307"/>
+            <a:ext cx="1600200" cy="1025723"/>
           </a:xfrm>
           <a:prstGeom prst="arc">
             <a:avLst>
@@ -4635,13 +5084,13 @@
       </p:sp>
       <p:sp>
         <p:nvSpPr>
-          <p:cNvPr id="115" name="Arc 114"/>
+          <p:cNvPr id="134" name="Arc 133"/>
           <p:cNvSpPr/>
           <p:nvPr/>
         </p:nvSpPr>
         <p:spPr>
           <a:xfrm rot="2715976" flipV="1">
-            <a:off x="2998146" y="1853413"/>
+            <a:off x="3783165" y="2018071"/>
             <a:ext cx="1356586" cy="381000"/>
           </a:xfrm>
           <a:prstGeom prst="arc">
@@ -4683,13 +5132,13 @@
       </p:sp>
       <p:sp>
         <p:nvSpPr>
-          <p:cNvPr id="116" name="TextBox 115"/>
+          <p:cNvPr id="135" name="TextBox 134"/>
           <p:cNvSpPr txBox="1"/>
           <p:nvPr/>
         </p:nvSpPr>
         <p:spPr>
           <a:xfrm rot="2360287">
-            <a:off x="3177381" y="2273896"/>
+            <a:off x="3962400" y="2542977"/>
             <a:ext cx="685800" cy="215444"/>
           </a:xfrm>
           <a:prstGeom prst="rect">
@@ -4721,13 +5170,13 @@
       </p:sp>
       <p:sp>
         <p:nvSpPr>
-          <p:cNvPr id="117" name="Arc 116"/>
+          <p:cNvPr id="136" name="Arc 135"/>
           <p:cNvSpPr/>
           <p:nvPr/>
         </p:nvSpPr>
         <p:spPr>
           <a:xfrm rot="16709798">
-            <a:off x="4156356" y="2332422"/>
+            <a:off x="4941375" y="2601503"/>
             <a:ext cx="381000" cy="304800"/>
           </a:xfrm>
           <a:prstGeom prst="arc">
@@ -4773,13 +5222,13 @@
       </p:sp>
       <p:sp>
         <p:nvSpPr>
-          <p:cNvPr id="118" name="TextBox 117"/>
+          <p:cNvPr id="137" name="TextBox 136"/>
           <p:cNvSpPr txBox="1"/>
           <p:nvPr/>
         </p:nvSpPr>
         <p:spPr>
           <a:xfrm>
-            <a:off x="4091781" y="1816696"/>
+            <a:off x="4876800" y="2085777"/>
             <a:ext cx="838200" cy="430887"/>
           </a:xfrm>
           <a:prstGeom prst="rect">
@@ -4826,13 +5275,13 @@
       </p:sp>
       <p:sp>
         <p:nvSpPr>
-          <p:cNvPr id="119" name="Arc 118"/>
+          <p:cNvPr id="140" name="Arc 139"/>
           <p:cNvSpPr/>
           <p:nvPr/>
         </p:nvSpPr>
         <p:spPr>
           <a:xfrm rot="19019392" flipV="1">
-            <a:off x="4344224" y="1923378"/>
+            <a:off x="5129243" y="2088036"/>
             <a:ext cx="1356586" cy="381000"/>
           </a:xfrm>
           <a:prstGeom prst="arc">
@@ -4874,13 +5323,13 @@
       </p:sp>
       <p:sp>
         <p:nvSpPr>
-          <p:cNvPr id="120" name="TextBox 119"/>
+          <p:cNvPr id="141" name="TextBox 140"/>
           <p:cNvSpPr txBox="1"/>
           <p:nvPr/>
         </p:nvSpPr>
         <p:spPr>
           <a:xfrm rot="18996887">
-            <a:off x="5009792" y="2290249"/>
+            <a:off x="5695298" y="2559330"/>
             <a:ext cx="685800" cy="215444"/>
           </a:xfrm>
           <a:prstGeom prst="rect">
@@ -4912,13 +5361,13 @@
       </p:sp>
       <p:sp>
         <p:nvSpPr>
-          <p:cNvPr id="121" name="Arc 120"/>
+          <p:cNvPr id="142" name="Arc 141"/>
           <p:cNvSpPr/>
           <p:nvPr/>
         </p:nvSpPr>
         <p:spPr>
           <a:xfrm rot="2715976" flipV="1">
-            <a:off x="5515779" y="1794935"/>
+            <a:off x="6300798" y="1959593"/>
             <a:ext cx="1356586" cy="381000"/>
           </a:xfrm>
           <a:prstGeom prst="arc">
@@ -4960,13 +5409,13 @@
       </p:sp>
       <p:sp>
         <p:nvSpPr>
-          <p:cNvPr id="122" name="TextBox 121"/>
+          <p:cNvPr id="143" name="TextBox 142"/>
           <p:cNvSpPr txBox="1"/>
           <p:nvPr/>
         </p:nvSpPr>
         <p:spPr>
           <a:xfrm rot="1991192">
-            <a:off x="5695014" y="2215418"/>
+            <a:off x="6480033" y="2484499"/>
             <a:ext cx="685800" cy="215444"/>
           </a:xfrm>
           <a:prstGeom prst="rect">
@@ -4998,13 +5447,13 @@
       </p:sp>
       <p:sp>
         <p:nvSpPr>
-          <p:cNvPr id="123" name="Arc 122"/>
+          <p:cNvPr id="148" name="Arc 147"/>
           <p:cNvSpPr/>
           <p:nvPr/>
         </p:nvSpPr>
         <p:spPr>
           <a:xfrm rot="16709798">
-            <a:off x="6673989" y="2273944"/>
+            <a:off x="7459008" y="2543025"/>
             <a:ext cx="381000" cy="304800"/>
           </a:xfrm>
           <a:prstGeom prst="arc">
@@ -5046,13 +5495,13 @@
       </p:sp>
       <p:sp>
         <p:nvSpPr>
-          <p:cNvPr id="124" name="TextBox 123"/>
+          <p:cNvPr id="149" name="TextBox 148"/>
           <p:cNvSpPr txBox="1"/>
           <p:nvPr/>
         </p:nvSpPr>
         <p:spPr>
           <a:xfrm>
-            <a:off x="6609414" y="1969096"/>
+            <a:off x="7394433" y="2238177"/>
             <a:ext cx="835167" cy="215444"/>
           </a:xfrm>
           <a:prstGeom prst="rect">
@@ -5084,13 +5533,13 @@
       </p:sp>
       <p:sp>
         <p:nvSpPr>
-          <p:cNvPr id="125" name="Arc 124"/>
+          <p:cNvPr id="151" name="Arc 150"/>
           <p:cNvSpPr/>
           <p:nvPr/>
         </p:nvSpPr>
         <p:spPr>
           <a:xfrm rot="19019392" flipV="1">
-            <a:off x="6861857" y="1864900"/>
+            <a:off x="7646876" y="2029558"/>
             <a:ext cx="1356586" cy="381000"/>
           </a:xfrm>
           <a:prstGeom prst="arc">
@@ -5132,13 +5581,13 @@
       </p:sp>
       <p:sp>
         <p:nvSpPr>
-          <p:cNvPr id="126" name="TextBox 125"/>
+          <p:cNvPr id="152" name="TextBox 151"/>
           <p:cNvSpPr txBox="1"/>
           <p:nvPr/>
         </p:nvSpPr>
         <p:spPr>
           <a:xfrm rot="18996887">
-            <a:off x="7506125" y="2178227"/>
+            <a:off x="8291144" y="2447308"/>
             <a:ext cx="841701" cy="215444"/>
           </a:xfrm>
           <a:prstGeom prst="rect">
@@ -5170,13 +5619,13 @@
       </p:sp>
       <p:sp>
         <p:nvSpPr>
-          <p:cNvPr id="132" name="Freeform 131"/>
+          <p:cNvPr id="153" name="Freeform 152"/>
           <p:cNvSpPr/>
           <p:nvPr/>
         </p:nvSpPr>
         <p:spPr>
           <a:xfrm>
-            <a:off x="944545" y="423418"/>
+            <a:off x="1729564" y="423418"/>
             <a:ext cx="3959051" cy="1273620"/>
           </a:xfrm>
           <a:custGeom>
@@ -5304,13 +5753,13 @@
       </p:sp>
       <p:sp>
         <p:nvSpPr>
-          <p:cNvPr id="133" name="TextBox 132"/>
+          <p:cNvPr id="155" name="TextBox 154"/>
           <p:cNvSpPr txBox="1"/>
           <p:nvPr/>
         </p:nvSpPr>
         <p:spPr>
           <a:xfrm>
-            <a:off x="1119981" y="1697038"/>
+            <a:off x="1905000" y="1697038"/>
             <a:ext cx="838200" cy="215444"/>
           </a:xfrm>
           <a:prstGeom prst="rect">
@@ -5330,7 +5779,15 @@
                   <a:srgbClr val="00B050"/>
                 </a:solidFill>
               </a:rPr>
-              <a:t>3.1 update</a:t>
+              <a:t>3.1 </a:t>
+            </a:r>
+            <a:r>
+              <a:rPr lang="en-US" sz="1400" b="1" dirty="0" smtClean="0">
+                <a:solidFill>
+                  <a:srgbClr val="00B050"/>
+                </a:solidFill>
+              </a:rPr>
+              <a:t>pull</a:t>
             </a:r>
             <a:endParaRPr lang="en-US" sz="1400" b="1" dirty="0">
               <a:solidFill>
@@ -5342,13 +5799,13 @@
       </p:sp>
       <p:cxnSp>
         <p:nvCxnSpPr>
-          <p:cNvPr id="138" name="Straight Connector 137"/>
+          <p:cNvPr id="156" name="Straight Connector 155"/>
           <p:cNvCxnSpPr/>
           <p:nvPr/>
         </p:nvCxnSpPr>
         <p:spPr>
           <a:xfrm>
-            <a:off x="4548981" y="5275460"/>
+            <a:off x="5029200" y="5275460"/>
             <a:ext cx="3657600" cy="0"/>
           </a:xfrm>
           <a:prstGeom prst="line">
@@ -5380,13 +5837,13 @@
       </p:cxnSp>
       <p:sp>
         <p:nvSpPr>
-          <p:cNvPr id="139" name="Flowchart: Connector 138"/>
+          <p:cNvPr id="157" name="Flowchart: Connector 156"/>
           <p:cNvSpPr/>
           <p:nvPr/>
         </p:nvSpPr>
         <p:spPr>
           <a:xfrm>
-            <a:off x="5082382" y="5199260"/>
+            <a:off x="5562601" y="5199260"/>
             <a:ext cx="152400" cy="152400"/>
           </a:xfrm>
           <a:prstGeom prst="flowChartConnector">
@@ -5432,13 +5889,13 @@
       </p:sp>
       <p:sp>
         <p:nvSpPr>
-          <p:cNvPr id="144" name="Flowchart: Connector 143"/>
+          <p:cNvPr id="159" name="Flowchart: Connector 158"/>
           <p:cNvSpPr/>
           <p:nvPr/>
         </p:nvSpPr>
         <p:spPr>
           <a:xfrm>
-            <a:off x="7673181" y="5199260"/>
+            <a:off x="8153400" y="5199260"/>
             <a:ext cx="152400" cy="152400"/>
           </a:xfrm>
           <a:prstGeom prst="flowChartConnector">
@@ -5472,13 +5929,13 @@
       </p:sp>
       <p:sp>
         <p:nvSpPr>
-          <p:cNvPr id="145" name="Flowchart: Connector 144"/>
+          <p:cNvPr id="161" name="Flowchart: Connector 160"/>
           <p:cNvSpPr/>
           <p:nvPr/>
         </p:nvSpPr>
         <p:spPr>
           <a:xfrm>
-            <a:off x="6453981" y="5199260"/>
+            <a:off x="6934200" y="5199260"/>
             <a:ext cx="152400" cy="152400"/>
           </a:xfrm>
           <a:prstGeom prst="flowChartConnector">
@@ -5524,13 +5981,13 @@
       </p:sp>
       <p:sp>
         <p:nvSpPr>
-          <p:cNvPr id="146" name="Flowchart: Connector 145"/>
+          <p:cNvPr id="162" name="Flowchart: Connector 161"/>
           <p:cNvSpPr/>
           <p:nvPr/>
         </p:nvSpPr>
         <p:spPr>
           <a:xfrm>
-            <a:off x="6834981" y="4589660"/>
+            <a:off x="7315200" y="4589660"/>
             <a:ext cx="152400" cy="152400"/>
           </a:xfrm>
           <a:prstGeom prst="flowChartConnector">
@@ -5575,13 +6032,13 @@
       </p:sp>
       <p:sp>
         <p:nvSpPr>
-          <p:cNvPr id="147" name="Flowchart: Connector 146"/>
+          <p:cNvPr id="164" name="Flowchart: Connector 163"/>
           <p:cNvSpPr/>
           <p:nvPr/>
         </p:nvSpPr>
         <p:spPr>
           <a:xfrm>
-            <a:off x="5615782" y="4589660"/>
+            <a:off x="6096001" y="4589660"/>
             <a:ext cx="152400" cy="152400"/>
           </a:xfrm>
           <a:prstGeom prst="flowChartConnector">
@@ -5626,16 +6083,16 @@
       </p:sp>
       <p:cxnSp>
         <p:nvCxnSpPr>
-          <p:cNvPr id="150" name="Shape 149"/>
+          <p:cNvPr id="167" name="Shape 149"/>
           <p:cNvCxnSpPr>
-            <a:stCxn id="139" idx="0"/>
-            <a:endCxn id="147" idx="2"/>
+            <a:stCxn id="157" idx="0"/>
+            <a:endCxn id="164" idx="2"/>
           </p:cNvCxnSpPr>
           <p:nvPr/>
         </p:nvCxnSpPr>
         <p:spPr>
           <a:xfrm rot="5400000" flipH="1" flipV="1">
-            <a:off x="5120482" y="4703960"/>
+            <a:off x="5600701" y="4703960"/>
             <a:ext cx="533400" cy="457200"/>
           </a:xfrm>
           <a:prstGeom prst="curvedConnector2">
@@ -5666,16 +6123,16 @@
       </p:cxnSp>
       <p:cxnSp>
         <p:nvCxnSpPr>
-          <p:cNvPr id="154" name="Shape 153"/>
+          <p:cNvPr id="169" name="Shape 153"/>
           <p:cNvCxnSpPr>
-            <a:stCxn id="146" idx="6"/>
-            <a:endCxn id="144" idx="1"/>
+            <a:stCxn id="162" idx="6"/>
+            <a:endCxn id="159" idx="1"/>
           </p:cNvCxnSpPr>
           <p:nvPr/>
         </p:nvCxnSpPr>
         <p:spPr>
           <a:xfrm>
-            <a:off x="6987381" y="4665860"/>
+            <a:off x="7467600" y="4665860"/>
             <a:ext cx="708118" cy="555718"/>
           </a:xfrm>
           <a:prstGeom prst="curvedConnector2">
@@ -5706,16 +6163,16 @@
       </p:cxnSp>
       <p:cxnSp>
         <p:nvCxnSpPr>
-          <p:cNvPr id="158" name="Straight Arrow Connector 157"/>
+          <p:cNvPr id="171" name="Straight Arrow Connector 170"/>
           <p:cNvCxnSpPr>
-            <a:stCxn id="147" idx="6"/>
-            <a:endCxn id="146" idx="2"/>
+            <a:stCxn id="164" idx="6"/>
+            <a:endCxn id="162" idx="2"/>
           </p:cNvCxnSpPr>
           <p:nvPr/>
         </p:nvCxnSpPr>
         <p:spPr>
           <a:xfrm>
-            <a:off x="5768182" y="4665860"/>
+            <a:off x="6248401" y="4665860"/>
             <a:ext cx="1066799" cy="0"/>
           </a:xfrm>
           <a:prstGeom prst="straightConnector1">
@@ -5746,16 +6203,16 @@
       </p:cxnSp>
       <p:cxnSp>
         <p:nvCxnSpPr>
-          <p:cNvPr id="160" name="Curved Connector 159"/>
+          <p:cNvPr id="172" name="Curved Connector 171"/>
           <p:cNvCxnSpPr>
-            <a:stCxn id="145" idx="7"/>
-            <a:endCxn id="146" idx="4"/>
+            <a:stCxn id="161" idx="7"/>
+            <a:endCxn id="162" idx="4"/>
           </p:cNvCxnSpPr>
           <p:nvPr/>
         </p:nvCxnSpPr>
         <p:spPr>
           <a:xfrm rot="5400000" flipH="1" flipV="1">
-            <a:off x="6507863" y="4818260"/>
+            <a:off x="6988082" y="4818260"/>
             <a:ext cx="479518" cy="327118"/>
           </a:xfrm>
           <a:prstGeom prst="curvedConnector3">
@@ -5789,13 +6246,13 @@
       </p:cxnSp>
       <p:sp>
         <p:nvSpPr>
-          <p:cNvPr id="163" name="TextBox 162"/>
+          <p:cNvPr id="174" name="TextBox 173"/>
           <p:cNvSpPr txBox="1"/>
           <p:nvPr/>
         </p:nvSpPr>
         <p:spPr>
           <a:xfrm rot="18268321">
-            <a:off x="4662895" y="4608370"/>
+            <a:off x="5143114" y="4608370"/>
             <a:ext cx="762000" cy="307777"/>
           </a:xfrm>
           <a:prstGeom prst="rect">
@@ -5827,13 +6284,13 @@
       </p:sp>
       <p:sp>
         <p:nvSpPr>
-          <p:cNvPr id="165" name="TextBox 164"/>
+          <p:cNvPr id="175" name="TextBox 174"/>
           <p:cNvSpPr txBox="1"/>
           <p:nvPr/>
         </p:nvSpPr>
         <p:spPr>
           <a:xfrm rot="2419831">
-            <a:off x="7273198" y="4522254"/>
+            <a:off x="7753417" y="4522254"/>
             <a:ext cx="762000" cy="307777"/>
           </a:xfrm>
           <a:prstGeom prst="rect">
@@ -5865,13 +6322,13 @@
       </p:sp>
       <p:sp>
         <p:nvSpPr>
-          <p:cNvPr id="166" name="TextBox 165"/>
+          <p:cNvPr id="176" name="TextBox 175"/>
           <p:cNvSpPr txBox="1"/>
           <p:nvPr/>
         </p:nvSpPr>
         <p:spPr>
           <a:xfrm>
-            <a:off x="5768181" y="4056260"/>
+            <a:off x="6248400" y="4056260"/>
             <a:ext cx="1295400" cy="523220"/>
           </a:xfrm>
           <a:prstGeom prst="rect">
@@ -5915,13 +6372,13 @@
       </p:sp>
       <p:sp>
         <p:nvSpPr>
-          <p:cNvPr id="168" name="TextBox 167"/>
+          <p:cNvPr id="177" name="TextBox 176"/>
           <p:cNvSpPr txBox="1"/>
           <p:nvPr/>
         </p:nvSpPr>
         <p:spPr>
           <a:xfrm>
-            <a:off x="5920581" y="4815283"/>
+            <a:off x="6355855" y="4858742"/>
             <a:ext cx="762000" cy="307777"/>
           </a:xfrm>
           <a:prstGeom prst="rect">
@@ -5935,13 +6392,14 @@
           </a:bodyPr>
           <a:lstStyle/>
           <a:p>
+            <a:pPr algn="r"/>
             <a:r>
               <a:rPr lang="en-US" sz="1400" b="1" dirty="0" smtClean="0">
                 <a:solidFill>
                   <a:srgbClr val="00B050"/>
                 </a:solidFill>
               </a:rPr>
-              <a:t>update</a:t>
+              <a:t>pull</a:t>
             </a:r>
             <a:endParaRPr lang="en-US" sz="1400" b="1" dirty="0">
               <a:solidFill>
@@ -5953,13 +6411,13 @@
       </p:sp>
       <p:sp>
         <p:nvSpPr>
-          <p:cNvPr id="170" name="TextBox 169"/>
+          <p:cNvPr id="178" name="TextBox 177"/>
           <p:cNvSpPr txBox="1"/>
           <p:nvPr/>
         </p:nvSpPr>
         <p:spPr>
           <a:xfrm>
-            <a:off x="3786981" y="4970660"/>
+            <a:off x="4267200" y="4970660"/>
             <a:ext cx="762000" cy="523220"/>
           </a:xfrm>
           <a:prstGeom prst="rect">
@@ -6012,10 +6470,152 @@
           </a:p>
         </p:txBody>
       </p:sp>
+      <p:cxnSp>
+        <p:nvCxnSpPr>
+          <p:cNvPr id="179" name="Straight Arrow Connector 178"/>
+          <p:cNvCxnSpPr/>
+          <p:nvPr/>
+        </p:nvCxnSpPr>
+        <p:spPr>
+          <a:xfrm flipH="1">
+            <a:off x="4572000" y="1328598"/>
+            <a:ext cx="914400" cy="0"/>
+          </a:xfrm>
+          <a:prstGeom prst="straightConnector1">
+            <a:avLst/>
+          </a:prstGeom>
+          <a:ln w="28575">
+            <a:solidFill>
+              <a:schemeClr val="bg1">
+                <a:lumMod val="65000"/>
+              </a:schemeClr>
+            </a:solidFill>
+            <a:tailEnd type="triangle"/>
+          </a:ln>
+        </p:spPr>
+        <p:style>
+          <a:lnRef idx="1">
+            <a:schemeClr val="accent1"/>
+          </a:lnRef>
+          <a:fillRef idx="0">
+            <a:schemeClr val="accent1"/>
+          </a:fillRef>
+          <a:effectRef idx="0">
+            <a:schemeClr val="accent1"/>
+          </a:effectRef>
+          <a:fontRef idx="minor">
+            <a:schemeClr val="tx1"/>
+          </a:fontRef>
+        </p:style>
+      </p:cxnSp>
+      <p:sp>
+        <p:nvSpPr>
+          <p:cNvPr id="180" name="TextBox 179"/>
+          <p:cNvSpPr txBox="1"/>
+          <p:nvPr/>
+        </p:nvSpPr>
+        <p:spPr>
+          <a:xfrm>
+            <a:off x="4385258" y="975519"/>
+            <a:ext cx="1482143" cy="307777"/>
+          </a:xfrm>
+          <a:prstGeom prst="rect">
+            <a:avLst/>
+          </a:prstGeom>
+          <a:noFill/>
+        </p:spPr>
+        <p:txBody>
+          <a:bodyPr wrap="square" rtlCol="0">
+            <a:spAutoFit/>
+          </a:bodyPr>
+          <a:lstStyle/>
+          <a:p>
+            <a:r>
+              <a:rPr lang="en-US" sz="1400" b="1" dirty="0" smtClean="0">
+                <a:solidFill>
+                  <a:schemeClr val="bg1">
+                    <a:lumMod val="65000"/>
+                  </a:schemeClr>
+                </a:solidFill>
+              </a:rPr>
+              <a:t>server-side clone</a:t>
+            </a:r>
+            <a:endParaRPr lang="en-US" sz="1400" b="1" dirty="0">
+              <a:solidFill>
+                <a:schemeClr val="bg1">
+                  <a:lumMod val="65000"/>
+                </a:schemeClr>
+              </a:solidFill>
+            </a:endParaRPr>
+          </a:p>
+        </p:txBody>
+      </p:sp>
+      <p:sp>
+        <p:nvSpPr>
+          <p:cNvPr id="181" name="Can 180"/>
+          <p:cNvSpPr/>
+          <p:nvPr/>
+        </p:nvSpPr>
+        <p:spPr>
+          <a:xfrm>
+            <a:off x="805543" y="902296"/>
+            <a:ext cx="685800" cy="650081"/>
+          </a:xfrm>
+          <a:prstGeom prst="can">
+            <a:avLst/>
+          </a:prstGeom>
+          <a:solidFill>
+            <a:schemeClr val="accent2">
+              <a:lumMod val="60000"/>
+              <a:lumOff val="40000"/>
+            </a:schemeClr>
+          </a:solidFill>
+          <a:ln>
+            <a:solidFill>
+              <a:srgbClr val="D28280"/>
+            </a:solidFill>
+          </a:ln>
+        </p:spPr>
+        <p:style>
+          <a:lnRef idx="2">
+            <a:schemeClr val="accent1">
+              <a:shade val="50000"/>
+            </a:schemeClr>
+          </a:lnRef>
+          <a:fillRef idx="1">
+            <a:schemeClr val="accent1"/>
+          </a:fillRef>
+          <a:effectRef idx="0">
+            <a:schemeClr val="accent1"/>
+          </a:effectRef>
+          <a:fontRef idx="minor">
+            <a:schemeClr val="lt1"/>
+          </a:fontRef>
+        </p:style>
+        <p:txBody>
+          <a:bodyPr rtlCol="0" anchor="ctr"/>
+          <a:lstStyle/>
+          <a:p>
+            <a:pPr algn="ctr"/>
+            <a:r>
+              <a:rPr lang="en-US" sz="1600" b="1" dirty="0"/>
+              <a:t>Local</a:t>
+            </a:r>
+          </a:p>
+          <a:p>
+            <a:pPr algn="ctr"/>
+            <a:r>
+              <a:rPr lang="en-US" sz="1600" b="1" dirty="0"/>
+              <a:t>Repo</a:t>
+            </a:r>
+            <a:endParaRPr lang="en-US" sz="1600" b="1" dirty="0"/>
+          </a:p>
+        </p:txBody>
+      </p:sp>
     </p:spTree>
     <p:extLst>
       <p:ext uri="{BB962C8B-B14F-4D97-AF65-F5344CB8AC3E}">
-        <p14:creationId xmlns:p14="http://schemas.microsoft.com/office/powerpoint/2010/main" xmlns="" val="2312643091"/>
+        <p14:creationId xmlns:p14="http://schemas.microsoft.com/office/powerpoint/2010/main" val="2312643091"/>
       </p:ext>
     </p:extLst>
   </p:cSld>

</xml_diff>

<commit_message>
Continuing Issue 619 [Adding institutions for Accounts] Update Issue 619 merge with default (revision 90a7d1e4c25a)
</commit_message>
<xml_diff>
--- a/doc/diagrams/workflow.pptx
+++ b/doc/diagrams/workflow.pptx
@@ -10,7 +10,7 @@
   <p:sldIdLst>
     <p:sldId id="256" r:id="rId2"/>
   </p:sldIdLst>
-  <p:sldSz cx="8640763" cy="5761038"/>
+  <p:sldSz cx="9144000" cy="5761038"/>
   <p:notesSz cx="6858000" cy="9144000"/>
   <p:defaultTextStyle>
     <a:defPPr>
@@ -193,7 +193,7 @@
             <a:fld id="{DC50A2AC-D691-437C-A69B-81ECFE08AD4B}" type="datetimeFigureOut">
               <a:rPr lang="en-SG" smtClean="0"/>
               <a:pPr/>
-              <a:t>28/7/2012</a:t>
+              <a:t>9/2/2013</a:t>
             </a:fld>
             <a:endParaRPr lang="en-SG"/>
           </a:p>
@@ -211,8 +211,8 @@
         </p:nvSpPr>
         <p:spPr>
           <a:xfrm>
-            <a:off x="858838" y="685800"/>
-            <a:ext cx="5140325" cy="3429000"/>
+            <a:off x="708025" y="685800"/>
+            <a:ext cx="5441950" cy="3429000"/>
           </a:xfrm>
           <a:prstGeom prst="rect">
             <a:avLst/>
@@ -362,7 +362,7 @@
     </p:spTree>
     <p:extLst>
       <p:ext uri="{BB962C8B-B14F-4D97-AF65-F5344CB8AC3E}">
-        <p14:creationId xmlns:p14="http://schemas.microsoft.com/office/powerpoint/2010/main" xmlns="" val="2265103329"/>
+        <p14:creationId xmlns:p14="http://schemas.microsoft.com/office/powerpoint/2010/main" val="2265103329"/>
       </p:ext>
     </p:extLst>
   </p:cSld>
@@ -491,8 +491,8 @@
         </p:nvSpPr>
         <p:spPr>
           <a:xfrm>
-            <a:off x="858838" y="685800"/>
-            <a:ext cx="5140325" cy="3429000"/>
+            <a:off x="708025" y="685800"/>
+            <a:ext cx="5441950" cy="3429000"/>
           </a:xfrm>
         </p:spPr>
       </p:sp>
@@ -542,7 +542,7 @@
     </p:spTree>
     <p:extLst>
       <p:ext uri="{BB962C8B-B14F-4D97-AF65-F5344CB8AC3E}">
-        <p14:creationId xmlns:p14="http://schemas.microsoft.com/office/powerpoint/2010/main" xmlns="" val="1558229004"/>
+        <p14:creationId xmlns:p14="http://schemas.microsoft.com/office/powerpoint/2010/main" val="1558229004"/>
       </p:ext>
     </p:extLst>
   </p:cSld>
@@ -581,8 +581,8 @@
         </p:nvSpPr>
         <p:spPr>
           <a:xfrm>
-            <a:off x="648057" y="1789656"/>
-            <a:ext cx="7344649" cy="1234890"/>
+            <a:off x="685802" y="1789656"/>
+            <a:ext cx="7772400" cy="1234890"/>
           </a:xfrm>
         </p:spPr>
         <p:txBody>
@@ -609,8 +609,8 @@
         </p:nvSpPr>
         <p:spPr>
           <a:xfrm>
-            <a:off x="1296115" y="3264588"/>
-            <a:ext cx="6048534" cy="1472266"/>
+            <a:off x="1371601" y="3264588"/>
+            <a:ext cx="6400800" cy="1472266"/>
           </a:xfrm>
         </p:spPr>
         <p:txBody>
@@ -734,7 +734,7 @@
             <a:fld id="{1D8BD707-D9CF-40AE-B4C6-C98DA3205C09}" type="datetimeFigureOut">
               <a:rPr lang="en-US" smtClean="0"/>
               <a:pPr/>
-              <a:t>7/28/2012</a:t>
+              <a:t>2/9/2013</a:t>
             </a:fld>
             <a:endParaRPr lang="en-US"/>
           </a:p>
@@ -901,7 +901,7 @@
             <a:fld id="{1D8BD707-D9CF-40AE-B4C6-C98DA3205C09}" type="datetimeFigureOut">
               <a:rPr lang="en-US" smtClean="0"/>
               <a:pPr/>
-              <a:t>7/28/2012</a:t>
+              <a:t>2/9/2013</a:t>
             </a:fld>
             <a:endParaRPr lang="en-US"/>
           </a:p>
@@ -987,8 +987,8 @@
         </p:nvSpPr>
         <p:spPr>
           <a:xfrm>
-            <a:off x="6264553" y="230710"/>
-            <a:ext cx="1944172" cy="4915552"/>
+            <a:off x="6629401" y="230710"/>
+            <a:ext cx="2057400" cy="4915552"/>
           </a:xfrm>
         </p:spPr>
         <p:txBody>
@@ -1015,8 +1015,8 @@
         </p:nvSpPr>
         <p:spPr>
           <a:xfrm>
-            <a:off x="432039" y="230710"/>
-            <a:ext cx="5688502" cy="4915552"/>
+            <a:off x="457201" y="230710"/>
+            <a:ext cx="6019800" cy="4915552"/>
           </a:xfrm>
         </p:spPr>
         <p:txBody>
@@ -1078,7 +1078,7 @@
             <a:fld id="{1D8BD707-D9CF-40AE-B4C6-C98DA3205C09}" type="datetimeFigureOut">
               <a:rPr lang="en-US" smtClean="0"/>
               <a:pPr/>
-              <a:t>7/28/2012</a:t>
+              <a:t>2/9/2013</a:t>
             </a:fld>
             <a:endParaRPr lang="en-US"/>
           </a:p>
@@ -1245,7 +1245,7 @@
             <a:fld id="{1D8BD707-D9CF-40AE-B4C6-C98DA3205C09}" type="datetimeFigureOut">
               <a:rPr lang="en-US" smtClean="0"/>
               <a:pPr/>
-              <a:t>7/28/2012</a:t>
+              <a:t>2/9/2013</a:t>
             </a:fld>
             <a:endParaRPr lang="en-US"/>
           </a:p>
@@ -1331,8 +1331,8 @@
         </p:nvSpPr>
         <p:spPr>
           <a:xfrm>
-            <a:off x="682561" y="3702001"/>
-            <a:ext cx="7344649" cy="1144206"/>
+            <a:off x="722314" y="3702001"/>
+            <a:ext cx="7772400" cy="1144206"/>
           </a:xfrm>
         </p:spPr>
         <p:txBody>
@@ -1363,8 +1363,8 @@
         </p:nvSpPr>
         <p:spPr>
           <a:xfrm>
-            <a:off x="682561" y="2441774"/>
-            <a:ext cx="7344649" cy="1260227"/>
+            <a:off x="722314" y="2441774"/>
+            <a:ext cx="7772400" cy="1260227"/>
           </a:xfrm>
         </p:spPr>
         <p:txBody>
@@ -1488,7 +1488,7 @@
             <a:fld id="{1D8BD707-D9CF-40AE-B4C6-C98DA3205C09}" type="datetimeFigureOut">
               <a:rPr lang="en-US" smtClean="0"/>
               <a:pPr/>
-              <a:t>7/28/2012</a:t>
+              <a:t>2/9/2013</a:t>
             </a:fld>
             <a:endParaRPr lang="en-US"/>
           </a:p>
@@ -1597,8 +1597,8 @@
         </p:nvSpPr>
         <p:spPr>
           <a:xfrm>
-            <a:off x="432039" y="1344242"/>
-            <a:ext cx="3816337" cy="3802019"/>
+            <a:off x="457202" y="1344242"/>
+            <a:ext cx="4038600" cy="3802019"/>
           </a:xfrm>
         </p:spPr>
         <p:txBody>
@@ -1682,8 +1682,8 @@
         </p:nvSpPr>
         <p:spPr>
           <a:xfrm>
-            <a:off x="4392388" y="1344242"/>
-            <a:ext cx="3816337" cy="3802019"/>
+            <a:off x="4648201" y="1344242"/>
+            <a:ext cx="4038600" cy="3802019"/>
           </a:xfrm>
         </p:spPr>
         <p:txBody>
@@ -1773,7 +1773,7 @@
             <a:fld id="{1D8BD707-D9CF-40AE-B4C6-C98DA3205C09}" type="datetimeFigureOut">
               <a:rPr lang="en-US" smtClean="0"/>
               <a:pPr/>
-              <a:t>7/28/2012</a:t>
+              <a:t>2/9/2013</a:t>
             </a:fld>
             <a:endParaRPr lang="en-US"/>
           </a:p>
@@ -1886,8 +1886,8 @@
         </p:nvSpPr>
         <p:spPr>
           <a:xfrm>
-            <a:off x="432039" y="1289566"/>
-            <a:ext cx="3817838" cy="537430"/>
+            <a:off x="457201" y="1289566"/>
+            <a:ext cx="4040189" cy="537430"/>
           </a:xfrm>
         </p:spPr>
         <p:txBody>
@@ -1951,8 +1951,8 @@
         </p:nvSpPr>
         <p:spPr>
           <a:xfrm>
-            <a:off x="432039" y="1826997"/>
-            <a:ext cx="3817838" cy="3319265"/>
+            <a:off x="457201" y="1826997"/>
+            <a:ext cx="4040189" cy="3319265"/>
           </a:xfrm>
         </p:spPr>
         <p:txBody>
@@ -2036,8 +2036,8 @@
         </p:nvSpPr>
         <p:spPr>
           <a:xfrm>
-            <a:off x="4389389" y="1289566"/>
-            <a:ext cx="3819337" cy="537430"/>
+            <a:off x="4645028" y="1289566"/>
+            <a:ext cx="4041774" cy="537430"/>
           </a:xfrm>
         </p:spPr>
         <p:txBody>
@@ -2101,8 +2101,8 @@
         </p:nvSpPr>
         <p:spPr>
           <a:xfrm>
-            <a:off x="4389389" y="1826997"/>
-            <a:ext cx="3819337" cy="3319265"/>
+            <a:off x="4645028" y="1826997"/>
+            <a:ext cx="4041774" cy="3319265"/>
           </a:xfrm>
         </p:spPr>
         <p:txBody>
@@ -2192,7 +2192,7 @@
             <a:fld id="{1D8BD707-D9CF-40AE-B4C6-C98DA3205C09}" type="datetimeFigureOut">
               <a:rPr lang="en-US" smtClean="0"/>
               <a:pPr/>
-              <a:t>7/28/2012</a:t>
+              <a:t>2/9/2013</a:t>
             </a:fld>
             <a:endParaRPr lang="en-US"/>
           </a:p>
@@ -2307,7 +2307,7 @@
             <a:fld id="{1D8BD707-D9CF-40AE-B4C6-C98DA3205C09}" type="datetimeFigureOut">
               <a:rPr lang="en-US" smtClean="0"/>
               <a:pPr/>
-              <a:t>7/28/2012</a:t>
+              <a:t>2/9/2013</a:t>
             </a:fld>
             <a:endParaRPr lang="en-US"/>
           </a:p>
@@ -2399,7 +2399,7 @@
             <a:fld id="{1D8BD707-D9CF-40AE-B4C6-C98DA3205C09}" type="datetimeFigureOut">
               <a:rPr lang="en-US" smtClean="0"/>
               <a:pPr/>
-              <a:t>7/28/2012</a:t>
+              <a:t>2/9/2013</a:t>
             </a:fld>
             <a:endParaRPr lang="en-US"/>
           </a:p>
@@ -2485,8 +2485,8 @@
         </p:nvSpPr>
         <p:spPr>
           <a:xfrm>
-            <a:off x="432039" y="229375"/>
-            <a:ext cx="2842752" cy="976176"/>
+            <a:off x="457201" y="229375"/>
+            <a:ext cx="3008314" cy="976176"/>
           </a:xfrm>
         </p:spPr>
         <p:txBody>
@@ -2517,8 +2517,8 @@
         </p:nvSpPr>
         <p:spPr>
           <a:xfrm>
-            <a:off x="3378298" y="229375"/>
-            <a:ext cx="4830427" cy="4916886"/>
+            <a:off x="3575051" y="229375"/>
+            <a:ext cx="5111751" cy="4916886"/>
           </a:xfrm>
         </p:spPr>
         <p:txBody>
@@ -2602,8 +2602,8 @@
         </p:nvSpPr>
         <p:spPr>
           <a:xfrm>
-            <a:off x="432039" y="1205551"/>
-            <a:ext cx="2842752" cy="3940710"/>
+            <a:off x="457201" y="1205551"/>
+            <a:ext cx="3008314" cy="3940710"/>
           </a:xfrm>
         </p:spPr>
         <p:txBody>
@@ -2673,7 +2673,7 @@
             <a:fld id="{1D8BD707-D9CF-40AE-B4C6-C98DA3205C09}" type="datetimeFigureOut">
               <a:rPr lang="en-US" smtClean="0"/>
               <a:pPr/>
-              <a:t>7/28/2012</a:t>
+              <a:t>2/9/2013</a:t>
             </a:fld>
             <a:endParaRPr lang="en-US"/>
           </a:p>
@@ -2759,8 +2759,8 @@
         </p:nvSpPr>
         <p:spPr>
           <a:xfrm>
-            <a:off x="1693650" y="4032727"/>
-            <a:ext cx="5184458" cy="476086"/>
+            <a:off x="1792288" y="4032727"/>
+            <a:ext cx="5486400" cy="476086"/>
           </a:xfrm>
         </p:spPr>
         <p:txBody>
@@ -2791,8 +2791,8 @@
         </p:nvSpPr>
         <p:spPr>
           <a:xfrm>
-            <a:off x="1693650" y="514760"/>
-            <a:ext cx="5184458" cy="3456623"/>
+            <a:off x="1792288" y="514762"/>
+            <a:ext cx="5486400" cy="3456623"/>
           </a:xfrm>
         </p:spPr>
         <p:txBody>
@@ -2852,8 +2852,8 @@
         </p:nvSpPr>
         <p:spPr>
           <a:xfrm>
-            <a:off x="1693650" y="4508813"/>
-            <a:ext cx="5184458" cy="676121"/>
+            <a:off x="1792288" y="4508815"/>
+            <a:ext cx="5486400" cy="676121"/>
           </a:xfrm>
         </p:spPr>
         <p:txBody>
@@ -2923,7 +2923,7 @@
             <a:fld id="{1D8BD707-D9CF-40AE-B4C6-C98DA3205C09}" type="datetimeFigureOut">
               <a:rPr lang="en-US" smtClean="0"/>
               <a:pPr/>
-              <a:t>7/28/2012</a:t>
+              <a:t>2/9/2013</a:t>
             </a:fld>
             <a:endParaRPr lang="en-US"/>
           </a:p>
@@ -3014,8 +3014,8 @@
         </p:nvSpPr>
         <p:spPr>
           <a:xfrm>
-            <a:off x="432038" y="230709"/>
-            <a:ext cx="7776687" cy="960173"/>
+            <a:off x="457202" y="230709"/>
+            <a:ext cx="8229600" cy="960173"/>
           </a:xfrm>
           <a:prstGeom prst="rect">
             <a:avLst/>
@@ -3047,8 +3047,8 @@
         </p:nvSpPr>
         <p:spPr>
           <a:xfrm>
-            <a:off x="432038" y="1344242"/>
-            <a:ext cx="7776687" cy="3802019"/>
+            <a:off x="457202" y="1344242"/>
+            <a:ext cx="8229600" cy="3802019"/>
           </a:xfrm>
           <a:prstGeom prst="rect">
             <a:avLst/>
@@ -3109,8 +3109,8 @@
         </p:nvSpPr>
         <p:spPr>
           <a:xfrm>
-            <a:off x="432039" y="5339630"/>
-            <a:ext cx="2016178" cy="306722"/>
+            <a:off x="457201" y="5339630"/>
+            <a:ext cx="2133600" cy="306722"/>
           </a:xfrm>
           <a:prstGeom prst="rect">
             <a:avLst/>
@@ -3133,7 +3133,7 @@
             <a:fld id="{1D8BD707-D9CF-40AE-B4C6-C98DA3205C09}" type="datetimeFigureOut">
               <a:rPr lang="en-US" smtClean="0"/>
               <a:pPr/>
-              <a:t>7/28/2012</a:t>
+              <a:t>2/9/2013</a:t>
             </a:fld>
             <a:endParaRPr lang="en-US"/>
           </a:p>
@@ -3151,8 +3151,8 @@
         </p:nvSpPr>
         <p:spPr>
           <a:xfrm>
-            <a:off x="2952262" y="5339630"/>
-            <a:ext cx="2736242" cy="306722"/>
+            <a:off x="3124202" y="5339630"/>
+            <a:ext cx="2895600" cy="306722"/>
           </a:xfrm>
           <a:prstGeom prst="rect">
             <a:avLst/>
@@ -3188,8 +3188,8 @@
         </p:nvSpPr>
         <p:spPr>
           <a:xfrm>
-            <a:off x="6192548" y="5339630"/>
-            <a:ext cx="2016178" cy="306722"/>
+            <a:off x="6553201" y="5339630"/>
+            <a:ext cx="2133600" cy="306722"/>
           </a:xfrm>
           <a:prstGeom prst="rect">
             <a:avLst/>
@@ -3506,13 +3506,449 @@
       </p:grpSpPr>
       <p:sp>
         <p:nvSpPr>
-          <p:cNvPr id="173" name="Rounded Rectangle 172"/>
+          <p:cNvPr id="5" name="laptop"/>
+          <p:cNvSpPr>
+            <a:spLocks noEditPoints="1" noChangeArrowheads="1"/>
+          </p:cNvSpPr>
+          <p:nvPr/>
+        </p:nvSpPr>
+        <p:spPr bwMode="auto">
+          <a:xfrm>
+            <a:off x="457199" y="1053848"/>
+            <a:ext cx="1272365" cy="988472"/>
+          </a:xfrm>
+          <a:custGeom>
+            <a:avLst/>
+            <a:gdLst>
+              <a:gd name="T0" fmla="*/ 3362 w 21600"/>
+              <a:gd name="T1" fmla="*/ 0 h 21600"/>
+              <a:gd name="T2" fmla="*/ 3362 w 21600"/>
+              <a:gd name="T3" fmla="*/ 7173 h 21600"/>
+              <a:gd name="T4" fmla="*/ 18327 w 21600"/>
+              <a:gd name="T5" fmla="*/ 0 h 21600"/>
+              <a:gd name="T6" fmla="*/ 18327 w 21600"/>
+              <a:gd name="T7" fmla="*/ 7173 h 21600"/>
+              <a:gd name="T8" fmla="*/ 10800 w 21600"/>
+              <a:gd name="T9" fmla="*/ 0 h 21600"/>
+              <a:gd name="T10" fmla="*/ 10800 w 21600"/>
+              <a:gd name="T11" fmla="*/ 21600 h 21600"/>
+              <a:gd name="T12" fmla="*/ 0 w 21600"/>
+              <a:gd name="T13" fmla="*/ 21600 h 21600"/>
+              <a:gd name="T14" fmla="*/ 21600 w 21600"/>
+              <a:gd name="T15" fmla="*/ 21600 h 21600"/>
+              <a:gd name="T16" fmla="*/ 4445 w 21600"/>
+              <a:gd name="T17" fmla="*/ 1858 h 21600"/>
+              <a:gd name="T18" fmla="*/ 17311 w 21600"/>
+              <a:gd name="T19" fmla="*/ 12323 h 21600"/>
+            </a:gdLst>
+            <a:ahLst/>
+            <a:cxnLst>
+              <a:cxn ang="0">
+                <a:pos x="T0" y="T1"/>
+              </a:cxn>
+              <a:cxn ang="0">
+                <a:pos x="T2" y="T3"/>
+              </a:cxn>
+              <a:cxn ang="0">
+                <a:pos x="T4" y="T5"/>
+              </a:cxn>
+              <a:cxn ang="0">
+                <a:pos x="T6" y="T7"/>
+              </a:cxn>
+              <a:cxn ang="0">
+                <a:pos x="T8" y="T9"/>
+              </a:cxn>
+              <a:cxn ang="0">
+                <a:pos x="T10" y="T11"/>
+              </a:cxn>
+              <a:cxn ang="0">
+                <a:pos x="T12" y="T13"/>
+              </a:cxn>
+              <a:cxn ang="0">
+                <a:pos x="T14" y="T15"/>
+              </a:cxn>
+            </a:cxnLst>
+            <a:rect l="T16" t="T17" r="T18" b="T19"/>
+            <a:pathLst>
+              <a:path w="21600" h="21600" extrusionOk="0">
+                <a:moveTo>
+                  <a:pt x="3362" y="0"/>
+                </a:moveTo>
+                <a:lnTo>
+                  <a:pt x="18327" y="0"/>
+                </a:lnTo>
+                <a:lnTo>
+                  <a:pt x="18327" y="14347"/>
+                </a:lnTo>
+                <a:lnTo>
+                  <a:pt x="3362" y="14347"/>
+                </a:lnTo>
+                <a:lnTo>
+                  <a:pt x="3362" y="0"/>
+                </a:lnTo>
+                <a:close/>
+              </a:path>
+              <a:path w="21600" h="21600" extrusionOk="0">
+                <a:moveTo>
+                  <a:pt x="3340" y="15068"/>
+                </a:moveTo>
+                <a:lnTo>
+                  <a:pt x="0" y="19877"/>
+                </a:lnTo>
+                <a:lnTo>
+                  <a:pt x="21600" y="19877"/>
+                </a:lnTo>
+                <a:lnTo>
+                  <a:pt x="18327" y="15068"/>
+                </a:lnTo>
+                <a:lnTo>
+                  <a:pt x="3340" y="15068"/>
+                </a:lnTo>
+                <a:close/>
+              </a:path>
+              <a:path w="21600" h="21600" extrusionOk="0">
+                <a:moveTo>
+                  <a:pt x="0" y="19877"/>
+                </a:moveTo>
+                <a:lnTo>
+                  <a:pt x="0" y="21600"/>
+                </a:lnTo>
+                <a:lnTo>
+                  <a:pt x="21600" y="21600"/>
+                </a:lnTo>
+                <a:lnTo>
+                  <a:pt x="21600" y="19877"/>
+                </a:lnTo>
+                <a:lnTo>
+                  <a:pt x="0" y="19877"/>
+                </a:lnTo>
+                <a:close/>
+              </a:path>
+              <a:path w="21600" h="21600" extrusionOk="0">
+                <a:moveTo>
+                  <a:pt x="4186" y="1523"/>
+                </a:moveTo>
+                <a:lnTo>
+                  <a:pt x="17547" y="1523"/>
+                </a:lnTo>
+                <a:lnTo>
+                  <a:pt x="17547" y="12744"/>
+                </a:lnTo>
+                <a:lnTo>
+                  <a:pt x="4186" y="12744"/>
+                </a:lnTo>
+                <a:lnTo>
+                  <a:pt x="4186" y="1523"/>
+                </a:lnTo>
+                <a:close/>
+              </a:path>
+              <a:path w="21600" h="21600" extrusionOk="0">
+                <a:moveTo>
+                  <a:pt x="3318" y="15549"/>
+                </a:moveTo>
+                <a:lnTo>
+                  <a:pt x="2917" y="16110"/>
+                </a:lnTo>
+                <a:lnTo>
+                  <a:pt x="18727" y="16110"/>
+                </a:lnTo>
+                <a:lnTo>
+                  <a:pt x="18327" y="15549"/>
+                </a:lnTo>
+                <a:lnTo>
+                  <a:pt x="3318" y="15549"/>
+                </a:lnTo>
+                <a:close/>
+              </a:path>
+              <a:path w="21600" h="21600" extrusionOk="0">
+                <a:moveTo>
+                  <a:pt x="6213" y="18314"/>
+                </a:moveTo>
+                <a:lnTo>
+                  <a:pt x="5946" y="18875"/>
+                </a:lnTo>
+                <a:lnTo>
+                  <a:pt x="15766" y="18875"/>
+                </a:lnTo>
+                <a:lnTo>
+                  <a:pt x="15499" y="18314"/>
+                </a:lnTo>
+                <a:lnTo>
+                  <a:pt x="6213" y="18314"/>
+                </a:lnTo>
+                <a:close/>
+              </a:path>
+              <a:path w="21600" h="21600" extrusionOk="0">
+                <a:moveTo>
+                  <a:pt x="2828" y="16471"/>
+                </a:moveTo>
+                <a:lnTo>
+                  <a:pt x="2405" y="17072"/>
+                </a:lnTo>
+                <a:lnTo>
+                  <a:pt x="19284" y="17072"/>
+                </a:lnTo>
+                <a:lnTo>
+                  <a:pt x="18839" y="16471"/>
+                </a:lnTo>
+                <a:lnTo>
+                  <a:pt x="2828" y="16471"/>
+                </a:lnTo>
+                <a:close/>
+              </a:path>
+              <a:path w="21600" h="21600" extrusionOk="0">
+                <a:moveTo>
+                  <a:pt x="2316" y="17352"/>
+                </a:moveTo>
+                <a:lnTo>
+                  <a:pt x="1871" y="17953"/>
+                </a:lnTo>
+                <a:lnTo>
+                  <a:pt x="19863" y="17953"/>
+                </a:lnTo>
+                <a:lnTo>
+                  <a:pt x="19395" y="17352"/>
+                </a:lnTo>
+                <a:lnTo>
+                  <a:pt x="2316" y="17352"/>
+                </a:lnTo>
+                <a:close/>
+              </a:path>
+            </a:pathLst>
+          </a:custGeom>
+          <a:solidFill>
+            <a:schemeClr val="bg1"/>
+          </a:solidFill>
+          <a:ln w="38100">
+            <a:solidFill>
+              <a:schemeClr val="bg1">
+                <a:lumMod val="85000"/>
+              </a:schemeClr>
+            </a:solidFill>
+            <a:miter lim="800000"/>
+            <a:headEnd/>
+            <a:tailEnd/>
+          </a:ln>
+        </p:spPr>
+        <p:txBody>
+          <a:bodyPr vert="horz" wrap="square" lIns="91440" tIns="45720" rIns="91440" bIns="45720" numCol="1" anchor="t" anchorCtr="0" compatLnSpc="1">
+            <a:prstTxWarp prst="textNoShape">
+              <a:avLst/>
+            </a:prstTxWarp>
+          </a:bodyPr>
+          <a:lstStyle/>
+          <a:p>
+            <a:endParaRPr lang="en-US"/>
+          </a:p>
+        </p:txBody>
+      </p:sp>
+      <p:sp>
+        <p:nvSpPr>
+          <p:cNvPr id="80" name="Cloud 79"/>
           <p:cNvSpPr/>
           <p:nvPr/>
         </p:nvSpPr>
         <p:spPr>
           <a:xfrm>
-            <a:off x="3482181" y="3947319"/>
+            <a:off x="7941267" y="1350987"/>
+            <a:ext cx="1186265" cy="462732"/>
+          </a:xfrm>
+          <a:prstGeom prst="cloud">
+            <a:avLst/>
+          </a:prstGeom>
+          <a:solidFill>
+            <a:schemeClr val="bg1"/>
+          </a:solidFill>
+          <a:ln>
+            <a:solidFill>
+              <a:schemeClr val="bg1">
+                <a:lumMod val="85000"/>
+              </a:schemeClr>
+            </a:solidFill>
+          </a:ln>
+        </p:spPr>
+        <p:style>
+          <a:lnRef idx="2">
+            <a:schemeClr val="accent1">
+              <a:shade val="50000"/>
+            </a:schemeClr>
+          </a:lnRef>
+          <a:fillRef idx="1">
+            <a:schemeClr val="accent1"/>
+          </a:fillRef>
+          <a:effectRef idx="0">
+            <a:schemeClr val="accent1"/>
+          </a:effectRef>
+          <a:fontRef idx="minor">
+            <a:schemeClr val="lt1"/>
+          </a:fontRef>
+        </p:style>
+        <p:txBody>
+          <a:bodyPr lIns="0" rIns="0" bIns="0" rtlCol="0" anchor="ctr"/>
+          <a:lstStyle/>
+          <a:p>
+            <a:pPr algn="ctr"/>
+            <a:r>
+              <a:rPr lang="en-US" sz="1400" b="1" dirty="0" err="1">
+                <a:solidFill>
+                  <a:schemeClr val="bg1">
+                    <a:lumMod val="65000"/>
+                  </a:schemeClr>
+                </a:solidFill>
+              </a:rPr>
+              <a:t>Appspot</a:t>
+            </a:r>
+            <a:endParaRPr lang="en-US" sz="1400" b="1" dirty="0">
+              <a:solidFill>
+                <a:schemeClr val="bg1">
+                  <a:lumMod val="65000"/>
+                </a:schemeClr>
+              </a:solidFill>
+            </a:endParaRPr>
+          </a:p>
+        </p:txBody>
+      </p:sp>
+      <p:sp>
+        <p:nvSpPr>
+          <p:cNvPr id="81" name="Cloud 80"/>
+          <p:cNvSpPr/>
+          <p:nvPr/>
+        </p:nvSpPr>
+        <p:spPr>
+          <a:xfrm>
+            <a:off x="5476710" y="1432719"/>
+            <a:ext cx="1609890" cy="462732"/>
+          </a:xfrm>
+          <a:prstGeom prst="cloud">
+            <a:avLst/>
+          </a:prstGeom>
+          <a:solidFill>
+            <a:schemeClr val="bg1"/>
+          </a:solidFill>
+          <a:ln>
+            <a:solidFill>
+              <a:schemeClr val="bg1">
+                <a:lumMod val="85000"/>
+              </a:schemeClr>
+            </a:solidFill>
+          </a:ln>
+        </p:spPr>
+        <p:style>
+          <a:lnRef idx="2">
+            <a:schemeClr val="accent1">
+              <a:shade val="50000"/>
+            </a:schemeClr>
+          </a:lnRef>
+          <a:fillRef idx="1">
+            <a:schemeClr val="accent1"/>
+          </a:fillRef>
+          <a:effectRef idx="0">
+            <a:schemeClr val="accent1"/>
+          </a:effectRef>
+          <a:fontRef idx="minor">
+            <a:schemeClr val="lt1"/>
+          </a:fontRef>
+        </p:style>
+        <p:txBody>
+          <a:bodyPr lIns="0" rIns="0" bIns="0" rtlCol="0" anchor="ctr"/>
+          <a:lstStyle/>
+          <a:p>
+            <a:pPr algn="ctr"/>
+            <a:r>
+              <a:rPr lang="en-US" sz="1400" b="1" dirty="0" err="1" smtClean="0">
+                <a:solidFill>
+                  <a:schemeClr val="bg1">
+                    <a:lumMod val="65000"/>
+                  </a:schemeClr>
+                </a:solidFill>
+              </a:rPr>
+              <a:t>GoogleCode</a:t>
+            </a:r>
+            <a:endParaRPr lang="en-US" sz="1400" b="1" dirty="0">
+              <a:solidFill>
+                <a:schemeClr val="bg1">
+                  <a:lumMod val="65000"/>
+                </a:schemeClr>
+              </a:solidFill>
+            </a:endParaRPr>
+          </a:p>
+        </p:txBody>
+      </p:sp>
+      <p:sp>
+        <p:nvSpPr>
+          <p:cNvPr id="82" name="Cloud 81"/>
+          <p:cNvSpPr/>
+          <p:nvPr/>
+        </p:nvSpPr>
+        <p:spPr>
+          <a:xfrm>
+            <a:off x="2895600" y="1432719"/>
+            <a:ext cx="1609890" cy="462732"/>
+          </a:xfrm>
+          <a:prstGeom prst="cloud">
+            <a:avLst/>
+          </a:prstGeom>
+          <a:solidFill>
+            <a:schemeClr val="bg1"/>
+          </a:solidFill>
+          <a:ln>
+            <a:solidFill>
+              <a:schemeClr val="bg1">
+                <a:lumMod val="85000"/>
+              </a:schemeClr>
+            </a:solidFill>
+          </a:ln>
+        </p:spPr>
+        <p:style>
+          <a:lnRef idx="2">
+            <a:schemeClr val="accent1">
+              <a:shade val="50000"/>
+            </a:schemeClr>
+          </a:lnRef>
+          <a:fillRef idx="1">
+            <a:schemeClr val="accent1"/>
+          </a:fillRef>
+          <a:effectRef idx="0">
+            <a:schemeClr val="accent1"/>
+          </a:effectRef>
+          <a:fontRef idx="minor">
+            <a:schemeClr val="lt1"/>
+          </a:fontRef>
+        </p:style>
+        <p:txBody>
+          <a:bodyPr lIns="0" rIns="0" bIns="0" rtlCol="0" anchor="ctr"/>
+          <a:lstStyle/>
+          <a:p>
+            <a:pPr algn="ctr"/>
+            <a:r>
+              <a:rPr lang="en-US" sz="1400" b="1" dirty="0" err="1" smtClean="0">
+                <a:solidFill>
+                  <a:schemeClr val="bg1">
+                    <a:lumMod val="65000"/>
+                  </a:schemeClr>
+                </a:solidFill>
+              </a:rPr>
+              <a:t>GoogleCode</a:t>
+            </a:r>
+            <a:endParaRPr lang="en-US" sz="1400" b="1" dirty="0">
+              <a:solidFill>
+                <a:schemeClr val="bg1">
+                  <a:lumMod val="65000"/>
+                </a:schemeClr>
+              </a:solidFill>
+            </a:endParaRPr>
+          </a:p>
+        </p:txBody>
+      </p:sp>
+      <p:sp>
+        <p:nvSpPr>
+          <p:cNvPr id="83" name="Rounded Rectangle 82"/>
+          <p:cNvSpPr/>
+          <p:nvPr/>
+        </p:nvSpPr>
+        <p:spPr>
+          <a:xfrm>
+            <a:off x="3962400" y="3947319"/>
             <a:ext cx="5029200" cy="1737518"/>
           </a:xfrm>
           <a:prstGeom prst="roundRect">
@@ -3559,28 +3995,27 @@
       </p:sp>
       <p:sp>
         <p:nvSpPr>
-          <p:cNvPr id="58" name="Can 57"/>
+          <p:cNvPr id="84" name="Can 83"/>
           <p:cNvSpPr/>
           <p:nvPr/>
         </p:nvSpPr>
         <p:spPr>
           <a:xfrm>
-            <a:off x="2491581" y="826096"/>
-            <a:ext cx="1066800" cy="762000"/>
+            <a:off x="3200400" y="826096"/>
+            <a:ext cx="1184858" cy="762000"/>
           </a:xfrm>
           <a:prstGeom prst="can">
             <a:avLst/>
           </a:prstGeom>
           <a:solidFill>
-            <a:schemeClr val="bg1">
-              <a:lumMod val="65000"/>
+            <a:schemeClr val="accent2">
+              <a:lumMod val="60000"/>
+              <a:lumOff val="40000"/>
             </a:schemeClr>
           </a:solidFill>
           <a:ln>
             <a:solidFill>
-              <a:schemeClr val="bg1">
-                <a:lumMod val="65000"/>
-              </a:schemeClr>
+              <a:srgbClr val="D28280"/>
             </a:solidFill>
           </a:ln>
         </p:spPr>
@@ -3606,44 +4041,43 @@
           <a:p>
             <a:pPr algn="ctr"/>
             <a:r>
-              <a:rPr lang="en-US" sz="1600" b="1" dirty="0" smtClean="0"/>
-              <a:t>Review</a:t>
+              <a:rPr lang="en-US" sz="1600" b="1" dirty="0"/>
+              <a:t>Contributor</a:t>
             </a:r>
           </a:p>
           <a:p>
             <a:pPr algn="ctr"/>
             <a:r>
-              <a:rPr lang="en-US" sz="1600" dirty="0" smtClean="0"/>
+              <a:rPr lang="en-US" sz="1600" b="1" dirty="0"/>
               <a:t>Repo</a:t>
             </a:r>
-            <a:endParaRPr lang="en-US" sz="1600" dirty="0"/>
-          </a:p>
-        </p:txBody>
-      </p:sp>
-      <p:sp>
-        <p:nvSpPr>
-          <p:cNvPr id="59" name="Can 58"/>
+            <a:endParaRPr lang="en-US" sz="1600" b="1" dirty="0"/>
+          </a:p>
+        </p:txBody>
+      </p:sp>
+      <p:sp>
+        <p:nvSpPr>
+          <p:cNvPr id="85" name="Can 84"/>
           <p:cNvSpPr/>
           <p:nvPr/>
         </p:nvSpPr>
         <p:spPr>
           <a:xfrm>
-            <a:off x="4929981" y="826096"/>
-            <a:ext cx="1066800" cy="762000"/>
+            <a:off x="5853514" y="826096"/>
+            <a:ext cx="1107933" cy="762000"/>
           </a:xfrm>
           <a:prstGeom prst="can">
             <a:avLst/>
           </a:prstGeom>
           <a:solidFill>
-            <a:schemeClr val="bg1">
-              <a:lumMod val="65000"/>
+            <a:schemeClr val="accent2">
+              <a:lumMod val="60000"/>
+              <a:lumOff val="40000"/>
             </a:schemeClr>
           </a:solidFill>
           <a:ln>
             <a:solidFill>
-              <a:schemeClr val="bg1">
-                <a:lumMod val="65000"/>
-              </a:schemeClr>
+              <a:srgbClr val="D28280"/>
             </a:solidFill>
           </a:ln>
         </p:spPr>
@@ -3670,8 +4104,9 @@
             <a:pPr algn="ctr"/>
             <a:r>
               <a:rPr lang="en-US" sz="1600" b="1" dirty="0" smtClean="0"/>
-              <a:t>Release</a:t>
-            </a:r>
+              <a:t>Committer</a:t>
+            </a:r>
+            <a:endParaRPr lang="en-US" sz="1600" b="1" dirty="0" smtClean="0"/>
           </a:p>
           <a:p>
             <a:pPr algn="ctr"/>
@@ -3684,7 +4119,7 @@
       </p:sp>
       <p:pic>
         <p:nvPicPr>
-          <p:cNvPr id="2050" name="Picture 2" descr="http://screenshots.en.sftcdn.net/en/scrn/70000/70210/google-app-engine-1.jpg"/>
+          <p:cNvPr id="86" name="Picture 2" descr="http://screenshots.en.sftcdn.net/en/scrn/70000/70210/google-app-engine-1.jpg"/>
           <p:cNvPicPr>
             <a:picLocks noChangeAspect="1" noChangeArrowheads="1"/>
           </p:cNvPicPr>
@@ -3702,7 +4137,13 @@
                 </a:srgbClr>
               </a:clrTo>
             </a:clrChange>
-            <a:grayscl/>
+            <a:duotone>
+              <a:schemeClr val="accent2">
+                <a:shade val="45000"/>
+                <a:satMod val="135000"/>
+              </a:schemeClr>
+              <a:prstClr val="white"/>
+            </a:duotone>
           </a:blip>
           <a:srcRect/>
           <a:stretch>
@@ -3711,7 +4152,7 @@
         </p:blipFill>
         <p:spPr bwMode="auto">
           <a:xfrm>
-            <a:off x="7349331" y="597496"/>
+            <a:off x="8058150" y="597496"/>
             <a:ext cx="1085850" cy="1085850"/>
           </a:xfrm>
           <a:prstGeom prst="rect">
@@ -3722,13 +4163,13 @@
       </p:pic>
       <p:grpSp>
         <p:nvGrpSpPr>
-          <p:cNvPr id="65" name="Group 64"/>
+          <p:cNvPr id="87" name="Group 86"/>
           <p:cNvGrpSpPr/>
           <p:nvPr/>
         </p:nvGrpSpPr>
         <p:grpSpPr>
           <a:xfrm>
-            <a:off x="434181" y="902296"/>
+            <a:off x="304800" y="902296"/>
             <a:ext cx="304800" cy="533400"/>
             <a:chOff x="2339181" y="3718719"/>
             <a:chExt cx="304800" cy="533400"/>
@@ -3742,7 +4183,7 @@
         </p:grpSpPr>
         <p:sp>
           <p:nvSpPr>
-            <p:cNvPr id="63" name="Flowchart: Connector 62"/>
+            <p:cNvPr id="88" name="Flowchart: Connector 87"/>
             <p:cNvSpPr/>
             <p:nvPr/>
           </p:nvSpPr>
@@ -3788,7 +4229,7 @@
         </p:sp>
         <p:sp>
           <p:nvSpPr>
-            <p:cNvPr id="64" name="Flowchart: Delay 63"/>
+            <p:cNvPr id="89" name="Flowchart: Delay 88"/>
             <p:cNvSpPr/>
             <p:nvPr/>
           </p:nvSpPr>
@@ -3835,13 +4276,13 @@
       </p:grpSp>
       <p:grpSp>
         <p:nvGrpSpPr>
-          <p:cNvPr id="68" name="Group 67"/>
+          <p:cNvPr id="90" name="Group 89"/>
           <p:cNvGrpSpPr/>
           <p:nvPr/>
         </p:nvGrpSpPr>
         <p:grpSpPr>
           <a:xfrm>
-            <a:off x="2415381" y="2578696"/>
+            <a:off x="3200400" y="2847777"/>
             <a:ext cx="304800" cy="533400"/>
             <a:chOff x="2339181" y="3718719"/>
             <a:chExt cx="304800" cy="533400"/>
@@ -3849,7 +4290,7 @@
         </p:grpSpPr>
         <p:sp>
           <p:nvSpPr>
-            <p:cNvPr id="69" name="Flowchart: Connector 68"/>
+            <p:cNvPr id="91" name="Flowchart: Connector 90"/>
             <p:cNvSpPr/>
             <p:nvPr/>
           </p:nvSpPr>
@@ -3889,7 +4330,7 @@
         </p:sp>
         <p:sp>
           <p:nvSpPr>
-            <p:cNvPr id="70" name="Flowchart: Delay 69"/>
+            <p:cNvPr id="93" name="Flowchart: Delay 92"/>
             <p:cNvSpPr/>
             <p:nvPr/>
           </p:nvSpPr>
@@ -3930,13 +4371,13 @@
       </p:grpSp>
       <p:sp>
         <p:nvSpPr>
-          <p:cNvPr id="71" name="TextBox 70"/>
+          <p:cNvPr id="94" name="TextBox 93"/>
           <p:cNvSpPr txBox="1"/>
           <p:nvPr/>
         </p:nvSpPr>
         <p:spPr>
           <a:xfrm>
-            <a:off x="2110581" y="3185319"/>
+            <a:off x="2895600" y="3454400"/>
             <a:ext cx="914400" cy="340519"/>
           </a:xfrm>
           <a:prstGeom prst="roundRect">
@@ -3973,13 +4414,13 @@
       </p:sp>
       <p:grpSp>
         <p:nvGrpSpPr>
-          <p:cNvPr id="72" name="Group 71"/>
+          <p:cNvPr id="95" name="Group 94"/>
           <p:cNvGrpSpPr/>
           <p:nvPr/>
         </p:nvGrpSpPr>
         <p:grpSpPr>
           <a:xfrm>
-            <a:off x="4167981" y="2578696"/>
+            <a:off x="4953000" y="2847777"/>
             <a:ext cx="304800" cy="533400"/>
             <a:chOff x="2339181" y="3718719"/>
             <a:chExt cx="304800" cy="533400"/>
@@ -3987,7 +4428,7 @@
         </p:grpSpPr>
         <p:sp>
           <p:nvSpPr>
-            <p:cNvPr id="73" name="Flowchart: Connector 72"/>
+            <p:cNvPr id="96" name="Flowchart: Connector 95"/>
             <p:cNvSpPr/>
             <p:nvPr/>
           </p:nvSpPr>
@@ -4027,7 +4468,7 @@
         </p:sp>
         <p:sp>
           <p:nvSpPr>
-            <p:cNvPr id="74" name="Flowchart: Delay 73"/>
+            <p:cNvPr id="100" name="Flowchart: Delay 99"/>
             <p:cNvSpPr/>
             <p:nvPr/>
           </p:nvSpPr>
@@ -4068,13 +4509,13 @@
       </p:grpSp>
       <p:sp>
         <p:nvSpPr>
-          <p:cNvPr id="75" name="TextBox 74"/>
+          <p:cNvPr id="101" name="TextBox 100"/>
           <p:cNvSpPr txBox="1"/>
           <p:nvPr/>
         </p:nvSpPr>
         <p:spPr>
           <a:xfrm>
-            <a:off x="3863181" y="3185319"/>
+            <a:off x="4648200" y="3454400"/>
             <a:ext cx="1066800" cy="340519"/>
           </a:xfrm>
           <a:prstGeom prst="roundRect">
@@ -4104,13 +4545,13 @@
       </p:sp>
       <p:grpSp>
         <p:nvGrpSpPr>
-          <p:cNvPr id="76" name="Group 75"/>
+          <p:cNvPr id="104" name="Group 103"/>
           <p:cNvGrpSpPr/>
           <p:nvPr/>
         </p:nvGrpSpPr>
         <p:grpSpPr>
           <a:xfrm>
-            <a:off x="6682581" y="2578696"/>
+            <a:off x="7467600" y="2847777"/>
             <a:ext cx="304800" cy="533400"/>
             <a:chOff x="2339181" y="3718719"/>
             <a:chExt cx="304800" cy="533400"/>
@@ -4118,7 +4559,7 @@
         </p:grpSpPr>
         <p:sp>
           <p:nvSpPr>
-            <p:cNvPr id="77" name="Flowchart: Connector 76"/>
+            <p:cNvPr id="105" name="Flowchart: Connector 104"/>
             <p:cNvSpPr/>
             <p:nvPr/>
           </p:nvSpPr>
@@ -4158,7 +4599,7 @@
         </p:sp>
         <p:sp>
           <p:nvSpPr>
-            <p:cNvPr id="78" name="Flowchart: Delay 77"/>
+            <p:cNvPr id="106" name="Flowchart: Delay 105"/>
             <p:cNvSpPr/>
             <p:nvPr/>
           </p:nvSpPr>
@@ -4199,13 +4640,13 @@
       </p:grpSp>
       <p:sp>
         <p:nvSpPr>
-          <p:cNvPr id="79" name="TextBox 78"/>
+          <p:cNvPr id="108" name="TextBox 107"/>
           <p:cNvSpPr txBox="1"/>
           <p:nvPr/>
         </p:nvSpPr>
         <p:spPr>
           <a:xfrm>
-            <a:off x="6576237" y="3185319"/>
+            <a:off x="7361256" y="3454400"/>
             <a:ext cx="533400" cy="340519"/>
           </a:xfrm>
           <a:prstGeom prst="roundRect">
@@ -4237,13 +4678,13 @@
       </p:sp>
       <p:sp>
         <p:nvSpPr>
-          <p:cNvPr id="92" name="TextBox 91"/>
+          <p:cNvPr id="109" name="TextBox 108"/>
           <p:cNvSpPr txBox="1"/>
           <p:nvPr/>
         </p:nvSpPr>
         <p:spPr>
           <a:xfrm>
-            <a:off x="205581" y="1552377"/>
+            <a:off x="76200" y="1552377"/>
             <a:ext cx="533400" cy="340519"/>
           </a:xfrm>
           <a:prstGeom prst="roundRect">
@@ -4272,14 +4713,14 @@
       </p:sp>
       <p:sp>
         <p:nvSpPr>
-          <p:cNvPr id="97" name="TextBox 96"/>
+          <p:cNvPr id="110" name="TextBox 109"/>
           <p:cNvSpPr txBox="1"/>
           <p:nvPr/>
         </p:nvSpPr>
         <p:spPr>
           <a:xfrm>
-            <a:off x="738981" y="137319"/>
-            <a:ext cx="762000" cy="307777"/>
+            <a:off x="1523999" y="-15081"/>
+            <a:ext cx="1533097" cy="307777"/>
           </a:xfrm>
           <a:prstGeom prst="rect">
             <a:avLst/>
@@ -4298,7 +4739,15 @@
                   <a:srgbClr val="00B050"/>
                 </a:solidFill>
               </a:rPr>
-              <a:t>1. pull</a:t>
+              <a:t>1. </a:t>
+            </a:r>
+            <a:r>
+              <a:rPr lang="en-US" sz="1400" b="1" dirty="0" smtClean="0">
+                <a:solidFill>
+                  <a:srgbClr val="00B050"/>
+                </a:solidFill>
+              </a:rPr>
+              <a:t>pull</a:t>
             </a:r>
             <a:endParaRPr lang="en-US" sz="1400" b="1" dirty="0">
               <a:solidFill>
@@ -4310,13 +4759,13 @@
       </p:sp>
       <p:sp>
         <p:nvSpPr>
-          <p:cNvPr id="98" name="Arc 97"/>
+          <p:cNvPr id="112" name="Arc 111"/>
           <p:cNvSpPr/>
           <p:nvPr/>
         </p:nvSpPr>
         <p:spPr>
           <a:xfrm>
-            <a:off x="662781" y="978496"/>
+            <a:off x="1447800" y="978496"/>
             <a:ext cx="381000" cy="304800"/>
           </a:xfrm>
           <a:prstGeom prst="arc">
@@ -4358,13 +4807,13 @@
       </p:sp>
       <p:sp>
         <p:nvSpPr>
-          <p:cNvPr id="99" name="TextBox 98"/>
+          <p:cNvPr id="114" name="TextBox 113"/>
           <p:cNvSpPr txBox="1"/>
           <p:nvPr/>
         </p:nvSpPr>
         <p:spPr>
           <a:xfrm>
-            <a:off x="1119981" y="749896"/>
+            <a:off x="1905000" y="749896"/>
             <a:ext cx="990600" cy="646331"/>
           </a:xfrm>
           <a:prstGeom prst="rect">
@@ -4421,13 +4870,13 @@
       </p:sp>
       <p:sp>
         <p:nvSpPr>
-          <p:cNvPr id="102" name="TextBox 101"/>
+          <p:cNvPr id="127" name="TextBox 126"/>
           <p:cNvSpPr txBox="1"/>
           <p:nvPr/>
         </p:nvSpPr>
         <p:spPr>
           <a:xfrm>
-            <a:off x="1119981" y="2154238"/>
+            <a:off x="1905000" y="2619104"/>
             <a:ext cx="685800" cy="215444"/>
           </a:xfrm>
           <a:prstGeom prst="rect">
@@ -4459,13 +4908,13 @@
       </p:sp>
       <p:cxnSp>
         <p:nvCxnSpPr>
-          <p:cNvPr id="103" name="Straight Arrow Connector 102"/>
+          <p:cNvPr id="128" name="Straight Arrow Connector 127"/>
           <p:cNvCxnSpPr/>
           <p:nvPr/>
         </p:nvCxnSpPr>
         <p:spPr>
           <a:xfrm flipV="1">
-            <a:off x="2567781" y="1773238"/>
+            <a:off x="3352800" y="2042319"/>
             <a:ext cx="228600" cy="685800"/>
           </a:xfrm>
           <a:prstGeom prst="straightConnector1">
@@ -4497,13 +4946,13 @@
       </p:cxnSp>
       <p:sp>
         <p:nvSpPr>
-          <p:cNvPr id="107" name="TextBox 106"/>
+          <p:cNvPr id="129" name="TextBox 128"/>
           <p:cNvSpPr txBox="1"/>
           <p:nvPr/>
         </p:nvSpPr>
         <p:spPr>
           <a:xfrm rot="17318509">
-            <a:off x="2087118" y="1989319"/>
+            <a:off x="2872137" y="2258400"/>
             <a:ext cx="843775" cy="215444"/>
           </a:xfrm>
           <a:prstGeom prst="rect">
@@ -4539,13 +4988,13 @@
       </p:sp>
       <p:sp>
         <p:nvSpPr>
-          <p:cNvPr id="111" name="Arc 110"/>
+          <p:cNvPr id="130" name="Arc 129"/>
           <p:cNvSpPr/>
           <p:nvPr/>
         </p:nvSpPr>
         <p:spPr>
           <a:xfrm>
-            <a:off x="738981" y="216496"/>
+            <a:off x="1524000" y="216496"/>
             <a:ext cx="4419600" cy="1219200"/>
           </a:xfrm>
           <a:prstGeom prst="arc">
@@ -4587,14 +5036,14 @@
       </p:sp>
       <p:sp>
         <p:nvSpPr>
-          <p:cNvPr id="113" name="Arc 112"/>
+          <p:cNvPr id="131" name="Arc 130"/>
           <p:cNvSpPr/>
           <p:nvPr/>
         </p:nvSpPr>
         <p:spPr>
           <a:xfrm flipV="1">
-            <a:off x="815181" y="1359496"/>
-            <a:ext cx="1600200" cy="718542"/>
+            <a:off x="1563511" y="1529307"/>
+            <a:ext cx="1600200" cy="1025723"/>
           </a:xfrm>
           <a:prstGeom prst="arc">
             <a:avLst>
@@ -4635,13 +5084,13 @@
       </p:sp>
       <p:sp>
         <p:nvSpPr>
-          <p:cNvPr id="115" name="Arc 114"/>
+          <p:cNvPr id="134" name="Arc 133"/>
           <p:cNvSpPr/>
           <p:nvPr/>
         </p:nvSpPr>
         <p:spPr>
           <a:xfrm rot="2715976" flipV="1">
-            <a:off x="2998146" y="1853413"/>
+            <a:off x="3783165" y="2018071"/>
             <a:ext cx="1356586" cy="381000"/>
           </a:xfrm>
           <a:prstGeom prst="arc">
@@ -4683,13 +5132,13 @@
       </p:sp>
       <p:sp>
         <p:nvSpPr>
-          <p:cNvPr id="116" name="TextBox 115"/>
+          <p:cNvPr id="135" name="TextBox 134"/>
           <p:cNvSpPr txBox="1"/>
           <p:nvPr/>
         </p:nvSpPr>
         <p:spPr>
           <a:xfrm rot="2360287">
-            <a:off x="3177381" y="2273896"/>
+            <a:off x="3962400" y="2542977"/>
             <a:ext cx="685800" cy="215444"/>
           </a:xfrm>
           <a:prstGeom prst="rect">
@@ -4721,13 +5170,13 @@
       </p:sp>
       <p:sp>
         <p:nvSpPr>
-          <p:cNvPr id="117" name="Arc 116"/>
+          <p:cNvPr id="136" name="Arc 135"/>
           <p:cNvSpPr/>
           <p:nvPr/>
         </p:nvSpPr>
         <p:spPr>
           <a:xfrm rot="16709798">
-            <a:off x="4156356" y="2332422"/>
+            <a:off x="4941375" y="2601503"/>
             <a:ext cx="381000" cy="304800"/>
           </a:xfrm>
           <a:prstGeom prst="arc">
@@ -4773,13 +5222,13 @@
       </p:sp>
       <p:sp>
         <p:nvSpPr>
-          <p:cNvPr id="118" name="TextBox 117"/>
+          <p:cNvPr id="137" name="TextBox 136"/>
           <p:cNvSpPr txBox="1"/>
           <p:nvPr/>
         </p:nvSpPr>
         <p:spPr>
           <a:xfrm>
-            <a:off x="4091781" y="1816696"/>
+            <a:off x="4876800" y="2085777"/>
             <a:ext cx="838200" cy="430887"/>
           </a:xfrm>
           <a:prstGeom prst="rect">
@@ -4826,13 +5275,13 @@
       </p:sp>
       <p:sp>
         <p:nvSpPr>
-          <p:cNvPr id="119" name="Arc 118"/>
+          <p:cNvPr id="140" name="Arc 139"/>
           <p:cNvSpPr/>
           <p:nvPr/>
         </p:nvSpPr>
         <p:spPr>
           <a:xfrm rot="19019392" flipV="1">
-            <a:off x="4344224" y="1923378"/>
+            <a:off x="5129243" y="2088036"/>
             <a:ext cx="1356586" cy="381000"/>
           </a:xfrm>
           <a:prstGeom prst="arc">
@@ -4874,13 +5323,13 @@
       </p:sp>
       <p:sp>
         <p:nvSpPr>
-          <p:cNvPr id="120" name="TextBox 119"/>
+          <p:cNvPr id="141" name="TextBox 140"/>
           <p:cNvSpPr txBox="1"/>
           <p:nvPr/>
         </p:nvSpPr>
         <p:spPr>
           <a:xfrm rot="18996887">
-            <a:off x="5009792" y="2290249"/>
+            <a:off x="5695298" y="2559330"/>
             <a:ext cx="685800" cy="215444"/>
           </a:xfrm>
           <a:prstGeom prst="rect">
@@ -4912,13 +5361,13 @@
       </p:sp>
       <p:sp>
         <p:nvSpPr>
-          <p:cNvPr id="121" name="Arc 120"/>
+          <p:cNvPr id="142" name="Arc 141"/>
           <p:cNvSpPr/>
           <p:nvPr/>
         </p:nvSpPr>
         <p:spPr>
           <a:xfrm rot="2715976" flipV="1">
-            <a:off x="5515779" y="1794935"/>
+            <a:off x="6300798" y="1959593"/>
             <a:ext cx="1356586" cy="381000"/>
           </a:xfrm>
           <a:prstGeom prst="arc">
@@ -4960,13 +5409,13 @@
       </p:sp>
       <p:sp>
         <p:nvSpPr>
-          <p:cNvPr id="122" name="TextBox 121"/>
+          <p:cNvPr id="143" name="TextBox 142"/>
           <p:cNvSpPr txBox="1"/>
           <p:nvPr/>
         </p:nvSpPr>
         <p:spPr>
           <a:xfrm rot="1991192">
-            <a:off x="5695014" y="2215418"/>
+            <a:off x="6480033" y="2484499"/>
             <a:ext cx="685800" cy="215444"/>
           </a:xfrm>
           <a:prstGeom prst="rect">
@@ -4998,13 +5447,13 @@
       </p:sp>
       <p:sp>
         <p:nvSpPr>
-          <p:cNvPr id="123" name="Arc 122"/>
+          <p:cNvPr id="148" name="Arc 147"/>
           <p:cNvSpPr/>
           <p:nvPr/>
         </p:nvSpPr>
         <p:spPr>
           <a:xfrm rot="16709798">
-            <a:off x="6673989" y="2273944"/>
+            <a:off x="7459008" y="2543025"/>
             <a:ext cx="381000" cy="304800"/>
           </a:xfrm>
           <a:prstGeom prst="arc">
@@ -5046,13 +5495,13 @@
       </p:sp>
       <p:sp>
         <p:nvSpPr>
-          <p:cNvPr id="124" name="TextBox 123"/>
+          <p:cNvPr id="149" name="TextBox 148"/>
           <p:cNvSpPr txBox="1"/>
           <p:nvPr/>
         </p:nvSpPr>
         <p:spPr>
           <a:xfrm>
-            <a:off x="6609414" y="1969096"/>
+            <a:off x="7394433" y="2238177"/>
             <a:ext cx="835167" cy="215444"/>
           </a:xfrm>
           <a:prstGeom prst="rect">
@@ -5084,13 +5533,13 @@
       </p:sp>
       <p:sp>
         <p:nvSpPr>
-          <p:cNvPr id="125" name="Arc 124"/>
+          <p:cNvPr id="151" name="Arc 150"/>
           <p:cNvSpPr/>
           <p:nvPr/>
         </p:nvSpPr>
         <p:spPr>
           <a:xfrm rot="19019392" flipV="1">
-            <a:off x="6861857" y="1864900"/>
+            <a:off x="7646876" y="2029558"/>
             <a:ext cx="1356586" cy="381000"/>
           </a:xfrm>
           <a:prstGeom prst="arc">
@@ -5132,13 +5581,13 @@
       </p:sp>
       <p:sp>
         <p:nvSpPr>
-          <p:cNvPr id="126" name="TextBox 125"/>
+          <p:cNvPr id="152" name="TextBox 151"/>
           <p:cNvSpPr txBox="1"/>
           <p:nvPr/>
         </p:nvSpPr>
         <p:spPr>
           <a:xfrm rot="18996887">
-            <a:off x="7506125" y="2178227"/>
+            <a:off x="8291144" y="2447308"/>
             <a:ext cx="841701" cy="215444"/>
           </a:xfrm>
           <a:prstGeom prst="rect">
@@ -5170,13 +5619,13 @@
       </p:sp>
       <p:sp>
         <p:nvSpPr>
-          <p:cNvPr id="132" name="Freeform 131"/>
+          <p:cNvPr id="153" name="Freeform 152"/>
           <p:cNvSpPr/>
           <p:nvPr/>
         </p:nvSpPr>
         <p:spPr>
           <a:xfrm>
-            <a:off x="944545" y="423418"/>
+            <a:off x="1729564" y="423418"/>
             <a:ext cx="3959051" cy="1273620"/>
           </a:xfrm>
           <a:custGeom>
@@ -5304,13 +5753,13 @@
       </p:sp>
       <p:sp>
         <p:nvSpPr>
-          <p:cNvPr id="133" name="TextBox 132"/>
+          <p:cNvPr id="155" name="TextBox 154"/>
           <p:cNvSpPr txBox="1"/>
           <p:nvPr/>
         </p:nvSpPr>
         <p:spPr>
           <a:xfrm>
-            <a:off x="1119981" y="1697038"/>
+            <a:off x="1905000" y="1697038"/>
             <a:ext cx="838200" cy="215444"/>
           </a:xfrm>
           <a:prstGeom prst="rect">
@@ -5330,7 +5779,15 @@
                   <a:srgbClr val="00B050"/>
                 </a:solidFill>
               </a:rPr>
-              <a:t>3.1 update</a:t>
+              <a:t>3.1 </a:t>
+            </a:r>
+            <a:r>
+              <a:rPr lang="en-US" sz="1400" b="1" dirty="0" smtClean="0">
+                <a:solidFill>
+                  <a:srgbClr val="00B050"/>
+                </a:solidFill>
+              </a:rPr>
+              <a:t>pull</a:t>
             </a:r>
             <a:endParaRPr lang="en-US" sz="1400" b="1" dirty="0">
               <a:solidFill>
@@ -5342,13 +5799,13 @@
       </p:sp>
       <p:cxnSp>
         <p:nvCxnSpPr>
-          <p:cNvPr id="138" name="Straight Connector 137"/>
+          <p:cNvPr id="156" name="Straight Connector 155"/>
           <p:cNvCxnSpPr/>
           <p:nvPr/>
         </p:nvCxnSpPr>
         <p:spPr>
           <a:xfrm>
-            <a:off x="4548981" y="5275460"/>
+            <a:off x="5029200" y="5275460"/>
             <a:ext cx="3657600" cy="0"/>
           </a:xfrm>
           <a:prstGeom prst="line">
@@ -5380,13 +5837,13 @@
       </p:cxnSp>
       <p:sp>
         <p:nvSpPr>
-          <p:cNvPr id="139" name="Flowchart: Connector 138"/>
+          <p:cNvPr id="157" name="Flowchart: Connector 156"/>
           <p:cNvSpPr/>
           <p:nvPr/>
         </p:nvSpPr>
         <p:spPr>
           <a:xfrm>
-            <a:off x="5082382" y="5199260"/>
+            <a:off x="5562601" y="5199260"/>
             <a:ext cx="152400" cy="152400"/>
           </a:xfrm>
           <a:prstGeom prst="flowChartConnector">
@@ -5432,13 +5889,13 @@
       </p:sp>
       <p:sp>
         <p:nvSpPr>
-          <p:cNvPr id="144" name="Flowchart: Connector 143"/>
+          <p:cNvPr id="159" name="Flowchart: Connector 158"/>
           <p:cNvSpPr/>
           <p:nvPr/>
         </p:nvSpPr>
         <p:spPr>
           <a:xfrm>
-            <a:off x="7673181" y="5199260"/>
+            <a:off x="8153400" y="5199260"/>
             <a:ext cx="152400" cy="152400"/>
           </a:xfrm>
           <a:prstGeom prst="flowChartConnector">
@@ -5472,13 +5929,13 @@
       </p:sp>
       <p:sp>
         <p:nvSpPr>
-          <p:cNvPr id="145" name="Flowchart: Connector 144"/>
+          <p:cNvPr id="161" name="Flowchart: Connector 160"/>
           <p:cNvSpPr/>
           <p:nvPr/>
         </p:nvSpPr>
         <p:spPr>
           <a:xfrm>
-            <a:off x="6453981" y="5199260"/>
+            <a:off x="6934200" y="5199260"/>
             <a:ext cx="152400" cy="152400"/>
           </a:xfrm>
           <a:prstGeom prst="flowChartConnector">
@@ -5524,13 +5981,13 @@
       </p:sp>
       <p:sp>
         <p:nvSpPr>
-          <p:cNvPr id="146" name="Flowchart: Connector 145"/>
+          <p:cNvPr id="162" name="Flowchart: Connector 161"/>
           <p:cNvSpPr/>
           <p:nvPr/>
         </p:nvSpPr>
         <p:spPr>
           <a:xfrm>
-            <a:off x="6834981" y="4589660"/>
+            <a:off x="7315200" y="4589660"/>
             <a:ext cx="152400" cy="152400"/>
           </a:xfrm>
           <a:prstGeom prst="flowChartConnector">
@@ -5575,13 +6032,13 @@
       </p:sp>
       <p:sp>
         <p:nvSpPr>
-          <p:cNvPr id="147" name="Flowchart: Connector 146"/>
+          <p:cNvPr id="164" name="Flowchart: Connector 163"/>
           <p:cNvSpPr/>
           <p:nvPr/>
         </p:nvSpPr>
         <p:spPr>
           <a:xfrm>
-            <a:off x="5615782" y="4589660"/>
+            <a:off x="6096001" y="4589660"/>
             <a:ext cx="152400" cy="152400"/>
           </a:xfrm>
           <a:prstGeom prst="flowChartConnector">
@@ -5626,16 +6083,16 @@
       </p:sp>
       <p:cxnSp>
         <p:nvCxnSpPr>
-          <p:cNvPr id="150" name="Shape 149"/>
+          <p:cNvPr id="167" name="Shape 149"/>
           <p:cNvCxnSpPr>
-            <a:stCxn id="139" idx="0"/>
-            <a:endCxn id="147" idx="2"/>
+            <a:stCxn id="157" idx="0"/>
+            <a:endCxn id="164" idx="2"/>
           </p:cNvCxnSpPr>
           <p:nvPr/>
         </p:nvCxnSpPr>
         <p:spPr>
           <a:xfrm rot="5400000" flipH="1" flipV="1">
-            <a:off x="5120482" y="4703960"/>
+            <a:off x="5600701" y="4703960"/>
             <a:ext cx="533400" cy="457200"/>
           </a:xfrm>
           <a:prstGeom prst="curvedConnector2">
@@ -5666,16 +6123,16 @@
       </p:cxnSp>
       <p:cxnSp>
         <p:nvCxnSpPr>
-          <p:cNvPr id="154" name="Shape 153"/>
+          <p:cNvPr id="169" name="Shape 153"/>
           <p:cNvCxnSpPr>
-            <a:stCxn id="146" idx="6"/>
-            <a:endCxn id="144" idx="1"/>
+            <a:stCxn id="162" idx="6"/>
+            <a:endCxn id="159" idx="1"/>
           </p:cNvCxnSpPr>
           <p:nvPr/>
         </p:nvCxnSpPr>
         <p:spPr>
           <a:xfrm>
-            <a:off x="6987381" y="4665860"/>
+            <a:off x="7467600" y="4665860"/>
             <a:ext cx="708118" cy="555718"/>
           </a:xfrm>
           <a:prstGeom prst="curvedConnector2">
@@ -5706,16 +6163,16 @@
       </p:cxnSp>
       <p:cxnSp>
         <p:nvCxnSpPr>
-          <p:cNvPr id="158" name="Straight Arrow Connector 157"/>
+          <p:cNvPr id="171" name="Straight Arrow Connector 170"/>
           <p:cNvCxnSpPr>
-            <a:stCxn id="147" idx="6"/>
-            <a:endCxn id="146" idx="2"/>
+            <a:stCxn id="164" idx="6"/>
+            <a:endCxn id="162" idx="2"/>
           </p:cNvCxnSpPr>
           <p:nvPr/>
         </p:nvCxnSpPr>
         <p:spPr>
           <a:xfrm>
-            <a:off x="5768182" y="4665860"/>
+            <a:off x="6248401" y="4665860"/>
             <a:ext cx="1066799" cy="0"/>
           </a:xfrm>
           <a:prstGeom prst="straightConnector1">
@@ -5746,16 +6203,16 @@
       </p:cxnSp>
       <p:cxnSp>
         <p:nvCxnSpPr>
-          <p:cNvPr id="160" name="Curved Connector 159"/>
+          <p:cNvPr id="172" name="Curved Connector 171"/>
           <p:cNvCxnSpPr>
-            <a:stCxn id="145" idx="7"/>
-            <a:endCxn id="146" idx="4"/>
+            <a:stCxn id="161" idx="7"/>
+            <a:endCxn id="162" idx="4"/>
           </p:cNvCxnSpPr>
           <p:nvPr/>
         </p:nvCxnSpPr>
         <p:spPr>
           <a:xfrm rot="5400000" flipH="1" flipV="1">
-            <a:off x="6507863" y="4818260"/>
+            <a:off x="6988082" y="4818260"/>
             <a:ext cx="479518" cy="327118"/>
           </a:xfrm>
           <a:prstGeom prst="curvedConnector3">
@@ -5789,13 +6246,13 @@
       </p:cxnSp>
       <p:sp>
         <p:nvSpPr>
-          <p:cNvPr id="163" name="TextBox 162"/>
+          <p:cNvPr id="174" name="TextBox 173"/>
           <p:cNvSpPr txBox="1"/>
           <p:nvPr/>
         </p:nvSpPr>
         <p:spPr>
           <a:xfrm rot="18268321">
-            <a:off x="4662895" y="4608370"/>
+            <a:off x="5143114" y="4608370"/>
             <a:ext cx="762000" cy="307777"/>
           </a:xfrm>
           <a:prstGeom prst="rect">
@@ -5827,13 +6284,13 @@
       </p:sp>
       <p:sp>
         <p:nvSpPr>
-          <p:cNvPr id="165" name="TextBox 164"/>
+          <p:cNvPr id="175" name="TextBox 174"/>
           <p:cNvSpPr txBox="1"/>
           <p:nvPr/>
         </p:nvSpPr>
         <p:spPr>
           <a:xfrm rot="2419831">
-            <a:off x="7273198" y="4522254"/>
+            <a:off x="7753417" y="4522254"/>
             <a:ext cx="762000" cy="307777"/>
           </a:xfrm>
           <a:prstGeom prst="rect">
@@ -5865,13 +6322,13 @@
       </p:sp>
       <p:sp>
         <p:nvSpPr>
-          <p:cNvPr id="166" name="TextBox 165"/>
+          <p:cNvPr id="176" name="TextBox 175"/>
           <p:cNvSpPr txBox="1"/>
           <p:nvPr/>
         </p:nvSpPr>
         <p:spPr>
           <a:xfrm>
-            <a:off x="5768181" y="4056260"/>
+            <a:off x="6248400" y="4056260"/>
             <a:ext cx="1295400" cy="523220"/>
           </a:xfrm>
           <a:prstGeom prst="rect">
@@ -5915,13 +6372,13 @@
       </p:sp>
       <p:sp>
         <p:nvSpPr>
-          <p:cNvPr id="168" name="TextBox 167"/>
+          <p:cNvPr id="177" name="TextBox 176"/>
           <p:cNvSpPr txBox="1"/>
           <p:nvPr/>
         </p:nvSpPr>
         <p:spPr>
           <a:xfrm>
-            <a:off x="5920581" y="4815283"/>
+            <a:off x="6355855" y="4858742"/>
             <a:ext cx="762000" cy="307777"/>
           </a:xfrm>
           <a:prstGeom prst="rect">
@@ -5935,13 +6392,14 @@
           </a:bodyPr>
           <a:lstStyle/>
           <a:p>
+            <a:pPr algn="r"/>
             <a:r>
               <a:rPr lang="en-US" sz="1400" b="1" dirty="0" smtClean="0">
                 <a:solidFill>
                   <a:srgbClr val="00B050"/>
                 </a:solidFill>
               </a:rPr>
-              <a:t>update</a:t>
+              <a:t>pull</a:t>
             </a:r>
             <a:endParaRPr lang="en-US" sz="1400" b="1" dirty="0">
               <a:solidFill>
@@ -5953,13 +6411,13 @@
       </p:sp>
       <p:sp>
         <p:nvSpPr>
-          <p:cNvPr id="170" name="TextBox 169"/>
+          <p:cNvPr id="178" name="TextBox 177"/>
           <p:cNvSpPr txBox="1"/>
           <p:nvPr/>
         </p:nvSpPr>
         <p:spPr>
           <a:xfrm>
-            <a:off x="3786981" y="4970660"/>
+            <a:off x="4267200" y="4970660"/>
             <a:ext cx="762000" cy="523220"/>
           </a:xfrm>
           <a:prstGeom prst="rect">
@@ -6012,10 +6470,152 @@
           </a:p>
         </p:txBody>
       </p:sp>
+      <p:cxnSp>
+        <p:nvCxnSpPr>
+          <p:cNvPr id="179" name="Straight Arrow Connector 178"/>
+          <p:cNvCxnSpPr/>
+          <p:nvPr/>
+        </p:nvCxnSpPr>
+        <p:spPr>
+          <a:xfrm flipH="1">
+            <a:off x="4572000" y="1328598"/>
+            <a:ext cx="914400" cy="0"/>
+          </a:xfrm>
+          <a:prstGeom prst="straightConnector1">
+            <a:avLst/>
+          </a:prstGeom>
+          <a:ln w="28575">
+            <a:solidFill>
+              <a:schemeClr val="bg1">
+                <a:lumMod val="65000"/>
+              </a:schemeClr>
+            </a:solidFill>
+            <a:tailEnd type="triangle"/>
+          </a:ln>
+        </p:spPr>
+        <p:style>
+          <a:lnRef idx="1">
+            <a:schemeClr val="accent1"/>
+          </a:lnRef>
+          <a:fillRef idx="0">
+            <a:schemeClr val="accent1"/>
+          </a:fillRef>
+          <a:effectRef idx="0">
+            <a:schemeClr val="accent1"/>
+          </a:effectRef>
+          <a:fontRef idx="minor">
+            <a:schemeClr val="tx1"/>
+          </a:fontRef>
+        </p:style>
+      </p:cxnSp>
+      <p:sp>
+        <p:nvSpPr>
+          <p:cNvPr id="180" name="TextBox 179"/>
+          <p:cNvSpPr txBox="1"/>
+          <p:nvPr/>
+        </p:nvSpPr>
+        <p:spPr>
+          <a:xfrm>
+            <a:off x="4385258" y="975519"/>
+            <a:ext cx="1482143" cy="307777"/>
+          </a:xfrm>
+          <a:prstGeom prst="rect">
+            <a:avLst/>
+          </a:prstGeom>
+          <a:noFill/>
+        </p:spPr>
+        <p:txBody>
+          <a:bodyPr wrap="square" rtlCol="0">
+            <a:spAutoFit/>
+          </a:bodyPr>
+          <a:lstStyle/>
+          <a:p>
+            <a:r>
+              <a:rPr lang="en-US" sz="1400" b="1" dirty="0" smtClean="0">
+                <a:solidFill>
+                  <a:schemeClr val="bg1">
+                    <a:lumMod val="65000"/>
+                  </a:schemeClr>
+                </a:solidFill>
+              </a:rPr>
+              <a:t>server-side clone</a:t>
+            </a:r>
+            <a:endParaRPr lang="en-US" sz="1400" b="1" dirty="0">
+              <a:solidFill>
+                <a:schemeClr val="bg1">
+                  <a:lumMod val="65000"/>
+                </a:schemeClr>
+              </a:solidFill>
+            </a:endParaRPr>
+          </a:p>
+        </p:txBody>
+      </p:sp>
+      <p:sp>
+        <p:nvSpPr>
+          <p:cNvPr id="181" name="Can 180"/>
+          <p:cNvSpPr/>
+          <p:nvPr/>
+        </p:nvSpPr>
+        <p:spPr>
+          <a:xfrm>
+            <a:off x="805543" y="902296"/>
+            <a:ext cx="685800" cy="650081"/>
+          </a:xfrm>
+          <a:prstGeom prst="can">
+            <a:avLst/>
+          </a:prstGeom>
+          <a:solidFill>
+            <a:schemeClr val="accent2">
+              <a:lumMod val="60000"/>
+              <a:lumOff val="40000"/>
+            </a:schemeClr>
+          </a:solidFill>
+          <a:ln>
+            <a:solidFill>
+              <a:srgbClr val="D28280"/>
+            </a:solidFill>
+          </a:ln>
+        </p:spPr>
+        <p:style>
+          <a:lnRef idx="2">
+            <a:schemeClr val="accent1">
+              <a:shade val="50000"/>
+            </a:schemeClr>
+          </a:lnRef>
+          <a:fillRef idx="1">
+            <a:schemeClr val="accent1"/>
+          </a:fillRef>
+          <a:effectRef idx="0">
+            <a:schemeClr val="accent1"/>
+          </a:effectRef>
+          <a:fontRef idx="minor">
+            <a:schemeClr val="lt1"/>
+          </a:fontRef>
+        </p:style>
+        <p:txBody>
+          <a:bodyPr rtlCol="0" anchor="ctr"/>
+          <a:lstStyle/>
+          <a:p>
+            <a:pPr algn="ctr"/>
+            <a:r>
+              <a:rPr lang="en-US" sz="1600" b="1" dirty="0"/>
+              <a:t>Local</a:t>
+            </a:r>
+          </a:p>
+          <a:p>
+            <a:pPr algn="ctr"/>
+            <a:r>
+              <a:rPr lang="en-US" sz="1600" b="1" dirty="0"/>
+              <a:t>Repo</a:t>
+            </a:r>
+            <a:endParaRPr lang="en-US" sz="1600" b="1" dirty="0"/>
+          </a:p>
+        </p:txBody>
+      </p:sp>
     </p:spTree>
     <p:extLst>
       <p:ext uri="{BB962C8B-B14F-4D97-AF65-F5344CB8AC3E}">
-        <p14:creationId xmlns:p14="http://schemas.microsoft.com/office/powerpoint/2010/main" xmlns="" val="2312643091"/>
+        <p14:creationId xmlns:p14="http://schemas.microsoft.com/office/powerpoint/2010/main" val="2312643091"/>
       </p:ext>
     </p:extLst>
   </p:cSld>

</xml_diff>

<commit_message>
Reverting Issue495 [add more information/keywords into the index page] Reverting previous changes to apply a new page layout.
</commit_message>
<xml_diff>
--- a/doc/diagrams/workflow.pptx
+++ b/doc/diagrams/workflow.pptx
@@ -10,7 +10,7 @@
   <p:sldIdLst>
     <p:sldId id="256" r:id="rId2"/>
   </p:sldIdLst>
-  <p:sldSz cx="8640763" cy="5761038"/>
+  <p:sldSz cx="9144000" cy="5761038"/>
   <p:notesSz cx="6858000" cy="9144000"/>
   <p:defaultTextStyle>
     <a:defPPr>
@@ -193,7 +193,7 @@
             <a:fld id="{DC50A2AC-D691-437C-A69B-81ECFE08AD4B}" type="datetimeFigureOut">
               <a:rPr lang="en-SG" smtClean="0"/>
               <a:pPr/>
-              <a:t>28/7/2012</a:t>
+              <a:t>9/2/2013</a:t>
             </a:fld>
             <a:endParaRPr lang="en-SG"/>
           </a:p>
@@ -211,8 +211,8 @@
         </p:nvSpPr>
         <p:spPr>
           <a:xfrm>
-            <a:off x="858838" y="685800"/>
-            <a:ext cx="5140325" cy="3429000"/>
+            <a:off x="708025" y="685800"/>
+            <a:ext cx="5441950" cy="3429000"/>
           </a:xfrm>
           <a:prstGeom prst="rect">
             <a:avLst/>
@@ -362,7 +362,7 @@
     </p:spTree>
     <p:extLst>
       <p:ext uri="{BB962C8B-B14F-4D97-AF65-F5344CB8AC3E}">
-        <p14:creationId xmlns:p14="http://schemas.microsoft.com/office/powerpoint/2010/main" xmlns="" val="2265103329"/>
+        <p14:creationId xmlns:p14="http://schemas.microsoft.com/office/powerpoint/2010/main" val="2265103329"/>
       </p:ext>
     </p:extLst>
   </p:cSld>
@@ -491,8 +491,8 @@
         </p:nvSpPr>
         <p:spPr>
           <a:xfrm>
-            <a:off x="858838" y="685800"/>
-            <a:ext cx="5140325" cy="3429000"/>
+            <a:off x="708025" y="685800"/>
+            <a:ext cx="5441950" cy="3429000"/>
           </a:xfrm>
         </p:spPr>
       </p:sp>
@@ -542,7 +542,7 @@
     </p:spTree>
     <p:extLst>
       <p:ext uri="{BB962C8B-B14F-4D97-AF65-F5344CB8AC3E}">
-        <p14:creationId xmlns:p14="http://schemas.microsoft.com/office/powerpoint/2010/main" xmlns="" val="1558229004"/>
+        <p14:creationId xmlns:p14="http://schemas.microsoft.com/office/powerpoint/2010/main" val="1558229004"/>
       </p:ext>
     </p:extLst>
   </p:cSld>
@@ -581,8 +581,8 @@
         </p:nvSpPr>
         <p:spPr>
           <a:xfrm>
-            <a:off x="648057" y="1789656"/>
-            <a:ext cx="7344649" cy="1234890"/>
+            <a:off x="685802" y="1789656"/>
+            <a:ext cx="7772400" cy="1234890"/>
           </a:xfrm>
         </p:spPr>
         <p:txBody>
@@ -609,8 +609,8 @@
         </p:nvSpPr>
         <p:spPr>
           <a:xfrm>
-            <a:off x="1296115" y="3264588"/>
-            <a:ext cx="6048534" cy="1472266"/>
+            <a:off x="1371601" y="3264588"/>
+            <a:ext cx="6400800" cy="1472266"/>
           </a:xfrm>
         </p:spPr>
         <p:txBody>
@@ -734,7 +734,7 @@
             <a:fld id="{1D8BD707-D9CF-40AE-B4C6-C98DA3205C09}" type="datetimeFigureOut">
               <a:rPr lang="en-US" smtClean="0"/>
               <a:pPr/>
-              <a:t>7/28/2012</a:t>
+              <a:t>2/9/2013</a:t>
             </a:fld>
             <a:endParaRPr lang="en-US"/>
           </a:p>
@@ -901,7 +901,7 @@
             <a:fld id="{1D8BD707-D9CF-40AE-B4C6-C98DA3205C09}" type="datetimeFigureOut">
               <a:rPr lang="en-US" smtClean="0"/>
               <a:pPr/>
-              <a:t>7/28/2012</a:t>
+              <a:t>2/9/2013</a:t>
             </a:fld>
             <a:endParaRPr lang="en-US"/>
           </a:p>
@@ -987,8 +987,8 @@
         </p:nvSpPr>
         <p:spPr>
           <a:xfrm>
-            <a:off x="6264553" y="230710"/>
-            <a:ext cx="1944172" cy="4915552"/>
+            <a:off x="6629401" y="230710"/>
+            <a:ext cx="2057400" cy="4915552"/>
           </a:xfrm>
         </p:spPr>
         <p:txBody>
@@ -1015,8 +1015,8 @@
         </p:nvSpPr>
         <p:spPr>
           <a:xfrm>
-            <a:off x="432039" y="230710"/>
-            <a:ext cx="5688502" cy="4915552"/>
+            <a:off x="457201" y="230710"/>
+            <a:ext cx="6019800" cy="4915552"/>
           </a:xfrm>
         </p:spPr>
         <p:txBody>
@@ -1078,7 +1078,7 @@
             <a:fld id="{1D8BD707-D9CF-40AE-B4C6-C98DA3205C09}" type="datetimeFigureOut">
               <a:rPr lang="en-US" smtClean="0"/>
               <a:pPr/>
-              <a:t>7/28/2012</a:t>
+              <a:t>2/9/2013</a:t>
             </a:fld>
             <a:endParaRPr lang="en-US"/>
           </a:p>
@@ -1245,7 +1245,7 @@
             <a:fld id="{1D8BD707-D9CF-40AE-B4C6-C98DA3205C09}" type="datetimeFigureOut">
               <a:rPr lang="en-US" smtClean="0"/>
               <a:pPr/>
-              <a:t>7/28/2012</a:t>
+              <a:t>2/9/2013</a:t>
             </a:fld>
             <a:endParaRPr lang="en-US"/>
           </a:p>
@@ -1331,8 +1331,8 @@
         </p:nvSpPr>
         <p:spPr>
           <a:xfrm>
-            <a:off x="682561" y="3702001"/>
-            <a:ext cx="7344649" cy="1144206"/>
+            <a:off x="722314" y="3702001"/>
+            <a:ext cx="7772400" cy="1144206"/>
           </a:xfrm>
         </p:spPr>
         <p:txBody>
@@ -1363,8 +1363,8 @@
         </p:nvSpPr>
         <p:spPr>
           <a:xfrm>
-            <a:off x="682561" y="2441774"/>
-            <a:ext cx="7344649" cy="1260227"/>
+            <a:off x="722314" y="2441774"/>
+            <a:ext cx="7772400" cy="1260227"/>
           </a:xfrm>
         </p:spPr>
         <p:txBody>
@@ -1488,7 +1488,7 @@
             <a:fld id="{1D8BD707-D9CF-40AE-B4C6-C98DA3205C09}" type="datetimeFigureOut">
               <a:rPr lang="en-US" smtClean="0"/>
               <a:pPr/>
-              <a:t>7/28/2012</a:t>
+              <a:t>2/9/2013</a:t>
             </a:fld>
             <a:endParaRPr lang="en-US"/>
           </a:p>
@@ -1597,8 +1597,8 @@
         </p:nvSpPr>
         <p:spPr>
           <a:xfrm>
-            <a:off x="432039" y="1344242"/>
-            <a:ext cx="3816337" cy="3802019"/>
+            <a:off x="457202" y="1344242"/>
+            <a:ext cx="4038600" cy="3802019"/>
           </a:xfrm>
         </p:spPr>
         <p:txBody>
@@ -1682,8 +1682,8 @@
         </p:nvSpPr>
         <p:spPr>
           <a:xfrm>
-            <a:off x="4392388" y="1344242"/>
-            <a:ext cx="3816337" cy="3802019"/>
+            <a:off x="4648201" y="1344242"/>
+            <a:ext cx="4038600" cy="3802019"/>
           </a:xfrm>
         </p:spPr>
         <p:txBody>
@@ -1773,7 +1773,7 @@
             <a:fld id="{1D8BD707-D9CF-40AE-B4C6-C98DA3205C09}" type="datetimeFigureOut">
               <a:rPr lang="en-US" smtClean="0"/>
               <a:pPr/>
-              <a:t>7/28/2012</a:t>
+              <a:t>2/9/2013</a:t>
             </a:fld>
             <a:endParaRPr lang="en-US"/>
           </a:p>
@@ -1886,8 +1886,8 @@
         </p:nvSpPr>
         <p:spPr>
           <a:xfrm>
-            <a:off x="432039" y="1289566"/>
-            <a:ext cx="3817838" cy="537430"/>
+            <a:off x="457201" y="1289566"/>
+            <a:ext cx="4040189" cy="537430"/>
           </a:xfrm>
         </p:spPr>
         <p:txBody>
@@ -1951,8 +1951,8 @@
         </p:nvSpPr>
         <p:spPr>
           <a:xfrm>
-            <a:off x="432039" y="1826997"/>
-            <a:ext cx="3817838" cy="3319265"/>
+            <a:off x="457201" y="1826997"/>
+            <a:ext cx="4040189" cy="3319265"/>
           </a:xfrm>
         </p:spPr>
         <p:txBody>
@@ -2036,8 +2036,8 @@
         </p:nvSpPr>
         <p:spPr>
           <a:xfrm>
-            <a:off x="4389389" y="1289566"/>
-            <a:ext cx="3819337" cy="537430"/>
+            <a:off x="4645028" y="1289566"/>
+            <a:ext cx="4041774" cy="537430"/>
           </a:xfrm>
         </p:spPr>
         <p:txBody>
@@ -2101,8 +2101,8 @@
         </p:nvSpPr>
         <p:spPr>
           <a:xfrm>
-            <a:off x="4389389" y="1826997"/>
-            <a:ext cx="3819337" cy="3319265"/>
+            <a:off x="4645028" y="1826997"/>
+            <a:ext cx="4041774" cy="3319265"/>
           </a:xfrm>
         </p:spPr>
         <p:txBody>
@@ -2192,7 +2192,7 @@
             <a:fld id="{1D8BD707-D9CF-40AE-B4C6-C98DA3205C09}" type="datetimeFigureOut">
               <a:rPr lang="en-US" smtClean="0"/>
               <a:pPr/>
-              <a:t>7/28/2012</a:t>
+              <a:t>2/9/2013</a:t>
             </a:fld>
             <a:endParaRPr lang="en-US"/>
           </a:p>
@@ -2307,7 +2307,7 @@
             <a:fld id="{1D8BD707-D9CF-40AE-B4C6-C98DA3205C09}" type="datetimeFigureOut">
               <a:rPr lang="en-US" smtClean="0"/>
               <a:pPr/>
-              <a:t>7/28/2012</a:t>
+              <a:t>2/9/2013</a:t>
             </a:fld>
             <a:endParaRPr lang="en-US"/>
           </a:p>
@@ -2399,7 +2399,7 @@
             <a:fld id="{1D8BD707-D9CF-40AE-B4C6-C98DA3205C09}" type="datetimeFigureOut">
               <a:rPr lang="en-US" smtClean="0"/>
               <a:pPr/>
-              <a:t>7/28/2012</a:t>
+              <a:t>2/9/2013</a:t>
             </a:fld>
             <a:endParaRPr lang="en-US"/>
           </a:p>
@@ -2485,8 +2485,8 @@
         </p:nvSpPr>
         <p:spPr>
           <a:xfrm>
-            <a:off x="432039" y="229375"/>
-            <a:ext cx="2842752" cy="976176"/>
+            <a:off x="457201" y="229375"/>
+            <a:ext cx="3008314" cy="976176"/>
           </a:xfrm>
         </p:spPr>
         <p:txBody>
@@ -2517,8 +2517,8 @@
         </p:nvSpPr>
         <p:spPr>
           <a:xfrm>
-            <a:off x="3378298" y="229375"/>
-            <a:ext cx="4830427" cy="4916886"/>
+            <a:off x="3575051" y="229375"/>
+            <a:ext cx="5111751" cy="4916886"/>
           </a:xfrm>
         </p:spPr>
         <p:txBody>
@@ -2602,8 +2602,8 @@
         </p:nvSpPr>
         <p:spPr>
           <a:xfrm>
-            <a:off x="432039" y="1205551"/>
-            <a:ext cx="2842752" cy="3940710"/>
+            <a:off x="457201" y="1205551"/>
+            <a:ext cx="3008314" cy="3940710"/>
           </a:xfrm>
         </p:spPr>
         <p:txBody>
@@ -2673,7 +2673,7 @@
             <a:fld id="{1D8BD707-D9CF-40AE-B4C6-C98DA3205C09}" type="datetimeFigureOut">
               <a:rPr lang="en-US" smtClean="0"/>
               <a:pPr/>
-              <a:t>7/28/2012</a:t>
+              <a:t>2/9/2013</a:t>
             </a:fld>
             <a:endParaRPr lang="en-US"/>
           </a:p>
@@ -2759,8 +2759,8 @@
         </p:nvSpPr>
         <p:spPr>
           <a:xfrm>
-            <a:off x="1693650" y="4032727"/>
-            <a:ext cx="5184458" cy="476086"/>
+            <a:off x="1792288" y="4032727"/>
+            <a:ext cx="5486400" cy="476086"/>
           </a:xfrm>
         </p:spPr>
         <p:txBody>
@@ -2791,8 +2791,8 @@
         </p:nvSpPr>
         <p:spPr>
           <a:xfrm>
-            <a:off x="1693650" y="514760"/>
-            <a:ext cx="5184458" cy="3456623"/>
+            <a:off x="1792288" y="514762"/>
+            <a:ext cx="5486400" cy="3456623"/>
           </a:xfrm>
         </p:spPr>
         <p:txBody>
@@ -2852,8 +2852,8 @@
         </p:nvSpPr>
         <p:spPr>
           <a:xfrm>
-            <a:off x="1693650" y="4508813"/>
-            <a:ext cx="5184458" cy="676121"/>
+            <a:off x="1792288" y="4508815"/>
+            <a:ext cx="5486400" cy="676121"/>
           </a:xfrm>
         </p:spPr>
         <p:txBody>
@@ -2923,7 +2923,7 @@
             <a:fld id="{1D8BD707-D9CF-40AE-B4C6-C98DA3205C09}" type="datetimeFigureOut">
               <a:rPr lang="en-US" smtClean="0"/>
               <a:pPr/>
-              <a:t>7/28/2012</a:t>
+              <a:t>2/9/2013</a:t>
             </a:fld>
             <a:endParaRPr lang="en-US"/>
           </a:p>
@@ -3014,8 +3014,8 @@
         </p:nvSpPr>
         <p:spPr>
           <a:xfrm>
-            <a:off x="432038" y="230709"/>
-            <a:ext cx="7776687" cy="960173"/>
+            <a:off x="457202" y="230709"/>
+            <a:ext cx="8229600" cy="960173"/>
           </a:xfrm>
           <a:prstGeom prst="rect">
             <a:avLst/>
@@ -3047,8 +3047,8 @@
         </p:nvSpPr>
         <p:spPr>
           <a:xfrm>
-            <a:off x="432038" y="1344242"/>
-            <a:ext cx="7776687" cy="3802019"/>
+            <a:off x="457202" y="1344242"/>
+            <a:ext cx="8229600" cy="3802019"/>
           </a:xfrm>
           <a:prstGeom prst="rect">
             <a:avLst/>
@@ -3109,8 +3109,8 @@
         </p:nvSpPr>
         <p:spPr>
           <a:xfrm>
-            <a:off x="432039" y="5339630"/>
-            <a:ext cx="2016178" cy="306722"/>
+            <a:off x="457201" y="5339630"/>
+            <a:ext cx="2133600" cy="306722"/>
           </a:xfrm>
           <a:prstGeom prst="rect">
             <a:avLst/>
@@ -3133,7 +3133,7 @@
             <a:fld id="{1D8BD707-D9CF-40AE-B4C6-C98DA3205C09}" type="datetimeFigureOut">
               <a:rPr lang="en-US" smtClean="0"/>
               <a:pPr/>
-              <a:t>7/28/2012</a:t>
+              <a:t>2/9/2013</a:t>
             </a:fld>
             <a:endParaRPr lang="en-US"/>
           </a:p>
@@ -3151,8 +3151,8 @@
         </p:nvSpPr>
         <p:spPr>
           <a:xfrm>
-            <a:off x="2952262" y="5339630"/>
-            <a:ext cx="2736242" cy="306722"/>
+            <a:off x="3124202" y="5339630"/>
+            <a:ext cx="2895600" cy="306722"/>
           </a:xfrm>
           <a:prstGeom prst="rect">
             <a:avLst/>
@@ -3188,8 +3188,8 @@
         </p:nvSpPr>
         <p:spPr>
           <a:xfrm>
-            <a:off x="6192548" y="5339630"/>
-            <a:ext cx="2016178" cy="306722"/>
+            <a:off x="6553201" y="5339630"/>
+            <a:ext cx="2133600" cy="306722"/>
           </a:xfrm>
           <a:prstGeom prst="rect">
             <a:avLst/>
@@ -3506,13 +3506,449 @@
       </p:grpSpPr>
       <p:sp>
         <p:nvSpPr>
-          <p:cNvPr id="173" name="Rounded Rectangle 172"/>
+          <p:cNvPr id="5" name="laptop"/>
+          <p:cNvSpPr>
+            <a:spLocks noEditPoints="1" noChangeArrowheads="1"/>
+          </p:cNvSpPr>
+          <p:nvPr/>
+        </p:nvSpPr>
+        <p:spPr bwMode="auto">
+          <a:xfrm>
+            <a:off x="457199" y="1053848"/>
+            <a:ext cx="1272365" cy="988472"/>
+          </a:xfrm>
+          <a:custGeom>
+            <a:avLst/>
+            <a:gdLst>
+              <a:gd name="T0" fmla="*/ 3362 w 21600"/>
+              <a:gd name="T1" fmla="*/ 0 h 21600"/>
+              <a:gd name="T2" fmla="*/ 3362 w 21600"/>
+              <a:gd name="T3" fmla="*/ 7173 h 21600"/>
+              <a:gd name="T4" fmla="*/ 18327 w 21600"/>
+              <a:gd name="T5" fmla="*/ 0 h 21600"/>
+              <a:gd name="T6" fmla="*/ 18327 w 21600"/>
+              <a:gd name="T7" fmla="*/ 7173 h 21600"/>
+              <a:gd name="T8" fmla="*/ 10800 w 21600"/>
+              <a:gd name="T9" fmla="*/ 0 h 21600"/>
+              <a:gd name="T10" fmla="*/ 10800 w 21600"/>
+              <a:gd name="T11" fmla="*/ 21600 h 21600"/>
+              <a:gd name="T12" fmla="*/ 0 w 21600"/>
+              <a:gd name="T13" fmla="*/ 21600 h 21600"/>
+              <a:gd name="T14" fmla="*/ 21600 w 21600"/>
+              <a:gd name="T15" fmla="*/ 21600 h 21600"/>
+              <a:gd name="T16" fmla="*/ 4445 w 21600"/>
+              <a:gd name="T17" fmla="*/ 1858 h 21600"/>
+              <a:gd name="T18" fmla="*/ 17311 w 21600"/>
+              <a:gd name="T19" fmla="*/ 12323 h 21600"/>
+            </a:gdLst>
+            <a:ahLst/>
+            <a:cxnLst>
+              <a:cxn ang="0">
+                <a:pos x="T0" y="T1"/>
+              </a:cxn>
+              <a:cxn ang="0">
+                <a:pos x="T2" y="T3"/>
+              </a:cxn>
+              <a:cxn ang="0">
+                <a:pos x="T4" y="T5"/>
+              </a:cxn>
+              <a:cxn ang="0">
+                <a:pos x="T6" y="T7"/>
+              </a:cxn>
+              <a:cxn ang="0">
+                <a:pos x="T8" y="T9"/>
+              </a:cxn>
+              <a:cxn ang="0">
+                <a:pos x="T10" y="T11"/>
+              </a:cxn>
+              <a:cxn ang="0">
+                <a:pos x="T12" y="T13"/>
+              </a:cxn>
+              <a:cxn ang="0">
+                <a:pos x="T14" y="T15"/>
+              </a:cxn>
+            </a:cxnLst>
+            <a:rect l="T16" t="T17" r="T18" b="T19"/>
+            <a:pathLst>
+              <a:path w="21600" h="21600" extrusionOk="0">
+                <a:moveTo>
+                  <a:pt x="3362" y="0"/>
+                </a:moveTo>
+                <a:lnTo>
+                  <a:pt x="18327" y="0"/>
+                </a:lnTo>
+                <a:lnTo>
+                  <a:pt x="18327" y="14347"/>
+                </a:lnTo>
+                <a:lnTo>
+                  <a:pt x="3362" y="14347"/>
+                </a:lnTo>
+                <a:lnTo>
+                  <a:pt x="3362" y="0"/>
+                </a:lnTo>
+                <a:close/>
+              </a:path>
+              <a:path w="21600" h="21600" extrusionOk="0">
+                <a:moveTo>
+                  <a:pt x="3340" y="15068"/>
+                </a:moveTo>
+                <a:lnTo>
+                  <a:pt x="0" y="19877"/>
+                </a:lnTo>
+                <a:lnTo>
+                  <a:pt x="21600" y="19877"/>
+                </a:lnTo>
+                <a:lnTo>
+                  <a:pt x="18327" y="15068"/>
+                </a:lnTo>
+                <a:lnTo>
+                  <a:pt x="3340" y="15068"/>
+                </a:lnTo>
+                <a:close/>
+              </a:path>
+              <a:path w="21600" h="21600" extrusionOk="0">
+                <a:moveTo>
+                  <a:pt x="0" y="19877"/>
+                </a:moveTo>
+                <a:lnTo>
+                  <a:pt x="0" y="21600"/>
+                </a:lnTo>
+                <a:lnTo>
+                  <a:pt x="21600" y="21600"/>
+                </a:lnTo>
+                <a:lnTo>
+                  <a:pt x="21600" y="19877"/>
+                </a:lnTo>
+                <a:lnTo>
+                  <a:pt x="0" y="19877"/>
+                </a:lnTo>
+                <a:close/>
+              </a:path>
+              <a:path w="21600" h="21600" extrusionOk="0">
+                <a:moveTo>
+                  <a:pt x="4186" y="1523"/>
+                </a:moveTo>
+                <a:lnTo>
+                  <a:pt x="17547" y="1523"/>
+                </a:lnTo>
+                <a:lnTo>
+                  <a:pt x="17547" y="12744"/>
+                </a:lnTo>
+                <a:lnTo>
+                  <a:pt x="4186" y="12744"/>
+                </a:lnTo>
+                <a:lnTo>
+                  <a:pt x="4186" y="1523"/>
+                </a:lnTo>
+                <a:close/>
+              </a:path>
+              <a:path w="21600" h="21600" extrusionOk="0">
+                <a:moveTo>
+                  <a:pt x="3318" y="15549"/>
+                </a:moveTo>
+                <a:lnTo>
+                  <a:pt x="2917" y="16110"/>
+                </a:lnTo>
+                <a:lnTo>
+                  <a:pt x="18727" y="16110"/>
+                </a:lnTo>
+                <a:lnTo>
+                  <a:pt x="18327" y="15549"/>
+                </a:lnTo>
+                <a:lnTo>
+                  <a:pt x="3318" y="15549"/>
+                </a:lnTo>
+                <a:close/>
+              </a:path>
+              <a:path w="21600" h="21600" extrusionOk="0">
+                <a:moveTo>
+                  <a:pt x="6213" y="18314"/>
+                </a:moveTo>
+                <a:lnTo>
+                  <a:pt x="5946" y="18875"/>
+                </a:lnTo>
+                <a:lnTo>
+                  <a:pt x="15766" y="18875"/>
+                </a:lnTo>
+                <a:lnTo>
+                  <a:pt x="15499" y="18314"/>
+                </a:lnTo>
+                <a:lnTo>
+                  <a:pt x="6213" y="18314"/>
+                </a:lnTo>
+                <a:close/>
+              </a:path>
+              <a:path w="21600" h="21600" extrusionOk="0">
+                <a:moveTo>
+                  <a:pt x="2828" y="16471"/>
+                </a:moveTo>
+                <a:lnTo>
+                  <a:pt x="2405" y="17072"/>
+                </a:lnTo>
+                <a:lnTo>
+                  <a:pt x="19284" y="17072"/>
+                </a:lnTo>
+                <a:lnTo>
+                  <a:pt x="18839" y="16471"/>
+                </a:lnTo>
+                <a:lnTo>
+                  <a:pt x="2828" y="16471"/>
+                </a:lnTo>
+                <a:close/>
+              </a:path>
+              <a:path w="21600" h="21600" extrusionOk="0">
+                <a:moveTo>
+                  <a:pt x="2316" y="17352"/>
+                </a:moveTo>
+                <a:lnTo>
+                  <a:pt x="1871" y="17953"/>
+                </a:lnTo>
+                <a:lnTo>
+                  <a:pt x="19863" y="17953"/>
+                </a:lnTo>
+                <a:lnTo>
+                  <a:pt x="19395" y="17352"/>
+                </a:lnTo>
+                <a:lnTo>
+                  <a:pt x="2316" y="17352"/>
+                </a:lnTo>
+                <a:close/>
+              </a:path>
+            </a:pathLst>
+          </a:custGeom>
+          <a:solidFill>
+            <a:schemeClr val="bg1"/>
+          </a:solidFill>
+          <a:ln w="38100">
+            <a:solidFill>
+              <a:schemeClr val="bg1">
+                <a:lumMod val="85000"/>
+              </a:schemeClr>
+            </a:solidFill>
+            <a:miter lim="800000"/>
+            <a:headEnd/>
+            <a:tailEnd/>
+          </a:ln>
+        </p:spPr>
+        <p:txBody>
+          <a:bodyPr vert="horz" wrap="square" lIns="91440" tIns="45720" rIns="91440" bIns="45720" numCol="1" anchor="t" anchorCtr="0" compatLnSpc="1">
+            <a:prstTxWarp prst="textNoShape">
+              <a:avLst/>
+            </a:prstTxWarp>
+          </a:bodyPr>
+          <a:lstStyle/>
+          <a:p>
+            <a:endParaRPr lang="en-US"/>
+          </a:p>
+        </p:txBody>
+      </p:sp>
+      <p:sp>
+        <p:nvSpPr>
+          <p:cNvPr id="80" name="Cloud 79"/>
           <p:cNvSpPr/>
           <p:nvPr/>
         </p:nvSpPr>
         <p:spPr>
           <a:xfrm>
-            <a:off x="3482181" y="3947319"/>
+            <a:off x="7941267" y="1350987"/>
+            <a:ext cx="1186265" cy="462732"/>
+          </a:xfrm>
+          <a:prstGeom prst="cloud">
+            <a:avLst/>
+          </a:prstGeom>
+          <a:solidFill>
+            <a:schemeClr val="bg1"/>
+          </a:solidFill>
+          <a:ln>
+            <a:solidFill>
+              <a:schemeClr val="bg1">
+                <a:lumMod val="85000"/>
+              </a:schemeClr>
+            </a:solidFill>
+          </a:ln>
+        </p:spPr>
+        <p:style>
+          <a:lnRef idx="2">
+            <a:schemeClr val="accent1">
+              <a:shade val="50000"/>
+            </a:schemeClr>
+          </a:lnRef>
+          <a:fillRef idx="1">
+            <a:schemeClr val="accent1"/>
+          </a:fillRef>
+          <a:effectRef idx="0">
+            <a:schemeClr val="accent1"/>
+          </a:effectRef>
+          <a:fontRef idx="minor">
+            <a:schemeClr val="lt1"/>
+          </a:fontRef>
+        </p:style>
+        <p:txBody>
+          <a:bodyPr lIns="0" rIns="0" bIns="0" rtlCol="0" anchor="ctr"/>
+          <a:lstStyle/>
+          <a:p>
+            <a:pPr algn="ctr"/>
+            <a:r>
+              <a:rPr lang="en-US" sz="1400" b="1" dirty="0" err="1">
+                <a:solidFill>
+                  <a:schemeClr val="bg1">
+                    <a:lumMod val="65000"/>
+                  </a:schemeClr>
+                </a:solidFill>
+              </a:rPr>
+              <a:t>Appspot</a:t>
+            </a:r>
+            <a:endParaRPr lang="en-US" sz="1400" b="1" dirty="0">
+              <a:solidFill>
+                <a:schemeClr val="bg1">
+                  <a:lumMod val="65000"/>
+                </a:schemeClr>
+              </a:solidFill>
+            </a:endParaRPr>
+          </a:p>
+        </p:txBody>
+      </p:sp>
+      <p:sp>
+        <p:nvSpPr>
+          <p:cNvPr id="81" name="Cloud 80"/>
+          <p:cNvSpPr/>
+          <p:nvPr/>
+        </p:nvSpPr>
+        <p:spPr>
+          <a:xfrm>
+            <a:off x="5476710" y="1432719"/>
+            <a:ext cx="1609890" cy="462732"/>
+          </a:xfrm>
+          <a:prstGeom prst="cloud">
+            <a:avLst/>
+          </a:prstGeom>
+          <a:solidFill>
+            <a:schemeClr val="bg1"/>
+          </a:solidFill>
+          <a:ln>
+            <a:solidFill>
+              <a:schemeClr val="bg1">
+                <a:lumMod val="85000"/>
+              </a:schemeClr>
+            </a:solidFill>
+          </a:ln>
+        </p:spPr>
+        <p:style>
+          <a:lnRef idx="2">
+            <a:schemeClr val="accent1">
+              <a:shade val="50000"/>
+            </a:schemeClr>
+          </a:lnRef>
+          <a:fillRef idx="1">
+            <a:schemeClr val="accent1"/>
+          </a:fillRef>
+          <a:effectRef idx="0">
+            <a:schemeClr val="accent1"/>
+          </a:effectRef>
+          <a:fontRef idx="minor">
+            <a:schemeClr val="lt1"/>
+          </a:fontRef>
+        </p:style>
+        <p:txBody>
+          <a:bodyPr lIns="0" rIns="0" bIns="0" rtlCol="0" anchor="ctr"/>
+          <a:lstStyle/>
+          <a:p>
+            <a:pPr algn="ctr"/>
+            <a:r>
+              <a:rPr lang="en-US" sz="1400" b="1" dirty="0" err="1" smtClean="0">
+                <a:solidFill>
+                  <a:schemeClr val="bg1">
+                    <a:lumMod val="65000"/>
+                  </a:schemeClr>
+                </a:solidFill>
+              </a:rPr>
+              <a:t>GoogleCode</a:t>
+            </a:r>
+            <a:endParaRPr lang="en-US" sz="1400" b="1" dirty="0">
+              <a:solidFill>
+                <a:schemeClr val="bg1">
+                  <a:lumMod val="65000"/>
+                </a:schemeClr>
+              </a:solidFill>
+            </a:endParaRPr>
+          </a:p>
+        </p:txBody>
+      </p:sp>
+      <p:sp>
+        <p:nvSpPr>
+          <p:cNvPr id="82" name="Cloud 81"/>
+          <p:cNvSpPr/>
+          <p:nvPr/>
+        </p:nvSpPr>
+        <p:spPr>
+          <a:xfrm>
+            <a:off x="2895600" y="1432719"/>
+            <a:ext cx="1609890" cy="462732"/>
+          </a:xfrm>
+          <a:prstGeom prst="cloud">
+            <a:avLst/>
+          </a:prstGeom>
+          <a:solidFill>
+            <a:schemeClr val="bg1"/>
+          </a:solidFill>
+          <a:ln>
+            <a:solidFill>
+              <a:schemeClr val="bg1">
+                <a:lumMod val="85000"/>
+              </a:schemeClr>
+            </a:solidFill>
+          </a:ln>
+        </p:spPr>
+        <p:style>
+          <a:lnRef idx="2">
+            <a:schemeClr val="accent1">
+              <a:shade val="50000"/>
+            </a:schemeClr>
+          </a:lnRef>
+          <a:fillRef idx="1">
+            <a:schemeClr val="accent1"/>
+          </a:fillRef>
+          <a:effectRef idx="0">
+            <a:schemeClr val="accent1"/>
+          </a:effectRef>
+          <a:fontRef idx="minor">
+            <a:schemeClr val="lt1"/>
+          </a:fontRef>
+        </p:style>
+        <p:txBody>
+          <a:bodyPr lIns="0" rIns="0" bIns="0" rtlCol="0" anchor="ctr"/>
+          <a:lstStyle/>
+          <a:p>
+            <a:pPr algn="ctr"/>
+            <a:r>
+              <a:rPr lang="en-US" sz="1400" b="1" dirty="0" err="1" smtClean="0">
+                <a:solidFill>
+                  <a:schemeClr val="bg1">
+                    <a:lumMod val="65000"/>
+                  </a:schemeClr>
+                </a:solidFill>
+              </a:rPr>
+              <a:t>GoogleCode</a:t>
+            </a:r>
+            <a:endParaRPr lang="en-US" sz="1400" b="1" dirty="0">
+              <a:solidFill>
+                <a:schemeClr val="bg1">
+                  <a:lumMod val="65000"/>
+                </a:schemeClr>
+              </a:solidFill>
+            </a:endParaRPr>
+          </a:p>
+        </p:txBody>
+      </p:sp>
+      <p:sp>
+        <p:nvSpPr>
+          <p:cNvPr id="83" name="Rounded Rectangle 82"/>
+          <p:cNvSpPr/>
+          <p:nvPr/>
+        </p:nvSpPr>
+        <p:spPr>
+          <a:xfrm>
+            <a:off x="3962400" y="3947319"/>
             <a:ext cx="5029200" cy="1737518"/>
           </a:xfrm>
           <a:prstGeom prst="roundRect">
@@ -3559,28 +3995,27 @@
       </p:sp>
       <p:sp>
         <p:nvSpPr>
-          <p:cNvPr id="58" name="Can 57"/>
+          <p:cNvPr id="84" name="Can 83"/>
           <p:cNvSpPr/>
           <p:nvPr/>
         </p:nvSpPr>
         <p:spPr>
           <a:xfrm>
-            <a:off x="2491581" y="826096"/>
-            <a:ext cx="1066800" cy="762000"/>
+            <a:off x="3200400" y="826096"/>
+            <a:ext cx="1184858" cy="762000"/>
           </a:xfrm>
           <a:prstGeom prst="can">
             <a:avLst/>
           </a:prstGeom>
           <a:solidFill>
-            <a:schemeClr val="bg1">
-              <a:lumMod val="65000"/>
+            <a:schemeClr val="accent2">
+              <a:lumMod val="60000"/>
+              <a:lumOff val="40000"/>
             </a:schemeClr>
           </a:solidFill>
           <a:ln>
             <a:solidFill>
-              <a:schemeClr val="bg1">
-                <a:lumMod val="65000"/>
-              </a:schemeClr>
+              <a:srgbClr val="D28280"/>
             </a:solidFill>
           </a:ln>
         </p:spPr>
@@ -3606,44 +4041,43 @@
           <a:p>
             <a:pPr algn="ctr"/>
             <a:r>
-              <a:rPr lang="en-US" sz="1600" b="1" dirty="0" smtClean="0"/>
-              <a:t>Review</a:t>
+              <a:rPr lang="en-US" sz="1600" b="1" dirty="0"/>
+              <a:t>Contributor</a:t>
             </a:r>
           </a:p>
           <a:p>
             <a:pPr algn="ctr"/>
             <a:r>
-              <a:rPr lang="en-US" sz="1600" dirty="0" smtClean="0"/>
+              <a:rPr lang="en-US" sz="1600" b="1" dirty="0"/>
               <a:t>Repo</a:t>
             </a:r>
-            <a:endParaRPr lang="en-US" sz="1600" dirty="0"/>
-          </a:p>
-        </p:txBody>
-      </p:sp>
-      <p:sp>
-        <p:nvSpPr>
-          <p:cNvPr id="59" name="Can 58"/>
+            <a:endParaRPr lang="en-US" sz="1600" b="1" dirty="0"/>
+          </a:p>
+        </p:txBody>
+      </p:sp>
+      <p:sp>
+        <p:nvSpPr>
+          <p:cNvPr id="85" name="Can 84"/>
           <p:cNvSpPr/>
           <p:nvPr/>
         </p:nvSpPr>
         <p:spPr>
           <a:xfrm>
-            <a:off x="4929981" y="826096"/>
-            <a:ext cx="1066800" cy="762000"/>
+            <a:off x="5853514" y="826096"/>
+            <a:ext cx="1107933" cy="762000"/>
           </a:xfrm>
           <a:prstGeom prst="can">
             <a:avLst/>
           </a:prstGeom>
           <a:solidFill>
-            <a:schemeClr val="bg1">
-              <a:lumMod val="65000"/>
+            <a:schemeClr val="accent2">
+              <a:lumMod val="60000"/>
+              <a:lumOff val="40000"/>
             </a:schemeClr>
           </a:solidFill>
           <a:ln>
             <a:solidFill>
-              <a:schemeClr val="bg1">
-                <a:lumMod val="65000"/>
-              </a:schemeClr>
+              <a:srgbClr val="D28280"/>
             </a:solidFill>
           </a:ln>
         </p:spPr>
@@ -3670,8 +4104,9 @@
             <a:pPr algn="ctr"/>
             <a:r>
               <a:rPr lang="en-US" sz="1600" b="1" dirty="0" smtClean="0"/>
-              <a:t>Release</a:t>
-            </a:r>
+              <a:t>Committer</a:t>
+            </a:r>
+            <a:endParaRPr lang="en-US" sz="1600" b="1" dirty="0" smtClean="0"/>
           </a:p>
           <a:p>
             <a:pPr algn="ctr"/>
@@ -3684,7 +4119,7 @@
       </p:sp>
       <p:pic>
         <p:nvPicPr>
-          <p:cNvPr id="2050" name="Picture 2" descr="http://screenshots.en.sftcdn.net/en/scrn/70000/70210/google-app-engine-1.jpg"/>
+          <p:cNvPr id="86" name="Picture 2" descr="http://screenshots.en.sftcdn.net/en/scrn/70000/70210/google-app-engine-1.jpg"/>
           <p:cNvPicPr>
             <a:picLocks noChangeAspect="1" noChangeArrowheads="1"/>
           </p:cNvPicPr>
@@ -3702,7 +4137,13 @@
                 </a:srgbClr>
               </a:clrTo>
             </a:clrChange>
-            <a:grayscl/>
+            <a:duotone>
+              <a:schemeClr val="accent2">
+                <a:shade val="45000"/>
+                <a:satMod val="135000"/>
+              </a:schemeClr>
+              <a:prstClr val="white"/>
+            </a:duotone>
           </a:blip>
           <a:srcRect/>
           <a:stretch>
@@ -3711,7 +4152,7 @@
         </p:blipFill>
         <p:spPr bwMode="auto">
           <a:xfrm>
-            <a:off x="7349331" y="597496"/>
+            <a:off x="8058150" y="597496"/>
             <a:ext cx="1085850" cy="1085850"/>
           </a:xfrm>
           <a:prstGeom prst="rect">
@@ -3722,13 +4163,13 @@
       </p:pic>
       <p:grpSp>
         <p:nvGrpSpPr>
-          <p:cNvPr id="65" name="Group 64"/>
+          <p:cNvPr id="87" name="Group 86"/>
           <p:cNvGrpSpPr/>
           <p:nvPr/>
         </p:nvGrpSpPr>
         <p:grpSpPr>
           <a:xfrm>
-            <a:off x="434181" y="902296"/>
+            <a:off x="304800" y="902296"/>
             <a:ext cx="304800" cy="533400"/>
             <a:chOff x="2339181" y="3718719"/>
             <a:chExt cx="304800" cy="533400"/>
@@ -3742,7 +4183,7 @@
         </p:grpSpPr>
         <p:sp>
           <p:nvSpPr>
-            <p:cNvPr id="63" name="Flowchart: Connector 62"/>
+            <p:cNvPr id="88" name="Flowchart: Connector 87"/>
             <p:cNvSpPr/>
             <p:nvPr/>
           </p:nvSpPr>
@@ -3788,7 +4229,7 @@
         </p:sp>
         <p:sp>
           <p:nvSpPr>
-            <p:cNvPr id="64" name="Flowchart: Delay 63"/>
+            <p:cNvPr id="89" name="Flowchart: Delay 88"/>
             <p:cNvSpPr/>
             <p:nvPr/>
           </p:nvSpPr>
@@ -3835,13 +4276,13 @@
       </p:grpSp>
       <p:grpSp>
         <p:nvGrpSpPr>
-          <p:cNvPr id="68" name="Group 67"/>
+          <p:cNvPr id="90" name="Group 89"/>
           <p:cNvGrpSpPr/>
           <p:nvPr/>
         </p:nvGrpSpPr>
         <p:grpSpPr>
           <a:xfrm>
-            <a:off x="2415381" y="2578696"/>
+            <a:off x="3200400" y="2847777"/>
             <a:ext cx="304800" cy="533400"/>
             <a:chOff x="2339181" y="3718719"/>
             <a:chExt cx="304800" cy="533400"/>
@@ -3849,7 +4290,7 @@
         </p:grpSpPr>
         <p:sp>
           <p:nvSpPr>
-            <p:cNvPr id="69" name="Flowchart: Connector 68"/>
+            <p:cNvPr id="91" name="Flowchart: Connector 90"/>
             <p:cNvSpPr/>
             <p:nvPr/>
           </p:nvSpPr>
@@ -3889,7 +4330,7 @@
         </p:sp>
         <p:sp>
           <p:nvSpPr>
-            <p:cNvPr id="70" name="Flowchart: Delay 69"/>
+            <p:cNvPr id="93" name="Flowchart: Delay 92"/>
             <p:cNvSpPr/>
             <p:nvPr/>
           </p:nvSpPr>
@@ -3930,13 +4371,13 @@
       </p:grpSp>
       <p:sp>
         <p:nvSpPr>
-          <p:cNvPr id="71" name="TextBox 70"/>
+          <p:cNvPr id="94" name="TextBox 93"/>
           <p:cNvSpPr txBox="1"/>
           <p:nvPr/>
         </p:nvSpPr>
         <p:spPr>
           <a:xfrm>
-            <a:off x="2110581" y="3185319"/>
+            <a:off x="2895600" y="3454400"/>
             <a:ext cx="914400" cy="340519"/>
           </a:xfrm>
           <a:prstGeom prst="roundRect">
@@ -3973,13 +4414,13 @@
       </p:sp>
       <p:grpSp>
         <p:nvGrpSpPr>
-          <p:cNvPr id="72" name="Group 71"/>
+          <p:cNvPr id="95" name="Group 94"/>
           <p:cNvGrpSpPr/>
           <p:nvPr/>
         </p:nvGrpSpPr>
         <p:grpSpPr>
           <a:xfrm>
-            <a:off x="4167981" y="2578696"/>
+            <a:off x="4953000" y="2847777"/>
             <a:ext cx="304800" cy="533400"/>
             <a:chOff x="2339181" y="3718719"/>
             <a:chExt cx="304800" cy="533400"/>
@@ -3987,7 +4428,7 @@
         </p:grpSpPr>
         <p:sp>
           <p:nvSpPr>
-            <p:cNvPr id="73" name="Flowchart: Connector 72"/>
+            <p:cNvPr id="96" name="Flowchart: Connector 95"/>
             <p:cNvSpPr/>
             <p:nvPr/>
           </p:nvSpPr>
@@ -4027,7 +4468,7 @@
         </p:sp>
         <p:sp>
           <p:nvSpPr>
-            <p:cNvPr id="74" name="Flowchart: Delay 73"/>
+            <p:cNvPr id="100" name="Flowchart: Delay 99"/>
             <p:cNvSpPr/>
             <p:nvPr/>
           </p:nvSpPr>
@@ -4068,13 +4509,13 @@
       </p:grpSp>
       <p:sp>
         <p:nvSpPr>
-          <p:cNvPr id="75" name="TextBox 74"/>
+          <p:cNvPr id="101" name="TextBox 100"/>
           <p:cNvSpPr txBox="1"/>
           <p:nvPr/>
         </p:nvSpPr>
         <p:spPr>
           <a:xfrm>
-            <a:off x="3863181" y="3185319"/>
+            <a:off x="4648200" y="3454400"/>
             <a:ext cx="1066800" cy="340519"/>
           </a:xfrm>
           <a:prstGeom prst="roundRect">
@@ -4104,13 +4545,13 @@
       </p:sp>
       <p:grpSp>
         <p:nvGrpSpPr>
-          <p:cNvPr id="76" name="Group 75"/>
+          <p:cNvPr id="104" name="Group 103"/>
           <p:cNvGrpSpPr/>
           <p:nvPr/>
         </p:nvGrpSpPr>
         <p:grpSpPr>
           <a:xfrm>
-            <a:off x="6682581" y="2578696"/>
+            <a:off x="7467600" y="2847777"/>
             <a:ext cx="304800" cy="533400"/>
             <a:chOff x="2339181" y="3718719"/>
             <a:chExt cx="304800" cy="533400"/>
@@ -4118,7 +4559,7 @@
         </p:grpSpPr>
         <p:sp>
           <p:nvSpPr>
-            <p:cNvPr id="77" name="Flowchart: Connector 76"/>
+            <p:cNvPr id="105" name="Flowchart: Connector 104"/>
             <p:cNvSpPr/>
             <p:nvPr/>
           </p:nvSpPr>
@@ -4158,7 +4599,7 @@
         </p:sp>
         <p:sp>
           <p:nvSpPr>
-            <p:cNvPr id="78" name="Flowchart: Delay 77"/>
+            <p:cNvPr id="106" name="Flowchart: Delay 105"/>
             <p:cNvSpPr/>
             <p:nvPr/>
           </p:nvSpPr>
@@ -4199,13 +4640,13 @@
       </p:grpSp>
       <p:sp>
         <p:nvSpPr>
-          <p:cNvPr id="79" name="TextBox 78"/>
+          <p:cNvPr id="108" name="TextBox 107"/>
           <p:cNvSpPr txBox="1"/>
           <p:nvPr/>
         </p:nvSpPr>
         <p:spPr>
           <a:xfrm>
-            <a:off x="6576237" y="3185319"/>
+            <a:off x="7361256" y="3454400"/>
             <a:ext cx="533400" cy="340519"/>
           </a:xfrm>
           <a:prstGeom prst="roundRect">
@@ -4237,13 +4678,13 @@
       </p:sp>
       <p:sp>
         <p:nvSpPr>
-          <p:cNvPr id="92" name="TextBox 91"/>
+          <p:cNvPr id="109" name="TextBox 108"/>
           <p:cNvSpPr txBox="1"/>
           <p:nvPr/>
         </p:nvSpPr>
         <p:spPr>
           <a:xfrm>
-            <a:off x="205581" y="1552377"/>
+            <a:off x="76200" y="1552377"/>
             <a:ext cx="533400" cy="340519"/>
           </a:xfrm>
           <a:prstGeom prst="roundRect">
@@ -4272,14 +4713,14 @@
       </p:sp>
       <p:sp>
         <p:nvSpPr>
-          <p:cNvPr id="97" name="TextBox 96"/>
+          <p:cNvPr id="110" name="TextBox 109"/>
           <p:cNvSpPr txBox="1"/>
           <p:nvPr/>
         </p:nvSpPr>
         <p:spPr>
           <a:xfrm>
-            <a:off x="738981" y="137319"/>
-            <a:ext cx="762000" cy="307777"/>
+            <a:off x="1523999" y="-15081"/>
+            <a:ext cx="1533097" cy="307777"/>
           </a:xfrm>
           <a:prstGeom prst="rect">
             <a:avLst/>
@@ -4298,7 +4739,15 @@
                   <a:srgbClr val="00B050"/>
                 </a:solidFill>
               </a:rPr>
-              <a:t>1. pull</a:t>
+              <a:t>1. </a:t>
+            </a:r>
+            <a:r>
+              <a:rPr lang="en-US" sz="1400" b="1" dirty="0" smtClean="0">
+                <a:solidFill>
+                  <a:srgbClr val="00B050"/>
+                </a:solidFill>
+              </a:rPr>
+              <a:t>pull</a:t>
             </a:r>
             <a:endParaRPr lang="en-US" sz="1400" b="1" dirty="0">
               <a:solidFill>
@@ -4310,13 +4759,13 @@
       </p:sp>
       <p:sp>
         <p:nvSpPr>
-          <p:cNvPr id="98" name="Arc 97"/>
+          <p:cNvPr id="112" name="Arc 111"/>
           <p:cNvSpPr/>
           <p:nvPr/>
         </p:nvSpPr>
         <p:spPr>
           <a:xfrm>
-            <a:off x="662781" y="978496"/>
+            <a:off x="1447800" y="978496"/>
             <a:ext cx="381000" cy="304800"/>
           </a:xfrm>
           <a:prstGeom prst="arc">
@@ -4358,13 +4807,13 @@
       </p:sp>
       <p:sp>
         <p:nvSpPr>
-          <p:cNvPr id="99" name="TextBox 98"/>
+          <p:cNvPr id="114" name="TextBox 113"/>
           <p:cNvSpPr txBox="1"/>
           <p:nvPr/>
         </p:nvSpPr>
         <p:spPr>
           <a:xfrm>
-            <a:off x="1119981" y="749896"/>
+            <a:off x="1905000" y="749896"/>
             <a:ext cx="990600" cy="646331"/>
           </a:xfrm>
           <a:prstGeom prst="rect">
@@ -4421,13 +4870,13 @@
       </p:sp>
       <p:sp>
         <p:nvSpPr>
-          <p:cNvPr id="102" name="TextBox 101"/>
+          <p:cNvPr id="127" name="TextBox 126"/>
           <p:cNvSpPr txBox="1"/>
           <p:nvPr/>
         </p:nvSpPr>
         <p:spPr>
           <a:xfrm>
-            <a:off x="1119981" y="2154238"/>
+            <a:off x="1905000" y="2619104"/>
             <a:ext cx="685800" cy="215444"/>
           </a:xfrm>
           <a:prstGeom prst="rect">
@@ -4459,13 +4908,13 @@
       </p:sp>
       <p:cxnSp>
         <p:nvCxnSpPr>
-          <p:cNvPr id="103" name="Straight Arrow Connector 102"/>
+          <p:cNvPr id="128" name="Straight Arrow Connector 127"/>
           <p:cNvCxnSpPr/>
           <p:nvPr/>
         </p:nvCxnSpPr>
         <p:spPr>
           <a:xfrm flipV="1">
-            <a:off x="2567781" y="1773238"/>
+            <a:off x="3352800" y="2042319"/>
             <a:ext cx="228600" cy="685800"/>
           </a:xfrm>
           <a:prstGeom prst="straightConnector1">
@@ -4497,13 +4946,13 @@
       </p:cxnSp>
       <p:sp>
         <p:nvSpPr>
-          <p:cNvPr id="107" name="TextBox 106"/>
+          <p:cNvPr id="129" name="TextBox 128"/>
           <p:cNvSpPr txBox="1"/>
           <p:nvPr/>
         </p:nvSpPr>
         <p:spPr>
           <a:xfrm rot="17318509">
-            <a:off x="2087118" y="1989319"/>
+            <a:off x="2872137" y="2258400"/>
             <a:ext cx="843775" cy="215444"/>
           </a:xfrm>
           <a:prstGeom prst="rect">
@@ -4539,13 +4988,13 @@
       </p:sp>
       <p:sp>
         <p:nvSpPr>
-          <p:cNvPr id="111" name="Arc 110"/>
+          <p:cNvPr id="130" name="Arc 129"/>
           <p:cNvSpPr/>
           <p:nvPr/>
         </p:nvSpPr>
         <p:spPr>
           <a:xfrm>
-            <a:off x="738981" y="216496"/>
+            <a:off x="1524000" y="216496"/>
             <a:ext cx="4419600" cy="1219200"/>
           </a:xfrm>
           <a:prstGeom prst="arc">
@@ -4587,14 +5036,14 @@
       </p:sp>
       <p:sp>
         <p:nvSpPr>
-          <p:cNvPr id="113" name="Arc 112"/>
+          <p:cNvPr id="131" name="Arc 130"/>
           <p:cNvSpPr/>
           <p:nvPr/>
         </p:nvSpPr>
         <p:spPr>
           <a:xfrm flipV="1">
-            <a:off x="815181" y="1359496"/>
-            <a:ext cx="1600200" cy="718542"/>
+            <a:off x="1563511" y="1529307"/>
+            <a:ext cx="1600200" cy="1025723"/>
           </a:xfrm>
           <a:prstGeom prst="arc">
             <a:avLst>
@@ -4635,13 +5084,13 @@
       </p:sp>
       <p:sp>
         <p:nvSpPr>
-          <p:cNvPr id="115" name="Arc 114"/>
+          <p:cNvPr id="134" name="Arc 133"/>
           <p:cNvSpPr/>
           <p:nvPr/>
         </p:nvSpPr>
         <p:spPr>
           <a:xfrm rot="2715976" flipV="1">
-            <a:off x="2998146" y="1853413"/>
+            <a:off x="3783165" y="2018071"/>
             <a:ext cx="1356586" cy="381000"/>
           </a:xfrm>
           <a:prstGeom prst="arc">
@@ -4683,13 +5132,13 @@
       </p:sp>
       <p:sp>
         <p:nvSpPr>
-          <p:cNvPr id="116" name="TextBox 115"/>
+          <p:cNvPr id="135" name="TextBox 134"/>
           <p:cNvSpPr txBox="1"/>
           <p:nvPr/>
         </p:nvSpPr>
         <p:spPr>
           <a:xfrm rot="2360287">
-            <a:off x="3177381" y="2273896"/>
+            <a:off x="3962400" y="2542977"/>
             <a:ext cx="685800" cy="215444"/>
           </a:xfrm>
           <a:prstGeom prst="rect">
@@ -4721,13 +5170,13 @@
       </p:sp>
       <p:sp>
         <p:nvSpPr>
-          <p:cNvPr id="117" name="Arc 116"/>
+          <p:cNvPr id="136" name="Arc 135"/>
           <p:cNvSpPr/>
           <p:nvPr/>
         </p:nvSpPr>
         <p:spPr>
           <a:xfrm rot="16709798">
-            <a:off x="4156356" y="2332422"/>
+            <a:off x="4941375" y="2601503"/>
             <a:ext cx="381000" cy="304800"/>
           </a:xfrm>
           <a:prstGeom prst="arc">
@@ -4773,13 +5222,13 @@
       </p:sp>
       <p:sp>
         <p:nvSpPr>
-          <p:cNvPr id="118" name="TextBox 117"/>
+          <p:cNvPr id="137" name="TextBox 136"/>
           <p:cNvSpPr txBox="1"/>
           <p:nvPr/>
         </p:nvSpPr>
         <p:spPr>
           <a:xfrm>
-            <a:off x="4091781" y="1816696"/>
+            <a:off x="4876800" y="2085777"/>
             <a:ext cx="838200" cy="430887"/>
           </a:xfrm>
           <a:prstGeom prst="rect">
@@ -4826,13 +5275,13 @@
       </p:sp>
       <p:sp>
         <p:nvSpPr>
-          <p:cNvPr id="119" name="Arc 118"/>
+          <p:cNvPr id="140" name="Arc 139"/>
           <p:cNvSpPr/>
           <p:nvPr/>
         </p:nvSpPr>
         <p:spPr>
           <a:xfrm rot="19019392" flipV="1">
-            <a:off x="4344224" y="1923378"/>
+            <a:off x="5129243" y="2088036"/>
             <a:ext cx="1356586" cy="381000"/>
           </a:xfrm>
           <a:prstGeom prst="arc">
@@ -4874,13 +5323,13 @@
       </p:sp>
       <p:sp>
         <p:nvSpPr>
-          <p:cNvPr id="120" name="TextBox 119"/>
+          <p:cNvPr id="141" name="TextBox 140"/>
           <p:cNvSpPr txBox="1"/>
           <p:nvPr/>
         </p:nvSpPr>
         <p:spPr>
           <a:xfrm rot="18996887">
-            <a:off x="5009792" y="2290249"/>
+            <a:off x="5695298" y="2559330"/>
             <a:ext cx="685800" cy="215444"/>
           </a:xfrm>
           <a:prstGeom prst="rect">
@@ -4912,13 +5361,13 @@
       </p:sp>
       <p:sp>
         <p:nvSpPr>
-          <p:cNvPr id="121" name="Arc 120"/>
+          <p:cNvPr id="142" name="Arc 141"/>
           <p:cNvSpPr/>
           <p:nvPr/>
         </p:nvSpPr>
         <p:spPr>
           <a:xfrm rot="2715976" flipV="1">
-            <a:off x="5515779" y="1794935"/>
+            <a:off x="6300798" y="1959593"/>
             <a:ext cx="1356586" cy="381000"/>
           </a:xfrm>
           <a:prstGeom prst="arc">
@@ -4960,13 +5409,13 @@
       </p:sp>
       <p:sp>
         <p:nvSpPr>
-          <p:cNvPr id="122" name="TextBox 121"/>
+          <p:cNvPr id="143" name="TextBox 142"/>
           <p:cNvSpPr txBox="1"/>
           <p:nvPr/>
         </p:nvSpPr>
         <p:spPr>
           <a:xfrm rot="1991192">
-            <a:off x="5695014" y="2215418"/>
+            <a:off x="6480033" y="2484499"/>
             <a:ext cx="685800" cy="215444"/>
           </a:xfrm>
           <a:prstGeom prst="rect">
@@ -4998,13 +5447,13 @@
       </p:sp>
       <p:sp>
         <p:nvSpPr>
-          <p:cNvPr id="123" name="Arc 122"/>
+          <p:cNvPr id="148" name="Arc 147"/>
           <p:cNvSpPr/>
           <p:nvPr/>
         </p:nvSpPr>
         <p:spPr>
           <a:xfrm rot="16709798">
-            <a:off x="6673989" y="2273944"/>
+            <a:off x="7459008" y="2543025"/>
             <a:ext cx="381000" cy="304800"/>
           </a:xfrm>
           <a:prstGeom prst="arc">
@@ -5046,13 +5495,13 @@
       </p:sp>
       <p:sp>
         <p:nvSpPr>
-          <p:cNvPr id="124" name="TextBox 123"/>
+          <p:cNvPr id="149" name="TextBox 148"/>
           <p:cNvSpPr txBox="1"/>
           <p:nvPr/>
         </p:nvSpPr>
         <p:spPr>
           <a:xfrm>
-            <a:off x="6609414" y="1969096"/>
+            <a:off x="7394433" y="2238177"/>
             <a:ext cx="835167" cy="215444"/>
           </a:xfrm>
           <a:prstGeom prst="rect">
@@ -5084,13 +5533,13 @@
       </p:sp>
       <p:sp>
         <p:nvSpPr>
-          <p:cNvPr id="125" name="Arc 124"/>
+          <p:cNvPr id="151" name="Arc 150"/>
           <p:cNvSpPr/>
           <p:nvPr/>
         </p:nvSpPr>
         <p:spPr>
           <a:xfrm rot="19019392" flipV="1">
-            <a:off x="6861857" y="1864900"/>
+            <a:off x="7646876" y="2029558"/>
             <a:ext cx="1356586" cy="381000"/>
           </a:xfrm>
           <a:prstGeom prst="arc">
@@ -5132,13 +5581,13 @@
       </p:sp>
       <p:sp>
         <p:nvSpPr>
-          <p:cNvPr id="126" name="TextBox 125"/>
+          <p:cNvPr id="152" name="TextBox 151"/>
           <p:cNvSpPr txBox="1"/>
           <p:nvPr/>
         </p:nvSpPr>
         <p:spPr>
           <a:xfrm rot="18996887">
-            <a:off x="7506125" y="2178227"/>
+            <a:off x="8291144" y="2447308"/>
             <a:ext cx="841701" cy="215444"/>
           </a:xfrm>
           <a:prstGeom prst="rect">
@@ -5170,13 +5619,13 @@
       </p:sp>
       <p:sp>
         <p:nvSpPr>
-          <p:cNvPr id="132" name="Freeform 131"/>
+          <p:cNvPr id="153" name="Freeform 152"/>
           <p:cNvSpPr/>
           <p:nvPr/>
         </p:nvSpPr>
         <p:spPr>
           <a:xfrm>
-            <a:off x="944545" y="423418"/>
+            <a:off x="1729564" y="423418"/>
             <a:ext cx="3959051" cy="1273620"/>
           </a:xfrm>
           <a:custGeom>
@@ -5304,13 +5753,13 @@
       </p:sp>
       <p:sp>
         <p:nvSpPr>
-          <p:cNvPr id="133" name="TextBox 132"/>
+          <p:cNvPr id="155" name="TextBox 154"/>
           <p:cNvSpPr txBox="1"/>
           <p:nvPr/>
         </p:nvSpPr>
         <p:spPr>
           <a:xfrm>
-            <a:off x="1119981" y="1697038"/>
+            <a:off x="1905000" y="1697038"/>
             <a:ext cx="838200" cy="215444"/>
           </a:xfrm>
           <a:prstGeom prst="rect">
@@ -5330,7 +5779,15 @@
                   <a:srgbClr val="00B050"/>
                 </a:solidFill>
               </a:rPr>
-              <a:t>3.1 update</a:t>
+              <a:t>3.1 </a:t>
+            </a:r>
+            <a:r>
+              <a:rPr lang="en-US" sz="1400" b="1" dirty="0" smtClean="0">
+                <a:solidFill>
+                  <a:srgbClr val="00B050"/>
+                </a:solidFill>
+              </a:rPr>
+              <a:t>pull</a:t>
             </a:r>
             <a:endParaRPr lang="en-US" sz="1400" b="1" dirty="0">
               <a:solidFill>
@@ -5342,13 +5799,13 @@
       </p:sp>
       <p:cxnSp>
         <p:nvCxnSpPr>
-          <p:cNvPr id="138" name="Straight Connector 137"/>
+          <p:cNvPr id="156" name="Straight Connector 155"/>
           <p:cNvCxnSpPr/>
           <p:nvPr/>
         </p:nvCxnSpPr>
         <p:spPr>
           <a:xfrm>
-            <a:off x="4548981" y="5275460"/>
+            <a:off x="5029200" y="5275460"/>
             <a:ext cx="3657600" cy="0"/>
           </a:xfrm>
           <a:prstGeom prst="line">
@@ -5380,13 +5837,13 @@
       </p:cxnSp>
       <p:sp>
         <p:nvSpPr>
-          <p:cNvPr id="139" name="Flowchart: Connector 138"/>
+          <p:cNvPr id="157" name="Flowchart: Connector 156"/>
           <p:cNvSpPr/>
           <p:nvPr/>
         </p:nvSpPr>
         <p:spPr>
           <a:xfrm>
-            <a:off x="5082382" y="5199260"/>
+            <a:off x="5562601" y="5199260"/>
             <a:ext cx="152400" cy="152400"/>
           </a:xfrm>
           <a:prstGeom prst="flowChartConnector">
@@ -5432,13 +5889,13 @@
       </p:sp>
       <p:sp>
         <p:nvSpPr>
-          <p:cNvPr id="144" name="Flowchart: Connector 143"/>
+          <p:cNvPr id="159" name="Flowchart: Connector 158"/>
           <p:cNvSpPr/>
           <p:nvPr/>
         </p:nvSpPr>
         <p:spPr>
           <a:xfrm>
-            <a:off x="7673181" y="5199260"/>
+            <a:off x="8153400" y="5199260"/>
             <a:ext cx="152400" cy="152400"/>
           </a:xfrm>
           <a:prstGeom prst="flowChartConnector">
@@ -5472,13 +5929,13 @@
       </p:sp>
       <p:sp>
         <p:nvSpPr>
-          <p:cNvPr id="145" name="Flowchart: Connector 144"/>
+          <p:cNvPr id="161" name="Flowchart: Connector 160"/>
           <p:cNvSpPr/>
           <p:nvPr/>
         </p:nvSpPr>
         <p:spPr>
           <a:xfrm>
-            <a:off x="6453981" y="5199260"/>
+            <a:off x="6934200" y="5199260"/>
             <a:ext cx="152400" cy="152400"/>
           </a:xfrm>
           <a:prstGeom prst="flowChartConnector">
@@ -5524,13 +5981,13 @@
       </p:sp>
       <p:sp>
         <p:nvSpPr>
-          <p:cNvPr id="146" name="Flowchart: Connector 145"/>
+          <p:cNvPr id="162" name="Flowchart: Connector 161"/>
           <p:cNvSpPr/>
           <p:nvPr/>
         </p:nvSpPr>
         <p:spPr>
           <a:xfrm>
-            <a:off x="6834981" y="4589660"/>
+            <a:off x="7315200" y="4589660"/>
             <a:ext cx="152400" cy="152400"/>
           </a:xfrm>
           <a:prstGeom prst="flowChartConnector">
@@ -5575,13 +6032,13 @@
       </p:sp>
       <p:sp>
         <p:nvSpPr>
-          <p:cNvPr id="147" name="Flowchart: Connector 146"/>
+          <p:cNvPr id="164" name="Flowchart: Connector 163"/>
           <p:cNvSpPr/>
           <p:nvPr/>
         </p:nvSpPr>
         <p:spPr>
           <a:xfrm>
-            <a:off x="5615782" y="4589660"/>
+            <a:off x="6096001" y="4589660"/>
             <a:ext cx="152400" cy="152400"/>
           </a:xfrm>
           <a:prstGeom prst="flowChartConnector">
@@ -5626,16 +6083,16 @@
       </p:sp>
       <p:cxnSp>
         <p:nvCxnSpPr>
-          <p:cNvPr id="150" name="Shape 149"/>
+          <p:cNvPr id="167" name="Shape 149"/>
           <p:cNvCxnSpPr>
-            <a:stCxn id="139" idx="0"/>
-            <a:endCxn id="147" idx="2"/>
+            <a:stCxn id="157" idx="0"/>
+            <a:endCxn id="164" idx="2"/>
           </p:cNvCxnSpPr>
           <p:nvPr/>
         </p:nvCxnSpPr>
         <p:spPr>
           <a:xfrm rot="5400000" flipH="1" flipV="1">
-            <a:off x="5120482" y="4703960"/>
+            <a:off x="5600701" y="4703960"/>
             <a:ext cx="533400" cy="457200"/>
           </a:xfrm>
           <a:prstGeom prst="curvedConnector2">
@@ -5666,16 +6123,16 @@
       </p:cxnSp>
       <p:cxnSp>
         <p:nvCxnSpPr>
-          <p:cNvPr id="154" name="Shape 153"/>
+          <p:cNvPr id="169" name="Shape 153"/>
           <p:cNvCxnSpPr>
-            <a:stCxn id="146" idx="6"/>
-            <a:endCxn id="144" idx="1"/>
+            <a:stCxn id="162" idx="6"/>
+            <a:endCxn id="159" idx="1"/>
           </p:cNvCxnSpPr>
           <p:nvPr/>
         </p:nvCxnSpPr>
         <p:spPr>
           <a:xfrm>
-            <a:off x="6987381" y="4665860"/>
+            <a:off x="7467600" y="4665860"/>
             <a:ext cx="708118" cy="555718"/>
           </a:xfrm>
           <a:prstGeom prst="curvedConnector2">
@@ -5706,16 +6163,16 @@
       </p:cxnSp>
       <p:cxnSp>
         <p:nvCxnSpPr>
-          <p:cNvPr id="158" name="Straight Arrow Connector 157"/>
+          <p:cNvPr id="171" name="Straight Arrow Connector 170"/>
           <p:cNvCxnSpPr>
-            <a:stCxn id="147" idx="6"/>
-            <a:endCxn id="146" idx="2"/>
+            <a:stCxn id="164" idx="6"/>
+            <a:endCxn id="162" idx="2"/>
           </p:cNvCxnSpPr>
           <p:nvPr/>
         </p:nvCxnSpPr>
         <p:spPr>
           <a:xfrm>
-            <a:off x="5768182" y="4665860"/>
+            <a:off x="6248401" y="4665860"/>
             <a:ext cx="1066799" cy="0"/>
           </a:xfrm>
           <a:prstGeom prst="straightConnector1">
@@ -5746,16 +6203,16 @@
       </p:cxnSp>
       <p:cxnSp>
         <p:nvCxnSpPr>
-          <p:cNvPr id="160" name="Curved Connector 159"/>
+          <p:cNvPr id="172" name="Curved Connector 171"/>
           <p:cNvCxnSpPr>
-            <a:stCxn id="145" idx="7"/>
-            <a:endCxn id="146" idx="4"/>
+            <a:stCxn id="161" idx="7"/>
+            <a:endCxn id="162" idx="4"/>
           </p:cNvCxnSpPr>
           <p:nvPr/>
         </p:nvCxnSpPr>
         <p:spPr>
           <a:xfrm rot="5400000" flipH="1" flipV="1">
-            <a:off x="6507863" y="4818260"/>
+            <a:off x="6988082" y="4818260"/>
             <a:ext cx="479518" cy="327118"/>
           </a:xfrm>
           <a:prstGeom prst="curvedConnector3">
@@ -5789,13 +6246,13 @@
       </p:cxnSp>
       <p:sp>
         <p:nvSpPr>
-          <p:cNvPr id="163" name="TextBox 162"/>
+          <p:cNvPr id="174" name="TextBox 173"/>
           <p:cNvSpPr txBox="1"/>
           <p:nvPr/>
         </p:nvSpPr>
         <p:spPr>
           <a:xfrm rot="18268321">
-            <a:off x="4662895" y="4608370"/>
+            <a:off x="5143114" y="4608370"/>
             <a:ext cx="762000" cy="307777"/>
           </a:xfrm>
           <a:prstGeom prst="rect">
@@ -5827,13 +6284,13 @@
       </p:sp>
       <p:sp>
         <p:nvSpPr>
-          <p:cNvPr id="165" name="TextBox 164"/>
+          <p:cNvPr id="175" name="TextBox 174"/>
           <p:cNvSpPr txBox="1"/>
           <p:nvPr/>
         </p:nvSpPr>
         <p:spPr>
           <a:xfrm rot="2419831">
-            <a:off x="7273198" y="4522254"/>
+            <a:off x="7753417" y="4522254"/>
             <a:ext cx="762000" cy="307777"/>
           </a:xfrm>
           <a:prstGeom prst="rect">
@@ -5865,13 +6322,13 @@
       </p:sp>
       <p:sp>
         <p:nvSpPr>
-          <p:cNvPr id="166" name="TextBox 165"/>
+          <p:cNvPr id="176" name="TextBox 175"/>
           <p:cNvSpPr txBox="1"/>
           <p:nvPr/>
         </p:nvSpPr>
         <p:spPr>
           <a:xfrm>
-            <a:off x="5768181" y="4056260"/>
+            <a:off x="6248400" y="4056260"/>
             <a:ext cx="1295400" cy="523220"/>
           </a:xfrm>
           <a:prstGeom prst="rect">
@@ -5915,13 +6372,13 @@
       </p:sp>
       <p:sp>
         <p:nvSpPr>
-          <p:cNvPr id="168" name="TextBox 167"/>
+          <p:cNvPr id="177" name="TextBox 176"/>
           <p:cNvSpPr txBox="1"/>
           <p:nvPr/>
         </p:nvSpPr>
         <p:spPr>
           <a:xfrm>
-            <a:off x="5920581" y="4815283"/>
+            <a:off x="6355855" y="4858742"/>
             <a:ext cx="762000" cy="307777"/>
           </a:xfrm>
           <a:prstGeom prst="rect">
@@ -5935,13 +6392,14 @@
           </a:bodyPr>
           <a:lstStyle/>
           <a:p>
+            <a:pPr algn="r"/>
             <a:r>
               <a:rPr lang="en-US" sz="1400" b="1" dirty="0" smtClean="0">
                 <a:solidFill>
                   <a:srgbClr val="00B050"/>
                 </a:solidFill>
               </a:rPr>
-              <a:t>update</a:t>
+              <a:t>pull</a:t>
             </a:r>
             <a:endParaRPr lang="en-US" sz="1400" b="1" dirty="0">
               <a:solidFill>
@@ -5953,13 +6411,13 @@
       </p:sp>
       <p:sp>
         <p:nvSpPr>
-          <p:cNvPr id="170" name="TextBox 169"/>
+          <p:cNvPr id="178" name="TextBox 177"/>
           <p:cNvSpPr txBox="1"/>
           <p:nvPr/>
         </p:nvSpPr>
         <p:spPr>
           <a:xfrm>
-            <a:off x="3786981" y="4970660"/>
+            <a:off x="4267200" y="4970660"/>
             <a:ext cx="762000" cy="523220"/>
           </a:xfrm>
           <a:prstGeom prst="rect">
@@ -6012,10 +6470,152 @@
           </a:p>
         </p:txBody>
       </p:sp>
+      <p:cxnSp>
+        <p:nvCxnSpPr>
+          <p:cNvPr id="179" name="Straight Arrow Connector 178"/>
+          <p:cNvCxnSpPr/>
+          <p:nvPr/>
+        </p:nvCxnSpPr>
+        <p:spPr>
+          <a:xfrm flipH="1">
+            <a:off x="4572000" y="1328598"/>
+            <a:ext cx="914400" cy="0"/>
+          </a:xfrm>
+          <a:prstGeom prst="straightConnector1">
+            <a:avLst/>
+          </a:prstGeom>
+          <a:ln w="28575">
+            <a:solidFill>
+              <a:schemeClr val="bg1">
+                <a:lumMod val="65000"/>
+              </a:schemeClr>
+            </a:solidFill>
+            <a:tailEnd type="triangle"/>
+          </a:ln>
+        </p:spPr>
+        <p:style>
+          <a:lnRef idx="1">
+            <a:schemeClr val="accent1"/>
+          </a:lnRef>
+          <a:fillRef idx="0">
+            <a:schemeClr val="accent1"/>
+          </a:fillRef>
+          <a:effectRef idx="0">
+            <a:schemeClr val="accent1"/>
+          </a:effectRef>
+          <a:fontRef idx="minor">
+            <a:schemeClr val="tx1"/>
+          </a:fontRef>
+        </p:style>
+      </p:cxnSp>
+      <p:sp>
+        <p:nvSpPr>
+          <p:cNvPr id="180" name="TextBox 179"/>
+          <p:cNvSpPr txBox="1"/>
+          <p:nvPr/>
+        </p:nvSpPr>
+        <p:spPr>
+          <a:xfrm>
+            <a:off x="4385258" y="975519"/>
+            <a:ext cx="1482143" cy="307777"/>
+          </a:xfrm>
+          <a:prstGeom prst="rect">
+            <a:avLst/>
+          </a:prstGeom>
+          <a:noFill/>
+        </p:spPr>
+        <p:txBody>
+          <a:bodyPr wrap="square" rtlCol="0">
+            <a:spAutoFit/>
+          </a:bodyPr>
+          <a:lstStyle/>
+          <a:p>
+            <a:r>
+              <a:rPr lang="en-US" sz="1400" b="1" dirty="0" smtClean="0">
+                <a:solidFill>
+                  <a:schemeClr val="bg1">
+                    <a:lumMod val="65000"/>
+                  </a:schemeClr>
+                </a:solidFill>
+              </a:rPr>
+              <a:t>server-side clone</a:t>
+            </a:r>
+            <a:endParaRPr lang="en-US" sz="1400" b="1" dirty="0">
+              <a:solidFill>
+                <a:schemeClr val="bg1">
+                  <a:lumMod val="65000"/>
+                </a:schemeClr>
+              </a:solidFill>
+            </a:endParaRPr>
+          </a:p>
+        </p:txBody>
+      </p:sp>
+      <p:sp>
+        <p:nvSpPr>
+          <p:cNvPr id="181" name="Can 180"/>
+          <p:cNvSpPr/>
+          <p:nvPr/>
+        </p:nvSpPr>
+        <p:spPr>
+          <a:xfrm>
+            <a:off x="805543" y="902296"/>
+            <a:ext cx="685800" cy="650081"/>
+          </a:xfrm>
+          <a:prstGeom prst="can">
+            <a:avLst/>
+          </a:prstGeom>
+          <a:solidFill>
+            <a:schemeClr val="accent2">
+              <a:lumMod val="60000"/>
+              <a:lumOff val="40000"/>
+            </a:schemeClr>
+          </a:solidFill>
+          <a:ln>
+            <a:solidFill>
+              <a:srgbClr val="D28280"/>
+            </a:solidFill>
+          </a:ln>
+        </p:spPr>
+        <p:style>
+          <a:lnRef idx="2">
+            <a:schemeClr val="accent1">
+              <a:shade val="50000"/>
+            </a:schemeClr>
+          </a:lnRef>
+          <a:fillRef idx="1">
+            <a:schemeClr val="accent1"/>
+          </a:fillRef>
+          <a:effectRef idx="0">
+            <a:schemeClr val="accent1"/>
+          </a:effectRef>
+          <a:fontRef idx="minor">
+            <a:schemeClr val="lt1"/>
+          </a:fontRef>
+        </p:style>
+        <p:txBody>
+          <a:bodyPr rtlCol="0" anchor="ctr"/>
+          <a:lstStyle/>
+          <a:p>
+            <a:pPr algn="ctr"/>
+            <a:r>
+              <a:rPr lang="en-US" sz="1600" b="1" dirty="0"/>
+              <a:t>Local</a:t>
+            </a:r>
+          </a:p>
+          <a:p>
+            <a:pPr algn="ctr"/>
+            <a:r>
+              <a:rPr lang="en-US" sz="1600" b="1" dirty="0"/>
+              <a:t>Repo</a:t>
+            </a:r>
+            <a:endParaRPr lang="en-US" sz="1600" b="1" dirty="0"/>
+          </a:p>
+        </p:txBody>
+      </p:sp>
     </p:spTree>
     <p:extLst>
       <p:ext uri="{BB962C8B-B14F-4D97-AF65-F5344CB8AC3E}">
-        <p14:creationId xmlns:p14="http://schemas.microsoft.com/office/powerpoint/2010/main" xmlns="" val="2312643091"/>
+        <p14:creationId xmlns:p14="http://schemas.microsoft.com/office/powerpoint/2010/main" val="2312643091"/>
       </p:ext>
     </p:extLst>
   </p:cSld>

</xml_diff>